<commit_message>
wohoo done with report
</commit_message>
<xml_diff>
--- a/images/code_diagrams.pptx
+++ b/images/code_diagrams.pptx
@@ -106,6 +106,11 @@
       </a:defRPr>
     </a:lvl9pPr>
   </p:defaultTextStyle>
+  <p:extLst>
+    <p:ext uri="{EFAFB233-063F-42B5-8137-9DF3F51BA10A}">
+      <p15:sldGuideLst xmlns:p15="http://schemas.microsoft.com/office/powerpoint/2012/main"/>
+    </p:ext>
+  </p:extLst>
 </p:presentation>
 </file>
 
@@ -2713,7 +2718,7 @@
 <file path=ppt/diagrams/data2.xml><?xml version="1.0" encoding="utf-8"?>
 <dgm:dataModel xmlns:dgm="http://schemas.openxmlformats.org/drawingml/2006/diagram" xmlns:a="http://schemas.openxmlformats.org/drawingml/2006/main">
   <dgm:ptLst>
-    <dgm:pt modelId="{F0F87F6D-4F65-4D13-A8E4-A6853B1EF6AD}" type="doc">
+    <dgm:pt modelId="{7A78EEB3-6DED-420D-98DD-45CEC9E033D8}" type="doc">
       <dgm:prSet loTypeId="urn:microsoft.com/office/officeart/2008/layout/CircleAccentTimeline" loCatId="process" qsTypeId="urn:microsoft.com/office/officeart/2005/8/quickstyle/simple1" qsCatId="simple" csTypeId="urn:microsoft.com/office/officeart/2005/8/colors/colorful4" csCatId="colorful" phldr="1"/>
       <dgm:spPr/>
       <dgm:t>
@@ -2724,7 +2729,7 @@
         </a:p>
       </dgm:t>
     </dgm:pt>
-    <dgm:pt modelId="{45D78C88-24C5-4C14-BA2F-3B03F3B2EF4E}">
+    <dgm:pt modelId="{23597617-2E56-4878-9915-90066F9776E3}">
       <dgm:prSet phldrT="[Text]" custT="1"/>
       <dgm:spPr/>
       <dgm:t>
@@ -2745,7 +2750,7 @@
         </a:p>
       </dgm:t>
     </dgm:pt>
-    <dgm:pt modelId="{D9F37008-52A4-4904-B345-3367889E0E3A}" type="parTrans" cxnId="{534ABED9-DE67-4396-B86F-67F11D868B55}">
+    <dgm:pt modelId="{3684D4E9-78C9-4921-99EC-44BCA4B75BA6}" type="sibTrans" cxnId="{5146E3AA-AFDF-442C-9DB7-62CF80F05169}">
       <dgm:prSet/>
       <dgm:spPr/>
       <dgm:t>
@@ -2756,7 +2761,7 @@
         </a:p>
       </dgm:t>
     </dgm:pt>
-    <dgm:pt modelId="{F167DC11-2313-4B88-BE12-5E363D5AA8AE}" type="sibTrans" cxnId="{534ABED9-DE67-4396-B86F-67F11D868B55}">
+    <dgm:pt modelId="{5FE6FF4A-4777-4AE0-AFE4-00D2926951D5}" type="parTrans" cxnId="{5146E3AA-AFDF-442C-9DB7-62CF80F05169}">
       <dgm:prSet/>
       <dgm:spPr/>
       <dgm:t>
@@ -2767,7 +2772,7 @@
         </a:p>
       </dgm:t>
     </dgm:pt>
-    <dgm:pt modelId="{03101640-68C5-4728-95FE-C8A4350669A5}">
+    <dgm:pt modelId="{9568C8F3-6E8E-43FB-85D2-16AEFA52FC52}">
       <dgm:prSet phldrT="[Text]" custT="1"/>
       <dgm:spPr/>
       <dgm:t>
@@ -2775,14 +2780,14 @@
         <a:lstStyle/>
         <a:p>
           <a:r>
-            <a:rPr lang="en-GB" sz="1600" dirty="0" smtClean="0"/>
+            <a:rPr lang="en-GB" sz="1800" dirty="0" smtClean="0"/>
             <a:t>Filenames, index</a:t>
           </a:r>
-          <a:endParaRPr lang="en-GB" sz="1600" dirty="0"/>
+          <a:endParaRPr lang="en-GB" sz="1800" dirty="0"/>
         </a:p>
       </dgm:t>
     </dgm:pt>
-    <dgm:pt modelId="{39FEEF07-1D0F-46E6-990F-1664E3B3B9B4}" type="parTrans" cxnId="{FF8208E2-ED7F-4580-A4D4-DD37FD315DB4}">
+    <dgm:pt modelId="{FFE19F8A-67B0-4278-87D4-2777CFE9A555}" type="parTrans" cxnId="{5CDE87D6-97E2-4C42-BBB2-E84073A9B22C}">
       <dgm:prSet/>
       <dgm:spPr/>
       <dgm:t>
@@ -2793,7 +2798,7 @@
         </a:p>
       </dgm:t>
     </dgm:pt>
-    <dgm:pt modelId="{67124F03-9780-4589-9351-C03DE250B390}" type="sibTrans" cxnId="{FF8208E2-ED7F-4580-A4D4-DD37FD315DB4}">
+    <dgm:pt modelId="{9E5A15E9-771A-486A-A40B-7D5D6AD9F1B3}" type="sibTrans" cxnId="{5CDE87D6-97E2-4C42-BBB2-E84073A9B22C}">
       <dgm:prSet/>
       <dgm:spPr/>
       <dgm:t>
@@ -2804,7 +2809,44 @@
         </a:p>
       </dgm:t>
     </dgm:pt>
-    <dgm:pt modelId="{AA1F47CE-D52E-44B1-9A6B-2F421FCC85E1}">
+    <dgm:pt modelId="{A3D9B79B-0425-435E-87EF-64AB524FC556}">
+      <dgm:prSet phldrT="[Text]" custT="1"/>
+      <dgm:spPr/>
+      <dgm:t>
+        <a:bodyPr/>
+        <a:lstStyle/>
+        <a:p>
+          <a:r>
+            <a:rPr lang="en-GB" sz="1800" dirty="0" smtClean="0"/>
+            <a:t>Image array</a:t>
+          </a:r>
+          <a:endParaRPr lang="en-GB" sz="1800" dirty="0"/>
+        </a:p>
+      </dgm:t>
+    </dgm:pt>
+    <dgm:pt modelId="{23EE9AB1-FC21-449E-B725-17638B0AF4B2}" type="parTrans" cxnId="{603F85FF-8233-46A4-8293-24487C43613F}">
+      <dgm:prSet/>
+      <dgm:spPr/>
+      <dgm:t>
+        <a:bodyPr/>
+        <a:lstStyle/>
+        <a:p>
+          <a:endParaRPr lang="en-GB"/>
+        </a:p>
+      </dgm:t>
+    </dgm:pt>
+    <dgm:pt modelId="{B6CD6E2D-401C-49C0-BC73-D5A8EAD4CBE7}" type="sibTrans" cxnId="{603F85FF-8233-46A4-8293-24487C43613F}">
+      <dgm:prSet/>
+      <dgm:spPr/>
+      <dgm:t>
+        <a:bodyPr/>
+        <a:lstStyle/>
+        <a:p>
+          <a:endParaRPr lang="en-GB"/>
+        </a:p>
+      </dgm:t>
+    </dgm:pt>
+    <dgm:pt modelId="{201FEB28-DDBC-4589-9C37-26D28715B70F}">
       <dgm:prSet phldrT="[Text]" custT="1"/>
       <dgm:spPr/>
       <dgm:t>
@@ -2825,7 +2867,7 @@
         </a:p>
       </dgm:t>
     </dgm:pt>
-    <dgm:pt modelId="{605E0662-E1A5-4D43-A521-3D36893F8392}" type="parTrans" cxnId="{8E1267B6-E7FB-4487-83B3-84136C0682AC}">
+    <dgm:pt modelId="{3B0AD1DE-033C-486A-AF50-EE552684146D}" type="parTrans" cxnId="{848E6BF0-969E-44A3-9FCB-06ABE1D1AB7D}">
       <dgm:prSet/>
       <dgm:spPr/>
       <dgm:t>
@@ -2836,7 +2878,7 @@
         </a:p>
       </dgm:t>
     </dgm:pt>
-    <dgm:pt modelId="{D0021959-7147-481A-97FB-2C4482611FB1}" type="sibTrans" cxnId="{8E1267B6-E7FB-4487-83B3-84136C0682AC}">
+    <dgm:pt modelId="{7BF1AE38-E401-4544-A16D-F5FBCBE011F9}" type="sibTrans" cxnId="{848E6BF0-969E-44A3-9FCB-06ABE1D1AB7D}">
       <dgm:prSet/>
       <dgm:spPr/>
       <dgm:t>
@@ -2847,7 +2889,7 @@
         </a:p>
       </dgm:t>
     </dgm:pt>
-    <dgm:pt modelId="{EF12AC74-949B-49AF-9227-763FD769DE71}">
+    <dgm:pt modelId="{2FD8BA84-DAF8-44CD-8405-FCABFBD0F7EC}">
       <dgm:prSet phldrT="[Text]" custT="1"/>
       <dgm:spPr/>
       <dgm:t>
@@ -2855,14 +2897,14 @@
         <a:lstStyle/>
         <a:p>
           <a:r>
-            <a:rPr lang="en-GB" sz="1600" dirty="0" smtClean="0"/>
+            <a:rPr lang="en-GB" sz="1800" dirty="0" smtClean="0"/>
             <a:t>Image array</a:t>
           </a:r>
-          <a:endParaRPr lang="en-GB" sz="1600" dirty="0"/>
+          <a:endParaRPr lang="en-GB" sz="1800" dirty="0"/>
         </a:p>
       </dgm:t>
     </dgm:pt>
-    <dgm:pt modelId="{2247D31D-3A16-40C8-A656-2AEAE5DEA193}" type="parTrans" cxnId="{7DCB6F39-EA05-43AC-B786-E315D8EA9C70}">
+    <dgm:pt modelId="{B5A3FEBA-1A40-4E40-B872-2A1AE29ABD51}" type="parTrans" cxnId="{7609F8FF-350A-4999-866D-7A46779D6876}">
       <dgm:prSet/>
       <dgm:spPr/>
       <dgm:t>
@@ -2873,7 +2915,7 @@
         </a:p>
       </dgm:t>
     </dgm:pt>
-    <dgm:pt modelId="{2E9D9464-13CF-4D47-A512-DB1CDA94F992}" type="sibTrans" cxnId="{7DCB6F39-EA05-43AC-B786-E315D8EA9C70}">
+    <dgm:pt modelId="{C270664F-BB7C-4905-8DAA-E1A22AE79A24}" type="sibTrans" cxnId="{7609F8FF-350A-4999-866D-7A46779D6876}">
       <dgm:prSet/>
       <dgm:spPr/>
       <dgm:t>
@@ -2884,7 +2926,7 @@
         </a:p>
       </dgm:t>
     </dgm:pt>
-    <dgm:pt modelId="{4863C0E4-95C8-4147-A53C-79ECEE76910D}">
+    <dgm:pt modelId="{A34E0275-88B4-48C3-A324-57E923D2BD58}">
       <dgm:prSet phldrT="[Text]" custT="1"/>
       <dgm:spPr/>
       <dgm:t>
@@ -2892,14 +2934,14 @@
         <a:lstStyle/>
         <a:p>
           <a:r>
-            <a:rPr lang="en-GB" sz="1600" dirty="0" smtClean="0"/>
+            <a:rPr lang="en-GB" sz="1800" dirty="0" smtClean="0"/>
             <a:t>Image array</a:t>
           </a:r>
-          <a:endParaRPr lang="en-GB" sz="1600" dirty="0"/>
+          <a:endParaRPr lang="en-GB" sz="1800" dirty="0"/>
         </a:p>
       </dgm:t>
     </dgm:pt>
-    <dgm:pt modelId="{29A05584-376D-4408-8AE8-03AC4501D8D9}" type="parTrans" cxnId="{DEFD74E2-09B3-4BB9-A3BA-E6E87341C424}">
+    <dgm:pt modelId="{D3FD84C9-04F1-4244-8FE5-31251E98EC1F}" type="parTrans" cxnId="{E736CC99-88B0-451C-9D13-EE65DDE6BB59}">
       <dgm:prSet/>
       <dgm:spPr/>
       <dgm:t>
@@ -2910,7 +2952,7 @@
         </a:p>
       </dgm:t>
     </dgm:pt>
-    <dgm:pt modelId="{CF2BA0BB-27DD-4581-8940-BEEEC5D7A119}" type="sibTrans" cxnId="{DEFD74E2-09B3-4BB9-A3BA-E6E87341C424}">
+    <dgm:pt modelId="{F9FDE683-2CEF-4C77-A2E7-563ABB7A9A5A}" type="sibTrans" cxnId="{E736CC99-88B0-451C-9D13-EE65DDE6BB59}">
       <dgm:prSet/>
       <dgm:spPr/>
       <dgm:t>
@@ -2921,44 +2963,7 @@
         </a:p>
       </dgm:t>
     </dgm:pt>
-    <dgm:pt modelId="{F3DE65EB-FE54-4BAB-833C-44BDC0E2E37A}">
-      <dgm:prSet phldrT="[Text]" custT="1"/>
-      <dgm:spPr/>
-      <dgm:t>
-        <a:bodyPr/>
-        <a:lstStyle/>
-        <a:p>
-          <a:r>
-            <a:rPr lang="en-GB" sz="1600" dirty="0" smtClean="0"/>
-            <a:t>Image array</a:t>
-          </a:r>
-          <a:endParaRPr lang="en-GB" sz="1600" dirty="0"/>
-        </a:p>
-      </dgm:t>
-    </dgm:pt>
-    <dgm:pt modelId="{61806595-60D0-434A-9D91-FEACF3516096}" type="sibTrans" cxnId="{7342034A-DE23-4A24-A28F-A3D0F048E4D9}">
-      <dgm:prSet/>
-      <dgm:spPr/>
-      <dgm:t>
-        <a:bodyPr/>
-        <a:lstStyle/>
-        <a:p>
-          <a:endParaRPr lang="en-GB"/>
-        </a:p>
-      </dgm:t>
-    </dgm:pt>
-    <dgm:pt modelId="{7ED89E8D-65BA-4F46-AD92-25CB0B75777E}" type="parTrans" cxnId="{7342034A-DE23-4A24-A28F-A3D0F048E4D9}">
-      <dgm:prSet/>
-      <dgm:spPr/>
-      <dgm:t>
-        <a:bodyPr/>
-        <a:lstStyle/>
-        <a:p>
-          <a:endParaRPr lang="en-GB"/>
-        </a:p>
-      </dgm:t>
-    </dgm:pt>
-    <dgm:pt modelId="{23DB4C3F-D41A-4070-BDC3-FD3AB1ABD8B2}">
+    <dgm:pt modelId="{ECA755EE-4655-4EF7-94EE-677668341EEE}">
       <dgm:prSet phldrT="[Text]" custT="1"/>
       <dgm:spPr/>
       <dgm:t>
@@ -2979,7 +2984,7 @@
         </a:p>
       </dgm:t>
     </dgm:pt>
-    <dgm:pt modelId="{7873B683-CA7B-4C3A-B49F-9C9EFC48BDD4}" type="parTrans" cxnId="{B74CAFA8-3300-4392-9600-36FFDE5CD63A}">
+    <dgm:pt modelId="{833CEC5A-9309-4419-B0D5-B3C5126BF1D0}" type="parTrans" cxnId="{4BD11441-25F9-47B3-9D72-C863EFA902A7}">
       <dgm:prSet/>
       <dgm:spPr/>
       <dgm:t>
@@ -2990,7 +2995,7 @@
         </a:p>
       </dgm:t>
     </dgm:pt>
-    <dgm:pt modelId="{7B58D452-70BA-4DB7-8882-C877FEB0D07F}" type="sibTrans" cxnId="{B74CAFA8-3300-4392-9600-36FFDE5CD63A}">
+    <dgm:pt modelId="{1D82F4CE-D48F-4412-BE95-A15525616933}" type="sibTrans" cxnId="{4BD11441-25F9-47B3-9D72-C863EFA902A7}">
       <dgm:prSet/>
       <dgm:spPr/>
       <dgm:t>
@@ -3001,7 +3006,7 @@
         </a:p>
       </dgm:t>
     </dgm:pt>
-    <dgm:pt modelId="{2E5A4D08-29B9-4DC4-A06F-C78B40C8F721}">
+    <dgm:pt modelId="{9CD0B046-E933-48AE-85A5-A80E8E686B44}">
       <dgm:prSet phldrT="[Text]" custT="1"/>
       <dgm:spPr/>
       <dgm:t>
@@ -3009,14 +3014,14 @@
         <a:lstStyle/>
         <a:p>
           <a:r>
-            <a:rPr lang="en-GB" sz="1600" smtClean="0"/>
+            <a:rPr lang="en-GB" sz="1800" dirty="0" smtClean="0"/>
             <a:t>Image array</a:t>
           </a:r>
-          <a:endParaRPr lang="en-GB" sz="1600" dirty="0"/>
+          <a:endParaRPr lang="en-GB" sz="1800" dirty="0"/>
         </a:p>
       </dgm:t>
     </dgm:pt>
-    <dgm:pt modelId="{553116FF-11FB-4F22-97EC-A45AD2737CEB}" type="parTrans" cxnId="{481BBFD4-BD79-496E-921A-8CE03A30CA79}">
+    <dgm:pt modelId="{812E3148-284A-4053-B5C4-D914C2C1F784}" type="parTrans" cxnId="{C6E8725B-7C56-463F-A5CC-059ED93252E7}">
       <dgm:prSet/>
       <dgm:spPr/>
       <dgm:t>
@@ -3027,7 +3032,7 @@
         </a:p>
       </dgm:t>
     </dgm:pt>
-    <dgm:pt modelId="{1BBEC5E1-632D-4637-9EFB-AD09FDE4A2E0}" type="sibTrans" cxnId="{481BBFD4-BD79-496E-921A-8CE03A30CA79}">
+    <dgm:pt modelId="{CD8EEC97-E412-417A-952C-7039DE3E8271}" type="sibTrans" cxnId="{C6E8725B-7C56-463F-A5CC-059ED93252E7}">
       <dgm:prSet/>
       <dgm:spPr/>
       <dgm:t>
@@ -3038,7 +3043,87 @@
         </a:p>
       </dgm:t>
     </dgm:pt>
-    <dgm:pt modelId="{7F88DB34-5723-4A6C-83DC-6C73E72D4D11}">
+    <dgm:pt modelId="{B03F3D18-46EB-4E75-99C7-8F4963E8E8C6}">
+      <dgm:prSet phldrT="[Text]" custT="1"/>
+      <dgm:spPr/>
+      <dgm:t>
+        <a:bodyPr/>
+        <a:lstStyle/>
+        <a:p>
+          <a:r>
+            <a:rPr lang="en-GB" sz="2000" b="1" dirty="0" err="1" smtClean="0">
+              <a:latin typeface="Courier New" panose="02070309020205020404" pitchFamily="49" charset="0"/>
+              <a:cs typeface="Courier New" panose="02070309020205020404" pitchFamily="49" charset="0"/>
+            </a:rPr>
+            <a:t>detectDifferences</a:t>
+          </a:r>
+          <a:endParaRPr lang="en-GB" sz="2000" b="1" dirty="0">
+            <a:latin typeface="Courier New" panose="02070309020205020404" pitchFamily="49" charset="0"/>
+            <a:cs typeface="Courier New" panose="02070309020205020404" pitchFamily="49" charset="0"/>
+          </a:endParaRPr>
+        </a:p>
+      </dgm:t>
+    </dgm:pt>
+    <dgm:pt modelId="{70BA02EA-8433-4438-B78C-700A530310E7}" type="parTrans" cxnId="{CA0856AE-E9E7-45EE-8017-390B8F0B66F4}">
+      <dgm:prSet/>
+      <dgm:spPr/>
+      <dgm:t>
+        <a:bodyPr/>
+        <a:lstStyle/>
+        <a:p>
+          <a:endParaRPr lang="en-GB"/>
+        </a:p>
+      </dgm:t>
+    </dgm:pt>
+    <dgm:pt modelId="{E26545A8-EAF3-490F-8F7D-C6E118D7FB8D}" type="sibTrans" cxnId="{CA0856AE-E9E7-45EE-8017-390B8F0B66F4}">
+      <dgm:prSet/>
+      <dgm:spPr/>
+      <dgm:t>
+        <a:bodyPr/>
+        <a:lstStyle/>
+        <a:p>
+          <a:endParaRPr lang="en-GB"/>
+        </a:p>
+      </dgm:t>
+    </dgm:pt>
+    <dgm:pt modelId="{034FDF3E-3F25-4A47-8653-25EFE2144F0E}">
+      <dgm:prSet phldrT="[Text]" custT="1"/>
+      <dgm:spPr/>
+      <dgm:t>
+        <a:bodyPr/>
+        <a:lstStyle/>
+        <a:p>
+          <a:r>
+            <a:rPr lang="en-GB" sz="1800" dirty="0" smtClean="0"/>
+            <a:t>Image array</a:t>
+          </a:r>
+          <a:endParaRPr lang="en-GB" sz="1800" dirty="0"/>
+        </a:p>
+      </dgm:t>
+    </dgm:pt>
+    <dgm:pt modelId="{8FE440A5-29CE-4E33-A70D-FC5C31742A40}" type="parTrans" cxnId="{1A251E93-B7C5-49BA-8DEC-F6ADBB0BEF55}">
+      <dgm:prSet/>
+      <dgm:spPr/>
+      <dgm:t>
+        <a:bodyPr/>
+        <a:lstStyle/>
+        <a:p>
+          <a:endParaRPr lang="en-GB"/>
+        </a:p>
+      </dgm:t>
+    </dgm:pt>
+    <dgm:pt modelId="{A288B57A-6CE9-49DE-9AB5-6C88021AF0DC}" type="sibTrans" cxnId="{1A251E93-B7C5-49BA-8DEC-F6ADBB0BEF55}">
+      <dgm:prSet/>
+      <dgm:spPr/>
+      <dgm:t>
+        <a:bodyPr/>
+        <a:lstStyle/>
+        <a:p>
+          <a:endParaRPr lang="en-GB"/>
+        </a:p>
+      </dgm:t>
+    </dgm:pt>
+    <dgm:pt modelId="{C1B91312-1432-4484-B62B-51494D291CF8}">
       <dgm:prSet phldrT="[Text]" custT="1"/>
       <dgm:spPr/>
       <dgm:t>
@@ -3053,7 +3138,7 @@
         </a:p>
       </dgm:t>
     </dgm:pt>
-    <dgm:pt modelId="{0E15DCB4-A6E4-45E8-88F7-148D159CDED0}" type="parTrans" cxnId="{DEB922FE-0ACC-46C6-94AF-E5C90F0AE787}">
+    <dgm:pt modelId="{C87494A9-3611-4B90-964C-A18E1F486462}" type="parTrans" cxnId="{7EDD9690-F39C-40ED-AF81-C974E29C603C}">
       <dgm:prSet/>
       <dgm:spPr/>
       <dgm:t>
@@ -3064,7 +3149,7 @@
         </a:p>
       </dgm:t>
     </dgm:pt>
-    <dgm:pt modelId="{B5B0A54D-6596-4D88-B94B-AC760AF4A09D}" type="sibTrans" cxnId="{DEB922FE-0ACC-46C6-94AF-E5C90F0AE787}">
+    <dgm:pt modelId="{FE37475A-6706-43FB-97ED-1029182EF528}" type="sibTrans" cxnId="{7EDD9690-F39C-40ED-AF81-C974E29C603C}">
       <dgm:prSet/>
       <dgm:spPr/>
       <dgm:t>
@@ -3075,7 +3160,971 @@
         </a:p>
       </dgm:t>
     </dgm:pt>
-    <dgm:pt modelId="{A6CE3E09-12E0-4CCD-A0FF-EAB8ECBF6BFE}">
+    <dgm:pt modelId="{C25EE115-C433-4D48-A787-09B283C557B8}">
+      <dgm:prSet phldrT="[Text]" custT="1"/>
+      <dgm:spPr/>
+      <dgm:t>
+        <a:bodyPr/>
+        <a:lstStyle/>
+        <a:p>
+          <a:r>
+            <a:rPr lang="en-GB" sz="1800" smtClean="0"/>
+            <a:t>Image array</a:t>
+          </a:r>
+          <a:endParaRPr lang="en-GB" sz="1800" dirty="0"/>
+        </a:p>
+      </dgm:t>
+    </dgm:pt>
+    <dgm:pt modelId="{F686DF7E-1323-401C-B71A-083211A2FABA}" type="parTrans" cxnId="{47000DC6-236E-4AD1-BC88-2F26483E9D4C}">
+      <dgm:prSet/>
+      <dgm:spPr/>
+      <dgm:t>
+        <a:bodyPr/>
+        <a:lstStyle/>
+        <a:p>
+          <a:endParaRPr lang="en-GB"/>
+        </a:p>
+      </dgm:t>
+    </dgm:pt>
+    <dgm:pt modelId="{0ED2DFAD-6F0E-4BF5-A4AB-4D0BE5B792BE}" type="sibTrans" cxnId="{47000DC6-236E-4AD1-BC88-2F26483E9D4C}">
+      <dgm:prSet/>
+      <dgm:spPr/>
+      <dgm:t>
+        <a:bodyPr/>
+        <a:lstStyle/>
+        <a:p>
+          <a:endParaRPr lang="en-GB"/>
+        </a:p>
+      </dgm:t>
+    </dgm:pt>
+    <dgm:pt modelId="{44A526F2-9704-4CCF-BCD3-C67C8B85B3D0}" type="pres">
+      <dgm:prSet presAssocID="{7A78EEB3-6DED-420D-98DD-45CEC9E033D8}" presName="Name0" presStyleCnt="0">
+        <dgm:presLayoutVars>
+          <dgm:dir/>
+        </dgm:presLayoutVars>
+      </dgm:prSet>
+      <dgm:spPr/>
+    </dgm:pt>
+    <dgm:pt modelId="{E1AEAA72-3D0E-403F-980B-B2D7552BF663}" type="pres">
+      <dgm:prSet presAssocID="{23597617-2E56-4878-9915-90066F9776E3}" presName="parComposite" presStyleCnt="0"/>
+      <dgm:spPr/>
+    </dgm:pt>
+    <dgm:pt modelId="{7E8606C6-A9FC-4D39-842E-189787294FA6}" type="pres">
+      <dgm:prSet presAssocID="{23597617-2E56-4878-9915-90066F9776E3}" presName="parBigCircle" presStyleLbl="node0" presStyleIdx="0" presStyleCnt="4" custLinFactNeighborY="15916"/>
+      <dgm:spPr/>
+    </dgm:pt>
+    <dgm:pt modelId="{092C5D9E-1535-42D8-9733-671B60D68406}" type="pres">
+      <dgm:prSet presAssocID="{23597617-2E56-4878-9915-90066F9776E3}" presName="parTx" presStyleLbl="revTx" presStyleIdx="0" presStyleCnt="20" custScaleX="128128" custScaleY="371013" custLinFactNeighborX="9901" custLinFactNeighborY="-2642"/>
+      <dgm:spPr/>
+      <dgm:t>
+        <a:bodyPr/>
+        <a:lstStyle/>
+        <a:p>
+          <a:endParaRPr lang="en-GB"/>
+        </a:p>
+      </dgm:t>
+    </dgm:pt>
+    <dgm:pt modelId="{9506EF0E-AA34-4F6B-B141-1FABD60AF8D3}" type="pres">
+      <dgm:prSet presAssocID="{23597617-2E56-4878-9915-90066F9776E3}" presName="bSpace" presStyleCnt="0"/>
+      <dgm:spPr/>
+    </dgm:pt>
+    <dgm:pt modelId="{8879F159-92CC-4227-BA37-0D23C3B0C4B9}" type="pres">
+      <dgm:prSet presAssocID="{23597617-2E56-4878-9915-90066F9776E3}" presName="parBackupNorm" presStyleCnt="0"/>
+      <dgm:spPr/>
+    </dgm:pt>
+    <dgm:pt modelId="{129EA93B-BEFE-489E-90A6-F67DDF15232B}" type="pres">
+      <dgm:prSet presAssocID="{3684D4E9-78C9-4921-99EC-44BCA4B75BA6}" presName="parSpace" presStyleCnt="0"/>
+      <dgm:spPr/>
+    </dgm:pt>
+    <dgm:pt modelId="{6A3B6F15-99EB-4367-93C1-0EC2A001C548}" type="pres">
+      <dgm:prSet presAssocID="{9568C8F3-6E8E-43FB-85D2-16AEFA52FC52}" presName="desBackupLeftNorm" presStyleCnt="0"/>
+      <dgm:spPr/>
+    </dgm:pt>
+    <dgm:pt modelId="{DC600BB9-4406-4872-8EB1-DD0F1AC46688}" type="pres">
+      <dgm:prSet presAssocID="{9568C8F3-6E8E-43FB-85D2-16AEFA52FC52}" presName="desComposite" presStyleCnt="0"/>
+      <dgm:spPr/>
+    </dgm:pt>
+    <dgm:pt modelId="{D159ADD1-8659-4869-9E65-ABCA8FCB446A}" type="pres">
+      <dgm:prSet presAssocID="{9568C8F3-6E8E-43FB-85D2-16AEFA52FC52}" presName="desCircle" presStyleLbl="node1" presStyleIdx="0" presStyleCnt="8"/>
+      <dgm:spPr/>
+    </dgm:pt>
+    <dgm:pt modelId="{9925F6FA-F9CF-4CE2-995A-260A6F7B50E1}" type="pres">
+      <dgm:prSet presAssocID="{9568C8F3-6E8E-43FB-85D2-16AEFA52FC52}" presName="chTx" presStyleLbl="revTx" presStyleIdx="1" presStyleCnt="20"/>
+      <dgm:spPr/>
+      <dgm:t>
+        <a:bodyPr/>
+        <a:lstStyle/>
+        <a:p>
+          <a:endParaRPr lang="en-GB"/>
+        </a:p>
+      </dgm:t>
+    </dgm:pt>
+    <dgm:pt modelId="{7801E619-EC98-4026-8531-FD5BA6438C49}" type="pres">
+      <dgm:prSet presAssocID="{9568C8F3-6E8E-43FB-85D2-16AEFA52FC52}" presName="desTx" presStyleLbl="revTx" presStyleIdx="2" presStyleCnt="20">
+        <dgm:presLayoutVars>
+          <dgm:bulletEnabled val="1"/>
+        </dgm:presLayoutVars>
+      </dgm:prSet>
+      <dgm:spPr/>
+    </dgm:pt>
+    <dgm:pt modelId="{76A8A978-37CE-48BB-93DC-9DB783A989C7}" type="pres">
+      <dgm:prSet presAssocID="{9568C8F3-6E8E-43FB-85D2-16AEFA52FC52}" presName="desBackupRightNorm" presStyleCnt="0"/>
+      <dgm:spPr/>
+    </dgm:pt>
+    <dgm:pt modelId="{616846F0-9D57-47B6-BD27-6A5B2703FEF8}" type="pres">
+      <dgm:prSet presAssocID="{9E5A15E9-771A-486A-A40B-7D5D6AD9F1B3}" presName="desSpace" presStyleCnt="0"/>
+      <dgm:spPr/>
+    </dgm:pt>
+    <dgm:pt modelId="{166C4622-C2C7-48F3-B425-44163E2D24A6}" type="pres">
+      <dgm:prSet presAssocID="{A3D9B79B-0425-435E-87EF-64AB524FC556}" presName="desBackupLeftNorm" presStyleCnt="0"/>
+      <dgm:spPr/>
+    </dgm:pt>
+    <dgm:pt modelId="{0443B5BB-D6E9-4A07-A1C4-389A548839DF}" type="pres">
+      <dgm:prSet presAssocID="{A3D9B79B-0425-435E-87EF-64AB524FC556}" presName="desComposite" presStyleCnt="0"/>
+      <dgm:spPr/>
+    </dgm:pt>
+    <dgm:pt modelId="{ACF9F588-742E-45D3-A993-3053685F41F6}" type="pres">
+      <dgm:prSet presAssocID="{A3D9B79B-0425-435E-87EF-64AB524FC556}" presName="desCircle" presStyleLbl="node1" presStyleIdx="1" presStyleCnt="8"/>
+      <dgm:spPr/>
+    </dgm:pt>
+    <dgm:pt modelId="{0E12781F-B22A-4B0E-AF31-E4765DEB5A46}" type="pres">
+      <dgm:prSet presAssocID="{A3D9B79B-0425-435E-87EF-64AB524FC556}" presName="chTx" presStyleLbl="revTx" presStyleIdx="3" presStyleCnt="20"/>
+      <dgm:spPr/>
+      <dgm:t>
+        <a:bodyPr/>
+        <a:lstStyle/>
+        <a:p>
+          <a:endParaRPr lang="en-GB"/>
+        </a:p>
+      </dgm:t>
+    </dgm:pt>
+    <dgm:pt modelId="{DBFB4B7A-8773-4E4B-A4DC-F92CD537BF44}" type="pres">
+      <dgm:prSet presAssocID="{A3D9B79B-0425-435E-87EF-64AB524FC556}" presName="desTx" presStyleLbl="revTx" presStyleIdx="4" presStyleCnt="20">
+        <dgm:presLayoutVars>
+          <dgm:bulletEnabled val="1"/>
+        </dgm:presLayoutVars>
+      </dgm:prSet>
+      <dgm:spPr/>
+    </dgm:pt>
+    <dgm:pt modelId="{1B95F86B-AC21-4E20-AA0D-ACCA70B8CF72}" type="pres">
+      <dgm:prSet presAssocID="{A3D9B79B-0425-435E-87EF-64AB524FC556}" presName="desBackupRightNorm" presStyleCnt="0"/>
+      <dgm:spPr/>
+    </dgm:pt>
+    <dgm:pt modelId="{866C23C5-E29A-4886-B797-9682B5CF8352}" type="pres">
+      <dgm:prSet presAssocID="{B6CD6E2D-401C-49C0-BC73-D5A8EAD4CBE7}" presName="desSpace" presStyleCnt="0"/>
+      <dgm:spPr/>
+    </dgm:pt>
+    <dgm:pt modelId="{1DE529F8-E369-48CA-BDDD-2D66B7E12133}" type="pres">
+      <dgm:prSet presAssocID="{201FEB28-DDBC-4589-9C37-26D28715B70F}" presName="parComposite" presStyleCnt="0"/>
+      <dgm:spPr/>
+    </dgm:pt>
+    <dgm:pt modelId="{7DDDA715-336F-434C-AC1F-E091A43DA84D}" type="pres">
+      <dgm:prSet presAssocID="{201FEB28-DDBC-4589-9C37-26D28715B70F}" presName="parBigCircle" presStyleLbl="node0" presStyleIdx="1" presStyleCnt="4"/>
+      <dgm:spPr/>
+    </dgm:pt>
+    <dgm:pt modelId="{34249376-2C44-474E-9023-D720F8E6BC91}" type="pres">
+      <dgm:prSet presAssocID="{201FEB28-DDBC-4589-9C37-26D28715B70F}" presName="parTx" presStyleLbl="revTx" presStyleIdx="5" presStyleCnt="20" custScaleX="154575" custScaleY="295556" custLinFactNeighborX="16067" custLinFactNeighborY="-20663"/>
+      <dgm:spPr/>
+      <dgm:t>
+        <a:bodyPr/>
+        <a:lstStyle/>
+        <a:p>
+          <a:endParaRPr lang="en-GB"/>
+        </a:p>
+      </dgm:t>
+    </dgm:pt>
+    <dgm:pt modelId="{D1543B60-DE50-4F57-81B0-247A641B9B0F}" type="pres">
+      <dgm:prSet presAssocID="{201FEB28-DDBC-4589-9C37-26D28715B70F}" presName="bSpace" presStyleCnt="0"/>
+      <dgm:spPr/>
+    </dgm:pt>
+    <dgm:pt modelId="{A5B05196-A956-4529-B4BF-0FD95590208F}" type="pres">
+      <dgm:prSet presAssocID="{201FEB28-DDBC-4589-9C37-26D28715B70F}" presName="parBackupNorm" presStyleCnt="0"/>
+      <dgm:spPr/>
+    </dgm:pt>
+    <dgm:pt modelId="{511F1C90-448B-403E-B99F-5B4E98AF3658}" type="pres">
+      <dgm:prSet presAssocID="{7BF1AE38-E401-4544-A16D-F5FBCBE011F9}" presName="parSpace" presStyleCnt="0"/>
+      <dgm:spPr/>
+    </dgm:pt>
+    <dgm:pt modelId="{A9A4EA35-26C9-4797-A18C-AE9B3E951B9E}" type="pres">
+      <dgm:prSet presAssocID="{2FD8BA84-DAF8-44CD-8405-FCABFBD0F7EC}" presName="desBackupLeftNorm" presStyleCnt="0"/>
+      <dgm:spPr/>
+    </dgm:pt>
+    <dgm:pt modelId="{A0B8FDBD-9D87-4D37-B9AF-D1D493BAC92F}" type="pres">
+      <dgm:prSet presAssocID="{2FD8BA84-DAF8-44CD-8405-FCABFBD0F7EC}" presName="desComposite" presStyleCnt="0"/>
+      <dgm:spPr/>
+    </dgm:pt>
+    <dgm:pt modelId="{501CB302-E6A0-41DC-97F3-D8A6CE339D3A}" type="pres">
+      <dgm:prSet presAssocID="{2FD8BA84-DAF8-44CD-8405-FCABFBD0F7EC}" presName="desCircle" presStyleLbl="node1" presStyleIdx="2" presStyleCnt="8"/>
+      <dgm:spPr/>
+    </dgm:pt>
+    <dgm:pt modelId="{6DFC4E55-C238-4CD3-AE39-A6B5B3B553C0}" type="pres">
+      <dgm:prSet presAssocID="{2FD8BA84-DAF8-44CD-8405-FCABFBD0F7EC}" presName="chTx" presStyleLbl="revTx" presStyleIdx="6" presStyleCnt="20"/>
+      <dgm:spPr/>
+      <dgm:t>
+        <a:bodyPr/>
+        <a:lstStyle/>
+        <a:p>
+          <a:endParaRPr lang="en-GB"/>
+        </a:p>
+      </dgm:t>
+    </dgm:pt>
+    <dgm:pt modelId="{FDFD8208-5EB0-4759-916D-57FFCDF8C9A8}" type="pres">
+      <dgm:prSet presAssocID="{2FD8BA84-DAF8-44CD-8405-FCABFBD0F7EC}" presName="desTx" presStyleLbl="revTx" presStyleIdx="7" presStyleCnt="20">
+        <dgm:presLayoutVars>
+          <dgm:bulletEnabled val="1"/>
+        </dgm:presLayoutVars>
+      </dgm:prSet>
+      <dgm:spPr/>
+    </dgm:pt>
+    <dgm:pt modelId="{0DA72D40-0DC2-4965-AE91-1C95AA752D4E}" type="pres">
+      <dgm:prSet presAssocID="{2FD8BA84-DAF8-44CD-8405-FCABFBD0F7EC}" presName="desBackupRightNorm" presStyleCnt="0"/>
+      <dgm:spPr/>
+    </dgm:pt>
+    <dgm:pt modelId="{AFF56AF2-11AC-401F-B56E-892F70B82507}" type="pres">
+      <dgm:prSet presAssocID="{C270664F-BB7C-4905-8DAA-E1A22AE79A24}" presName="desSpace" presStyleCnt="0"/>
+      <dgm:spPr/>
+    </dgm:pt>
+    <dgm:pt modelId="{073F8991-762C-4C74-AE43-1164843380E2}" type="pres">
+      <dgm:prSet presAssocID="{A34E0275-88B4-48C3-A324-57E923D2BD58}" presName="desBackupLeftNorm" presStyleCnt="0"/>
+      <dgm:spPr/>
+    </dgm:pt>
+    <dgm:pt modelId="{0AC56C49-9A2B-47C4-99F1-7120A8966362}" type="pres">
+      <dgm:prSet presAssocID="{A34E0275-88B4-48C3-A324-57E923D2BD58}" presName="desComposite" presStyleCnt="0"/>
+      <dgm:spPr/>
+    </dgm:pt>
+    <dgm:pt modelId="{A9FBE3EB-C760-4D38-99D1-941341088C92}" type="pres">
+      <dgm:prSet presAssocID="{A34E0275-88B4-48C3-A324-57E923D2BD58}" presName="desCircle" presStyleLbl="node1" presStyleIdx="3" presStyleCnt="8"/>
+      <dgm:spPr/>
+    </dgm:pt>
+    <dgm:pt modelId="{FAA2B098-51D4-4067-887A-C83C1261A51C}" type="pres">
+      <dgm:prSet presAssocID="{A34E0275-88B4-48C3-A324-57E923D2BD58}" presName="chTx" presStyleLbl="revTx" presStyleIdx="8" presStyleCnt="20"/>
+      <dgm:spPr/>
+      <dgm:t>
+        <a:bodyPr/>
+        <a:lstStyle/>
+        <a:p>
+          <a:endParaRPr lang="en-GB"/>
+        </a:p>
+      </dgm:t>
+    </dgm:pt>
+    <dgm:pt modelId="{651100C1-FA72-4A1B-B8E0-6AE638CD0874}" type="pres">
+      <dgm:prSet presAssocID="{A34E0275-88B4-48C3-A324-57E923D2BD58}" presName="desTx" presStyleLbl="revTx" presStyleIdx="9" presStyleCnt="20">
+        <dgm:presLayoutVars>
+          <dgm:bulletEnabled val="1"/>
+        </dgm:presLayoutVars>
+      </dgm:prSet>
+      <dgm:spPr/>
+    </dgm:pt>
+    <dgm:pt modelId="{46B1956E-1133-4D0A-B1AF-209FE8C6BC7A}" type="pres">
+      <dgm:prSet presAssocID="{A34E0275-88B4-48C3-A324-57E923D2BD58}" presName="desBackupRightNorm" presStyleCnt="0"/>
+      <dgm:spPr/>
+    </dgm:pt>
+    <dgm:pt modelId="{EE5CEAD5-8F04-4246-90CD-B1E766D605D2}" type="pres">
+      <dgm:prSet presAssocID="{F9FDE683-2CEF-4C77-A2E7-563ABB7A9A5A}" presName="desSpace" presStyleCnt="0"/>
+      <dgm:spPr/>
+    </dgm:pt>
+    <dgm:pt modelId="{30729BC5-28E1-410E-A329-3F56E8125715}" type="pres">
+      <dgm:prSet presAssocID="{ECA755EE-4655-4EF7-94EE-677668341EEE}" presName="parComposite" presStyleCnt="0"/>
+      <dgm:spPr/>
+    </dgm:pt>
+    <dgm:pt modelId="{5EBE810A-7891-4C02-9C0E-F161AE20AC2F}" type="pres">
+      <dgm:prSet presAssocID="{ECA755EE-4655-4EF7-94EE-677668341EEE}" presName="parBigCircle" presStyleLbl="node0" presStyleIdx="2" presStyleCnt="4" custLinFactNeighborX="10541" custLinFactNeighborY="17568"/>
+      <dgm:spPr/>
+    </dgm:pt>
+    <dgm:pt modelId="{FB72DEA4-537A-4147-8D56-48A18869250D}" type="pres">
+      <dgm:prSet presAssocID="{ECA755EE-4655-4EF7-94EE-677668341EEE}" presName="parTx" presStyleLbl="revTx" presStyleIdx="10" presStyleCnt="20" custScaleX="157033" custScaleY="371013" custLinFactNeighborX="18674" custLinFactNeighborY="-18721"/>
+      <dgm:spPr/>
+      <dgm:t>
+        <a:bodyPr/>
+        <a:lstStyle/>
+        <a:p>
+          <a:endParaRPr lang="en-GB"/>
+        </a:p>
+      </dgm:t>
+    </dgm:pt>
+    <dgm:pt modelId="{74833B70-9423-4821-A882-50D3FD3E0BE4}" type="pres">
+      <dgm:prSet presAssocID="{ECA755EE-4655-4EF7-94EE-677668341EEE}" presName="bSpace" presStyleCnt="0"/>
+      <dgm:spPr/>
+    </dgm:pt>
+    <dgm:pt modelId="{59FF0D6C-7E50-4A0C-94E8-30E23331D08A}" type="pres">
+      <dgm:prSet presAssocID="{ECA755EE-4655-4EF7-94EE-677668341EEE}" presName="parBackupNorm" presStyleCnt="0"/>
+      <dgm:spPr/>
+    </dgm:pt>
+    <dgm:pt modelId="{F4354BF4-01F7-4F85-9E73-D82E03E434B5}" type="pres">
+      <dgm:prSet presAssocID="{1D82F4CE-D48F-4412-BE95-A15525616933}" presName="parSpace" presStyleCnt="0"/>
+      <dgm:spPr/>
+    </dgm:pt>
+    <dgm:pt modelId="{C5EAF416-B619-4A42-8480-DBBB4DBF8FB3}" type="pres">
+      <dgm:prSet presAssocID="{9CD0B046-E933-48AE-85A5-A80E8E686B44}" presName="desBackupLeftNorm" presStyleCnt="0"/>
+      <dgm:spPr/>
+    </dgm:pt>
+    <dgm:pt modelId="{ABCD4498-5166-45F3-81AD-757D37AA8FE2}" type="pres">
+      <dgm:prSet presAssocID="{9CD0B046-E933-48AE-85A5-A80E8E686B44}" presName="desComposite" presStyleCnt="0"/>
+      <dgm:spPr/>
+    </dgm:pt>
+    <dgm:pt modelId="{191086B9-3E46-4C18-8EB5-42DC545151A6}" type="pres">
+      <dgm:prSet presAssocID="{9CD0B046-E933-48AE-85A5-A80E8E686B44}" presName="desCircle" presStyleLbl="node1" presStyleIdx="4" presStyleCnt="8"/>
+      <dgm:spPr/>
+    </dgm:pt>
+    <dgm:pt modelId="{E339CC44-0883-4D04-952D-E92DDAED2D8E}" type="pres">
+      <dgm:prSet presAssocID="{9CD0B046-E933-48AE-85A5-A80E8E686B44}" presName="chTx" presStyleLbl="revTx" presStyleIdx="11" presStyleCnt="20"/>
+      <dgm:spPr/>
+      <dgm:t>
+        <a:bodyPr/>
+        <a:lstStyle/>
+        <a:p>
+          <a:endParaRPr lang="en-GB"/>
+        </a:p>
+      </dgm:t>
+    </dgm:pt>
+    <dgm:pt modelId="{BE60AF2B-10F6-41EB-9B3D-C968B3B63B02}" type="pres">
+      <dgm:prSet presAssocID="{9CD0B046-E933-48AE-85A5-A80E8E686B44}" presName="desTx" presStyleLbl="revTx" presStyleIdx="12" presStyleCnt="20">
+        <dgm:presLayoutVars>
+          <dgm:bulletEnabled val="1"/>
+        </dgm:presLayoutVars>
+      </dgm:prSet>
+      <dgm:spPr/>
+    </dgm:pt>
+    <dgm:pt modelId="{C5236DF1-9282-4B15-87F3-93B8CC1F88B9}" type="pres">
+      <dgm:prSet presAssocID="{9CD0B046-E933-48AE-85A5-A80E8E686B44}" presName="desBackupRightNorm" presStyleCnt="0"/>
+      <dgm:spPr/>
+    </dgm:pt>
+    <dgm:pt modelId="{E18FE7FA-A6CA-44FE-A39E-334990ACA50E}" type="pres">
+      <dgm:prSet presAssocID="{CD8EEC97-E412-417A-952C-7039DE3E8271}" presName="desSpace" presStyleCnt="0"/>
+      <dgm:spPr/>
+    </dgm:pt>
+    <dgm:pt modelId="{DBAD66CD-69C2-4C91-BA5C-1A59AB94F13E}" type="pres">
+      <dgm:prSet presAssocID="{C25EE115-C433-4D48-A787-09B283C557B8}" presName="desBackupLeftNorm" presStyleCnt="0"/>
+      <dgm:spPr/>
+    </dgm:pt>
+    <dgm:pt modelId="{6E37CCF8-E783-41A5-BDF9-88BEA6797033}" type="pres">
+      <dgm:prSet presAssocID="{C25EE115-C433-4D48-A787-09B283C557B8}" presName="desComposite" presStyleCnt="0"/>
+      <dgm:spPr/>
+    </dgm:pt>
+    <dgm:pt modelId="{7AFBBAFC-96F3-4846-8EE4-195E86EB71DA}" type="pres">
+      <dgm:prSet presAssocID="{C25EE115-C433-4D48-A787-09B283C557B8}" presName="desCircle" presStyleLbl="node1" presStyleIdx="5" presStyleCnt="8"/>
+      <dgm:spPr/>
+    </dgm:pt>
+    <dgm:pt modelId="{E19C2DC8-F392-499F-A712-A44537B3FC02}" type="pres">
+      <dgm:prSet presAssocID="{C25EE115-C433-4D48-A787-09B283C557B8}" presName="chTx" presStyleLbl="revTx" presStyleIdx="13" presStyleCnt="20"/>
+      <dgm:spPr/>
+      <dgm:t>
+        <a:bodyPr/>
+        <a:lstStyle/>
+        <a:p>
+          <a:endParaRPr lang="en-GB"/>
+        </a:p>
+      </dgm:t>
+    </dgm:pt>
+    <dgm:pt modelId="{1ECD68C5-1D7A-424E-8665-D233608F296E}" type="pres">
+      <dgm:prSet presAssocID="{C25EE115-C433-4D48-A787-09B283C557B8}" presName="desTx" presStyleLbl="revTx" presStyleIdx="14" presStyleCnt="20">
+        <dgm:presLayoutVars>
+          <dgm:bulletEnabled val="1"/>
+        </dgm:presLayoutVars>
+      </dgm:prSet>
+      <dgm:spPr/>
+    </dgm:pt>
+    <dgm:pt modelId="{05A5D28E-A522-45B5-AE25-2893749A74BB}" type="pres">
+      <dgm:prSet presAssocID="{C25EE115-C433-4D48-A787-09B283C557B8}" presName="desBackupRightNorm" presStyleCnt="0"/>
+      <dgm:spPr/>
+    </dgm:pt>
+    <dgm:pt modelId="{E73517C3-FEAD-4ACB-97C3-6899ED0AD142}" type="pres">
+      <dgm:prSet presAssocID="{0ED2DFAD-6F0E-4BF5-A4AB-4D0BE5B792BE}" presName="desSpace" presStyleCnt="0"/>
+      <dgm:spPr/>
+    </dgm:pt>
+    <dgm:pt modelId="{550BB4BB-D011-4854-9919-7653B7381C68}" type="pres">
+      <dgm:prSet presAssocID="{B03F3D18-46EB-4E75-99C7-8F4963E8E8C6}" presName="parComposite" presStyleCnt="0"/>
+      <dgm:spPr/>
+    </dgm:pt>
+    <dgm:pt modelId="{3648EABA-D3F0-4218-B78F-A99C55BA2041}" type="pres">
+      <dgm:prSet presAssocID="{B03F3D18-46EB-4E75-99C7-8F4963E8E8C6}" presName="parBigCircle" presStyleLbl="node0" presStyleIdx="3" presStyleCnt="4"/>
+      <dgm:spPr/>
+    </dgm:pt>
+    <dgm:pt modelId="{B970DA31-055B-43B9-A012-D4169B3AF7EF}" type="pres">
+      <dgm:prSet presAssocID="{B03F3D18-46EB-4E75-99C7-8F4963E8E8C6}" presName="parTx" presStyleLbl="revTx" presStyleIdx="15" presStyleCnt="20" custScaleX="127317" custScaleY="204263" custLinFactNeighborX="9949" custLinFactNeighborY="-11554"/>
+      <dgm:spPr/>
+      <dgm:t>
+        <a:bodyPr/>
+        <a:lstStyle/>
+        <a:p>
+          <a:endParaRPr lang="en-GB"/>
+        </a:p>
+      </dgm:t>
+    </dgm:pt>
+    <dgm:pt modelId="{DD171AD1-97C8-4720-903D-52761EAB0D2E}" type="pres">
+      <dgm:prSet presAssocID="{B03F3D18-46EB-4E75-99C7-8F4963E8E8C6}" presName="bSpace" presStyleCnt="0"/>
+      <dgm:spPr/>
+    </dgm:pt>
+    <dgm:pt modelId="{14B6F16C-786A-4E09-B496-43B98DED3C15}" type="pres">
+      <dgm:prSet presAssocID="{B03F3D18-46EB-4E75-99C7-8F4963E8E8C6}" presName="parBackupNorm" presStyleCnt="0"/>
+      <dgm:spPr/>
+    </dgm:pt>
+    <dgm:pt modelId="{60EE079F-4D5F-4FC3-9A63-E45B63AE3535}" type="pres">
+      <dgm:prSet presAssocID="{E26545A8-EAF3-490F-8F7D-C6E118D7FB8D}" presName="parSpace" presStyleCnt="0"/>
+      <dgm:spPr/>
+    </dgm:pt>
+    <dgm:pt modelId="{8E879326-F6AF-470F-A0D1-7E15EA71ACA5}" type="pres">
+      <dgm:prSet presAssocID="{034FDF3E-3F25-4A47-8653-25EFE2144F0E}" presName="desBackupLeftNorm" presStyleCnt="0"/>
+      <dgm:spPr/>
+    </dgm:pt>
+    <dgm:pt modelId="{83A20D1C-6225-42A3-870A-BE7206F78732}" type="pres">
+      <dgm:prSet presAssocID="{034FDF3E-3F25-4A47-8653-25EFE2144F0E}" presName="desComposite" presStyleCnt="0"/>
+      <dgm:spPr/>
+    </dgm:pt>
+    <dgm:pt modelId="{DCE6F5F6-DE07-45DE-B29E-48C5FFF53841}" type="pres">
+      <dgm:prSet presAssocID="{034FDF3E-3F25-4A47-8653-25EFE2144F0E}" presName="desCircle" presStyleLbl="node1" presStyleIdx="6" presStyleCnt="8"/>
+      <dgm:spPr/>
+    </dgm:pt>
+    <dgm:pt modelId="{54775A38-A56D-4BB8-977E-30F8C06AD61A}" type="pres">
+      <dgm:prSet presAssocID="{034FDF3E-3F25-4A47-8653-25EFE2144F0E}" presName="chTx" presStyleLbl="revTx" presStyleIdx="16" presStyleCnt="20"/>
+      <dgm:spPr/>
+      <dgm:t>
+        <a:bodyPr/>
+        <a:lstStyle/>
+        <a:p>
+          <a:endParaRPr lang="en-GB"/>
+        </a:p>
+      </dgm:t>
+    </dgm:pt>
+    <dgm:pt modelId="{FEF9792E-E78E-483F-8C7A-472BE0A5D023}" type="pres">
+      <dgm:prSet presAssocID="{034FDF3E-3F25-4A47-8653-25EFE2144F0E}" presName="desTx" presStyleLbl="revTx" presStyleIdx="17" presStyleCnt="20">
+        <dgm:presLayoutVars>
+          <dgm:bulletEnabled val="1"/>
+        </dgm:presLayoutVars>
+      </dgm:prSet>
+      <dgm:spPr/>
+    </dgm:pt>
+    <dgm:pt modelId="{593C2BBA-29C6-4C9B-B1C4-49B9C7EE9173}" type="pres">
+      <dgm:prSet presAssocID="{034FDF3E-3F25-4A47-8653-25EFE2144F0E}" presName="desBackupRightNorm" presStyleCnt="0"/>
+      <dgm:spPr/>
+    </dgm:pt>
+    <dgm:pt modelId="{C38EC906-8FC9-4DFA-B4A4-1492E280CD49}" type="pres">
+      <dgm:prSet presAssocID="{A288B57A-6CE9-49DE-9AB5-6C88021AF0DC}" presName="desSpace" presStyleCnt="0"/>
+      <dgm:spPr/>
+    </dgm:pt>
+    <dgm:pt modelId="{331A609E-2653-4360-8BCE-FF8199F1C0B0}" type="pres">
+      <dgm:prSet presAssocID="{C1B91312-1432-4484-B62B-51494D291CF8}" presName="desBackupLeftNorm" presStyleCnt="0"/>
+      <dgm:spPr/>
+    </dgm:pt>
+    <dgm:pt modelId="{FB2D468B-E1CF-418B-9363-769F8316207A}" type="pres">
+      <dgm:prSet presAssocID="{C1B91312-1432-4484-B62B-51494D291CF8}" presName="desComposite" presStyleCnt="0"/>
+      <dgm:spPr/>
+    </dgm:pt>
+    <dgm:pt modelId="{0F4919A2-7B5F-45D1-8B9D-93D9E054AC79}" type="pres">
+      <dgm:prSet presAssocID="{C1B91312-1432-4484-B62B-51494D291CF8}" presName="desCircle" presStyleLbl="node1" presStyleIdx="7" presStyleCnt="8" custLinFactNeighborX="1705" custLinFactNeighborY="18760"/>
+      <dgm:spPr/>
+    </dgm:pt>
+    <dgm:pt modelId="{19662F01-965A-4DB7-B190-F79AB48F5357}" type="pres">
+      <dgm:prSet presAssocID="{C1B91312-1432-4484-B62B-51494D291CF8}" presName="chTx" presStyleLbl="revTx" presStyleIdx="18" presStyleCnt="20" custScaleX="119213" custScaleY="115568" custLinFactNeighborX="-3831" custLinFactNeighborY="12607"/>
+      <dgm:spPr/>
+      <dgm:t>
+        <a:bodyPr/>
+        <a:lstStyle/>
+        <a:p>
+          <a:endParaRPr lang="en-GB"/>
+        </a:p>
+      </dgm:t>
+    </dgm:pt>
+    <dgm:pt modelId="{3693A17A-5E5D-43EE-A35A-97A3BAC021D3}" type="pres">
+      <dgm:prSet presAssocID="{C1B91312-1432-4484-B62B-51494D291CF8}" presName="desTx" presStyleLbl="revTx" presStyleIdx="19" presStyleCnt="20">
+        <dgm:presLayoutVars>
+          <dgm:bulletEnabled val="1"/>
+        </dgm:presLayoutVars>
+      </dgm:prSet>
+      <dgm:spPr/>
+    </dgm:pt>
+    <dgm:pt modelId="{38BDD492-3D3B-4C5E-8C5C-5E75B828F72C}" type="pres">
+      <dgm:prSet presAssocID="{C1B91312-1432-4484-B62B-51494D291CF8}" presName="desBackupRightNorm" presStyleCnt="0"/>
+      <dgm:spPr/>
+    </dgm:pt>
+    <dgm:pt modelId="{D7F8E9D6-5CF2-49FB-8371-92218B305FCB}" type="pres">
+      <dgm:prSet presAssocID="{FE37475A-6706-43FB-97ED-1029182EF528}" presName="desSpace" presStyleCnt="0"/>
+      <dgm:spPr/>
+    </dgm:pt>
+  </dgm:ptLst>
+  <dgm:cxnLst>
+    <dgm:cxn modelId="{D739075C-23B7-4D35-BB2C-4EED3CFD591A}" type="presOf" srcId="{23597617-2E56-4878-9915-90066F9776E3}" destId="{092C5D9E-1535-42D8-9733-671B60D68406}" srcOrd="0" destOrd="0" presId="urn:microsoft.com/office/officeart/2008/layout/CircleAccentTimeline"/>
+    <dgm:cxn modelId="{4BD11441-25F9-47B3-9D72-C863EFA902A7}" srcId="{7A78EEB3-6DED-420D-98DD-45CEC9E033D8}" destId="{ECA755EE-4655-4EF7-94EE-677668341EEE}" srcOrd="2" destOrd="0" parTransId="{833CEC5A-9309-4419-B0D5-B3C5126BF1D0}" sibTransId="{1D82F4CE-D48F-4412-BE95-A15525616933}"/>
+    <dgm:cxn modelId="{848E6BF0-969E-44A3-9FCB-06ABE1D1AB7D}" srcId="{7A78EEB3-6DED-420D-98DD-45CEC9E033D8}" destId="{201FEB28-DDBC-4589-9C37-26D28715B70F}" srcOrd="1" destOrd="0" parTransId="{3B0AD1DE-033C-486A-AF50-EE552684146D}" sibTransId="{7BF1AE38-E401-4544-A16D-F5FBCBE011F9}"/>
+    <dgm:cxn modelId="{603F85FF-8233-46A4-8293-24487C43613F}" srcId="{23597617-2E56-4878-9915-90066F9776E3}" destId="{A3D9B79B-0425-435E-87EF-64AB524FC556}" srcOrd="1" destOrd="0" parTransId="{23EE9AB1-FC21-449E-B725-17638B0AF4B2}" sibTransId="{B6CD6E2D-401C-49C0-BC73-D5A8EAD4CBE7}"/>
+    <dgm:cxn modelId="{7EDD9690-F39C-40ED-AF81-C974E29C603C}" srcId="{B03F3D18-46EB-4E75-99C7-8F4963E8E8C6}" destId="{C1B91312-1432-4484-B62B-51494D291CF8}" srcOrd="1" destOrd="0" parTransId="{C87494A9-3611-4B90-964C-A18E1F486462}" sibTransId="{FE37475A-6706-43FB-97ED-1029182EF528}"/>
+    <dgm:cxn modelId="{A75BABDF-A92C-4D09-9C3D-087092375744}" type="presOf" srcId="{9568C8F3-6E8E-43FB-85D2-16AEFA52FC52}" destId="{9925F6FA-F9CF-4CE2-995A-260A6F7B50E1}" srcOrd="0" destOrd="0" presId="urn:microsoft.com/office/officeart/2008/layout/CircleAccentTimeline"/>
+    <dgm:cxn modelId="{3BED9A42-2F95-4CDD-9D34-2158A98C2F91}" type="presOf" srcId="{9CD0B046-E933-48AE-85A5-A80E8E686B44}" destId="{E339CC44-0883-4D04-952D-E92DDAED2D8E}" srcOrd="0" destOrd="0" presId="urn:microsoft.com/office/officeart/2008/layout/CircleAccentTimeline"/>
+    <dgm:cxn modelId="{B811118B-EFE7-424C-84D4-6520D23EFEBE}" type="presOf" srcId="{2FD8BA84-DAF8-44CD-8405-FCABFBD0F7EC}" destId="{6DFC4E55-C238-4CD3-AE39-A6B5B3B553C0}" srcOrd="0" destOrd="0" presId="urn:microsoft.com/office/officeart/2008/layout/CircleAccentTimeline"/>
+    <dgm:cxn modelId="{D2EC138A-CBC8-4CE5-947A-8DE24B8AF885}" type="presOf" srcId="{B03F3D18-46EB-4E75-99C7-8F4963E8E8C6}" destId="{B970DA31-055B-43B9-A012-D4169B3AF7EF}" srcOrd="0" destOrd="0" presId="urn:microsoft.com/office/officeart/2008/layout/CircleAccentTimeline"/>
+    <dgm:cxn modelId="{33DDBB7E-BA92-412B-B391-9B37E78BEB0F}" type="presOf" srcId="{034FDF3E-3F25-4A47-8653-25EFE2144F0E}" destId="{54775A38-A56D-4BB8-977E-30F8C06AD61A}" srcOrd="0" destOrd="0" presId="urn:microsoft.com/office/officeart/2008/layout/CircleAccentTimeline"/>
+    <dgm:cxn modelId="{FA8223BB-4335-46D8-8B7A-FDD419966560}" type="presOf" srcId="{C25EE115-C433-4D48-A787-09B283C557B8}" destId="{E19C2DC8-F392-499F-A712-A44537B3FC02}" srcOrd="0" destOrd="0" presId="urn:microsoft.com/office/officeart/2008/layout/CircleAccentTimeline"/>
+    <dgm:cxn modelId="{3DA93A13-F8B9-4300-A608-52944DF2D030}" type="presOf" srcId="{A34E0275-88B4-48C3-A324-57E923D2BD58}" destId="{FAA2B098-51D4-4067-887A-C83C1261A51C}" srcOrd="0" destOrd="0" presId="urn:microsoft.com/office/officeart/2008/layout/CircleAccentTimeline"/>
+    <dgm:cxn modelId="{47000DC6-236E-4AD1-BC88-2F26483E9D4C}" srcId="{ECA755EE-4655-4EF7-94EE-677668341EEE}" destId="{C25EE115-C433-4D48-A787-09B283C557B8}" srcOrd="1" destOrd="0" parTransId="{F686DF7E-1323-401C-B71A-083211A2FABA}" sibTransId="{0ED2DFAD-6F0E-4BF5-A4AB-4D0BE5B792BE}"/>
+    <dgm:cxn modelId="{E736CC99-88B0-451C-9D13-EE65DDE6BB59}" srcId="{201FEB28-DDBC-4589-9C37-26D28715B70F}" destId="{A34E0275-88B4-48C3-A324-57E923D2BD58}" srcOrd="1" destOrd="0" parTransId="{D3FD84C9-04F1-4244-8FE5-31251E98EC1F}" sibTransId="{F9FDE683-2CEF-4C77-A2E7-563ABB7A9A5A}"/>
+    <dgm:cxn modelId="{CA0856AE-E9E7-45EE-8017-390B8F0B66F4}" srcId="{7A78EEB3-6DED-420D-98DD-45CEC9E033D8}" destId="{B03F3D18-46EB-4E75-99C7-8F4963E8E8C6}" srcOrd="3" destOrd="0" parTransId="{70BA02EA-8433-4438-B78C-700A530310E7}" sibTransId="{E26545A8-EAF3-490F-8F7D-C6E118D7FB8D}"/>
+    <dgm:cxn modelId="{5146E3AA-AFDF-442C-9DB7-62CF80F05169}" srcId="{7A78EEB3-6DED-420D-98DD-45CEC9E033D8}" destId="{23597617-2E56-4878-9915-90066F9776E3}" srcOrd="0" destOrd="0" parTransId="{5FE6FF4A-4777-4AE0-AFE4-00D2926951D5}" sibTransId="{3684D4E9-78C9-4921-99EC-44BCA4B75BA6}"/>
+    <dgm:cxn modelId="{A8775FC5-9428-4A2B-9DAD-470FBA9609F9}" type="presOf" srcId="{A3D9B79B-0425-435E-87EF-64AB524FC556}" destId="{0E12781F-B22A-4B0E-AF31-E4765DEB5A46}" srcOrd="0" destOrd="0" presId="urn:microsoft.com/office/officeart/2008/layout/CircleAccentTimeline"/>
+    <dgm:cxn modelId="{B5313107-7FCB-451C-A88C-53F0E490197D}" type="presOf" srcId="{201FEB28-DDBC-4589-9C37-26D28715B70F}" destId="{34249376-2C44-474E-9023-D720F8E6BC91}" srcOrd="0" destOrd="0" presId="urn:microsoft.com/office/officeart/2008/layout/CircleAccentTimeline"/>
+    <dgm:cxn modelId="{13AF65E2-966F-4515-9046-07274334E539}" type="presOf" srcId="{C1B91312-1432-4484-B62B-51494D291CF8}" destId="{19662F01-965A-4DB7-B190-F79AB48F5357}" srcOrd="0" destOrd="0" presId="urn:microsoft.com/office/officeart/2008/layout/CircleAccentTimeline"/>
+    <dgm:cxn modelId="{C6E8725B-7C56-463F-A5CC-059ED93252E7}" srcId="{ECA755EE-4655-4EF7-94EE-677668341EEE}" destId="{9CD0B046-E933-48AE-85A5-A80E8E686B44}" srcOrd="0" destOrd="0" parTransId="{812E3148-284A-4053-B5C4-D914C2C1F784}" sibTransId="{CD8EEC97-E412-417A-952C-7039DE3E8271}"/>
+    <dgm:cxn modelId="{7609F8FF-350A-4999-866D-7A46779D6876}" srcId="{201FEB28-DDBC-4589-9C37-26D28715B70F}" destId="{2FD8BA84-DAF8-44CD-8405-FCABFBD0F7EC}" srcOrd="0" destOrd="0" parTransId="{B5A3FEBA-1A40-4E40-B872-2A1AE29ABD51}" sibTransId="{C270664F-BB7C-4905-8DAA-E1A22AE79A24}"/>
+    <dgm:cxn modelId="{93AA692C-3B80-4305-9670-075AE460DF99}" type="presOf" srcId="{7A78EEB3-6DED-420D-98DD-45CEC9E033D8}" destId="{44A526F2-9704-4CCF-BCD3-C67C8B85B3D0}" srcOrd="0" destOrd="0" presId="urn:microsoft.com/office/officeart/2008/layout/CircleAccentTimeline"/>
+    <dgm:cxn modelId="{1A251E93-B7C5-49BA-8DEC-F6ADBB0BEF55}" srcId="{B03F3D18-46EB-4E75-99C7-8F4963E8E8C6}" destId="{034FDF3E-3F25-4A47-8653-25EFE2144F0E}" srcOrd="0" destOrd="0" parTransId="{8FE440A5-29CE-4E33-A70D-FC5C31742A40}" sibTransId="{A288B57A-6CE9-49DE-9AB5-6C88021AF0DC}"/>
+    <dgm:cxn modelId="{7B189A79-39B7-4934-8947-8CCCC8D3A333}" type="presOf" srcId="{ECA755EE-4655-4EF7-94EE-677668341EEE}" destId="{FB72DEA4-537A-4147-8D56-48A18869250D}" srcOrd="0" destOrd="0" presId="urn:microsoft.com/office/officeart/2008/layout/CircleAccentTimeline"/>
+    <dgm:cxn modelId="{5CDE87D6-97E2-4C42-BBB2-E84073A9B22C}" srcId="{23597617-2E56-4878-9915-90066F9776E3}" destId="{9568C8F3-6E8E-43FB-85D2-16AEFA52FC52}" srcOrd="0" destOrd="0" parTransId="{FFE19F8A-67B0-4278-87D4-2777CFE9A555}" sibTransId="{9E5A15E9-771A-486A-A40B-7D5D6AD9F1B3}"/>
+    <dgm:cxn modelId="{88898AE4-9C85-46D6-9838-EB3A934B8FC7}" type="presParOf" srcId="{44A526F2-9704-4CCF-BCD3-C67C8B85B3D0}" destId="{E1AEAA72-3D0E-403F-980B-B2D7552BF663}" srcOrd="0" destOrd="0" presId="urn:microsoft.com/office/officeart/2008/layout/CircleAccentTimeline"/>
+    <dgm:cxn modelId="{A1612F37-1DEA-4AAB-8E17-834BC0E33F3C}" type="presParOf" srcId="{E1AEAA72-3D0E-403F-980B-B2D7552BF663}" destId="{7E8606C6-A9FC-4D39-842E-189787294FA6}" srcOrd="0" destOrd="0" presId="urn:microsoft.com/office/officeart/2008/layout/CircleAccentTimeline"/>
+    <dgm:cxn modelId="{D7D039AE-30C1-414D-92BD-59757F263265}" type="presParOf" srcId="{E1AEAA72-3D0E-403F-980B-B2D7552BF663}" destId="{092C5D9E-1535-42D8-9733-671B60D68406}" srcOrd="1" destOrd="0" presId="urn:microsoft.com/office/officeart/2008/layout/CircleAccentTimeline"/>
+    <dgm:cxn modelId="{CD8E7E33-9E3C-4427-BD18-17C99E76E981}" type="presParOf" srcId="{E1AEAA72-3D0E-403F-980B-B2D7552BF663}" destId="{9506EF0E-AA34-4F6B-B141-1FABD60AF8D3}" srcOrd="2" destOrd="0" presId="urn:microsoft.com/office/officeart/2008/layout/CircleAccentTimeline"/>
+    <dgm:cxn modelId="{85781CC9-8D8D-42A8-A8A3-A0EBC2E1D48E}" type="presParOf" srcId="{44A526F2-9704-4CCF-BCD3-C67C8B85B3D0}" destId="{8879F159-92CC-4227-BA37-0D23C3B0C4B9}" srcOrd="1" destOrd="0" presId="urn:microsoft.com/office/officeart/2008/layout/CircleAccentTimeline"/>
+    <dgm:cxn modelId="{6B8AB240-F06E-4AAB-8F0D-6D34D126CEC5}" type="presParOf" srcId="{44A526F2-9704-4CCF-BCD3-C67C8B85B3D0}" destId="{129EA93B-BEFE-489E-90A6-F67DDF15232B}" srcOrd="2" destOrd="0" presId="urn:microsoft.com/office/officeart/2008/layout/CircleAccentTimeline"/>
+    <dgm:cxn modelId="{7604AEEE-71C2-434F-AFB4-B987565D9284}" type="presParOf" srcId="{44A526F2-9704-4CCF-BCD3-C67C8B85B3D0}" destId="{6A3B6F15-99EB-4367-93C1-0EC2A001C548}" srcOrd="3" destOrd="0" presId="urn:microsoft.com/office/officeart/2008/layout/CircleAccentTimeline"/>
+    <dgm:cxn modelId="{0DDEAB7A-3D22-4C71-8345-0ACD4A0AC6F8}" type="presParOf" srcId="{44A526F2-9704-4CCF-BCD3-C67C8B85B3D0}" destId="{DC600BB9-4406-4872-8EB1-DD0F1AC46688}" srcOrd="4" destOrd="0" presId="urn:microsoft.com/office/officeart/2008/layout/CircleAccentTimeline"/>
+    <dgm:cxn modelId="{89505D79-48CD-4823-B3E2-A11DE5C88F5A}" type="presParOf" srcId="{DC600BB9-4406-4872-8EB1-DD0F1AC46688}" destId="{D159ADD1-8659-4869-9E65-ABCA8FCB446A}" srcOrd="0" destOrd="0" presId="urn:microsoft.com/office/officeart/2008/layout/CircleAccentTimeline"/>
+    <dgm:cxn modelId="{E41B253A-4209-4FAC-B794-B3C74C10CB5F}" type="presParOf" srcId="{DC600BB9-4406-4872-8EB1-DD0F1AC46688}" destId="{9925F6FA-F9CF-4CE2-995A-260A6F7B50E1}" srcOrd="1" destOrd="0" presId="urn:microsoft.com/office/officeart/2008/layout/CircleAccentTimeline"/>
+    <dgm:cxn modelId="{D2C388DD-94D7-4421-A4DB-02AB3DAB74F8}" type="presParOf" srcId="{DC600BB9-4406-4872-8EB1-DD0F1AC46688}" destId="{7801E619-EC98-4026-8531-FD5BA6438C49}" srcOrd="2" destOrd="0" presId="urn:microsoft.com/office/officeart/2008/layout/CircleAccentTimeline"/>
+    <dgm:cxn modelId="{5AECD8CC-20D2-4E60-A827-7EF7F5EEF3BB}" type="presParOf" srcId="{44A526F2-9704-4CCF-BCD3-C67C8B85B3D0}" destId="{76A8A978-37CE-48BB-93DC-9DB783A989C7}" srcOrd="5" destOrd="0" presId="urn:microsoft.com/office/officeart/2008/layout/CircleAccentTimeline"/>
+    <dgm:cxn modelId="{84F79836-E1E2-4F52-8C46-0464C8B1D4F2}" type="presParOf" srcId="{44A526F2-9704-4CCF-BCD3-C67C8B85B3D0}" destId="{616846F0-9D57-47B6-BD27-6A5B2703FEF8}" srcOrd="6" destOrd="0" presId="urn:microsoft.com/office/officeart/2008/layout/CircleAccentTimeline"/>
+    <dgm:cxn modelId="{D7C64264-4BCF-46A0-9E0B-3C3A52C17214}" type="presParOf" srcId="{44A526F2-9704-4CCF-BCD3-C67C8B85B3D0}" destId="{166C4622-C2C7-48F3-B425-44163E2D24A6}" srcOrd="7" destOrd="0" presId="urn:microsoft.com/office/officeart/2008/layout/CircleAccentTimeline"/>
+    <dgm:cxn modelId="{7F07F074-3B43-478F-A0EA-CFC555B53383}" type="presParOf" srcId="{44A526F2-9704-4CCF-BCD3-C67C8B85B3D0}" destId="{0443B5BB-D6E9-4A07-A1C4-389A548839DF}" srcOrd="8" destOrd="0" presId="urn:microsoft.com/office/officeart/2008/layout/CircleAccentTimeline"/>
+    <dgm:cxn modelId="{E1F9DCA4-03FB-4AB4-85F1-1BF29B63E4A2}" type="presParOf" srcId="{0443B5BB-D6E9-4A07-A1C4-389A548839DF}" destId="{ACF9F588-742E-45D3-A993-3053685F41F6}" srcOrd="0" destOrd="0" presId="urn:microsoft.com/office/officeart/2008/layout/CircleAccentTimeline"/>
+    <dgm:cxn modelId="{8E0B044C-907A-457A-AA3F-285AFE22E963}" type="presParOf" srcId="{0443B5BB-D6E9-4A07-A1C4-389A548839DF}" destId="{0E12781F-B22A-4B0E-AF31-E4765DEB5A46}" srcOrd="1" destOrd="0" presId="urn:microsoft.com/office/officeart/2008/layout/CircleAccentTimeline"/>
+    <dgm:cxn modelId="{D64FD600-269B-41AD-90FE-1865E429C67B}" type="presParOf" srcId="{0443B5BB-D6E9-4A07-A1C4-389A548839DF}" destId="{DBFB4B7A-8773-4E4B-A4DC-F92CD537BF44}" srcOrd="2" destOrd="0" presId="urn:microsoft.com/office/officeart/2008/layout/CircleAccentTimeline"/>
+    <dgm:cxn modelId="{C7A32A59-C49C-46CD-B9FF-6CA38B61C693}" type="presParOf" srcId="{44A526F2-9704-4CCF-BCD3-C67C8B85B3D0}" destId="{1B95F86B-AC21-4E20-AA0D-ACCA70B8CF72}" srcOrd="9" destOrd="0" presId="urn:microsoft.com/office/officeart/2008/layout/CircleAccentTimeline"/>
+    <dgm:cxn modelId="{AE6EF172-5493-4AD0-B511-AC280E497406}" type="presParOf" srcId="{44A526F2-9704-4CCF-BCD3-C67C8B85B3D0}" destId="{866C23C5-E29A-4886-B797-9682B5CF8352}" srcOrd="10" destOrd="0" presId="urn:microsoft.com/office/officeart/2008/layout/CircleAccentTimeline"/>
+    <dgm:cxn modelId="{CAE1CD2A-C6AF-4D55-AF43-4EA1019A6DA4}" type="presParOf" srcId="{44A526F2-9704-4CCF-BCD3-C67C8B85B3D0}" destId="{1DE529F8-E369-48CA-BDDD-2D66B7E12133}" srcOrd="11" destOrd="0" presId="urn:microsoft.com/office/officeart/2008/layout/CircleAccentTimeline"/>
+    <dgm:cxn modelId="{41589EA6-B58B-4DF7-800C-4FF93EE72A2A}" type="presParOf" srcId="{1DE529F8-E369-48CA-BDDD-2D66B7E12133}" destId="{7DDDA715-336F-434C-AC1F-E091A43DA84D}" srcOrd="0" destOrd="0" presId="urn:microsoft.com/office/officeart/2008/layout/CircleAccentTimeline"/>
+    <dgm:cxn modelId="{19771242-0020-43E1-A518-04C5D77806EF}" type="presParOf" srcId="{1DE529F8-E369-48CA-BDDD-2D66B7E12133}" destId="{34249376-2C44-474E-9023-D720F8E6BC91}" srcOrd="1" destOrd="0" presId="urn:microsoft.com/office/officeart/2008/layout/CircleAccentTimeline"/>
+    <dgm:cxn modelId="{C94FF87C-3440-4657-AFEC-18738F9C491C}" type="presParOf" srcId="{1DE529F8-E369-48CA-BDDD-2D66B7E12133}" destId="{D1543B60-DE50-4F57-81B0-247A641B9B0F}" srcOrd="2" destOrd="0" presId="urn:microsoft.com/office/officeart/2008/layout/CircleAccentTimeline"/>
+    <dgm:cxn modelId="{0F3E08FD-7045-4E61-B4FD-FE757FE86181}" type="presParOf" srcId="{44A526F2-9704-4CCF-BCD3-C67C8B85B3D0}" destId="{A5B05196-A956-4529-B4BF-0FD95590208F}" srcOrd="12" destOrd="0" presId="urn:microsoft.com/office/officeart/2008/layout/CircleAccentTimeline"/>
+    <dgm:cxn modelId="{1B05B257-4DD0-498C-9ECF-3ED84D2F8514}" type="presParOf" srcId="{44A526F2-9704-4CCF-BCD3-C67C8B85B3D0}" destId="{511F1C90-448B-403E-B99F-5B4E98AF3658}" srcOrd="13" destOrd="0" presId="urn:microsoft.com/office/officeart/2008/layout/CircleAccentTimeline"/>
+    <dgm:cxn modelId="{72AD946C-454F-4422-A539-317AD378F343}" type="presParOf" srcId="{44A526F2-9704-4CCF-BCD3-C67C8B85B3D0}" destId="{A9A4EA35-26C9-4797-A18C-AE9B3E951B9E}" srcOrd="14" destOrd="0" presId="urn:microsoft.com/office/officeart/2008/layout/CircleAccentTimeline"/>
+    <dgm:cxn modelId="{8F85C192-2A3C-49B1-9074-AD9E020CFACB}" type="presParOf" srcId="{44A526F2-9704-4CCF-BCD3-C67C8B85B3D0}" destId="{A0B8FDBD-9D87-4D37-B9AF-D1D493BAC92F}" srcOrd="15" destOrd="0" presId="urn:microsoft.com/office/officeart/2008/layout/CircleAccentTimeline"/>
+    <dgm:cxn modelId="{D552B1F8-28DB-4C83-93EF-CECEFBE37F99}" type="presParOf" srcId="{A0B8FDBD-9D87-4D37-B9AF-D1D493BAC92F}" destId="{501CB302-E6A0-41DC-97F3-D8A6CE339D3A}" srcOrd="0" destOrd="0" presId="urn:microsoft.com/office/officeart/2008/layout/CircleAccentTimeline"/>
+    <dgm:cxn modelId="{D397BE4A-DD4B-40CB-A0C1-3D5186ACFCDC}" type="presParOf" srcId="{A0B8FDBD-9D87-4D37-B9AF-D1D493BAC92F}" destId="{6DFC4E55-C238-4CD3-AE39-A6B5B3B553C0}" srcOrd="1" destOrd="0" presId="urn:microsoft.com/office/officeart/2008/layout/CircleAccentTimeline"/>
+    <dgm:cxn modelId="{510E32DE-D0CF-4646-B9D5-CE59E18550AE}" type="presParOf" srcId="{A0B8FDBD-9D87-4D37-B9AF-D1D493BAC92F}" destId="{FDFD8208-5EB0-4759-916D-57FFCDF8C9A8}" srcOrd="2" destOrd="0" presId="urn:microsoft.com/office/officeart/2008/layout/CircleAccentTimeline"/>
+    <dgm:cxn modelId="{FA4E9052-5599-4076-969B-BA32131C092B}" type="presParOf" srcId="{44A526F2-9704-4CCF-BCD3-C67C8B85B3D0}" destId="{0DA72D40-0DC2-4965-AE91-1C95AA752D4E}" srcOrd="16" destOrd="0" presId="urn:microsoft.com/office/officeart/2008/layout/CircleAccentTimeline"/>
+    <dgm:cxn modelId="{8F295F97-8D39-4B6D-8714-528F6C1736C0}" type="presParOf" srcId="{44A526F2-9704-4CCF-BCD3-C67C8B85B3D0}" destId="{AFF56AF2-11AC-401F-B56E-892F70B82507}" srcOrd="17" destOrd="0" presId="urn:microsoft.com/office/officeart/2008/layout/CircleAccentTimeline"/>
+    <dgm:cxn modelId="{8E629E37-28FF-4805-A0F9-82D6708CCA63}" type="presParOf" srcId="{44A526F2-9704-4CCF-BCD3-C67C8B85B3D0}" destId="{073F8991-762C-4C74-AE43-1164843380E2}" srcOrd="18" destOrd="0" presId="urn:microsoft.com/office/officeart/2008/layout/CircleAccentTimeline"/>
+    <dgm:cxn modelId="{1CB1485B-7E9D-480F-92D7-2AF735B6253F}" type="presParOf" srcId="{44A526F2-9704-4CCF-BCD3-C67C8B85B3D0}" destId="{0AC56C49-9A2B-47C4-99F1-7120A8966362}" srcOrd="19" destOrd="0" presId="urn:microsoft.com/office/officeart/2008/layout/CircleAccentTimeline"/>
+    <dgm:cxn modelId="{AE4E95FC-6C26-46F5-9721-22F0CEF30F0E}" type="presParOf" srcId="{0AC56C49-9A2B-47C4-99F1-7120A8966362}" destId="{A9FBE3EB-C760-4D38-99D1-941341088C92}" srcOrd="0" destOrd="0" presId="urn:microsoft.com/office/officeart/2008/layout/CircleAccentTimeline"/>
+    <dgm:cxn modelId="{053CEB6B-7C58-499C-8A28-A8075B0BBDC2}" type="presParOf" srcId="{0AC56C49-9A2B-47C4-99F1-7120A8966362}" destId="{FAA2B098-51D4-4067-887A-C83C1261A51C}" srcOrd="1" destOrd="0" presId="urn:microsoft.com/office/officeart/2008/layout/CircleAccentTimeline"/>
+    <dgm:cxn modelId="{4959EFD7-BA16-412C-99FE-B377C3DAD16D}" type="presParOf" srcId="{0AC56C49-9A2B-47C4-99F1-7120A8966362}" destId="{651100C1-FA72-4A1B-B8E0-6AE638CD0874}" srcOrd="2" destOrd="0" presId="urn:microsoft.com/office/officeart/2008/layout/CircleAccentTimeline"/>
+    <dgm:cxn modelId="{7A3148A4-CEEB-4965-B5FD-5E30D7236E52}" type="presParOf" srcId="{44A526F2-9704-4CCF-BCD3-C67C8B85B3D0}" destId="{46B1956E-1133-4D0A-B1AF-209FE8C6BC7A}" srcOrd="20" destOrd="0" presId="urn:microsoft.com/office/officeart/2008/layout/CircleAccentTimeline"/>
+    <dgm:cxn modelId="{10F007E0-4B2F-40C9-AEE4-258881E8EF90}" type="presParOf" srcId="{44A526F2-9704-4CCF-BCD3-C67C8B85B3D0}" destId="{EE5CEAD5-8F04-4246-90CD-B1E766D605D2}" srcOrd="21" destOrd="0" presId="urn:microsoft.com/office/officeart/2008/layout/CircleAccentTimeline"/>
+    <dgm:cxn modelId="{D8C63275-FFAC-4822-B567-13581D28ABE0}" type="presParOf" srcId="{44A526F2-9704-4CCF-BCD3-C67C8B85B3D0}" destId="{30729BC5-28E1-410E-A329-3F56E8125715}" srcOrd="22" destOrd="0" presId="urn:microsoft.com/office/officeart/2008/layout/CircleAccentTimeline"/>
+    <dgm:cxn modelId="{0230E57C-00B9-40CA-8E1B-D4E20CB824D1}" type="presParOf" srcId="{30729BC5-28E1-410E-A329-3F56E8125715}" destId="{5EBE810A-7891-4C02-9C0E-F161AE20AC2F}" srcOrd="0" destOrd="0" presId="urn:microsoft.com/office/officeart/2008/layout/CircleAccentTimeline"/>
+    <dgm:cxn modelId="{E19E327F-DC37-4E3B-B56D-62ABC61EC8F5}" type="presParOf" srcId="{30729BC5-28E1-410E-A329-3F56E8125715}" destId="{FB72DEA4-537A-4147-8D56-48A18869250D}" srcOrd="1" destOrd="0" presId="urn:microsoft.com/office/officeart/2008/layout/CircleAccentTimeline"/>
+    <dgm:cxn modelId="{18EBF17A-872B-408C-8B35-63AF34750515}" type="presParOf" srcId="{30729BC5-28E1-410E-A329-3F56E8125715}" destId="{74833B70-9423-4821-A882-50D3FD3E0BE4}" srcOrd="2" destOrd="0" presId="urn:microsoft.com/office/officeart/2008/layout/CircleAccentTimeline"/>
+    <dgm:cxn modelId="{A18C646D-3C1A-4327-8490-09704EA33FCB}" type="presParOf" srcId="{44A526F2-9704-4CCF-BCD3-C67C8B85B3D0}" destId="{59FF0D6C-7E50-4A0C-94E8-30E23331D08A}" srcOrd="23" destOrd="0" presId="urn:microsoft.com/office/officeart/2008/layout/CircleAccentTimeline"/>
+    <dgm:cxn modelId="{4A474083-2510-4785-836A-9098887D10A2}" type="presParOf" srcId="{44A526F2-9704-4CCF-BCD3-C67C8B85B3D0}" destId="{F4354BF4-01F7-4F85-9E73-D82E03E434B5}" srcOrd="24" destOrd="0" presId="urn:microsoft.com/office/officeart/2008/layout/CircleAccentTimeline"/>
+    <dgm:cxn modelId="{BA10FC87-DC60-4FC7-B1FE-1E4018CDB0D0}" type="presParOf" srcId="{44A526F2-9704-4CCF-BCD3-C67C8B85B3D0}" destId="{C5EAF416-B619-4A42-8480-DBBB4DBF8FB3}" srcOrd="25" destOrd="0" presId="urn:microsoft.com/office/officeart/2008/layout/CircleAccentTimeline"/>
+    <dgm:cxn modelId="{416CCAF8-6C31-4B37-B2F9-6FA2150CF9A3}" type="presParOf" srcId="{44A526F2-9704-4CCF-BCD3-C67C8B85B3D0}" destId="{ABCD4498-5166-45F3-81AD-757D37AA8FE2}" srcOrd="26" destOrd="0" presId="urn:microsoft.com/office/officeart/2008/layout/CircleAccentTimeline"/>
+    <dgm:cxn modelId="{55D6C75E-2A00-4D86-96CE-BF39A67B9E0F}" type="presParOf" srcId="{ABCD4498-5166-45F3-81AD-757D37AA8FE2}" destId="{191086B9-3E46-4C18-8EB5-42DC545151A6}" srcOrd="0" destOrd="0" presId="urn:microsoft.com/office/officeart/2008/layout/CircleAccentTimeline"/>
+    <dgm:cxn modelId="{A792082E-0F04-42E3-923B-76A13E8BC44D}" type="presParOf" srcId="{ABCD4498-5166-45F3-81AD-757D37AA8FE2}" destId="{E339CC44-0883-4D04-952D-E92DDAED2D8E}" srcOrd="1" destOrd="0" presId="urn:microsoft.com/office/officeart/2008/layout/CircleAccentTimeline"/>
+    <dgm:cxn modelId="{3B2B1AE1-089E-4BDA-9306-11241082993C}" type="presParOf" srcId="{ABCD4498-5166-45F3-81AD-757D37AA8FE2}" destId="{BE60AF2B-10F6-41EB-9B3D-C968B3B63B02}" srcOrd="2" destOrd="0" presId="urn:microsoft.com/office/officeart/2008/layout/CircleAccentTimeline"/>
+    <dgm:cxn modelId="{D283DECD-D64F-4F88-B8CF-244D4C620FDC}" type="presParOf" srcId="{44A526F2-9704-4CCF-BCD3-C67C8B85B3D0}" destId="{C5236DF1-9282-4B15-87F3-93B8CC1F88B9}" srcOrd="27" destOrd="0" presId="urn:microsoft.com/office/officeart/2008/layout/CircleAccentTimeline"/>
+    <dgm:cxn modelId="{52B613D3-1DD7-4F23-B9B7-5F82CD5A26B9}" type="presParOf" srcId="{44A526F2-9704-4CCF-BCD3-C67C8B85B3D0}" destId="{E18FE7FA-A6CA-44FE-A39E-334990ACA50E}" srcOrd="28" destOrd="0" presId="urn:microsoft.com/office/officeart/2008/layout/CircleAccentTimeline"/>
+    <dgm:cxn modelId="{DD95C0D3-D5D9-4E65-9286-D976B8DD01A5}" type="presParOf" srcId="{44A526F2-9704-4CCF-BCD3-C67C8B85B3D0}" destId="{DBAD66CD-69C2-4C91-BA5C-1A59AB94F13E}" srcOrd="29" destOrd="0" presId="urn:microsoft.com/office/officeart/2008/layout/CircleAccentTimeline"/>
+    <dgm:cxn modelId="{19E83201-DD34-405A-BDBC-FA75CAE3B299}" type="presParOf" srcId="{44A526F2-9704-4CCF-BCD3-C67C8B85B3D0}" destId="{6E37CCF8-E783-41A5-BDF9-88BEA6797033}" srcOrd="30" destOrd="0" presId="urn:microsoft.com/office/officeart/2008/layout/CircleAccentTimeline"/>
+    <dgm:cxn modelId="{8B7387BA-A5EA-4DA2-885F-AAA7E6853500}" type="presParOf" srcId="{6E37CCF8-E783-41A5-BDF9-88BEA6797033}" destId="{7AFBBAFC-96F3-4846-8EE4-195E86EB71DA}" srcOrd="0" destOrd="0" presId="urn:microsoft.com/office/officeart/2008/layout/CircleAccentTimeline"/>
+    <dgm:cxn modelId="{638660CA-5F66-4C48-AB4F-BAAC7395784E}" type="presParOf" srcId="{6E37CCF8-E783-41A5-BDF9-88BEA6797033}" destId="{E19C2DC8-F392-499F-A712-A44537B3FC02}" srcOrd="1" destOrd="0" presId="urn:microsoft.com/office/officeart/2008/layout/CircleAccentTimeline"/>
+    <dgm:cxn modelId="{4EDF6D12-E5C1-48F6-9C7F-23DA07398D95}" type="presParOf" srcId="{6E37CCF8-E783-41A5-BDF9-88BEA6797033}" destId="{1ECD68C5-1D7A-424E-8665-D233608F296E}" srcOrd="2" destOrd="0" presId="urn:microsoft.com/office/officeart/2008/layout/CircleAccentTimeline"/>
+    <dgm:cxn modelId="{2CE0AC96-82C5-4F74-A241-BBE4CC62F30E}" type="presParOf" srcId="{44A526F2-9704-4CCF-BCD3-C67C8B85B3D0}" destId="{05A5D28E-A522-45B5-AE25-2893749A74BB}" srcOrd="31" destOrd="0" presId="urn:microsoft.com/office/officeart/2008/layout/CircleAccentTimeline"/>
+    <dgm:cxn modelId="{C10275F6-D319-4ECB-A326-CDED90852732}" type="presParOf" srcId="{44A526F2-9704-4CCF-BCD3-C67C8B85B3D0}" destId="{E73517C3-FEAD-4ACB-97C3-6899ED0AD142}" srcOrd="32" destOrd="0" presId="urn:microsoft.com/office/officeart/2008/layout/CircleAccentTimeline"/>
+    <dgm:cxn modelId="{D7F3101A-CBB8-450D-95E6-C3863584A121}" type="presParOf" srcId="{44A526F2-9704-4CCF-BCD3-C67C8B85B3D0}" destId="{550BB4BB-D011-4854-9919-7653B7381C68}" srcOrd="33" destOrd="0" presId="urn:microsoft.com/office/officeart/2008/layout/CircleAccentTimeline"/>
+    <dgm:cxn modelId="{E25D60B8-6FFE-4951-AB7A-237CF2ECC32B}" type="presParOf" srcId="{550BB4BB-D011-4854-9919-7653B7381C68}" destId="{3648EABA-D3F0-4218-B78F-A99C55BA2041}" srcOrd="0" destOrd="0" presId="urn:microsoft.com/office/officeart/2008/layout/CircleAccentTimeline"/>
+    <dgm:cxn modelId="{C3223762-914E-459A-8255-D7B8864B3358}" type="presParOf" srcId="{550BB4BB-D011-4854-9919-7653B7381C68}" destId="{B970DA31-055B-43B9-A012-D4169B3AF7EF}" srcOrd="1" destOrd="0" presId="urn:microsoft.com/office/officeart/2008/layout/CircleAccentTimeline"/>
+    <dgm:cxn modelId="{E7E9ABEE-EECA-4B39-AF55-9D3427708121}" type="presParOf" srcId="{550BB4BB-D011-4854-9919-7653B7381C68}" destId="{DD171AD1-97C8-4720-903D-52761EAB0D2E}" srcOrd="2" destOrd="0" presId="urn:microsoft.com/office/officeart/2008/layout/CircleAccentTimeline"/>
+    <dgm:cxn modelId="{E4A55069-74E0-402A-9F7D-08D628F56F5C}" type="presParOf" srcId="{44A526F2-9704-4CCF-BCD3-C67C8B85B3D0}" destId="{14B6F16C-786A-4E09-B496-43B98DED3C15}" srcOrd="34" destOrd="0" presId="urn:microsoft.com/office/officeart/2008/layout/CircleAccentTimeline"/>
+    <dgm:cxn modelId="{811AAA41-9732-4BD1-9EFD-266D5CB83A28}" type="presParOf" srcId="{44A526F2-9704-4CCF-BCD3-C67C8B85B3D0}" destId="{60EE079F-4D5F-4FC3-9A63-E45B63AE3535}" srcOrd="35" destOrd="0" presId="urn:microsoft.com/office/officeart/2008/layout/CircleAccentTimeline"/>
+    <dgm:cxn modelId="{10728A5F-2985-4DDC-8D08-40C157A7A528}" type="presParOf" srcId="{44A526F2-9704-4CCF-BCD3-C67C8B85B3D0}" destId="{8E879326-F6AF-470F-A0D1-7E15EA71ACA5}" srcOrd="36" destOrd="0" presId="urn:microsoft.com/office/officeart/2008/layout/CircleAccentTimeline"/>
+    <dgm:cxn modelId="{BC7AEC3E-5D11-4392-AF1E-0FCDE5248E72}" type="presParOf" srcId="{44A526F2-9704-4CCF-BCD3-C67C8B85B3D0}" destId="{83A20D1C-6225-42A3-870A-BE7206F78732}" srcOrd="37" destOrd="0" presId="urn:microsoft.com/office/officeart/2008/layout/CircleAccentTimeline"/>
+    <dgm:cxn modelId="{DF174BCA-43A5-406C-816B-FD3BB6BFF1AB}" type="presParOf" srcId="{83A20D1C-6225-42A3-870A-BE7206F78732}" destId="{DCE6F5F6-DE07-45DE-B29E-48C5FFF53841}" srcOrd="0" destOrd="0" presId="urn:microsoft.com/office/officeart/2008/layout/CircleAccentTimeline"/>
+    <dgm:cxn modelId="{5AC7FE46-A340-43D5-AD45-6525650725CB}" type="presParOf" srcId="{83A20D1C-6225-42A3-870A-BE7206F78732}" destId="{54775A38-A56D-4BB8-977E-30F8C06AD61A}" srcOrd="1" destOrd="0" presId="urn:microsoft.com/office/officeart/2008/layout/CircleAccentTimeline"/>
+    <dgm:cxn modelId="{97490FE1-4CE6-44E6-B6E2-8F9B93285B21}" type="presParOf" srcId="{83A20D1C-6225-42A3-870A-BE7206F78732}" destId="{FEF9792E-E78E-483F-8C7A-472BE0A5D023}" srcOrd="2" destOrd="0" presId="urn:microsoft.com/office/officeart/2008/layout/CircleAccentTimeline"/>
+    <dgm:cxn modelId="{CFDD777A-0389-40AC-A65A-62362C9CE3AE}" type="presParOf" srcId="{44A526F2-9704-4CCF-BCD3-C67C8B85B3D0}" destId="{593C2BBA-29C6-4C9B-B1C4-49B9C7EE9173}" srcOrd="38" destOrd="0" presId="urn:microsoft.com/office/officeart/2008/layout/CircleAccentTimeline"/>
+    <dgm:cxn modelId="{1B26B19B-3ABA-4D20-80B7-AE3E6B726880}" type="presParOf" srcId="{44A526F2-9704-4CCF-BCD3-C67C8B85B3D0}" destId="{C38EC906-8FC9-4DFA-B4A4-1492E280CD49}" srcOrd="39" destOrd="0" presId="urn:microsoft.com/office/officeart/2008/layout/CircleAccentTimeline"/>
+    <dgm:cxn modelId="{B15879B9-E6D3-49BC-B1C7-B9D87BE6B36C}" type="presParOf" srcId="{44A526F2-9704-4CCF-BCD3-C67C8B85B3D0}" destId="{331A609E-2653-4360-8BCE-FF8199F1C0B0}" srcOrd="40" destOrd="0" presId="urn:microsoft.com/office/officeart/2008/layout/CircleAccentTimeline"/>
+    <dgm:cxn modelId="{5CAA081A-5572-4BD7-825B-8C5C8EA0DF37}" type="presParOf" srcId="{44A526F2-9704-4CCF-BCD3-C67C8B85B3D0}" destId="{FB2D468B-E1CF-418B-9363-769F8316207A}" srcOrd="41" destOrd="0" presId="urn:microsoft.com/office/officeart/2008/layout/CircleAccentTimeline"/>
+    <dgm:cxn modelId="{83B612D6-0179-4DB8-84D0-20D40F5AC4B4}" type="presParOf" srcId="{FB2D468B-E1CF-418B-9363-769F8316207A}" destId="{0F4919A2-7B5F-45D1-8B9D-93D9E054AC79}" srcOrd="0" destOrd="0" presId="urn:microsoft.com/office/officeart/2008/layout/CircleAccentTimeline"/>
+    <dgm:cxn modelId="{F2E6ACE8-15B4-423A-92F0-23DE88BC4C9A}" type="presParOf" srcId="{FB2D468B-E1CF-418B-9363-769F8316207A}" destId="{19662F01-965A-4DB7-B190-F79AB48F5357}" srcOrd="1" destOrd="0" presId="urn:microsoft.com/office/officeart/2008/layout/CircleAccentTimeline"/>
+    <dgm:cxn modelId="{55F289D7-1AF4-4CC9-8D43-D61F86FCC796}" type="presParOf" srcId="{FB2D468B-E1CF-418B-9363-769F8316207A}" destId="{3693A17A-5E5D-43EE-A35A-97A3BAC021D3}" srcOrd="2" destOrd="0" presId="urn:microsoft.com/office/officeart/2008/layout/CircleAccentTimeline"/>
+    <dgm:cxn modelId="{7FEBB39B-BEE5-41D5-8F59-CBB8994EF9B0}" type="presParOf" srcId="{44A526F2-9704-4CCF-BCD3-C67C8B85B3D0}" destId="{38BDD492-3D3B-4C5E-8C5C-5E75B828F72C}" srcOrd="42" destOrd="0" presId="urn:microsoft.com/office/officeart/2008/layout/CircleAccentTimeline"/>
+    <dgm:cxn modelId="{9D4A5AD9-7770-49EB-9B5A-8AEACD6C339C}" type="presParOf" srcId="{44A526F2-9704-4CCF-BCD3-C67C8B85B3D0}" destId="{D7F8E9D6-5CF2-49FB-8371-92218B305FCB}" srcOrd="43" destOrd="0" presId="urn:microsoft.com/office/officeart/2008/layout/CircleAccentTimeline"/>
+  </dgm:cxnLst>
+  <dgm:bg/>
+  <dgm:whole/>
+  <dgm:extLst>
+    <a:ext uri="http://schemas.microsoft.com/office/drawing/2008/diagram">
+      <dsp:dataModelExt xmlns:dsp="http://schemas.microsoft.com/office/drawing/2008/diagram" relId="rId6" minVer="http://schemas.openxmlformats.org/drawingml/2006/diagram"/>
+    </a:ext>
+  </dgm:extLst>
+</dgm:dataModel>
+</file>
+
+<file path=ppt/diagrams/data3.xml><?xml version="1.0" encoding="utf-8"?>
+<dgm:dataModel xmlns:dgm="http://schemas.openxmlformats.org/drawingml/2006/diagram" xmlns:a="http://schemas.openxmlformats.org/drawingml/2006/main">
+  <dgm:ptLst>
+    <dgm:pt modelId="{5ECA6DCA-C759-48CD-B85E-658D7FF4B9A3}" type="doc">
+      <dgm:prSet loTypeId="urn:microsoft.com/office/officeart/2008/layout/CircleAccentTimeline" loCatId="process" qsTypeId="urn:microsoft.com/office/officeart/2005/8/quickstyle/simple1" qsCatId="simple" csTypeId="urn:microsoft.com/office/officeart/2005/8/colors/colorful4" csCatId="colorful" phldr="1"/>
+      <dgm:spPr/>
+      <dgm:t>
+        <a:bodyPr/>
+        <a:lstStyle/>
+        <a:p>
+          <a:endParaRPr lang="en-GB"/>
+        </a:p>
+      </dgm:t>
+    </dgm:pt>
+    <dgm:pt modelId="{82BB8E71-6E46-4CFA-8FF6-DFA2FD7C079F}">
+      <dgm:prSet phldrT="[Text]" custT="1"/>
+      <dgm:spPr/>
+      <dgm:t>
+        <a:bodyPr/>
+        <a:lstStyle/>
+        <a:p>
+          <a:r>
+            <a:rPr lang="en-GB" sz="2000" b="1" dirty="0" err="1" smtClean="0">
+              <a:latin typeface="Courier New" panose="02070309020205020404" pitchFamily="49" charset="0"/>
+              <a:cs typeface="Courier New" panose="02070309020205020404" pitchFamily="49" charset="0"/>
+            </a:rPr>
+            <a:t>findBBs</a:t>
+          </a:r>
+          <a:endParaRPr lang="en-GB" sz="2000" b="1" dirty="0">
+            <a:latin typeface="Courier New" panose="02070309020205020404" pitchFamily="49" charset="0"/>
+            <a:cs typeface="Courier New" panose="02070309020205020404" pitchFamily="49" charset="0"/>
+          </a:endParaRPr>
+        </a:p>
+      </dgm:t>
+    </dgm:pt>
+    <dgm:pt modelId="{7248C1A9-7B1D-4115-B4C8-3DE468484551}" type="parTrans" cxnId="{8899A5CF-D47D-4454-AB77-2C6EB6C07F52}">
+      <dgm:prSet/>
+      <dgm:spPr/>
+      <dgm:t>
+        <a:bodyPr/>
+        <a:lstStyle/>
+        <a:p>
+          <a:endParaRPr lang="en-GB"/>
+        </a:p>
+      </dgm:t>
+    </dgm:pt>
+    <dgm:pt modelId="{482E10F3-6897-440A-8111-658C31AB03C6}" type="sibTrans" cxnId="{8899A5CF-D47D-4454-AB77-2C6EB6C07F52}">
+      <dgm:prSet/>
+      <dgm:spPr/>
+      <dgm:t>
+        <a:bodyPr/>
+        <a:lstStyle/>
+        <a:p>
+          <a:endParaRPr lang="en-GB"/>
+        </a:p>
+      </dgm:t>
+    </dgm:pt>
+    <dgm:pt modelId="{B0E57D30-8025-4D63-A6B2-6DD851E4B257}">
+      <dgm:prSet phldrT="[Text]" custT="1"/>
+      <dgm:spPr/>
+      <dgm:t>
+        <a:bodyPr/>
+        <a:lstStyle/>
+        <a:p>
+          <a:r>
+            <a:rPr lang="en-GB" sz="1600" dirty="0" smtClean="0"/>
+            <a:t>Output image, labels</a:t>
+          </a:r>
+          <a:endParaRPr lang="en-GB" sz="1600" dirty="0"/>
+        </a:p>
+      </dgm:t>
+    </dgm:pt>
+    <dgm:pt modelId="{746CB427-6D26-4E6A-830D-7EDA354BC3C0}" type="parTrans" cxnId="{C4E82EDA-5EFE-4861-A557-A91548699321}">
+      <dgm:prSet/>
+      <dgm:spPr/>
+      <dgm:t>
+        <a:bodyPr/>
+        <a:lstStyle/>
+        <a:p>
+          <a:endParaRPr lang="en-GB"/>
+        </a:p>
+      </dgm:t>
+    </dgm:pt>
+    <dgm:pt modelId="{5D7B4CB4-3A01-4E2E-BED0-F2EB71B6957A}" type="sibTrans" cxnId="{C4E82EDA-5EFE-4861-A557-A91548699321}">
+      <dgm:prSet/>
+      <dgm:spPr/>
+      <dgm:t>
+        <a:bodyPr/>
+        <a:lstStyle/>
+        <a:p>
+          <a:endParaRPr lang="en-GB"/>
+        </a:p>
+      </dgm:t>
+    </dgm:pt>
+    <dgm:pt modelId="{C97BDEEB-78B6-4994-8F20-0BA55313DF32}">
+      <dgm:prSet phldrT="[Text]" custT="1"/>
+      <dgm:spPr/>
+      <dgm:t>
+        <a:bodyPr/>
+        <a:lstStyle/>
+        <a:p>
+          <a:r>
+            <a:rPr lang="en-GB" sz="1600" dirty="0" smtClean="0"/>
+            <a:t>Bounding box vector</a:t>
+          </a:r>
+          <a:endParaRPr lang="en-GB" sz="1600" dirty="0"/>
+        </a:p>
+      </dgm:t>
+    </dgm:pt>
+    <dgm:pt modelId="{BE43B0C8-D79E-4748-BAFD-390E33BD03C0}" type="parTrans" cxnId="{CB5DBCD1-DBF7-4F9F-8174-757AD43B183F}">
+      <dgm:prSet/>
+      <dgm:spPr/>
+      <dgm:t>
+        <a:bodyPr/>
+        <a:lstStyle/>
+        <a:p>
+          <a:endParaRPr lang="en-GB"/>
+        </a:p>
+      </dgm:t>
+    </dgm:pt>
+    <dgm:pt modelId="{0FA685D8-3AD6-419A-9F68-49BC56316D17}" type="sibTrans" cxnId="{CB5DBCD1-DBF7-4F9F-8174-757AD43B183F}">
+      <dgm:prSet/>
+      <dgm:spPr/>
+      <dgm:t>
+        <a:bodyPr/>
+        <a:lstStyle/>
+        <a:p>
+          <a:endParaRPr lang="en-GB"/>
+        </a:p>
+      </dgm:t>
+    </dgm:pt>
+    <dgm:pt modelId="{5077B2D9-722E-4285-B280-2CD035099AE6}">
+      <dgm:prSet phldrT="[Text]" custT="1"/>
+      <dgm:spPr/>
+      <dgm:t>
+        <a:bodyPr/>
+        <a:lstStyle/>
+        <a:p>
+          <a:r>
+            <a:rPr lang="en-GB" sz="2000" b="1" dirty="0" err="1" smtClean="0">
+              <a:latin typeface="Courier New" panose="02070309020205020404" pitchFamily="49" charset="0"/>
+              <a:cs typeface="Courier New" panose="02070309020205020404" pitchFamily="49" charset="0"/>
+            </a:rPr>
+            <a:t>selectBBs</a:t>
+          </a:r>
+          <a:endParaRPr lang="en-GB" sz="2000" b="1" dirty="0">
+            <a:latin typeface="Courier New" panose="02070309020205020404" pitchFamily="49" charset="0"/>
+            <a:cs typeface="Courier New" panose="02070309020205020404" pitchFamily="49" charset="0"/>
+          </a:endParaRPr>
+        </a:p>
+      </dgm:t>
+    </dgm:pt>
+    <dgm:pt modelId="{8EFEC4A1-5895-4CAB-8F37-DD30FC875CFC}" type="parTrans" cxnId="{627016CB-F302-4FA9-8BE7-1F8640A37739}">
+      <dgm:prSet/>
+      <dgm:spPr/>
+      <dgm:t>
+        <a:bodyPr/>
+        <a:lstStyle/>
+        <a:p>
+          <a:endParaRPr lang="en-GB"/>
+        </a:p>
+      </dgm:t>
+    </dgm:pt>
+    <dgm:pt modelId="{035A84C1-AC43-4EFD-ADEE-7E7792CBF826}" type="sibTrans" cxnId="{627016CB-F302-4FA9-8BE7-1F8640A37739}">
+      <dgm:prSet/>
+      <dgm:spPr/>
+      <dgm:t>
+        <a:bodyPr/>
+        <a:lstStyle/>
+        <a:p>
+          <a:endParaRPr lang="en-GB"/>
+        </a:p>
+      </dgm:t>
+    </dgm:pt>
+    <dgm:pt modelId="{CD212DAD-B19C-4C50-B5CF-C2B393CA84B3}">
+      <dgm:prSet phldrT="[Text]" custT="1"/>
+      <dgm:spPr/>
+      <dgm:t>
+        <a:bodyPr/>
+        <a:lstStyle/>
+        <a:p>
+          <a:r>
+            <a:rPr lang="en-GB" sz="1400" dirty="0" smtClean="0"/>
+            <a:t>Bounding box vector</a:t>
+          </a:r>
+          <a:endParaRPr lang="en-GB" sz="1400" dirty="0"/>
+        </a:p>
+      </dgm:t>
+    </dgm:pt>
+    <dgm:pt modelId="{F69E3CF4-0B6F-40EE-9095-19E4E6E0D05B}" type="parTrans" cxnId="{5337B3DB-3CB2-446C-B21B-62DB974F675A}">
+      <dgm:prSet/>
+      <dgm:spPr/>
+      <dgm:t>
+        <a:bodyPr/>
+        <a:lstStyle/>
+        <a:p>
+          <a:endParaRPr lang="en-GB"/>
+        </a:p>
+      </dgm:t>
+    </dgm:pt>
+    <dgm:pt modelId="{0D8F5FB1-6A95-4B31-A43E-0CFFFF429532}" type="sibTrans" cxnId="{5337B3DB-3CB2-446C-B21B-62DB974F675A}">
+      <dgm:prSet/>
+      <dgm:spPr/>
+      <dgm:t>
+        <a:bodyPr/>
+        <a:lstStyle/>
+        <a:p>
+          <a:endParaRPr lang="en-GB"/>
+        </a:p>
+      </dgm:t>
+    </dgm:pt>
+    <dgm:pt modelId="{E6423BA6-930D-4A15-84AA-0BEC7878629E}">
+      <dgm:prSet phldrT="[Text]" custT="1"/>
+      <dgm:spPr/>
+      <dgm:t>
+        <a:bodyPr/>
+        <a:lstStyle/>
+        <a:p>
+          <a:r>
+            <a:rPr lang="en-GB" sz="1400" dirty="0" smtClean="0"/>
+            <a:t>Bounding box validity, selected bounding box index</a:t>
+          </a:r>
+          <a:endParaRPr lang="en-GB" sz="1400" dirty="0"/>
+        </a:p>
+      </dgm:t>
+    </dgm:pt>
+    <dgm:pt modelId="{1B2719A0-218C-47D9-8D35-5517C2413DC0}" type="parTrans" cxnId="{66B2CCE3-2FDE-4CDB-825D-F1DCA07C9337}">
+      <dgm:prSet/>
+      <dgm:spPr/>
+      <dgm:t>
+        <a:bodyPr/>
+        <a:lstStyle/>
+        <a:p>
+          <a:endParaRPr lang="en-GB"/>
+        </a:p>
+      </dgm:t>
+    </dgm:pt>
+    <dgm:pt modelId="{5D5EA7DB-6C66-46ED-ADE7-400DA25E32AF}" type="sibTrans" cxnId="{66B2CCE3-2FDE-4CDB-825D-F1DCA07C9337}">
+      <dgm:prSet/>
+      <dgm:spPr/>
+      <dgm:t>
+        <a:bodyPr/>
+        <a:lstStyle/>
+        <a:p>
+          <a:endParaRPr lang="en-GB"/>
+        </a:p>
+      </dgm:t>
+    </dgm:pt>
+    <dgm:pt modelId="{366A18A4-A553-4F6D-89E8-15504C0011BD}">
+      <dgm:prSet phldrT="[Text]" custT="1"/>
+      <dgm:spPr/>
+      <dgm:t>
+        <a:bodyPr/>
+        <a:lstStyle/>
+        <a:p>
+          <a:r>
+            <a:rPr lang="en-GB" sz="2000" b="1" dirty="0" err="1" smtClean="0">
+              <a:latin typeface="Courier New" panose="02070309020205020404" pitchFamily="49" charset="0"/>
+              <a:cs typeface="Courier New" panose="02070309020205020404" pitchFamily="49" charset="0"/>
+            </a:rPr>
+            <a:t>drawBB</a:t>
+          </a:r>
+          <a:endParaRPr lang="en-GB" sz="2000" b="1" dirty="0">
+            <a:latin typeface="Courier New" panose="02070309020205020404" pitchFamily="49" charset="0"/>
+            <a:cs typeface="Courier New" panose="02070309020205020404" pitchFamily="49" charset="0"/>
+          </a:endParaRPr>
+        </a:p>
+      </dgm:t>
+    </dgm:pt>
+    <dgm:pt modelId="{1BA40D3A-1335-49EC-86DB-439AE895CE00}" type="parTrans" cxnId="{1BBE9534-E3CB-414E-A17C-1480980549CE}">
+      <dgm:prSet/>
+      <dgm:spPr/>
+      <dgm:t>
+        <a:bodyPr/>
+        <a:lstStyle/>
+        <a:p>
+          <a:endParaRPr lang="en-GB"/>
+        </a:p>
+      </dgm:t>
+    </dgm:pt>
+    <dgm:pt modelId="{65B22984-A5BA-4456-9BC9-89A37A57521F}" type="sibTrans" cxnId="{1BBE9534-E3CB-414E-A17C-1480980549CE}">
+      <dgm:prSet/>
+      <dgm:spPr/>
+      <dgm:t>
+        <a:bodyPr/>
+        <a:lstStyle/>
+        <a:p>
+          <a:endParaRPr lang="en-GB"/>
+        </a:p>
+      </dgm:t>
+    </dgm:pt>
+    <dgm:pt modelId="{11E7C407-5F8B-42CF-80BE-F8449BE9286F}">
+      <dgm:prSet phldrT="[Text]" custT="1"/>
+      <dgm:spPr/>
+      <dgm:t>
+        <a:bodyPr/>
+        <a:lstStyle/>
+        <a:p>
+          <a:r>
+            <a:rPr lang="en-GB" sz="1400" dirty="0" smtClean="0"/>
+            <a:t>Filenames, output image, bounding box vector, selected bounding box</a:t>
+          </a:r>
+          <a:endParaRPr lang="en-GB" sz="1400" dirty="0"/>
+        </a:p>
+      </dgm:t>
+    </dgm:pt>
+    <dgm:pt modelId="{8A7813E9-C67F-4A2A-8F1B-7B2B945E8B8B}" type="parTrans" cxnId="{1FCDF06B-FCD0-43A5-9D77-23FB1B9CAAFC}">
+      <dgm:prSet/>
+      <dgm:spPr/>
+      <dgm:t>
+        <a:bodyPr/>
+        <a:lstStyle/>
+        <a:p>
+          <a:endParaRPr lang="en-GB"/>
+        </a:p>
+      </dgm:t>
+    </dgm:pt>
+    <dgm:pt modelId="{FB4F6F0B-A797-4C22-BFE0-637B18256177}" type="sibTrans" cxnId="{1FCDF06B-FCD0-43A5-9D77-23FB1B9CAAFC}">
+      <dgm:prSet/>
+      <dgm:spPr/>
+      <dgm:t>
+        <a:bodyPr/>
+        <a:lstStyle/>
+        <a:p>
+          <a:endParaRPr lang="en-GB"/>
+        </a:p>
+      </dgm:t>
+    </dgm:pt>
+    <dgm:pt modelId="{ED50F0F3-F6CB-41EF-8344-FE1F75C670EB}">
+      <dgm:prSet phldrT="[Text]" custT="1"/>
+      <dgm:spPr/>
+      <dgm:t>
+        <a:bodyPr/>
+        <a:lstStyle/>
+        <a:p>
+          <a:r>
+            <a:rPr lang="en-GB" sz="1400" dirty="0" smtClean="0"/>
+            <a:t>Difference image (.bin.png) generated</a:t>
+          </a:r>
+          <a:endParaRPr lang="en-GB" sz="1400" dirty="0"/>
+        </a:p>
+      </dgm:t>
+    </dgm:pt>
+    <dgm:pt modelId="{930170D7-F4DE-481B-AE30-2FB22E7FE43B}" type="parTrans" cxnId="{19A1C997-14F3-403F-B231-CEB9AF2FFDAB}">
+      <dgm:prSet/>
+      <dgm:spPr/>
+      <dgm:t>
+        <a:bodyPr/>
+        <a:lstStyle/>
+        <a:p>
+          <a:endParaRPr lang="en-GB"/>
+        </a:p>
+      </dgm:t>
+    </dgm:pt>
+    <dgm:pt modelId="{D377E90B-B98C-4304-8523-95AFF0234517}" type="sibTrans" cxnId="{19A1C997-14F3-403F-B231-CEB9AF2FFDAB}">
+      <dgm:prSet/>
+      <dgm:spPr/>
+      <dgm:t>
+        <a:bodyPr/>
+        <a:lstStyle/>
+        <a:p>
+          <a:endParaRPr lang="en-GB"/>
+        </a:p>
+      </dgm:t>
+    </dgm:pt>
+    <dgm:pt modelId="{B7A11CD5-84DD-4E26-B454-D70500B3FF9A}">
       <dgm:prSet phldrT="[Text]" custT="1"/>
       <dgm:spPr/>
       <dgm:t>
@@ -3096,7 +4145,7 @@
         </a:p>
       </dgm:t>
     </dgm:pt>
-    <dgm:pt modelId="{55647FD8-D986-4081-8079-1EA262561242}" type="parTrans" cxnId="{DD2CCE95-2DAC-4214-8E8A-4D788E51CD50}">
+    <dgm:pt modelId="{815E9BA0-49D2-4E2E-B4F3-5C9D789ED7E6}" type="parTrans" cxnId="{161B6901-66C5-42B8-BA50-EE44197B793F}">
       <dgm:prSet/>
       <dgm:spPr/>
       <dgm:t>
@@ -3107,7 +4156,7 @@
         </a:p>
       </dgm:t>
     </dgm:pt>
-    <dgm:pt modelId="{3C089AB6-5D32-4126-96E7-52A048E739F9}" type="sibTrans" cxnId="{DD2CCE95-2DAC-4214-8E8A-4D788E51CD50}">
+    <dgm:pt modelId="{89586516-59F2-4A9D-B145-1CF4F72F7E3D}" type="sibTrans" cxnId="{161B6901-66C5-42B8-BA50-EE44197B793F}">
       <dgm:prSet/>
       <dgm:spPr/>
       <dgm:t>
@@ -3118,7 +4167,7 @@
         </a:p>
       </dgm:t>
     </dgm:pt>
-    <dgm:pt modelId="{40E6FD91-4F22-4466-8458-B36681D8EE13}">
+    <dgm:pt modelId="{FAA5D020-0509-403E-903F-AEBD56157E2E}">
       <dgm:prSet phldrT="[Text]" custT="1"/>
       <dgm:spPr/>
       <dgm:t>
@@ -3133,7 +4182,7 @@
         </a:p>
       </dgm:t>
     </dgm:pt>
-    <dgm:pt modelId="{ACB08A7B-7532-4BDD-AD1A-92456FA1FDAF}" type="parTrans" cxnId="{E4DBCA2F-8B4B-412A-8A51-2E40140F8175}">
+    <dgm:pt modelId="{C75980B1-7490-4614-8305-D8A61406323C}" type="parTrans" cxnId="{FDB57652-7516-4746-9070-FE5C149C7D42}">
       <dgm:prSet/>
       <dgm:spPr/>
       <dgm:t>
@@ -3144,7 +4193,7 @@
         </a:p>
       </dgm:t>
     </dgm:pt>
-    <dgm:pt modelId="{AE1DD574-9654-4DA2-8916-EFB1A2AD16D0}" type="sibTrans" cxnId="{E4DBCA2F-8B4B-412A-8A51-2E40140F8175}">
+    <dgm:pt modelId="{5CFD6F5B-9CC0-4A15-9BC7-8083CD8781FF}" type="sibTrans" cxnId="{FDB57652-7516-4746-9070-FE5C149C7D42}">
       <dgm:prSet/>
       <dgm:spPr/>
       <dgm:t>
@@ -3155,7 +4204,7 @@
         </a:p>
       </dgm:t>
     </dgm:pt>
-    <dgm:pt modelId="{C2432358-4D70-4C8B-A8AF-920748B8950A}">
+    <dgm:pt modelId="{1CB4436E-0474-4FA4-9F16-D7347F10E0B1}">
       <dgm:prSet phldrT="[Text]" custT="1"/>
       <dgm:spPr/>
       <dgm:t>
@@ -3170,7 +4219,7 @@
         </a:p>
       </dgm:t>
     </dgm:pt>
-    <dgm:pt modelId="{D0D1251C-E01A-485C-B343-257E3F70CC9F}" type="parTrans" cxnId="{928AEF51-51A8-401A-A75F-CFBE984BEAF0}">
+    <dgm:pt modelId="{BA98535D-08A4-4F8C-9794-8A248BE570A5}" type="parTrans" cxnId="{09FFE4BA-2430-44F8-AA41-C3CFD8F027CF}">
       <dgm:prSet/>
       <dgm:spPr/>
       <dgm:t>
@@ -3181,7 +4230,7 @@
         </a:p>
       </dgm:t>
     </dgm:pt>
-    <dgm:pt modelId="{6C7CB5EA-54D0-402E-927E-9A3EC900A38F}" type="sibTrans" cxnId="{928AEF51-51A8-401A-A75F-CFBE984BEAF0}">
+    <dgm:pt modelId="{64D97E92-0574-4590-A617-468711B2781A}" type="sibTrans" cxnId="{09FFE4BA-2430-44F8-AA41-C3CFD8F027CF}">
       <dgm:prSet/>
       <dgm:spPr/>
       <dgm:t>
@@ -3192,52 +4241,12 @@
         </a:p>
       </dgm:t>
     </dgm:pt>
-    <dgm:pt modelId="{465CCDA1-02CB-4593-AE03-73A38FC8C4F5}" type="pres">
-      <dgm:prSet presAssocID="{F0F87F6D-4F65-4D13-A8E4-A6853B1EF6AD}" presName="Name0" presStyleCnt="0">
+    <dgm:pt modelId="{CC9436CB-A383-46C2-A127-293D0FD488D9}" type="pres">
+      <dgm:prSet presAssocID="{5ECA6DCA-C759-48CD-B85E-658D7FF4B9A3}" presName="Name0" presStyleCnt="0">
         <dgm:presLayoutVars>
           <dgm:dir/>
         </dgm:presLayoutVars>
       </dgm:prSet>
-      <dgm:spPr/>
-    </dgm:pt>
-    <dgm:pt modelId="{C9C0B96E-3A49-427D-B6F0-2C51FFD90E4B}" type="pres">
-      <dgm:prSet presAssocID="{45D78C88-24C5-4C14-BA2F-3B03F3B2EF4E}" presName="parComposite" presStyleCnt="0"/>
-      <dgm:spPr/>
-    </dgm:pt>
-    <dgm:pt modelId="{9688400C-9B1C-4922-A6B4-205FC5699ACD}" type="pres">
-      <dgm:prSet presAssocID="{45D78C88-24C5-4C14-BA2F-3B03F3B2EF4E}" presName="parBigCircle" presStyleLbl="node0" presStyleIdx="0" presStyleCnt="4"/>
-      <dgm:spPr/>
-    </dgm:pt>
-    <dgm:pt modelId="{13170522-CB26-466F-9CA0-0D90ED23F89F}" type="pres">
-      <dgm:prSet presAssocID="{45D78C88-24C5-4C14-BA2F-3B03F3B2EF4E}" presName="parTx" presStyleLbl="revTx" presStyleIdx="0" presStyleCnt="20" custScaleX="100638" custScaleY="369791" custLinFactNeighborX="5735" custLinFactNeighborY="-2323"/>
-      <dgm:spPr/>
-    </dgm:pt>
-    <dgm:pt modelId="{0E309449-D750-49E0-885D-5F321D8656B9}" type="pres">
-      <dgm:prSet presAssocID="{45D78C88-24C5-4C14-BA2F-3B03F3B2EF4E}" presName="bSpace" presStyleCnt="0"/>
-      <dgm:spPr/>
-    </dgm:pt>
-    <dgm:pt modelId="{34056A3D-B389-4A38-9895-9C6FDBE32613}" type="pres">
-      <dgm:prSet presAssocID="{45D78C88-24C5-4C14-BA2F-3B03F3B2EF4E}" presName="parBackupNorm" presStyleCnt="0"/>
-      <dgm:spPr/>
-    </dgm:pt>
-    <dgm:pt modelId="{496D9B44-4570-4757-8C8F-6BE9E025191E}" type="pres">
-      <dgm:prSet presAssocID="{F167DC11-2313-4B88-BE12-5E363D5AA8AE}" presName="parSpace" presStyleCnt="0"/>
-      <dgm:spPr/>
-    </dgm:pt>
-    <dgm:pt modelId="{B34ACB6F-E99F-484E-B4F9-884A5F6527CF}" type="pres">
-      <dgm:prSet presAssocID="{03101640-68C5-4728-95FE-C8A4350669A5}" presName="desBackupLeftNorm" presStyleCnt="0"/>
-      <dgm:spPr/>
-    </dgm:pt>
-    <dgm:pt modelId="{7307AECF-08B3-4012-B5DF-7D8B0A80E081}" type="pres">
-      <dgm:prSet presAssocID="{03101640-68C5-4728-95FE-C8A4350669A5}" presName="desComposite" presStyleCnt="0"/>
-      <dgm:spPr/>
-    </dgm:pt>
-    <dgm:pt modelId="{C1324DF7-F3DA-473B-BA62-047A938E5C04}" type="pres">
-      <dgm:prSet presAssocID="{03101640-68C5-4728-95FE-C8A4350669A5}" presName="desCircle" presStyleLbl="node1" presStyleIdx="0" presStyleCnt="8"/>
-      <dgm:spPr/>
-    </dgm:pt>
-    <dgm:pt modelId="{DBB0E32A-4E7D-4E35-BEDA-799FEABC310A}" type="pres">
-      <dgm:prSet presAssocID="{03101640-68C5-4728-95FE-C8A4350669A5}" presName="chTx" presStyleLbl="revTx" presStyleIdx="1" presStyleCnt="20"/>
       <dgm:spPr/>
       <dgm:t>
         <a:bodyPr/>
@@ -3247,36 +4256,16 @@
         </a:p>
       </dgm:t>
     </dgm:pt>
-    <dgm:pt modelId="{20FA75F1-CEEF-4297-BB56-8F68CDB693CE}" type="pres">
-      <dgm:prSet presAssocID="{03101640-68C5-4728-95FE-C8A4350669A5}" presName="desTx" presStyleLbl="revTx" presStyleIdx="2" presStyleCnt="20">
-        <dgm:presLayoutVars>
-          <dgm:bulletEnabled val="1"/>
-        </dgm:presLayoutVars>
-      </dgm:prSet>
-      <dgm:spPr/>
-    </dgm:pt>
-    <dgm:pt modelId="{41FFE963-5F85-4AAD-BCFE-2EC6F98D8D3A}" type="pres">
-      <dgm:prSet presAssocID="{03101640-68C5-4728-95FE-C8A4350669A5}" presName="desBackupRightNorm" presStyleCnt="0"/>
-      <dgm:spPr/>
-    </dgm:pt>
-    <dgm:pt modelId="{9F1CB8BA-3142-4DD7-A356-0AA771638158}" type="pres">
-      <dgm:prSet presAssocID="{67124F03-9780-4589-9351-C03DE250B390}" presName="desSpace" presStyleCnt="0"/>
-      <dgm:spPr/>
-    </dgm:pt>
-    <dgm:pt modelId="{EE0D6F23-196F-4C91-BC47-8F6987F15D79}" type="pres">
-      <dgm:prSet presAssocID="{F3DE65EB-FE54-4BAB-833C-44BDC0E2E37A}" presName="desBackupLeftNorm" presStyleCnt="0"/>
-      <dgm:spPr/>
-    </dgm:pt>
-    <dgm:pt modelId="{DC6D7C8B-D0B9-4820-B4BA-8A1E68216E68}" type="pres">
-      <dgm:prSet presAssocID="{F3DE65EB-FE54-4BAB-833C-44BDC0E2E37A}" presName="desComposite" presStyleCnt="0"/>
-      <dgm:spPr/>
-    </dgm:pt>
-    <dgm:pt modelId="{E80C5DA5-89D8-455E-A2A0-C6B709B878CE}" type="pres">
-      <dgm:prSet presAssocID="{F3DE65EB-FE54-4BAB-833C-44BDC0E2E37A}" presName="desCircle" presStyleLbl="node1" presStyleIdx="1" presStyleCnt="8"/>
-      <dgm:spPr/>
-    </dgm:pt>
-    <dgm:pt modelId="{92B0746D-0CB2-4048-8D10-9D48BDA0DB9E}" type="pres">
-      <dgm:prSet presAssocID="{F3DE65EB-FE54-4BAB-833C-44BDC0E2E37A}" presName="chTx" presStyleLbl="revTx" presStyleIdx="3" presStyleCnt="20"/>
+    <dgm:pt modelId="{776C68B5-BC55-4C12-AECC-3BFC4E5FC6C9}" type="pres">
+      <dgm:prSet presAssocID="{B7A11CD5-84DD-4E26-B454-D70500B3FF9A}" presName="parComposite" presStyleCnt="0"/>
+      <dgm:spPr/>
+    </dgm:pt>
+    <dgm:pt modelId="{33EA8CD0-4107-414E-85B3-A6B3CAFE3303}" type="pres">
+      <dgm:prSet presAssocID="{B7A11CD5-84DD-4E26-B454-D70500B3FF9A}" presName="parBigCircle" presStyleLbl="node0" presStyleIdx="0" presStyleCnt="4" custLinFactNeighborX="22722" custLinFactNeighborY="-2435"/>
+      <dgm:spPr/>
+    </dgm:pt>
+    <dgm:pt modelId="{138D8308-1825-4093-AA5E-7A021D04E4DE}" type="pres">
+      <dgm:prSet presAssocID="{B7A11CD5-84DD-4E26-B454-D70500B3FF9A}" presName="parTx" presStyleLbl="revTx" presStyleIdx="0" presStyleCnt="20" custScaleX="146721" custScaleY="160337" custLinFactNeighborX="31099" custLinFactNeighborY="-22247"/>
       <dgm:spPr/>
       <dgm:t>
         <a:bodyPr/>
@@ -3286,60 +4275,32 @@
         </a:p>
       </dgm:t>
     </dgm:pt>
-    <dgm:pt modelId="{8CB45ED5-BF85-4D66-AE26-8BFBBDFF06CF}" type="pres">
-      <dgm:prSet presAssocID="{F3DE65EB-FE54-4BAB-833C-44BDC0E2E37A}" presName="desTx" presStyleLbl="revTx" presStyleIdx="4" presStyleCnt="20">
-        <dgm:presLayoutVars>
-          <dgm:bulletEnabled val="1"/>
-        </dgm:presLayoutVars>
-      </dgm:prSet>
-      <dgm:spPr/>
-    </dgm:pt>
-    <dgm:pt modelId="{2A9F5105-DC67-4F8C-8D01-BC7A8431B153}" type="pres">
-      <dgm:prSet presAssocID="{F3DE65EB-FE54-4BAB-833C-44BDC0E2E37A}" presName="desBackupRightNorm" presStyleCnt="0"/>
-      <dgm:spPr/>
-    </dgm:pt>
-    <dgm:pt modelId="{DE2D3D58-CCF2-4B42-A8D2-031A36691FFF}" type="pres">
-      <dgm:prSet presAssocID="{61806595-60D0-434A-9D91-FEACF3516096}" presName="desSpace" presStyleCnt="0"/>
-      <dgm:spPr/>
-    </dgm:pt>
-    <dgm:pt modelId="{C252EBE7-AFCF-4C6C-8541-9C1160331615}" type="pres">
-      <dgm:prSet presAssocID="{AA1F47CE-D52E-44B1-9A6B-2F421FCC85E1}" presName="parComposite" presStyleCnt="0"/>
-      <dgm:spPr/>
-    </dgm:pt>
-    <dgm:pt modelId="{2BDA2006-D2CC-4271-8953-F05A714AC723}" type="pres">
-      <dgm:prSet presAssocID="{AA1F47CE-D52E-44B1-9A6B-2F421FCC85E1}" presName="parBigCircle" presStyleLbl="node0" presStyleIdx="1" presStyleCnt="4"/>
-      <dgm:spPr/>
-    </dgm:pt>
-    <dgm:pt modelId="{4AAD5A86-CDC5-4210-91CD-D7F23622A03D}" type="pres">
-      <dgm:prSet presAssocID="{AA1F47CE-D52E-44B1-9A6B-2F421FCC85E1}" presName="parTx" presStyleLbl="revTx" presStyleIdx="5" presStyleCnt="20" custScaleX="121410" custScaleY="144694" custLinFactNeighborX="6118" custLinFactNeighborY="-9109"/>
-      <dgm:spPr/>
-    </dgm:pt>
-    <dgm:pt modelId="{7A800816-76BE-46AC-969E-9BD5BFECD37C}" type="pres">
-      <dgm:prSet presAssocID="{AA1F47CE-D52E-44B1-9A6B-2F421FCC85E1}" presName="bSpace" presStyleCnt="0"/>
-      <dgm:spPr/>
-    </dgm:pt>
-    <dgm:pt modelId="{67596111-D67A-44D4-85A4-547BDF4749AB}" type="pres">
-      <dgm:prSet presAssocID="{AA1F47CE-D52E-44B1-9A6B-2F421FCC85E1}" presName="parBackupNorm" presStyleCnt="0"/>
-      <dgm:spPr/>
-    </dgm:pt>
-    <dgm:pt modelId="{D2E39FCE-7922-491E-9C61-1B6AEAE2B6E5}" type="pres">
-      <dgm:prSet presAssocID="{D0021959-7147-481A-97FB-2C4482611FB1}" presName="parSpace" presStyleCnt="0"/>
-      <dgm:spPr/>
-    </dgm:pt>
-    <dgm:pt modelId="{43151C5D-2277-4998-8D14-B714104206CD}" type="pres">
-      <dgm:prSet presAssocID="{EF12AC74-949B-49AF-9227-763FD769DE71}" presName="desBackupLeftNorm" presStyleCnt="0"/>
-      <dgm:spPr/>
-    </dgm:pt>
-    <dgm:pt modelId="{07E7184C-C805-487B-B48D-C7D76F251B35}" type="pres">
-      <dgm:prSet presAssocID="{EF12AC74-949B-49AF-9227-763FD769DE71}" presName="desComposite" presStyleCnt="0"/>
-      <dgm:spPr/>
-    </dgm:pt>
-    <dgm:pt modelId="{05E5D5B0-32D7-4D16-BF77-F9373A0B2F36}" type="pres">
-      <dgm:prSet presAssocID="{EF12AC74-949B-49AF-9227-763FD769DE71}" presName="desCircle" presStyleLbl="node1" presStyleIdx="2" presStyleCnt="8"/>
-      <dgm:spPr/>
-    </dgm:pt>
-    <dgm:pt modelId="{835E47B9-A54D-4E11-A093-8B3E340D9D00}" type="pres">
-      <dgm:prSet presAssocID="{EF12AC74-949B-49AF-9227-763FD769DE71}" presName="chTx" presStyleLbl="revTx" presStyleIdx="6" presStyleCnt="20"/>
+    <dgm:pt modelId="{10ECC972-E5E3-4BA4-888D-B40B01CBF4CF}" type="pres">
+      <dgm:prSet presAssocID="{B7A11CD5-84DD-4E26-B454-D70500B3FF9A}" presName="bSpace" presStyleCnt="0"/>
+      <dgm:spPr/>
+    </dgm:pt>
+    <dgm:pt modelId="{317374B4-FB1E-4992-84B6-D57C3D7658C6}" type="pres">
+      <dgm:prSet presAssocID="{B7A11CD5-84DD-4E26-B454-D70500B3FF9A}" presName="parBackupNorm" presStyleCnt="0"/>
+      <dgm:spPr/>
+    </dgm:pt>
+    <dgm:pt modelId="{64F9066A-5387-4D7D-9AEF-741F7197DAB1}" type="pres">
+      <dgm:prSet presAssocID="{89586516-59F2-4A9D-B145-1CF4F72F7E3D}" presName="parSpace" presStyleCnt="0"/>
+      <dgm:spPr/>
+    </dgm:pt>
+    <dgm:pt modelId="{300FFDBB-5191-4E9B-9F8B-0683B8BDB31A}" type="pres">
+      <dgm:prSet presAssocID="{FAA5D020-0509-403E-903F-AEBD56157E2E}" presName="desBackupLeftNorm" presStyleCnt="0"/>
+      <dgm:spPr/>
+    </dgm:pt>
+    <dgm:pt modelId="{CEB4ACAA-4D3A-4092-A32E-D7A7279FC6DD}" type="pres">
+      <dgm:prSet presAssocID="{FAA5D020-0509-403E-903F-AEBD56157E2E}" presName="desComposite" presStyleCnt="0"/>
+      <dgm:spPr/>
+    </dgm:pt>
+    <dgm:pt modelId="{DBF3E5A5-B586-4C1B-93A4-4D45FA876099}" type="pres">
+      <dgm:prSet presAssocID="{FAA5D020-0509-403E-903F-AEBD56157E2E}" presName="desCircle" presStyleLbl="node1" presStyleIdx="0" presStyleCnt="8"/>
+      <dgm:spPr/>
+    </dgm:pt>
+    <dgm:pt modelId="{12D15966-0A2C-4720-B5D6-B6AD87177C07}" type="pres">
+      <dgm:prSet presAssocID="{FAA5D020-0509-403E-903F-AEBD56157E2E}" presName="chTx" presStyleLbl="revTx" presStyleIdx="1" presStyleCnt="20"/>
       <dgm:spPr/>
       <dgm:t>
         <a:bodyPr/>
@@ -3349,36 +4310,36 @@
         </a:p>
       </dgm:t>
     </dgm:pt>
-    <dgm:pt modelId="{D18F9E56-98BB-48DC-9544-4B218D91759F}" type="pres">
-      <dgm:prSet presAssocID="{EF12AC74-949B-49AF-9227-763FD769DE71}" presName="desTx" presStyleLbl="revTx" presStyleIdx="7" presStyleCnt="20">
+    <dgm:pt modelId="{583D3A7D-F913-47E2-8016-8E409F0BCFCC}" type="pres">
+      <dgm:prSet presAssocID="{FAA5D020-0509-403E-903F-AEBD56157E2E}" presName="desTx" presStyleLbl="revTx" presStyleIdx="2" presStyleCnt="20">
         <dgm:presLayoutVars>
           <dgm:bulletEnabled val="1"/>
         </dgm:presLayoutVars>
       </dgm:prSet>
       <dgm:spPr/>
     </dgm:pt>
-    <dgm:pt modelId="{F65A812F-6DD7-4369-ADCC-4A593126E15E}" type="pres">
-      <dgm:prSet presAssocID="{EF12AC74-949B-49AF-9227-763FD769DE71}" presName="desBackupRightNorm" presStyleCnt="0"/>
-      <dgm:spPr/>
-    </dgm:pt>
-    <dgm:pt modelId="{AF104042-723D-48CE-9C17-35108164E8EC}" type="pres">
-      <dgm:prSet presAssocID="{2E9D9464-13CF-4D47-A512-DB1CDA94F992}" presName="desSpace" presStyleCnt="0"/>
-      <dgm:spPr/>
-    </dgm:pt>
-    <dgm:pt modelId="{784485C4-D2EE-4331-B48A-17C125F6993E}" type="pres">
-      <dgm:prSet presAssocID="{4863C0E4-95C8-4147-A53C-79ECEE76910D}" presName="desBackupLeftNorm" presStyleCnt="0"/>
-      <dgm:spPr/>
-    </dgm:pt>
-    <dgm:pt modelId="{B32C801C-7C8A-47F7-BD85-193235206CCD}" type="pres">
-      <dgm:prSet presAssocID="{4863C0E4-95C8-4147-A53C-79ECEE76910D}" presName="desComposite" presStyleCnt="0"/>
-      <dgm:spPr/>
-    </dgm:pt>
-    <dgm:pt modelId="{28532D80-2937-4CD0-9269-CC53355394C3}" type="pres">
-      <dgm:prSet presAssocID="{4863C0E4-95C8-4147-A53C-79ECEE76910D}" presName="desCircle" presStyleLbl="node1" presStyleIdx="3" presStyleCnt="8"/>
-      <dgm:spPr/>
-    </dgm:pt>
-    <dgm:pt modelId="{D4676513-3691-439E-98F5-27DADB37ED56}" type="pres">
-      <dgm:prSet presAssocID="{4863C0E4-95C8-4147-A53C-79ECEE76910D}" presName="chTx" presStyleLbl="revTx" presStyleIdx="8" presStyleCnt="20"/>
+    <dgm:pt modelId="{2229CB04-69C7-456A-B6D9-9EB80D2706D9}" type="pres">
+      <dgm:prSet presAssocID="{FAA5D020-0509-403E-903F-AEBD56157E2E}" presName="desBackupRightNorm" presStyleCnt="0"/>
+      <dgm:spPr/>
+    </dgm:pt>
+    <dgm:pt modelId="{52D3CF00-0232-4A36-88D0-91F34C19A09F}" type="pres">
+      <dgm:prSet presAssocID="{5CFD6F5B-9CC0-4A15-9BC7-8083CD8781FF}" presName="desSpace" presStyleCnt="0"/>
+      <dgm:spPr/>
+    </dgm:pt>
+    <dgm:pt modelId="{6257729E-E791-43D7-B50E-614582D5DE60}" type="pres">
+      <dgm:prSet presAssocID="{1CB4436E-0474-4FA4-9F16-D7347F10E0B1}" presName="desBackupLeftNorm" presStyleCnt="0"/>
+      <dgm:spPr/>
+    </dgm:pt>
+    <dgm:pt modelId="{7F7C2637-4296-47E9-AFEC-8C9671A2F5B2}" type="pres">
+      <dgm:prSet presAssocID="{1CB4436E-0474-4FA4-9F16-D7347F10E0B1}" presName="desComposite" presStyleCnt="0"/>
+      <dgm:spPr/>
+    </dgm:pt>
+    <dgm:pt modelId="{AC0487C1-9396-4811-B9C3-FBCA0B57AAC1}" type="pres">
+      <dgm:prSet presAssocID="{1CB4436E-0474-4FA4-9F16-D7347F10E0B1}" presName="desCircle" presStyleLbl="node1" presStyleIdx="1" presStyleCnt="8"/>
+      <dgm:spPr/>
+    </dgm:pt>
+    <dgm:pt modelId="{77133696-84FB-4A28-ADCD-CB59880B1347}" type="pres">
+      <dgm:prSet presAssocID="{1CB4436E-0474-4FA4-9F16-D7347F10E0B1}" presName="chTx" presStyleLbl="revTx" presStyleIdx="3" presStyleCnt="20"/>
       <dgm:spPr/>
       <dgm:t>
         <a:bodyPr/>
@@ -3388,60 +4349,32 @@
         </a:p>
       </dgm:t>
     </dgm:pt>
-    <dgm:pt modelId="{1D0D467E-1E51-452B-9375-43A2E677CC97}" type="pres">
-      <dgm:prSet presAssocID="{4863C0E4-95C8-4147-A53C-79ECEE76910D}" presName="desTx" presStyleLbl="revTx" presStyleIdx="9" presStyleCnt="20">
+    <dgm:pt modelId="{73ED2672-0EB6-4B12-8CE7-4F35614D4107}" type="pres">
+      <dgm:prSet presAssocID="{1CB4436E-0474-4FA4-9F16-D7347F10E0B1}" presName="desTx" presStyleLbl="revTx" presStyleIdx="4" presStyleCnt="20">
         <dgm:presLayoutVars>
           <dgm:bulletEnabled val="1"/>
         </dgm:presLayoutVars>
       </dgm:prSet>
       <dgm:spPr/>
     </dgm:pt>
-    <dgm:pt modelId="{C9138E4F-6F29-478B-B2C2-DC111573B808}" type="pres">
-      <dgm:prSet presAssocID="{4863C0E4-95C8-4147-A53C-79ECEE76910D}" presName="desBackupRightNorm" presStyleCnt="0"/>
-      <dgm:spPr/>
-    </dgm:pt>
-    <dgm:pt modelId="{6B6FEC17-D798-42E1-B493-1F7535CCE85D}" type="pres">
-      <dgm:prSet presAssocID="{CF2BA0BB-27DD-4581-8940-BEEEC5D7A119}" presName="desSpace" presStyleCnt="0"/>
-      <dgm:spPr/>
-    </dgm:pt>
-    <dgm:pt modelId="{2A86851A-627E-4671-A103-5340F6543BF7}" type="pres">
-      <dgm:prSet presAssocID="{23DB4C3F-D41A-4070-BDC3-FD3AB1ABD8B2}" presName="parComposite" presStyleCnt="0"/>
-      <dgm:spPr/>
-    </dgm:pt>
-    <dgm:pt modelId="{A8EA4607-0075-4E8A-9C69-5825B2E3EE87}" type="pres">
-      <dgm:prSet presAssocID="{23DB4C3F-D41A-4070-BDC3-FD3AB1ABD8B2}" presName="parBigCircle" presStyleLbl="node0" presStyleIdx="2" presStyleCnt="4"/>
-      <dgm:spPr/>
-    </dgm:pt>
-    <dgm:pt modelId="{58AA0D98-BF47-4D33-BEE8-77888014D308}" type="pres">
-      <dgm:prSet presAssocID="{23DB4C3F-D41A-4070-BDC3-FD3AB1ABD8B2}" presName="parTx" presStyleLbl="revTx" presStyleIdx="10" presStyleCnt="20" custScaleX="123340" custScaleY="210154" custLinFactNeighborX="8732" custLinFactNeighborY="-12701"/>
-      <dgm:spPr/>
-    </dgm:pt>
-    <dgm:pt modelId="{FDA9EDDD-B075-4475-9E98-10C5C1B8AD97}" type="pres">
-      <dgm:prSet presAssocID="{23DB4C3F-D41A-4070-BDC3-FD3AB1ABD8B2}" presName="bSpace" presStyleCnt="0"/>
-      <dgm:spPr/>
-    </dgm:pt>
-    <dgm:pt modelId="{00009B53-337F-4471-9A06-69957BB4FE59}" type="pres">
-      <dgm:prSet presAssocID="{23DB4C3F-D41A-4070-BDC3-FD3AB1ABD8B2}" presName="parBackupNorm" presStyleCnt="0"/>
-      <dgm:spPr/>
-    </dgm:pt>
-    <dgm:pt modelId="{67329847-1B3E-4E71-A03D-AAE76A3EFC5B}" type="pres">
-      <dgm:prSet presAssocID="{7B58D452-70BA-4DB7-8882-C877FEB0D07F}" presName="parSpace" presStyleCnt="0"/>
-      <dgm:spPr/>
-    </dgm:pt>
-    <dgm:pt modelId="{E40507FA-A3BB-4F2B-896D-7C425EE0BD3B}" type="pres">
-      <dgm:prSet presAssocID="{2E5A4D08-29B9-4DC4-A06F-C78B40C8F721}" presName="desBackupLeftNorm" presStyleCnt="0"/>
-      <dgm:spPr/>
-    </dgm:pt>
-    <dgm:pt modelId="{58FA078F-EF37-4A68-9F7A-01402E6334B9}" type="pres">
-      <dgm:prSet presAssocID="{2E5A4D08-29B9-4DC4-A06F-C78B40C8F721}" presName="desComposite" presStyleCnt="0"/>
-      <dgm:spPr/>
-    </dgm:pt>
-    <dgm:pt modelId="{215553BB-EC1A-429F-860C-8D73872F200B}" type="pres">
-      <dgm:prSet presAssocID="{2E5A4D08-29B9-4DC4-A06F-C78B40C8F721}" presName="desCircle" presStyleLbl="node1" presStyleIdx="4" presStyleCnt="8"/>
-      <dgm:spPr/>
-    </dgm:pt>
-    <dgm:pt modelId="{0CF9C00C-2488-4AAA-83BF-6186357AF6E3}" type="pres">
-      <dgm:prSet presAssocID="{2E5A4D08-29B9-4DC4-A06F-C78B40C8F721}" presName="chTx" presStyleLbl="revTx" presStyleIdx="11" presStyleCnt="20"/>
+    <dgm:pt modelId="{2A86967B-C617-4433-B2FF-07AB612F41E3}" type="pres">
+      <dgm:prSet presAssocID="{1CB4436E-0474-4FA4-9F16-D7347F10E0B1}" presName="desBackupRightNorm" presStyleCnt="0"/>
+      <dgm:spPr/>
+    </dgm:pt>
+    <dgm:pt modelId="{B47DD55E-39DB-4E48-A227-7C3BAA93DA2B}" type="pres">
+      <dgm:prSet presAssocID="{64D97E92-0574-4590-A617-468711B2781A}" presName="desSpace" presStyleCnt="0"/>
+      <dgm:spPr/>
+    </dgm:pt>
+    <dgm:pt modelId="{74F3B316-76EE-4868-93D6-A9B9B6410E3C}" type="pres">
+      <dgm:prSet presAssocID="{82BB8E71-6E46-4CFA-8FF6-DFA2FD7C079F}" presName="parComposite" presStyleCnt="0"/>
+      <dgm:spPr/>
+    </dgm:pt>
+    <dgm:pt modelId="{D69C7994-67D1-4126-B06C-F46CF5C20439}" type="pres">
+      <dgm:prSet presAssocID="{82BB8E71-6E46-4CFA-8FF6-DFA2FD7C079F}" presName="parBigCircle" presStyleLbl="node0" presStyleIdx="1" presStyleCnt="4"/>
+      <dgm:spPr/>
+    </dgm:pt>
+    <dgm:pt modelId="{7F5A107E-5ECD-44BB-B595-1F47C0C49DB1}" type="pres">
+      <dgm:prSet presAssocID="{82BB8E71-6E46-4CFA-8FF6-DFA2FD7C079F}" presName="parTx" presStyleLbl="revTx" presStyleIdx="5" presStyleCnt="20"/>
       <dgm:spPr/>
       <dgm:t>
         <a:bodyPr/>
@@ -3451,64 +4384,32 @@
         </a:p>
       </dgm:t>
     </dgm:pt>
-    <dgm:pt modelId="{87F60D4E-EBBB-4910-BD03-A0D431985787}" type="pres">
-      <dgm:prSet presAssocID="{2E5A4D08-29B9-4DC4-A06F-C78B40C8F721}" presName="desTx" presStyleLbl="revTx" presStyleIdx="12" presStyleCnt="20">
-        <dgm:presLayoutVars>
-          <dgm:bulletEnabled val="1"/>
-        </dgm:presLayoutVars>
-      </dgm:prSet>
-      <dgm:spPr/>
-    </dgm:pt>
-    <dgm:pt modelId="{027D5E80-47BD-4BF1-8EA5-4670BA4E3405}" type="pres">
-      <dgm:prSet presAssocID="{2E5A4D08-29B9-4DC4-A06F-C78B40C8F721}" presName="desBackupRightNorm" presStyleCnt="0"/>
-      <dgm:spPr/>
-    </dgm:pt>
-    <dgm:pt modelId="{2C2FCCAE-134D-48D5-AB81-C42A5668E585}" type="pres">
-      <dgm:prSet presAssocID="{1BBEC5E1-632D-4637-9EFB-AD09FDE4A2E0}" presName="desSpace" presStyleCnt="0"/>
-      <dgm:spPr/>
-    </dgm:pt>
-    <dgm:pt modelId="{AA4437A2-3FF8-428C-BB53-01F73DC6C4C9}" type="pres">
-      <dgm:prSet presAssocID="{7F88DB34-5723-4A6C-83DC-6C73E72D4D11}" presName="desBackupLeftNorm" presStyleCnt="0"/>
-      <dgm:spPr/>
-    </dgm:pt>
-    <dgm:pt modelId="{71094713-F758-45D7-B7CD-0CA16BDF1320}" type="pres">
-      <dgm:prSet presAssocID="{7F88DB34-5723-4A6C-83DC-6C73E72D4D11}" presName="desComposite" presStyleCnt="0"/>
-      <dgm:spPr/>
-    </dgm:pt>
-    <dgm:pt modelId="{2DE2F1A0-42C1-4BD6-9361-9BC55B0CAB80}" type="pres">
-      <dgm:prSet presAssocID="{7F88DB34-5723-4A6C-83DC-6C73E72D4D11}" presName="desCircle" presStyleLbl="node1" presStyleIdx="5" presStyleCnt="8"/>
-      <dgm:spPr/>
-    </dgm:pt>
-    <dgm:pt modelId="{5FC37EE6-E8E2-49C5-AD86-1DE7CF0E23C2}" type="pres">
-      <dgm:prSet presAssocID="{7F88DB34-5723-4A6C-83DC-6C73E72D4D11}" presName="chTx" presStyleLbl="revTx" presStyleIdx="13" presStyleCnt="20"/>
-      <dgm:spPr/>
-    </dgm:pt>
-    <dgm:pt modelId="{AA363555-0838-4968-9137-0E047988D5E1}" type="pres">
-      <dgm:prSet presAssocID="{7F88DB34-5723-4A6C-83DC-6C73E72D4D11}" presName="desTx" presStyleLbl="revTx" presStyleIdx="14" presStyleCnt="20">
-        <dgm:presLayoutVars>
-          <dgm:bulletEnabled val="1"/>
-        </dgm:presLayoutVars>
-      </dgm:prSet>
-      <dgm:spPr/>
-    </dgm:pt>
-    <dgm:pt modelId="{58721376-A8E8-496B-BA58-9D45DD623EB8}" type="pres">
-      <dgm:prSet presAssocID="{7F88DB34-5723-4A6C-83DC-6C73E72D4D11}" presName="desBackupRightNorm" presStyleCnt="0"/>
-      <dgm:spPr/>
-    </dgm:pt>
-    <dgm:pt modelId="{A91D24C3-40C1-4EB7-AED9-317EF92B0A66}" type="pres">
-      <dgm:prSet presAssocID="{B5B0A54D-6596-4D88-B94B-AC760AF4A09D}" presName="desSpace" presStyleCnt="0"/>
-      <dgm:spPr/>
-    </dgm:pt>
-    <dgm:pt modelId="{9967F6BC-8815-475B-8321-2A8D5E268D5A}" type="pres">
-      <dgm:prSet presAssocID="{A6CE3E09-12E0-4CCD-A0FF-EAB8ECBF6BFE}" presName="parComposite" presStyleCnt="0"/>
-      <dgm:spPr/>
-    </dgm:pt>
-    <dgm:pt modelId="{1E15F4E8-0DC5-49EB-A1DB-E5E559965511}" type="pres">
-      <dgm:prSet presAssocID="{A6CE3E09-12E0-4CCD-A0FF-EAB8ECBF6BFE}" presName="parBigCircle" presStyleLbl="node0" presStyleIdx="3" presStyleCnt="4"/>
-      <dgm:spPr/>
-    </dgm:pt>
-    <dgm:pt modelId="{8AF272FB-F19E-4C5C-A4A0-95CF2BC96881}" type="pres">
-      <dgm:prSet presAssocID="{A6CE3E09-12E0-4CCD-A0FF-EAB8ECBF6BFE}" presName="parTx" presStyleLbl="revTx" presStyleIdx="15" presStyleCnt="20" custScaleX="115213" custScaleY="160901" custLinFactNeighborX="8311" custLinFactNeighborY="-9896"/>
+    <dgm:pt modelId="{8E0C906C-8D4E-4028-A364-3EE06FFDC2A2}" type="pres">
+      <dgm:prSet presAssocID="{82BB8E71-6E46-4CFA-8FF6-DFA2FD7C079F}" presName="bSpace" presStyleCnt="0"/>
+      <dgm:spPr/>
+    </dgm:pt>
+    <dgm:pt modelId="{D14AA325-0BEE-476C-935D-F64A7F511DD2}" type="pres">
+      <dgm:prSet presAssocID="{82BB8E71-6E46-4CFA-8FF6-DFA2FD7C079F}" presName="parBackupNorm" presStyleCnt="0"/>
+      <dgm:spPr/>
+    </dgm:pt>
+    <dgm:pt modelId="{AE67EAB7-7F85-450A-ACB1-CADC3BB6A596}" type="pres">
+      <dgm:prSet presAssocID="{482E10F3-6897-440A-8111-658C31AB03C6}" presName="parSpace" presStyleCnt="0"/>
+      <dgm:spPr/>
+    </dgm:pt>
+    <dgm:pt modelId="{CBEB0D63-D225-42F4-9C54-E68E5E3B1724}" type="pres">
+      <dgm:prSet presAssocID="{B0E57D30-8025-4D63-A6B2-6DD851E4B257}" presName="desBackupLeftNorm" presStyleCnt="0"/>
+      <dgm:spPr/>
+    </dgm:pt>
+    <dgm:pt modelId="{D6FD5387-C469-449A-908F-0E936B9FE9D6}" type="pres">
+      <dgm:prSet presAssocID="{B0E57D30-8025-4D63-A6B2-6DD851E4B257}" presName="desComposite" presStyleCnt="0"/>
+      <dgm:spPr/>
+    </dgm:pt>
+    <dgm:pt modelId="{6C4AF1A4-C618-4EE3-8A03-80A803CC22A3}" type="pres">
+      <dgm:prSet presAssocID="{B0E57D30-8025-4D63-A6B2-6DD851E4B257}" presName="desCircle" presStyleLbl="node1" presStyleIdx="2" presStyleCnt="8"/>
+      <dgm:spPr/>
+    </dgm:pt>
+    <dgm:pt modelId="{7680FA50-9985-48ED-B5DD-40E7EF73FB5E}" type="pres">
+      <dgm:prSet presAssocID="{B0E57D30-8025-4D63-A6B2-6DD851E4B257}" presName="chTx" presStyleLbl="revTx" presStyleIdx="6" presStyleCnt="20"/>
       <dgm:spPr/>
       <dgm:t>
         <a:bodyPr/>
@@ -3518,64 +4419,36 @@
         </a:p>
       </dgm:t>
     </dgm:pt>
-    <dgm:pt modelId="{083929D2-7CB7-44E0-AA68-FE002AF9969F}" type="pres">
-      <dgm:prSet presAssocID="{A6CE3E09-12E0-4CCD-A0FF-EAB8ECBF6BFE}" presName="bSpace" presStyleCnt="0"/>
-      <dgm:spPr/>
-    </dgm:pt>
-    <dgm:pt modelId="{C5595781-32CD-439C-829E-EF7C1D9B032D}" type="pres">
-      <dgm:prSet presAssocID="{A6CE3E09-12E0-4CCD-A0FF-EAB8ECBF6BFE}" presName="parBackupNorm" presStyleCnt="0"/>
-      <dgm:spPr/>
-    </dgm:pt>
-    <dgm:pt modelId="{9BA619B2-D4BA-437F-B1DF-2751BA482279}" type="pres">
-      <dgm:prSet presAssocID="{3C089AB6-5D32-4126-96E7-52A048E739F9}" presName="parSpace" presStyleCnt="0"/>
-      <dgm:spPr/>
-    </dgm:pt>
-    <dgm:pt modelId="{D85280B3-E629-43B3-9F43-2434204E7054}" type="pres">
-      <dgm:prSet presAssocID="{40E6FD91-4F22-4466-8458-B36681D8EE13}" presName="desBackupLeftNorm" presStyleCnt="0"/>
-      <dgm:spPr/>
-    </dgm:pt>
-    <dgm:pt modelId="{D6FEDD6B-8521-4C07-84F0-0998F8F760F6}" type="pres">
-      <dgm:prSet presAssocID="{40E6FD91-4F22-4466-8458-B36681D8EE13}" presName="desComposite" presStyleCnt="0"/>
-      <dgm:spPr/>
-    </dgm:pt>
-    <dgm:pt modelId="{AF7FF73C-E897-47AF-A655-5F2431E1FA41}" type="pres">
-      <dgm:prSet presAssocID="{40E6FD91-4F22-4466-8458-B36681D8EE13}" presName="desCircle" presStyleLbl="node1" presStyleIdx="6" presStyleCnt="8"/>
-      <dgm:spPr/>
-    </dgm:pt>
-    <dgm:pt modelId="{48166FEA-9BEC-4A82-94BA-96137E37F782}" type="pres">
-      <dgm:prSet presAssocID="{40E6FD91-4F22-4466-8458-B36681D8EE13}" presName="chTx" presStyleLbl="revTx" presStyleIdx="16" presStyleCnt="20"/>
-      <dgm:spPr/>
-    </dgm:pt>
-    <dgm:pt modelId="{E71938D9-08E7-4775-9AB2-BD810D64D9FB}" type="pres">
-      <dgm:prSet presAssocID="{40E6FD91-4F22-4466-8458-B36681D8EE13}" presName="desTx" presStyleLbl="revTx" presStyleIdx="17" presStyleCnt="20">
+    <dgm:pt modelId="{29575E4C-25C1-43B2-ADC9-9E7B70641132}" type="pres">
+      <dgm:prSet presAssocID="{B0E57D30-8025-4D63-A6B2-6DD851E4B257}" presName="desTx" presStyleLbl="revTx" presStyleIdx="7" presStyleCnt="20">
         <dgm:presLayoutVars>
           <dgm:bulletEnabled val="1"/>
         </dgm:presLayoutVars>
       </dgm:prSet>
       <dgm:spPr/>
     </dgm:pt>
-    <dgm:pt modelId="{002C9987-2F7A-4E15-A061-4D5A13AC5C94}" type="pres">
-      <dgm:prSet presAssocID="{40E6FD91-4F22-4466-8458-B36681D8EE13}" presName="desBackupRightNorm" presStyleCnt="0"/>
-      <dgm:spPr/>
-    </dgm:pt>
-    <dgm:pt modelId="{83AD6AC4-8EF1-4C02-A7E5-343860488887}" type="pres">
-      <dgm:prSet presAssocID="{AE1DD574-9654-4DA2-8916-EFB1A2AD16D0}" presName="desSpace" presStyleCnt="0"/>
-      <dgm:spPr/>
-    </dgm:pt>
-    <dgm:pt modelId="{950C65DA-7211-4B12-AABF-63CDF325F2FE}" type="pres">
-      <dgm:prSet presAssocID="{C2432358-4D70-4C8B-A8AF-920748B8950A}" presName="desBackupLeftNorm" presStyleCnt="0"/>
-      <dgm:spPr/>
-    </dgm:pt>
-    <dgm:pt modelId="{525BA56C-5BD9-4A79-BAFF-8E67C0DA7EB0}" type="pres">
-      <dgm:prSet presAssocID="{C2432358-4D70-4C8B-A8AF-920748B8950A}" presName="desComposite" presStyleCnt="0"/>
-      <dgm:spPr/>
-    </dgm:pt>
-    <dgm:pt modelId="{BB0E9E5E-35F1-49F8-B91A-624D17854DBD}" type="pres">
-      <dgm:prSet presAssocID="{C2432358-4D70-4C8B-A8AF-920748B8950A}" presName="desCircle" presStyleLbl="node1" presStyleIdx="7" presStyleCnt="8"/>
-      <dgm:spPr/>
-    </dgm:pt>
-    <dgm:pt modelId="{EA332EF7-A428-44E5-8FC6-7838DAE85A7A}" type="pres">
-      <dgm:prSet presAssocID="{C2432358-4D70-4C8B-A8AF-920748B8950A}" presName="chTx" presStyleLbl="revTx" presStyleIdx="18" presStyleCnt="20"/>
+    <dgm:pt modelId="{AF4576F2-DC6A-419D-899D-15CFE9D62AFA}" type="pres">
+      <dgm:prSet presAssocID="{B0E57D30-8025-4D63-A6B2-6DD851E4B257}" presName="desBackupRightNorm" presStyleCnt="0"/>
+      <dgm:spPr/>
+    </dgm:pt>
+    <dgm:pt modelId="{098DE909-FA78-43C1-B45D-C966DB598DA9}" type="pres">
+      <dgm:prSet presAssocID="{5D7B4CB4-3A01-4E2E-BED0-F2EB71B6957A}" presName="desSpace" presStyleCnt="0"/>
+      <dgm:spPr/>
+    </dgm:pt>
+    <dgm:pt modelId="{FD9ACA3A-3435-47A0-ADAB-1B49E200319A}" type="pres">
+      <dgm:prSet presAssocID="{C97BDEEB-78B6-4994-8F20-0BA55313DF32}" presName="desBackupLeftNorm" presStyleCnt="0"/>
+      <dgm:spPr/>
+    </dgm:pt>
+    <dgm:pt modelId="{24C65332-7124-48C4-9D96-1A6EBFF259F8}" type="pres">
+      <dgm:prSet presAssocID="{C97BDEEB-78B6-4994-8F20-0BA55313DF32}" presName="desComposite" presStyleCnt="0"/>
+      <dgm:spPr/>
+    </dgm:pt>
+    <dgm:pt modelId="{3F078EDC-158C-4C63-844D-E4B1063CFF15}" type="pres">
+      <dgm:prSet presAssocID="{C97BDEEB-78B6-4994-8F20-0BA55313DF32}" presName="desCircle" presStyleLbl="node1" presStyleIdx="3" presStyleCnt="8"/>
+      <dgm:spPr/>
+    </dgm:pt>
+    <dgm:pt modelId="{EDC53E2A-6EC0-4A0B-B661-7117AB5B135F}" type="pres">
+      <dgm:prSet presAssocID="{C97BDEEB-78B6-4994-8F20-0BA55313DF32}" presName="chTx" presStyleLbl="revTx" presStyleIdx="8" presStyleCnt="20"/>
       <dgm:spPr/>
       <dgm:t>
         <a:bodyPr/>
@@ -3585,145 +4458,32 @@
         </a:p>
       </dgm:t>
     </dgm:pt>
-    <dgm:pt modelId="{868EDB69-232C-4315-B585-996F6BCF7B44}" type="pres">
-      <dgm:prSet presAssocID="{C2432358-4D70-4C8B-A8AF-920748B8950A}" presName="desTx" presStyleLbl="revTx" presStyleIdx="19" presStyleCnt="20">
+    <dgm:pt modelId="{BEAAB3AD-B3C9-494A-944C-59B6057BC422}" type="pres">
+      <dgm:prSet presAssocID="{C97BDEEB-78B6-4994-8F20-0BA55313DF32}" presName="desTx" presStyleLbl="revTx" presStyleIdx="9" presStyleCnt="20">
         <dgm:presLayoutVars>
           <dgm:bulletEnabled val="1"/>
         </dgm:presLayoutVars>
       </dgm:prSet>
       <dgm:spPr/>
     </dgm:pt>
-    <dgm:pt modelId="{755F2EDA-157C-4DB8-A242-E96253E61209}" type="pres">
-      <dgm:prSet presAssocID="{C2432358-4D70-4C8B-A8AF-920748B8950A}" presName="desBackupRightNorm" presStyleCnt="0"/>
-      <dgm:spPr/>
-    </dgm:pt>
-    <dgm:pt modelId="{9D5288F2-F7B7-4042-A48A-98BF52E96ADC}" type="pres">
-      <dgm:prSet presAssocID="{6C7CB5EA-54D0-402E-927E-9A3EC900A38F}" presName="desSpace" presStyleCnt="0"/>
-      <dgm:spPr/>
-    </dgm:pt>
-  </dgm:ptLst>
-  <dgm:cxnLst>
-    <dgm:cxn modelId="{3CAC3F89-04F7-46C2-9385-F356C5DF5EFD}" type="presOf" srcId="{A6CE3E09-12E0-4CCD-A0FF-EAB8ECBF6BFE}" destId="{8AF272FB-F19E-4C5C-A4A0-95CF2BC96881}" srcOrd="0" destOrd="0" presId="urn:microsoft.com/office/officeart/2008/layout/CircleAccentTimeline"/>
-    <dgm:cxn modelId="{481BBFD4-BD79-496E-921A-8CE03A30CA79}" srcId="{23DB4C3F-D41A-4070-BDC3-FD3AB1ABD8B2}" destId="{2E5A4D08-29B9-4DC4-A06F-C78B40C8F721}" srcOrd="0" destOrd="0" parTransId="{553116FF-11FB-4F22-97EC-A45AD2737CEB}" sibTransId="{1BBEC5E1-632D-4637-9EFB-AD09FDE4A2E0}"/>
-    <dgm:cxn modelId="{7DCB6F39-EA05-43AC-B786-E315D8EA9C70}" srcId="{AA1F47CE-D52E-44B1-9A6B-2F421FCC85E1}" destId="{EF12AC74-949B-49AF-9227-763FD769DE71}" srcOrd="0" destOrd="0" parTransId="{2247D31D-3A16-40C8-A656-2AEAE5DEA193}" sibTransId="{2E9D9464-13CF-4D47-A512-DB1CDA94F992}"/>
-    <dgm:cxn modelId="{DD54B7F4-AC94-4568-BDE0-DBEAF79D327A}" type="presOf" srcId="{4863C0E4-95C8-4147-A53C-79ECEE76910D}" destId="{D4676513-3691-439E-98F5-27DADB37ED56}" srcOrd="0" destOrd="0" presId="urn:microsoft.com/office/officeart/2008/layout/CircleAccentTimeline"/>
-    <dgm:cxn modelId="{7813775D-398D-4100-A63D-49E13FE5916B}" type="presOf" srcId="{40E6FD91-4F22-4466-8458-B36681D8EE13}" destId="{48166FEA-9BEC-4A82-94BA-96137E37F782}" srcOrd="0" destOrd="0" presId="urn:microsoft.com/office/officeart/2008/layout/CircleAccentTimeline"/>
-    <dgm:cxn modelId="{534ABED9-DE67-4396-B86F-67F11D868B55}" srcId="{F0F87F6D-4F65-4D13-A8E4-A6853B1EF6AD}" destId="{45D78C88-24C5-4C14-BA2F-3B03F3B2EF4E}" srcOrd="0" destOrd="0" parTransId="{D9F37008-52A4-4904-B345-3367889E0E3A}" sibTransId="{F167DC11-2313-4B88-BE12-5E363D5AA8AE}"/>
-    <dgm:cxn modelId="{DD36609B-BACB-4834-9732-067FE94599ED}" type="presOf" srcId="{03101640-68C5-4728-95FE-C8A4350669A5}" destId="{DBB0E32A-4E7D-4E35-BEDA-799FEABC310A}" srcOrd="0" destOrd="0" presId="urn:microsoft.com/office/officeart/2008/layout/CircleAccentTimeline"/>
-    <dgm:cxn modelId="{F25DD3E6-11E1-44AE-B02F-495FBF728958}" type="presOf" srcId="{45D78C88-24C5-4C14-BA2F-3B03F3B2EF4E}" destId="{13170522-CB26-466F-9CA0-0D90ED23F89F}" srcOrd="0" destOrd="0" presId="urn:microsoft.com/office/officeart/2008/layout/CircleAccentTimeline"/>
-    <dgm:cxn modelId="{E4DBCA2F-8B4B-412A-8A51-2E40140F8175}" srcId="{A6CE3E09-12E0-4CCD-A0FF-EAB8ECBF6BFE}" destId="{40E6FD91-4F22-4466-8458-B36681D8EE13}" srcOrd="0" destOrd="0" parTransId="{ACB08A7B-7532-4BDD-AD1A-92456FA1FDAF}" sibTransId="{AE1DD574-9654-4DA2-8916-EFB1A2AD16D0}"/>
-    <dgm:cxn modelId="{CCB8FD46-5A32-4FE4-A453-1E125D8DF2D9}" type="presOf" srcId="{F3DE65EB-FE54-4BAB-833C-44BDC0E2E37A}" destId="{92B0746D-0CB2-4048-8D10-9D48BDA0DB9E}" srcOrd="0" destOrd="0" presId="urn:microsoft.com/office/officeart/2008/layout/CircleAccentTimeline"/>
-    <dgm:cxn modelId="{DEB922FE-0ACC-46C6-94AF-E5C90F0AE787}" srcId="{23DB4C3F-D41A-4070-BDC3-FD3AB1ABD8B2}" destId="{7F88DB34-5723-4A6C-83DC-6C73E72D4D11}" srcOrd="1" destOrd="0" parTransId="{0E15DCB4-A6E4-45E8-88F7-148D159CDED0}" sibTransId="{B5B0A54D-6596-4D88-B94B-AC760AF4A09D}"/>
-    <dgm:cxn modelId="{DEFD74E2-09B3-4BB9-A3BA-E6E87341C424}" srcId="{AA1F47CE-D52E-44B1-9A6B-2F421FCC85E1}" destId="{4863C0E4-95C8-4147-A53C-79ECEE76910D}" srcOrd="1" destOrd="0" parTransId="{29A05584-376D-4408-8AE8-03AC4501D8D9}" sibTransId="{CF2BA0BB-27DD-4581-8940-BEEEC5D7A119}"/>
-    <dgm:cxn modelId="{61972409-8C5A-46DB-A3C1-83EC80FB1E14}" type="presOf" srcId="{C2432358-4D70-4C8B-A8AF-920748B8950A}" destId="{EA332EF7-A428-44E5-8FC6-7838DAE85A7A}" srcOrd="0" destOrd="0" presId="urn:microsoft.com/office/officeart/2008/layout/CircleAccentTimeline"/>
-    <dgm:cxn modelId="{8E1267B6-E7FB-4487-83B3-84136C0682AC}" srcId="{F0F87F6D-4F65-4D13-A8E4-A6853B1EF6AD}" destId="{AA1F47CE-D52E-44B1-9A6B-2F421FCC85E1}" srcOrd="1" destOrd="0" parTransId="{605E0662-E1A5-4D43-A521-3D36893F8392}" sibTransId="{D0021959-7147-481A-97FB-2C4482611FB1}"/>
-    <dgm:cxn modelId="{7342034A-DE23-4A24-A28F-A3D0F048E4D9}" srcId="{45D78C88-24C5-4C14-BA2F-3B03F3B2EF4E}" destId="{F3DE65EB-FE54-4BAB-833C-44BDC0E2E37A}" srcOrd="1" destOrd="0" parTransId="{7ED89E8D-65BA-4F46-AD92-25CB0B75777E}" sibTransId="{61806595-60D0-434A-9D91-FEACF3516096}"/>
-    <dgm:cxn modelId="{C357D9CF-1B9D-4B85-BC3B-47B8225FC828}" type="presOf" srcId="{7F88DB34-5723-4A6C-83DC-6C73E72D4D11}" destId="{5FC37EE6-E8E2-49C5-AD86-1DE7CF0E23C2}" srcOrd="0" destOrd="0" presId="urn:microsoft.com/office/officeart/2008/layout/CircleAccentTimeline"/>
-    <dgm:cxn modelId="{B74CAFA8-3300-4392-9600-36FFDE5CD63A}" srcId="{F0F87F6D-4F65-4D13-A8E4-A6853B1EF6AD}" destId="{23DB4C3F-D41A-4070-BDC3-FD3AB1ABD8B2}" srcOrd="2" destOrd="0" parTransId="{7873B683-CA7B-4C3A-B49F-9C9EFC48BDD4}" sibTransId="{7B58D452-70BA-4DB7-8882-C877FEB0D07F}"/>
-    <dgm:cxn modelId="{F383EDC0-0C6B-43BE-8D88-D8A37A29021E}" type="presOf" srcId="{AA1F47CE-D52E-44B1-9A6B-2F421FCC85E1}" destId="{4AAD5A86-CDC5-4210-91CD-D7F23622A03D}" srcOrd="0" destOrd="0" presId="urn:microsoft.com/office/officeart/2008/layout/CircleAccentTimeline"/>
-    <dgm:cxn modelId="{DD2CCE95-2DAC-4214-8E8A-4D788E51CD50}" srcId="{F0F87F6D-4F65-4D13-A8E4-A6853B1EF6AD}" destId="{A6CE3E09-12E0-4CCD-A0FF-EAB8ECBF6BFE}" srcOrd="3" destOrd="0" parTransId="{55647FD8-D986-4081-8079-1EA262561242}" sibTransId="{3C089AB6-5D32-4126-96E7-52A048E739F9}"/>
-    <dgm:cxn modelId="{46EFECDF-1291-4831-ACD2-5C425EC9458C}" type="presOf" srcId="{23DB4C3F-D41A-4070-BDC3-FD3AB1ABD8B2}" destId="{58AA0D98-BF47-4D33-BEE8-77888014D308}" srcOrd="0" destOrd="0" presId="urn:microsoft.com/office/officeart/2008/layout/CircleAccentTimeline"/>
-    <dgm:cxn modelId="{AF4BD8C9-D2E0-41CE-BB4F-337AC352A63B}" type="presOf" srcId="{F0F87F6D-4F65-4D13-A8E4-A6853B1EF6AD}" destId="{465CCDA1-02CB-4593-AE03-73A38FC8C4F5}" srcOrd="0" destOrd="0" presId="urn:microsoft.com/office/officeart/2008/layout/CircleAccentTimeline"/>
-    <dgm:cxn modelId="{74F67654-2626-4CD1-AD68-AE2F8B5E97DF}" type="presOf" srcId="{EF12AC74-949B-49AF-9227-763FD769DE71}" destId="{835E47B9-A54D-4E11-A093-8B3E340D9D00}" srcOrd="0" destOrd="0" presId="urn:microsoft.com/office/officeart/2008/layout/CircleAccentTimeline"/>
-    <dgm:cxn modelId="{18526852-EBC7-4248-83F7-9CCA1B3BF112}" type="presOf" srcId="{2E5A4D08-29B9-4DC4-A06F-C78B40C8F721}" destId="{0CF9C00C-2488-4AAA-83BF-6186357AF6E3}" srcOrd="0" destOrd="0" presId="urn:microsoft.com/office/officeart/2008/layout/CircleAccentTimeline"/>
-    <dgm:cxn modelId="{928AEF51-51A8-401A-A75F-CFBE984BEAF0}" srcId="{A6CE3E09-12E0-4CCD-A0FF-EAB8ECBF6BFE}" destId="{C2432358-4D70-4C8B-A8AF-920748B8950A}" srcOrd="1" destOrd="0" parTransId="{D0D1251C-E01A-485C-B343-257E3F70CC9F}" sibTransId="{6C7CB5EA-54D0-402E-927E-9A3EC900A38F}"/>
-    <dgm:cxn modelId="{FF8208E2-ED7F-4580-A4D4-DD37FD315DB4}" srcId="{45D78C88-24C5-4C14-BA2F-3B03F3B2EF4E}" destId="{03101640-68C5-4728-95FE-C8A4350669A5}" srcOrd="0" destOrd="0" parTransId="{39FEEF07-1D0F-46E6-990F-1664E3B3B9B4}" sibTransId="{67124F03-9780-4589-9351-C03DE250B390}"/>
-    <dgm:cxn modelId="{AF81C9A8-9492-4E94-B4C3-205CEA61726B}" type="presParOf" srcId="{465CCDA1-02CB-4593-AE03-73A38FC8C4F5}" destId="{C9C0B96E-3A49-427D-B6F0-2C51FFD90E4B}" srcOrd="0" destOrd="0" presId="urn:microsoft.com/office/officeart/2008/layout/CircleAccentTimeline"/>
-    <dgm:cxn modelId="{A6747F56-1B8D-4EFA-A227-8FC4F7E36928}" type="presParOf" srcId="{C9C0B96E-3A49-427D-B6F0-2C51FFD90E4B}" destId="{9688400C-9B1C-4922-A6B4-205FC5699ACD}" srcOrd="0" destOrd="0" presId="urn:microsoft.com/office/officeart/2008/layout/CircleAccentTimeline"/>
-    <dgm:cxn modelId="{6C740197-D0E6-416B-B4E4-07D31B284F4F}" type="presParOf" srcId="{C9C0B96E-3A49-427D-B6F0-2C51FFD90E4B}" destId="{13170522-CB26-466F-9CA0-0D90ED23F89F}" srcOrd="1" destOrd="0" presId="urn:microsoft.com/office/officeart/2008/layout/CircleAccentTimeline"/>
-    <dgm:cxn modelId="{B3FA9C40-454D-4D45-8720-0541EE502956}" type="presParOf" srcId="{C9C0B96E-3A49-427D-B6F0-2C51FFD90E4B}" destId="{0E309449-D750-49E0-885D-5F321D8656B9}" srcOrd="2" destOrd="0" presId="urn:microsoft.com/office/officeart/2008/layout/CircleAccentTimeline"/>
-    <dgm:cxn modelId="{6BF5D6C8-AFAC-4421-B7ED-FE8609B3A47B}" type="presParOf" srcId="{465CCDA1-02CB-4593-AE03-73A38FC8C4F5}" destId="{34056A3D-B389-4A38-9895-9C6FDBE32613}" srcOrd="1" destOrd="0" presId="urn:microsoft.com/office/officeart/2008/layout/CircleAccentTimeline"/>
-    <dgm:cxn modelId="{5BAC8EDD-754A-413E-8B93-234F41F34B01}" type="presParOf" srcId="{465CCDA1-02CB-4593-AE03-73A38FC8C4F5}" destId="{496D9B44-4570-4757-8C8F-6BE9E025191E}" srcOrd="2" destOrd="0" presId="urn:microsoft.com/office/officeart/2008/layout/CircleAccentTimeline"/>
-    <dgm:cxn modelId="{0469C776-319B-4429-A4C4-3126080C4B4F}" type="presParOf" srcId="{465CCDA1-02CB-4593-AE03-73A38FC8C4F5}" destId="{B34ACB6F-E99F-484E-B4F9-884A5F6527CF}" srcOrd="3" destOrd="0" presId="urn:microsoft.com/office/officeart/2008/layout/CircleAccentTimeline"/>
-    <dgm:cxn modelId="{DEB29D08-23F0-402D-976D-69ECC30DECE7}" type="presParOf" srcId="{465CCDA1-02CB-4593-AE03-73A38FC8C4F5}" destId="{7307AECF-08B3-4012-B5DF-7D8B0A80E081}" srcOrd="4" destOrd="0" presId="urn:microsoft.com/office/officeart/2008/layout/CircleAccentTimeline"/>
-    <dgm:cxn modelId="{55B5C8DC-A539-499C-8A60-BE9321664570}" type="presParOf" srcId="{7307AECF-08B3-4012-B5DF-7D8B0A80E081}" destId="{C1324DF7-F3DA-473B-BA62-047A938E5C04}" srcOrd="0" destOrd="0" presId="urn:microsoft.com/office/officeart/2008/layout/CircleAccentTimeline"/>
-    <dgm:cxn modelId="{19E840FF-A576-4D08-A590-83D3C1199099}" type="presParOf" srcId="{7307AECF-08B3-4012-B5DF-7D8B0A80E081}" destId="{DBB0E32A-4E7D-4E35-BEDA-799FEABC310A}" srcOrd="1" destOrd="0" presId="urn:microsoft.com/office/officeart/2008/layout/CircleAccentTimeline"/>
-    <dgm:cxn modelId="{5F47E294-66C7-424D-B2AF-344CC75D5C1C}" type="presParOf" srcId="{7307AECF-08B3-4012-B5DF-7D8B0A80E081}" destId="{20FA75F1-CEEF-4297-BB56-8F68CDB693CE}" srcOrd="2" destOrd="0" presId="urn:microsoft.com/office/officeart/2008/layout/CircleAccentTimeline"/>
-    <dgm:cxn modelId="{E80FF43B-DC56-491F-972C-8D6DD22AA4F6}" type="presParOf" srcId="{465CCDA1-02CB-4593-AE03-73A38FC8C4F5}" destId="{41FFE963-5F85-4AAD-BCFE-2EC6F98D8D3A}" srcOrd="5" destOrd="0" presId="urn:microsoft.com/office/officeart/2008/layout/CircleAccentTimeline"/>
-    <dgm:cxn modelId="{4659EF45-3BF5-49C2-B07D-F5A502662D2B}" type="presParOf" srcId="{465CCDA1-02CB-4593-AE03-73A38FC8C4F5}" destId="{9F1CB8BA-3142-4DD7-A356-0AA771638158}" srcOrd="6" destOrd="0" presId="urn:microsoft.com/office/officeart/2008/layout/CircleAccentTimeline"/>
-    <dgm:cxn modelId="{CCC3A7F5-B237-4632-8A99-5DED794E3F94}" type="presParOf" srcId="{465CCDA1-02CB-4593-AE03-73A38FC8C4F5}" destId="{EE0D6F23-196F-4C91-BC47-8F6987F15D79}" srcOrd="7" destOrd="0" presId="urn:microsoft.com/office/officeart/2008/layout/CircleAccentTimeline"/>
-    <dgm:cxn modelId="{A0205292-F86C-410C-AA86-CC49BE390299}" type="presParOf" srcId="{465CCDA1-02CB-4593-AE03-73A38FC8C4F5}" destId="{DC6D7C8B-D0B9-4820-B4BA-8A1E68216E68}" srcOrd="8" destOrd="0" presId="urn:microsoft.com/office/officeart/2008/layout/CircleAccentTimeline"/>
-    <dgm:cxn modelId="{6CA6AA57-FF9B-46D0-8799-2D0EEFC0968C}" type="presParOf" srcId="{DC6D7C8B-D0B9-4820-B4BA-8A1E68216E68}" destId="{E80C5DA5-89D8-455E-A2A0-C6B709B878CE}" srcOrd="0" destOrd="0" presId="urn:microsoft.com/office/officeart/2008/layout/CircleAccentTimeline"/>
-    <dgm:cxn modelId="{4485A35F-5B74-41D2-816F-7D8820484186}" type="presParOf" srcId="{DC6D7C8B-D0B9-4820-B4BA-8A1E68216E68}" destId="{92B0746D-0CB2-4048-8D10-9D48BDA0DB9E}" srcOrd="1" destOrd="0" presId="urn:microsoft.com/office/officeart/2008/layout/CircleAccentTimeline"/>
-    <dgm:cxn modelId="{196946E9-1A15-4084-A452-05EB454B6DF1}" type="presParOf" srcId="{DC6D7C8B-D0B9-4820-B4BA-8A1E68216E68}" destId="{8CB45ED5-BF85-4D66-AE26-8BFBBDFF06CF}" srcOrd="2" destOrd="0" presId="urn:microsoft.com/office/officeart/2008/layout/CircleAccentTimeline"/>
-    <dgm:cxn modelId="{5A345D5A-DED6-474E-A07F-C44DA37185DB}" type="presParOf" srcId="{465CCDA1-02CB-4593-AE03-73A38FC8C4F5}" destId="{2A9F5105-DC67-4F8C-8D01-BC7A8431B153}" srcOrd="9" destOrd="0" presId="urn:microsoft.com/office/officeart/2008/layout/CircleAccentTimeline"/>
-    <dgm:cxn modelId="{4ED795E2-A20F-46F1-BE58-16AE5AB276E3}" type="presParOf" srcId="{465CCDA1-02CB-4593-AE03-73A38FC8C4F5}" destId="{DE2D3D58-CCF2-4B42-A8D2-031A36691FFF}" srcOrd="10" destOrd="0" presId="urn:microsoft.com/office/officeart/2008/layout/CircleAccentTimeline"/>
-    <dgm:cxn modelId="{8CA23BB5-4C68-4B27-AD12-439662D29AA6}" type="presParOf" srcId="{465CCDA1-02CB-4593-AE03-73A38FC8C4F5}" destId="{C252EBE7-AFCF-4C6C-8541-9C1160331615}" srcOrd="11" destOrd="0" presId="urn:microsoft.com/office/officeart/2008/layout/CircleAccentTimeline"/>
-    <dgm:cxn modelId="{9F8B2ED4-5EDC-4E1B-AC5C-7024C6D8BC44}" type="presParOf" srcId="{C252EBE7-AFCF-4C6C-8541-9C1160331615}" destId="{2BDA2006-D2CC-4271-8953-F05A714AC723}" srcOrd="0" destOrd="0" presId="urn:microsoft.com/office/officeart/2008/layout/CircleAccentTimeline"/>
-    <dgm:cxn modelId="{D7099157-A410-4205-9147-E2B756344B59}" type="presParOf" srcId="{C252EBE7-AFCF-4C6C-8541-9C1160331615}" destId="{4AAD5A86-CDC5-4210-91CD-D7F23622A03D}" srcOrd="1" destOrd="0" presId="urn:microsoft.com/office/officeart/2008/layout/CircleAccentTimeline"/>
-    <dgm:cxn modelId="{FC9E9109-BB20-45B9-A6EE-28292CEEAD5C}" type="presParOf" srcId="{C252EBE7-AFCF-4C6C-8541-9C1160331615}" destId="{7A800816-76BE-46AC-969E-9BD5BFECD37C}" srcOrd="2" destOrd="0" presId="urn:microsoft.com/office/officeart/2008/layout/CircleAccentTimeline"/>
-    <dgm:cxn modelId="{7A17B568-A19C-433F-A655-C84438F90B7F}" type="presParOf" srcId="{465CCDA1-02CB-4593-AE03-73A38FC8C4F5}" destId="{67596111-D67A-44D4-85A4-547BDF4749AB}" srcOrd="12" destOrd="0" presId="urn:microsoft.com/office/officeart/2008/layout/CircleAccentTimeline"/>
-    <dgm:cxn modelId="{5B85222B-7237-43FA-A0BB-8D25A38873E3}" type="presParOf" srcId="{465CCDA1-02CB-4593-AE03-73A38FC8C4F5}" destId="{D2E39FCE-7922-491E-9C61-1B6AEAE2B6E5}" srcOrd="13" destOrd="0" presId="urn:microsoft.com/office/officeart/2008/layout/CircleAccentTimeline"/>
-    <dgm:cxn modelId="{0C5204D5-CD78-4B9B-8F07-79C8BAEDBD9C}" type="presParOf" srcId="{465CCDA1-02CB-4593-AE03-73A38FC8C4F5}" destId="{43151C5D-2277-4998-8D14-B714104206CD}" srcOrd="14" destOrd="0" presId="urn:microsoft.com/office/officeart/2008/layout/CircleAccentTimeline"/>
-    <dgm:cxn modelId="{D490B0AC-E8C9-4800-879D-57760914C40F}" type="presParOf" srcId="{465CCDA1-02CB-4593-AE03-73A38FC8C4F5}" destId="{07E7184C-C805-487B-B48D-C7D76F251B35}" srcOrd="15" destOrd="0" presId="urn:microsoft.com/office/officeart/2008/layout/CircleAccentTimeline"/>
-    <dgm:cxn modelId="{AA020F31-8A82-40E5-888D-1816D524B60E}" type="presParOf" srcId="{07E7184C-C805-487B-B48D-C7D76F251B35}" destId="{05E5D5B0-32D7-4D16-BF77-F9373A0B2F36}" srcOrd="0" destOrd="0" presId="urn:microsoft.com/office/officeart/2008/layout/CircleAccentTimeline"/>
-    <dgm:cxn modelId="{BE743FF8-3163-4A01-89FF-AC8B936BF7CC}" type="presParOf" srcId="{07E7184C-C805-487B-B48D-C7D76F251B35}" destId="{835E47B9-A54D-4E11-A093-8B3E340D9D00}" srcOrd="1" destOrd="0" presId="urn:microsoft.com/office/officeart/2008/layout/CircleAccentTimeline"/>
-    <dgm:cxn modelId="{B1ACA76D-75B5-489B-B132-523D033EAE83}" type="presParOf" srcId="{07E7184C-C805-487B-B48D-C7D76F251B35}" destId="{D18F9E56-98BB-48DC-9544-4B218D91759F}" srcOrd="2" destOrd="0" presId="urn:microsoft.com/office/officeart/2008/layout/CircleAccentTimeline"/>
-    <dgm:cxn modelId="{463A4F2C-2C8A-4CC8-8CFD-2B89CC5A2A30}" type="presParOf" srcId="{465CCDA1-02CB-4593-AE03-73A38FC8C4F5}" destId="{F65A812F-6DD7-4369-ADCC-4A593126E15E}" srcOrd="16" destOrd="0" presId="urn:microsoft.com/office/officeart/2008/layout/CircleAccentTimeline"/>
-    <dgm:cxn modelId="{1A966280-FC0C-409F-9375-3AA3E33E7E14}" type="presParOf" srcId="{465CCDA1-02CB-4593-AE03-73A38FC8C4F5}" destId="{AF104042-723D-48CE-9C17-35108164E8EC}" srcOrd="17" destOrd="0" presId="urn:microsoft.com/office/officeart/2008/layout/CircleAccentTimeline"/>
-    <dgm:cxn modelId="{B525641B-B0DA-4D96-89C0-4828A6B41F9D}" type="presParOf" srcId="{465CCDA1-02CB-4593-AE03-73A38FC8C4F5}" destId="{784485C4-D2EE-4331-B48A-17C125F6993E}" srcOrd="18" destOrd="0" presId="urn:microsoft.com/office/officeart/2008/layout/CircleAccentTimeline"/>
-    <dgm:cxn modelId="{6CD09671-69C8-4739-A655-F3D262C242FB}" type="presParOf" srcId="{465CCDA1-02CB-4593-AE03-73A38FC8C4F5}" destId="{B32C801C-7C8A-47F7-BD85-193235206CCD}" srcOrd="19" destOrd="0" presId="urn:microsoft.com/office/officeart/2008/layout/CircleAccentTimeline"/>
-    <dgm:cxn modelId="{D9B4DF08-6DAA-4CA9-931A-81870888D58B}" type="presParOf" srcId="{B32C801C-7C8A-47F7-BD85-193235206CCD}" destId="{28532D80-2937-4CD0-9269-CC53355394C3}" srcOrd="0" destOrd="0" presId="urn:microsoft.com/office/officeart/2008/layout/CircleAccentTimeline"/>
-    <dgm:cxn modelId="{54E4A04C-56B4-44BA-A3D6-FBCF029B9E32}" type="presParOf" srcId="{B32C801C-7C8A-47F7-BD85-193235206CCD}" destId="{D4676513-3691-439E-98F5-27DADB37ED56}" srcOrd="1" destOrd="0" presId="urn:microsoft.com/office/officeart/2008/layout/CircleAccentTimeline"/>
-    <dgm:cxn modelId="{AF55749E-58E3-4CB0-AC6A-3CF2EFCAE353}" type="presParOf" srcId="{B32C801C-7C8A-47F7-BD85-193235206CCD}" destId="{1D0D467E-1E51-452B-9375-43A2E677CC97}" srcOrd="2" destOrd="0" presId="urn:microsoft.com/office/officeart/2008/layout/CircleAccentTimeline"/>
-    <dgm:cxn modelId="{1594B514-4303-42DF-B282-0402B4072E4D}" type="presParOf" srcId="{465CCDA1-02CB-4593-AE03-73A38FC8C4F5}" destId="{C9138E4F-6F29-478B-B2C2-DC111573B808}" srcOrd="20" destOrd="0" presId="urn:microsoft.com/office/officeart/2008/layout/CircleAccentTimeline"/>
-    <dgm:cxn modelId="{DF89F0DE-9E79-477E-BBDB-561493F80C09}" type="presParOf" srcId="{465CCDA1-02CB-4593-AE03-73A38FC8C4F5}" destId="{6B6FEC17-D798-42E1-B493-1F7535CCE85D}" srcOrd="21" destOrd="0" presId="urn:microsoft.com/office/officeart/2008/layout/CircleAccentTimeline"/>
-    <dgm:cxn modelId="{307EE8C9-8ED3-4322-9D55-75127011F037}" type="presParOf" srcId="{465CCDA1-02CB-4593-AE03-73A38FC8C4F5}" destId="{2A86851A-627E-4671-A103-5340F6543BF7}" srcOrd="22" destOrd="0" presId="urn:microsoft.com/office/officeart/2008/layout/CircleAccentTimeline"/>
-    <dgm:cxn modelId="{C9DFDD35-CB72-4E11-9912-F0D0A969F9C8}" type="presParOf" srcId="{2A86851A-627E-4671-A103-5340F6543BF7}" destId="{A8EA4607-0075-4E8A-9C69-5825B2E3EE87}" srcOrd="0" destOrd="0" presId="urn:microsoft.com/office/officeart/2008/layout/CircleAccentTimeline"/>
-    <dgm:cxn modelId="{C361E945-2F2E-4031-873A-14A6C0BBB03F}" type="presParOf" srcId="{2A86851A-627E-4671-A103-5340F6543BF7}" destId="{58AA0D98-BF47-4D33-BEE8-77888014D308}" srcOrd="1" destOrd="0" presId="urn:microsoft.com/office/officeart/2008/layout/CircleAccentTimeline"/>
-    <dgm:cxn modelId="{4F8D144D-45FF-4750-988F-D952A746C135}" type="presParOf" srcId="{2A86851A-627E-4671-A103-5340F6543BF7}" destId="{FDA9EDDD-B075-4475-9E98-10C5C1B8AD97}" srcOrd="2" destOrd="0" presId="urn:microsoft.com/office/officeart/2008/layout/CircleAccentTimeline"/>
-    <dgm:cxn modelId="{1FDBFCB4-7B03-474A-A560-1300D91AA395}" type="presParOf" srcId="{465CCDA1-02CB-4593-AE03-73A38FC8C4F5}" destId="{00009B53-337F-4471-9A06-69957BB4FE59}" srcOrd="23" destOrd="0" presId="urn:microsoft.com/office/officeart/2008/layout/CircleAccentTimeline"/>
-    <dgm:cxn modelId="{C1BC56B4-3EE6-4B66-A936-EAD1D7BED0A3}" type="presParOf" srcId="{465CCDA1-02CB-4593-AE03-73A38FC8C4F5}" destId="{67329847-1B3E-4E71-A03D-AAE76A3EFC5B}" srcOrd="24" destOrd="0" presId="urn:microsoft.com/office/officeart/2008/layout/CircleAccentTimeline"/>
-    <dgm:cxn modelId="{C8D70F51-C1E5-42D0-8E0B-7C371DA62D40}" type="presParOf" srcId="{465CCDA1-02CB-4593-AE03-73A38FC8C4F5}" destId="{E40507FA-A3BB-4F2B-896D-7C425EE0BD3B}" srcOrd="25" destOrd="0" presId="urn:microsoft.com/office/officeart/2008/layout/CircleAccentTimeline"/>
-    <dgm:cxn modelId="{DD601D44-52A6-4779-9519-ACC95D2E334C}" type="presParOf" srcId="{465CCDA1-02CB-4593-AE03-73A38FC8C4F5}" destId="{58FA078F-EF37-4A68-9F7A-01402E6334B9}" srcOrd="26" destOrd="0" presId="urn:microsoft.com/office/officeart/2008/layout/CircleAccentTimeline"/>
-    <dgm:cxn modelId="{16EE0456-3A40-4DAE-81CB-D87E902A9746}" type="presParOf" srcId="{58FA078F-EF37-4A68-9F7A-01402E6334B9}" destId="{215553BB-EC1A-429F-860C-8D73872F200B}" srcOrd="0" destOrd="0" presId="urn:microsoft.com/office/officeart/2008/layout/CircleAccentTimeline"/>
-    <dgm:cxn modelId="{21BFC89D-A997-4C8E-811C-F73857BC5C16}" type="presParOf" srcId="{58FA078F-EF37-4A68-9F7A-01402E6334B9}" destId="{0CF9C00C-2488-4AAA-83BF-6186357AF6E3}" srcOrd="1" destOrd="0" presId="urn:microsoft.com/office/officeart/2008/layout/CircleAccentTimeline"/>
-    <dgm:cxn modelId="{1CE84BE9-1C97-445B-BA07-9133E35D2495}" type="presParOf" srcId="{58FA078F-EF37-4A68-9F7A-01402E6334B9}" destId="{87F60D4E-EBBB-4910-BD03-A0D431985787}" srcOrd="2" destOrd="0" presId="urn:microsoft.com/office/officeart/2008/layout/CircleAccentTimeline"/>
-    <dgm:cxn modelId="{60F8BF2C-F2D7-4E48-A250-2E923D922892}" type="presParOf" srcId="{465CCDA1-02CB-4593-AE03-73A38FC8C4F5}" destId="{027D5E80-47BD-4BF1-8EA5-4670BA4E3405}" srcOrd="27" destOrd="0" presId="urn:microsoft.com/office/officeart/2008/layout/CircleAccentTimeline"/>
-    <dgm:cxn modelId="{104CD4C0-2D30-4D2B-844F-6BED54548F0C}" type="presParOf" srcId="{465CCDA1-02CB-4593-AE03-73A38FC8C4F5}" destId="{2C2FCCAE-134D-48D5-AB81-C42A5668E585}" srcOrd="28" destOrd="0" presId="urn:microsoft.com/office/officeart/2008/layout/CircleAccentTimeline"/>
-    <dgm:cxn modelId="{F4F66FBC-3E5B-4B64-99D2-507D15B6C5DE}" type="presParOf" srcId="{465CCDA1-02CB-4593-AE03-73A38FC8C4F5}" destId="{AA4437A2-3FF8-428C-BB53-01F73DC6C4C9}" srcOrd="29" destOrd="0" presId="urn:microsoft.com/office/officeart/2008/layout/CircleAccentTimeline"/>
-    <dgm:cxn modelId="{4028F7F8-51B5-4DC2-9D8F-8966D7BD6BC0}" type="presParOf" srcId="{465CCDA1-02CB-4593-AE03-73A38FC8C4F5}" destId="{71094713-F758-45D7-B7CD-0CA16BDF1320}" srcOrd="30" destOrd="0" presId="urn:microsoft.com/office/officeart/2008/layout/CircleAccentTimeline"/>
-    <dgm:cxn modelId="{90768BA8-D8D3-4027-8332-F6C94BE45FB3}" type="presParOf" srcId="{71094713-F758-45D7-B7CD-0CA16BDF1320}" destId="{2DE2F1A0-42C1-4BD6-9361-9BC55B0CAB80}" srcOrd="0" destOrd="0" presId="urn:microsoft.com/office/officeart/2008/layout/CircleAccentTimeline"/>
-    <dgm:cxn modelId="{CE94CB5F-B125-46D9-85C9-9F8DC5B71F96}" type="presParOf" srcId="{71094713-F758-45D7-B7CD-0CA16BDF1320}" destId="{5FC37EE6-E8E2-49C5-AD86-1DE7CF0E23C2}" srcOrd="1" destOrd="0" presId="urn:microsoft.com/office/officeart/2008/layout/CircleAccentTimeline"/>
-    <dgm:cxn modelId="{30A94D02-C86B-4384-BDE8-D8A30104E869}" type="presParOf" srcId="{71094713-F758-45D7-B7CD-0CA16BDF1320}" destId="{AA363555-0838-4968-9137-0E047988D5E1}" srcOrd="2" destOrd="0" presId="urn:microsoft.com/office/officeart/2008/layout/CircleAccentTimeline"/>
-    <dgm:cxn modelId="{4DA49924-6B81-4BCB-AF88-31862DB97EAE}" type="presParOf" srcId="{465CCDA1-02CB-4593-AE03-73A38FC8C4F5}" destId="{58721376-A8E8-496B-BA58-9D45DD623EB8}" srcOrd="31" destOrd="0" presId="urn:microsoft.com/office/officeart/2008/layout/CircleAccentTimeline"/>
-    <dgm:cxn modelId="{E48CE5E6-5F1B-48CB-A25F-992D70F01FD8}" type="presParOf" srcId="{465CCDA1-02CB-4593-AE03-73A38FC8C4F5}" destId="{A91D24C3-40C1-4EB7-AED9-317EF92B0A66}" srcOrd="32" destOrd="0" presId="urn:microsoft.com/office/officeart/2008/layout/CircleAccentTimeline"/>
-    <dgm:cxn modelId="{0BF7A5C2-A87B-4349-B852-D826121A0181}" type="presParOf" srcId="{465CCDA1-02CB-4593-AE03-73A38FC8C4F5}" destId="{9967F6BC-8815-475B-8321-2A8D5E268D5A}" srcOrd="33" destOrd="0" presId="urn:microsoft.com/office/officeart/2008/layout/CircleAccentTimeline"/>
-    <dgm:cxn modelId="{18DCE91B-2F46-4801-B81B-C1DF44371438}" type="presParOf" srcId="{9967F6BC-8815-475B-8321-2A8D5E268D5A}" destId="{1E15F4E8-0DC5-49EB-A1DB-E5E559965511}" srcOrd="0" destOrd="0" presId="urn:microsoft.com/office/officeart/2008/layout/CircleAccentTimeline"/>
-    <dgm:cxn modelId="{E70AD39F-C374-4342-A876-E75EDFE3698C}" type="presParOf" srcId="{9967F6BC-8815-475B-8321-2A8D5E268D5A}" destId="{8AF272FB-F19E-4C5C-A4A0-95CF2BC96881}" srcOrd="1" destOrd="0" presId="urn:microsoft.com/office/officeart/2008/layout/CircleAccentTimeline"/>
-    <dgm:cxn modelId="{410697EA-55EE-4CF4-B54B-09EEC67CC807}" type="presParOf" srcId="{9967F6BC-8815-475B-8321-2A8D5E268D5A}" destId="{083929D2-7CB7-44E0-AA68-FE002AF9969F}" srcOrd="2" destOrd="0" presId="urn:microsoft.com/office/officeart/2008/layout/CircleAccentTimeline"/>
-    <dgm:cxn modelId="{F2B60046-352F-4C1C-BCCE-60175E798B9A}" type="presParOf" srcId="{465CCDA1-02CB-4593-AE03-73A38FC8C4F5}" destId="{C5595781-32CD-439C-829E-EF7C1D9B032D}" srcOrd="34" destOrd="0" presId="urn:microsoft.com/office/officeart/2008/layout/CircleAccentTimeline"/>
-    <dgm:cxn modelId="{3F5E247C-CC30-44DF-B841-DDBD696CF094}" type="presParOf" srcId="{465CCDA1-02CB-4593-AE03-73A38FC8C4F5}" destId="{9BA619B2-D4BA-437F-B1DF-2751BA482279}" srcOrd="35" destOrd="0" presId="urn:microsoft.com/office/officeart/2008/layout/CircleAccentTimeline"/>
-    <dgm:cxn modelId="{BCC3D629-3CDA-4F36-9EF8-867A722A156C}" type="presParOf" srcId="{465CCDA1-02CB-4593-AE03-73A38FC8C4F5}" destId="{D85280B3-E629-43B3-9F43-2434204E7054}" srcOrd="36" destOrd="0" presId="urn:microsoft.com/office/officeart/2008/layout/CircleAccentTimeline"/>
-    <dgm:cxn modelId="{A728AB3C-9CF5-4086-93FA-B311F4F9D446}" type="presParOf" srcId="{465CCDA1-02CB-4593-AE03-73A38FC8C4F5}" destId="{D6FEDD6B-8521-4C07-84F0-0998F8F760F6}" srcOrd="37" destOrd="0" presId="urn:microsoft.com/office/officeart/2008/layout/CircleAccentTimeline"/>
-    <dgm:cxn modelId="{E70A02A1-5B20-4A58-B13A-71DA237A5887}" type="presParOf" srcId="{D6FEDD6B-8521-4C07-84F0-0998F8F760F6}" destId="{AF7FF73C-E897-47AF-A655-5F2431E1FA41}" srcOrd="0" destOrd="0" presId="urn:microsoft.com/office/officeart/2008/layout/CircleAccentTimeline"/>
-    <dgm:cxn modelId="{4251ABCD-5DBA-457A-8401-51B685983D23}" type="presParOf" srcId="{D6FEDD6B-8521-4C07-84F0-0998F8F760F6}" destId="{48166FEA-9BEC-4A82-94BA-96137E37F782}" srcOrd="1" destOrd="0" presId="urn:microsoft.com/office/officeart/2008/layout/CircleAccentTimeline"/>
-    <dgm:cxn modelId="{4DBB029D-09D0-4570-8CFB-62F55A462DBE}" type="presParOf" srcId="{D6FEDD6B-8521-4C07-84F0-0998F8F760F6}" destId="{E71938D9-08E7-4775-9AB2-BD810D64D9FB}" srcOrd="2" destOrd="0" presId="urn:microsoft.com/office/officeart/2008/layout/CircleAccentTimeline"/>
-    <dgm:cxn modelId="{D32751B1-27EB-4380-873C-A6FEA431AB08}" type="presParOf" srcId="{465CCDA1-02CB-4593-AE03-73A38FC8C4F5}" destId="{002C9987-2F7A-4E15-A061-4D5A13AC5C94}" srcOrd="38" destOrd="0" presId="urn:microsoft.com/office/officeart/2008/layout/CircleAccentTimeline"/>
-    <dgm:cxn modelId="{5D0C544C-8A20-408A-ADB4-DB0F0BEAC9F5}" type="presParOf" srcId="{465CCDA1-02CB-4593-AE03-73A38FC8C4F5}" destId="{83AD6AC4-8EF1-4C02-A7E5-343860488887}" srcOrd="39" destOrd="0" presId="urn:microsoft.com/office/officeart/2008/layout/CircleAccentTimeline"/>
-    <dgm:cxn modelId="{52E39B9D-7BF5-4E26-93D9-BF1FD86FC58F}" type="presParOf" srcId="{465CCDA1-02CB-4593-AE03-73A38FC8C4F5}" destId="{950C65DA-7211-4B12-AABF-63CDF325F2FE}" srcOrd="40" destOrd="0" presId="urn:microsoft.com/office/officeart/2008/layout/CircleAccentTimeline"/>
-    <dgm:cxn modelId="{177EAE55-FAC6-40B3-9811-BA2111960D51}" type="presParOf" srcId="{465CCDA1-02CB-4593-AE03-73A38FC8C4F5}" destId="{525BA56C-5BD9-4A79-BAFF-8E67C0DA7EB0}" srcOrd="41" destOrd="0" presId="urn:microsoft.com/office/officeart/2008/layout/CircleAccentTimeline"/>
-    <dgm:cxn modelId="{27E2B87F-8FB6-46A4-A05C-4739897EEEEE}" type="presParOf" srcId="{525BA56C-5BD9-4A79-BAFF-8E67C0DA7EB0}" destId="{BB0E9E5E-35F1-49F8-B91A-624D17854DBD}" srcOrd="0" destOrd="0" presId="urn:microsoft.com/office/officeart/2008/layout/CircleAccentTimeline"/>
-    <dgm:cxn modelId="{3B1BA8F9-1551-4B56-9972-4688B331BD6C}" type="presParOf" srcId="{525BA56C-5BD9-4A79-BAFF-8E67C0DA7EB0}" destId="{EA332EF7-A428-44E5-8FC6-7838DAE85A7A}" srcOrd="1" destOrd="0" presId="urn:microsoft.com/office/officeart/2008/layout/CircleAccentTimeline"/>
-    <dgm:cxn modelId="{F20E9A9E-6DB4-4DD1-A713-B04E0B6722EC}" type="presParOf" srcId="{525BA56C-5BD9-4A79-BAFF-8E67C0DA7EB0}" destId="{868EDB69-232C-4315-B585-996F6BCF7B44}" srcOrd="2" destOrd="0" presId="urn:microsoft.com/office/officeart/2008/layout/CircleAccentTimeline"/>
-    <dgm:cxn modelId="{E03C4991-9DDD-4BE2-BC2E-30A598CAFD39}" type="presParOf" srcId="{465CCDA1-02CB-4593-AE03-73A38FC8C4F5}" destId="{755F2EDA-157C-4DB8-A242-E96253E61209}" srcOrd="42" destOrd="0" presId="urn:microsoft.com/office/officeart/2008/layout/CircleAccentTimeline"/>
-    <dgm:cxn modelId="{7839BD7D-E021-44D3-875B-A4A9A19E97E6}" type="presParOf" srcId="{465CCDA1-02CB-4593-AE03-73A38FC8C4F5}" destId="{9D5288F2-F7B7-4042-A48A-98BF52E96ADC}" srcOrd="43" destOrd="0" presId="urn:microsoft.com/office/officeart/2008/layout/CircleAccentTimeline"/>
-  </dgm:cxnLst>
-  <dgm:bg/>
-  <dgm:whole/>
-  <dgm:extLst>
-    <a:ext uri="http://schemas.microsoft.com/office/drawing/2008/diagram">
-      <dsp:dataModelExt xmlns:dsp="http://schemas.microsoft.com/office/drawing/2008/diagram" relId="rId6" minVer="http://schemas.openxmlformats.org/drawingml/2006/diagram"/>
-    </a:ext>
-  </dgm:extLst>
-</dgm:dataModel>
-</file>
-
-<file path=ppt/diagrams/data3.xml><?xml version="1.0" encoding="utf-8"?>
-<dgm:dataModel xmlns:dgm="http://schemas.openxmlformats.org/drawingml/2006/diagram" xmlns:a="http://schemas.openxmlformats.org/drawingml/2006/main">
-  <dgm:ptLst>
-    <dgm:pt modelId="{5ECA6DCA-C759-48CD-B85E-658D7FF4B9A3}" type="doc">
-      <dgm:prSet loTypeId="urn:microsoft.com/office/officeart/2008/layout/CircleAccentTimeline" loCatId="process" qsTypeId="urn:microsoft.com/office/officeart/2005/8/quickstyle/simple1" qsCatId="simple" csTypeId="urn:microsoft.com/office/officeart/2005/8/colors/colorful4" csCatId="colorful" phldr="1"/>
+    <dgm:pt modelId="{72E3FD53-6A20-4B3D-B3EC-415AD0017ACB}" type="pres">
+      <dgm:prSet presAssocID="{C97BDEEB-78B6-4994-8F20-0BA55313DF32}" presName="desBackupRightNorm" presStyleCnt="0"/>
+      <dgm:spPr/>
+    </dgm:pt>
+    <dgm:pt modelId="{9031D611-3928-43A1-BC77-9315214F6516}" type="pres">
+      <dgm:prSet presAssocID="{0FA685D8-3AD6-419A-9F68-49BC56316D17}" presName="desSpace" presStyleCnt="0"/>
+      <dgm:spPr/>
+    </dgm:pt>
+    <dgm:pt modelId="{959741F2-830A-4D09-8712-4D056AFC0405}" type="pres">
+      <dgm:prSet presAssocID="{5077B2D9-722E-4285-B280-2CD035099AE6}" presName="parComposite" presStyleCnt="0"/>
+      <dgm:spPr/>
+    </dgm:pt>
+    <dgm:pt modelId="{10E10192-D1DB-4540-BC9E-5F6B92991865}" type="pres">
+      <dgm:prSet presAssocID="{5077B2D9-722E-4285-B280-2CD035099AE6}" presName="parBigCircle" presStyleLbl="node0" presStyleIdx="2" presStyleCnt="4"/>
+      <dgm:spPr/>
+    </dgm:pt>
+    <dgm:pt modelId="{C25F440E-5989-47BB-9438-01B4A72D0B0E}" type="pres">
+      <dgm:prSet presAssocID="{5077B2D9-722E-4285-B280-2CD035099AE6}" presName="parTx" presStyleLbl="revTx" presStyleIdx="10" presStyleCnt="20"/>
       <dgm:spPr/>
       <dgm:t>
         <a:bodyPr/>
@@ -3733,29 +4493,32 @@
         </a:p>
       </dgm:t>
     </dgm:pt>
-    <dgm:pt modelId="{82BB8E71-6E46-4CFA-8FF6-DFA2FD7C079F}">
-      <dgm:prSet phldrT="[Text]" custT="1"/>
-      <dgm:spPr/>
-      <dgm:t>
-        <a:bodyPr/>
-        <a:lstStyle/>
-        <a:p>
-          <a:r>
-            <a:rPr lang="en-GB" sz="2000" b="1" dirty="0" err="1" smtClean="0">
-              <a:latin typeface="Courier New" panose="02070309020205020404" pitchFamily="49" charset="0"/>
-              <a:cs typeface="Courier New" panose="02070309020205020404" pitchFamily="49" charset="0"/>
-            </a:rPr>
-            <a:t>findBBs</a:t>
-          </a:r>
-          <a:endParaRPr lang="en-GB" sz="2000" b="1" dirty="0">
-            <a:latin typeface="Courier New" panose="02070309020205020404" pitchFamily="49" charset="0"/>
-            <a:cs typeface="Courier New" panose="02070309020205020404" pitchFamily="49" charset="0"/>
-          </a:endParaRPr>
-        </a:p>
-      </dgm:t>
-    </dgm:pt>
-    <dgm:pt modelId="{7248C1A9-7B1D-4115-B4C8-3DE468484551}" type="parTrans" cxnId="{8899A5CF-D47D-4454-AB77-2C6EB6C07F52}">
-      <dgm:prSet/>
+    <dgm:pt modelId="{E3F36667-886E-473C-8A00-B2B1D5543187}" type="pres">
+      <dgm:prSet presAssocID="{5077B2D9-722E-4285-B280-2CD035099AE6}" presName="bSpace" presStyleCnt="0"/>
+      <dgm:spPr/>
+    </dgm:pt>
+    <dgm:pt modelId="{5B0E8A3A-81FF-454D-B0F3-8317F662D0BF}" type="pres">
+      <dgm:prSet presAssocID="{5077B2D9-722E-4285-B280-2CD035099AE6}" presName="parBackupNorm" presStyleCnt="0"/>
+      <dgm:spPr/>
+    </dgm:pt>
+    <dgm:pt modelId="{D22FAE66-2780-429F-A442-F67FC83AFCD2}" type="pres">
+      <dgm:prSet presAssocID="{035A84C1-AC43-4EFD-ADEE-7E7792CBF826}" presName="parSpace" presStyleCnt="0"/>
+      <dgm:spPr/>
+    </dgm:pt>
+    <dgm:pt modelId="{AFCB98A6-9D11-4F07-BC27-B9A0351EB9ED}" type="pres">
+      <dgm:prSet presAssocID="{CD212DAD-B19C-4C50-B5CF-C2B393CA84B3}" presName="desBackupLeftNorm" presStyleCnt="0"/>
+      <dgm:spPr/>
+    </dgm:pt>
+    <dgm:pt modelId="{6436CD56-F091-4481-9EDC-4E73155ACD10}" type="pres">
+      <dgm:prSet presAssocID="{CD212DAD-B19C-4C50-B5CF-C2B393CA84B3}" presName="desComposite" presStyleCnt="0"/>
+      <dgm:spPr/>
+    </dgm:pt>
+    <dgm:pt modelId="{9367CC29-33D8-4FD1-AA42-B42C2C0900F2}" type="pres">
+      <dgm:prSet presAssocID="{CD212DAD-B19C-4C50-B5CF-C2B393CA84B3}" presName="desCircle" presStyleLbl="node1" presStyleIdx="4" presStyleCnt="8"/>
+      <dgm:spPr/>
+    </dgm:pt>
+    <dgm:pt modelId="{C51A1E82-AC8E-4B24-8DED-3EBBDDD58E25}" type="pres">
+      <dgm:prSet presAssocID="{CD212DAD-B19C-4C50-B5CF-C2B393CA84B3}" presName="chTx" presStyleLbl="revTx" presStyleIdx="11" presStyleCnt="20"/>
       <dgm:spPr/>
       <dgm:t>
         <a:bodyPr/>
@@ -3765,8 +4528,36 @@
         </a:p>
       </dgm:t>
     </dgm:pt>
-    <dgm:pt modelId="{482E10F3-6897-440A-8111-658C31AB03C6}" type="sibTrans" cxnId="{8899A5CF-D47D-4454-AB77-2C6EB6C07F52}">
-      <dgm:prSet/>
+    <dgm:pt modelId="{C71E06D2-F9F7-4C4B-81A0-B5BF7480B84C}" type="pres">
+      <dgm:prSet presAssocID="{CD212DAD-B19C-4C50-B5CF-C2B393CA84B3}" presName="desTx" presStyleLbl="revTx" presStyleIdx="12" presStyleCnt="20">
+        <dgm:presLayoutVars>
+          <dgm:bulletEnabled val="1"/>
+        </dgm:presLayoutVars>
+      </dgm:prSet>
+      <dgm:spPr/>
+    </dgm:pt>
+    <dgm:pt modelId="{4E7C56CB-32C2-45D5-BB7D-17A2D9E1FF2C}" type="pres">
+      <dgm:prSet presAssocID="{CD212DAD-B19C-4C50-B5CF-C2B393CA84B3}" presName="desBackupRightNorm" presStyleCnt="0"/>
+      <dgm:spPr/>
+    </dgm:pt>
+    <dgm:pt modelId="{3F7DCEDC-468E-405F-98BE-6DCD7243A661}" type="pres">
+      <dgm:prSet presAssocID="{0D8F5FB1-6A95-4B31-A43E-0CFFFF429532}" presName="desSpace" presStyleCnt="0"/>
+      <dgm:spPr/>
+    </dgm:pt>
+    <dgm:pt modelId="{07B2100A-0C00-4969-870A-25FC4364C763}" type="pres">
+      <dgm:prSet presAssocID="{E6423BA6-930D-4A15-84AA-0BEC7878629E}" presName="desBackupLeftNorm" presStyleCnt="0"/>
+      <dgm:spPr/>
+    </dgm:pt>
+    <dgm:pt modelId="{4537587C-8BC2-4223-807D-434F73C83258}" type="pres">
+      <dgm:prSet presAssocID="{E6423BA6-930D-4A15-84AA-0BEC7878629E}" presName="desComposite" presStyleCnt="0"/>
+      <dgm:spPr/>
+    </dgm:pt>
+    <dgm:pt modelId="{10CA07A6-D0E4-480D-9578-DEF8F7B8EE7A}" type="pres">
+      <dgm:prSet presAssocID="{E6423BA6-930D-4A15-84AA-0BEC7878629E}" presName="desCircle" presStyleLbl="node1" presStyleIdx="5" presStyleCnt="8"/>
+      <dgm:spPr/>
+    </dgm:pt>
+    <dgm:pt modelId="{D04BB978-ED60-4153-924B-65A50DDD181E}" type="pres">
+      <dgm:prSet presAssocID="{E6423BA6-930D-4A15-84AA-0BEC7878629E}" presName="chTx" presStyleLbl="revTx" presStyleIdx="13" presStyleCnt="20" custLinFactNeighborX="13814" custLinFactNeighborY="3343"/>
       <dgm:spPr/>
       <dgm:t>
         <a:bodyPr/>
@@ -3776,23 +4567,32 @@
         </a:p>
       </dgm:t>
     </dgm:pt>
-    <dgm:pt modelId="{B0E57D30-8025-4D63-A6B2-6DD851E4B257}">
-      <dgm:prSet phldrT="[Text]" custT="1"/>
-      <dgm:spPr/>
-      <dgm:t>
-        <a:bodyPr/>
-        <a:lstStyle/>
-        <a:p>
-          <a:r>
-            <a:rPr lang="en-GB" sz="1300" dirty="0" smtClean="0"/>
-            <a:t>Output image, labels</a:t>
-          </a:r>
-          <a:endParaRPr lang="en-GB" sz="1300" dirty="0"/>
-        </a:p>
-      </dgm:t>
-    </dgm:pt>
-    <dgm:pt modelId="{746CB427-6D26-4E6A-830D-7EDA354BC3C0}" type="parTrans" cxnId="{C4E82EDA-5EFE-4861-A557-A91548699321}">
-      <dgm:prSet/>
+    <dgm:pt modelId="{69403BB5-4D42-424D-B70C-D011F3EDB6B0}" type="pres">
+      <dgm:prSet presAssocID="{E6423BA6-930D-4A15-84AA-0BEC7878629E}" presName="desTx" presStyleLbl="revTx" presStyleIdx="14" presStyleCnt="20">
+        <dgm:presLayoutVars>
+          <dgm:bulletEnabled val="1"/>
+        </dgm:presLayoutVars>
+      </dgm:prSet>
+      <dgm:spPr/>
+    </dgm:pt>
+    <dgm:pt modelId="{A1E7B169-5DB5-4834-99B5-D4EBAC5EC7FB}" type="pres">
+      <dgm:prSet presAssocID="{E6423BA6-930D-4A15-84AA-0BEC7878629E}" presName="desBackupRightNorm" presStyleCnt="0"/>
+      <dgm:spPr/>
+    </dgm:pt>
+    <dgm:pt modelId="{19BC3BBA-6C3B-41A4-9870-0B36195A7A48}" type="pres">
+      <dgm:prSet presAssocID="{5D5EA7DB-6C66-46ED-ADE7-400DA25E32AF}" presName="desSpace" presStyleCnt="0"/>
+      <dgm:spPr/>
+    </dgm:pt>
+    <dgm:pt modelId="{60638939-F446-41A2-8D1A-FF1F29D4CCA2}" type="pres">
+      <dgm:prSet presAssocID="{366A18A4-A553-4F6D-89E8-15504C0011BD}" presName="parComposite" presStyleCnt="0"/>
+      <dgm:spPr/>
+    </dgm:pt>
+    <dgm:pt modelId="{26E5474D-8EF8-4691-B9DB-24EA66BB7220}" type="pres">
+      <dgm:prSet presAssocID="{366A18A4-A553-4F6D-89E8-15504C0011BD}" presName="parBigCircle" presStyleLbl="node0" presStyleIdx="3" presStyleCnt="4"/>
+      <dgm:spPr/>
+    </dgm:pt>
+    <dgm:pt modelId="{FE9185A6-A871-42E8-9720-DD96299AD075}" type="pres">
+      <dgm:prSet presAssocID="{366A18A4-A553-4F6D-89E8-15504C0011BD}" presName="parTx" presStyleLbl="revTx" presStyleIdx="15" presStyleCnt="20"/>
       <dgm:spPr/>
       <dgm:t>
         <a:bodyPr/>
@@ -3802,8 +4602,32 @@
         </a:p>
       </dgm:t>
     </dgm:pt>
-    <dgm:pt modelId="{5D7B4CB4-3A01-4E2E-BED0-F2EB71B6957A}" type="sibTrans" cxnId="{C4E82EDA-5EFE-4861-A557-A91548699321}">
-      <dgm:prSet/>
+    <dgm:pt modelId="{8C229429-6934-4DEE-84F3-46D6ECB15968}" type="pres">
+      <dgm:prSet presAssocID="{366A18A4-A553-4F6D-89E8-15504C0011BD}" presName="bSpace" presStyleCnt="0"/>
+      <dgm:spPr/>
+    </dgm:pt>
+    <dgm:pt modelId="{278D4510-4C6F-45A7-820A-0E3B036CD04C}" type="pres">
+      <dgm:prSet presAssocID="{366A18A4-A553-4F6D-89E8-15504C0011BD}" presName="parBackupNorm" presStyleCnt="0"/>
+      <dgm:spPr/>
+    </dgm:pt>
+    <dgm:pt modelId="{97E6E326-93C4-4E9C-92DF-3FDEA26EE24B}" type="pres">
+      <dgm:prSet presAssocID="{65B22984-A5BA-4456-9BC9-89A37A57521F}" presName="parSpace" presStyleCnt="0"/>
+      <dgm:spPr/>
+    </dgm:pt>
+    <dgm:pt modelId="{2AA21EA2-FB11-4B99-9943-B3259E3C9C3E}" type="pres">
+      <dgm:prSet presAssocID="{11E7C407-5F8B-42CF-80BE-F8449BE9286F}" presName="desBackupLeftNorm" presStyleCnt="0"/>
+      <dgm:spPr/>
+    </dgm:pt>
+    <dgm:pt modelId="{B1F793EB-14A2-45D4-88CF-DD58A5D4AA04}" type="pres">
+      <dgm:prSet presAssocID="{11E7C407-5F8B-42CF-80BE-F8449BE9286F}" presName="desComposite" presStyleCnt="0"/>
+      <dgm:spPr/>
+    </dgm:pt>
+    <dgm:pt modelId="{A9E52EBE-13BA-4B6A-B25D-203B758D84E9}" type="pres">
+      <dgm:prSet presAssocID="{11E7C407-5F8B-42CF-80BE-F8449BE9286F}" presName="desCircle" presStyleLbl="node1" presStyleIdx="6" presStyleCnt="8" custLinFactNeighborX="-15246" custLinFactNeighborY="83002"/>
+      <dgm:spPr/>
+    </dgm:pt>
+    <dgm:pt modelId="{74A3F228-2583-48CF-B747-D3940B109963}" type="pres">
+      <dgm:prSet presAssocID="{11E7C407-5F8B-42CF-80BE-F8449BE9286F}" presName="chTx" presStyleLbl="revTx" presStyleIdx="16" presStyleCnt="20" custScaleX="147164" custScaleY="173129" custLinFactNeighborX="-20396" custLinFactNeighborY="58317"/>
       <dgm:spPr/>
       <dgm:t>
         <a:bodyPr/>
@@ -3813,23 +4637,36 @@
         </a:p>
       </dgm:t>
     </dgm:pt>
-    <dgm:pt modelId="{C97BDEEB-78B6-4994-8F20-0BA55313DF32}">
-      <dgm:prSet phldrT="[Text]" custT="1"/>
-      <dgm:spPr/>
-      <dgm:t>
-        <a:bodyPr/>
-        <a:lstStyle/>
-        <a:p>
-          <a:r>
-            <a:rPr lang="en-GB" sz="1300" dirty="0" smtClean="0"/>
-            <a:t>Bounding box vector</a:t>
-          </a:r>
-          <a:endParaRPr lang="en-GB" sz="1300" dirty="0"/>
-        </a:p>
-      </dgm:t>
-    </dgm:pt>
-    <dgm:pt modelId="{BE43B0C8-D79E-4748-BAFD-390E33BD03C0}" type="parTrans" cxnId="{CB5DBCD1-DBF7-4F9F-8174-757AD43B183F}">
-      <dgm:prSet/>
+    <dgm:pt modelId="{6F4CAF73-6FA6-44A5-9B5E-8C132110D9F4}" type="pres">
+      <dgm:prSet presAssocID="{11E7C407-5F8B-42CF-80BE-F8449BE9286F}" presName="desTx" presStyleLbl="revTx" presStyleIdx="17" presStyleCnt="20">
+        <dgm:presLayoutVars>
+          <dgm:bulletEnabled val="1"/>
+        </dgm:presLayoutVars>
+      </dgm:prSet>
+      <dgm:spPr/>
+    </dgm:pt>
+    <dgm:pt modelId="{6A6B995E-F600-4BEA-A79D-103001030DF1}" type="pres">
+      <dgm:prSet presAssocID="{11E7C407-5F8B-42CF-80BE-F8449BE9286F}" presName="desBackupRightNorm" presStyleCnt="0"/>
+      <dgm:spPr/>
+    </dgm:pt>
+    <dgm:pt modelId="{B81B90CC-EB1C-4A2B-BC24-94728E703AC1}" type="pres">
+      <dgm:prSet presAssocID="{FB4F6F0B-A797-4C22-BFE0-637B18256177}" presName="desSpace" presStyleCnt="0"/>
+      <dgm:spPr/>
+    </dgm:pt>
+    <dgm:pt modelId="{3478AA6D-3D7B-40EA-9F2C-5A81D2699B73}" type="pres">
+      <dgm:prSet presAssocID="{ED50F0F3-F6CB-41EF-8344-FE1F75C670EB}" presName="desBackupLeftNorm" presStyleCnt="0"/>
+      <dgm:spPr/>
+    </dgm:pt>
+    <dgm:pt modelId="{21BEEAC3-E3D8-4883-82D8-9F9873A38E90}" type="pres">
+      <dgm:prSet presAssocID="{ED50F0F3-F6CB-41EF-8344-FE1F75C670EB}" presName="desComposite" presStyleCnt="0"/>
+      <dgm:spPr/>
+    </dgm:pt>
+    <dgm:pt modelId="{5B70E938-DB6E-4F35-A35D-F8430B08396A}" type="pres">
+      <dgm:prSet presAssocID="{ED50F0F3-F6CB-41EF-8344-FE1F75C670EB}" presName="desCircle" presStyleLbl="node1" presStyleIdx="7" presStyleCnt="8"/>
+      <dgm:spPr/>
+    </dgm:pt>
+    <dgm:pt modelId="{91C7FF6B-8779-43CF-A151-5A76DEB1795E}" type="pres">
+      <dgm:prSet presAssocID="{ED50F0F3-F6CB-41EF-8344-FE1F75C670EB}" presName="chTx" presStyleLbl="revTx" presStyleIdx="18" presStyleCnt="20" custLinFactNeighborX="6704" custLinFactNeighborY="1233"/>
       <dgm:spPr/>
       <dgm:t>
         <a:bodyPr/>
@@ -3839,536 +4676,14 @@
         </a:p>
       </dgm:t>
     </dgm:pt>
-    <dgm:pt modelId="{0FA685D8-3AD6-419A-9F68-49BC56316D17}" type="sibTrans" cxnId="{CB5DBCD1-DBF7-4F9F-8174-757AD43B183F}">
-      <dgm:prSet/>
-      <dgm:spPr/>
-      <dgm:t>
-        <a:bodyPr/>
-        <a:lstStyle/>
-        <a:p>
-          <a:endParaRPr lang="en-GB"/>
-        </a:p>
-      </dgm:t>
-    </dgm:pt>
-    <dgm:pt modelId="{5077B2D9-722E-4285-B280-2CD035099AE6}">
-      <dgm:prSet phldrT="[Text]" custT="1"/>
-      <dgm:spPr/>
-      <dgm:t>
-        <a:bodyPr/>
-        <a:lstStyle/>
-        <a:p>
-          <a:r>
-            <a:rPr lang="en-GB" sz="2000" b="1" dirty="0" err="1" smtClean="0">
-              <a:latin typeface="Courier New" panose="02070309020205020404" pitchFamily="49" charset="0"/>
-              <a:cs typeface="Courier New" panose="02070309020205020404" pitchFamily="49" charset="0"/>
-            </a:rPr>
-            <a:t>selectBBs</a:t>
-          </a:r>
-          <a:endParaRPr lang="en-GB" sz="2000" b="1" dirty="0">
-            <a:latin typeface="Courier New" panose="02070309020205020404" pitchFamily="49" charset="0"/>
-            <a:cs typeface="Courier New" panose="02070309020205020404" pitchFamily="49" charset="0"/>
-          </a:endParaRPr>
-        </a:p>
-      </dgm:t>
-    </dgm:pt>
-    <dgm:pt modelId="{8EFEC4A1-5895-4CAB-8F37-DD30FC875CFC}" type="parTrans" cxnId="{627016CB-F302-4FA9-8BE7-1F8640A37739}">
-      <dgm:prSet/>
-      <dgm:spPr/>
-      <dgm:t>
-        <a:bodyPr/>
-        <a:lstStyle/>
-        <a:p>
-          <a:endParaRPr lang="en-GB"/>
-        </a:p>
-      </dgm:t>
-    </dgm:pt>
-    <dgm:pt modelId="{035A84C1-AC43-4EFD-ADEE-7E7792CBF826}" type="sibTrans" cxnId="{627016CB-F302-4FA9-8BE7-1F8640A37739}">
-      <dgm:prSet/>
-      <dgm:spPr/>
-      <dgm:t>
-        <a:bodyPr/>
-        <a:lstStyle/>
-        <a:p>
-          <a:endParaRPr lang="en-GB"/>
-        </a:p>
-      </dgm:t>
-    </dgm:pt>
-    <dgm:pt modelId="{CD212DAD-B19C-4C50-B5CF-C2B393CA84B3}">
-      <dgm:prSet phldrT="[Text]" custT="1"/>
-      <dgm:spPr/>
-      <dgm:t>
-        <a:bodyPr/>
-        <a:lstStyle/>
-        <a:p>
-          <a:r>
-            <a:rPr lang="en-GB" sz="1300" dirty="0" smtClean="0"/>
-            <a:t>Bounding box vector</a:t>
-          </a:r>
-          <a:endParaRPr lang="en-GB" sz="1300" dirty="0"/>
-        </a:p>
-      </dgm:t>
-    </dgm:pt>
-    <dgm:pt modelId="{F69E3CF4-0B6F-40EE-9095-19E4E6E0D05B}" type="parTrans" cxnId="{5337B3DB-3CB2-446C-B21B-62DB974F675A}">
-      <dgm:prSet/>
-      <dgm:spPr/>
-      <dgm:t>
-        <a:bodyPr/>
-        <a:lstStyle/>
-        <a:p>
-          <a:endParaRPr lang="en-GB"/>
-        </a:p>
-      </dgm:t>
-    </dgm:pt>
-    <dgm:pt modelId="{0D8F5FB1-6A95-4B31-A43E-0CFFFF429532}" type="sibTrans" cxnId="{5337B3DB-3CB2-446C-B21B-62DB974F675A}">
-      <dgm:prSet/>
-      <dgm:spPr/>
-      <dgm:t>
-        <a:bodyPr/>
-        <a:lstStyle/>
-        <a:p>
-          <a:endParaRPr lang="en-GB"/>
-        </a:p>
-      </dgm:t>
-    </dgm:pt>
-    <dgm:pt modelId="{E6423BA6-930D-4A15-84AA-0BEC7878629E}">
-      <dgm:prSet phldrT="[Text]" custT="1"/>
-      <dgm:spPr/>
-      <dgm:t>
-        <a:bodyPr/>
-        <a:lstStyle/>
-        <a:p>
-          <a:r>
-            <a:rPr lang="en-GB" sz="1300" dirty="0" smtClean="0"/>
-            <a:t>Bounding box validity, selected bounding box index</a:t>
-          </a:r>
-          <a:endParaRPr lang="en-GB" sz="1300" dirty="0"/>
-        </a:p>
-      </dgm:t>
-    </dgm:pt>
-    <dgm:pt modelId="{1B2719A0-218C-47D9-8D35-5517C2413DC0}" type="parTrans" cxnId="{66B2CCE3-2FDE-4CDB-825D-F1DCA07C9337}">
-      <dgm:prSet/>
-      <dgm:spPr/>
-      <dgm:t>
-        <a:bodyPr/>
-        <a:lstStyle/>
-        <a:p>
-          <a:endParaRPr lang="en-GB"/>
-        </a:p>
-      </dgm:t>
-    </dgm:pt>
-    <dgm:pt modelId="{5D5EA7DB-6C66-46ED-ADE7-400DA25E32AF}" type="sibTrans" cxnId="{66B2CCE3-2FDE-4CDB-825D-F1DCA07C9337}">
-      <dgm:prSet/>
-      <dgm:spPr/>
-      <dgm:t>
-        <a:bodyPr/>
-        <a:lstStyle/>
-        <a:p>
-          <a:endParaRPr lang="en-GB"/>
-        </a:p>
-      </dgm:t>
-    </dgm:pt>
-    <dgm:pt modelId="{366A18A4-A553-4F6D-89E8-15504C0011BD}">
-      <dgm:prSet phldrT="[Text]" custT="1"/>
-      <dgm:spPr/>
-      <dgm:t>
-        <a:bodyPr/>
-        <a:lstStyle/>
-        <a:p>
-          <a:r>
-            <a:rPr lang="en-GB" sz="2000" b="1" dirty="0" err="1" smtClean="0">
-              <a:latin typeface="Courier New" panose="02070309020205020404" pitchFamily="49" charset="0"/>
-              <a:cs typeface="Courier New" panose="02070309020205020404" pitchFamily="49" charset="0"/>
-            </a:rPr>
-            <a:t>drawBB</a:t>
-          </a:r>
-          <a:endParaRPr lang="en-GB" sz="2000" b="1" dirty="0">
-            <a:latin typeface="Courier New" panose="02070309020205020404" pitchFamily="49" charset="0"/>
-            <a:cs typeface="Courier New" panose="02070309020205020404" pitchFamily="49" charset="0"/>
-          </a:endParaRPr>
-        </a:p>
-      </dgm:t>
-    </dgm:pt>
-    <dgm:pt modelId="{1BA40D3A-1335-49EC-86DB-439AE895CE00}" type="parTrans" cxnId="{1BBE9534-E3CB-414E-A17C-1480980549CE}">
-      <dgm:prSet/>
-      <dgm:spPr/>
-      <dgm:t>
-        <a:bodyPr/>
-        <a:lstStyle/>
-        <a:p>
-          <a:endParaRPr lang="en-GB"/>
-        </a:p>
-      </dgm:t>
-    </dgm:pt>
-    <dgm:pt modelId="{65B22984-A5BA-4456-9BC9-89A37A57521F}" type="sibTrans" cxnId="{1BBE9534-E3CB-414E-A17C-1480980549CE}">
-      <dgm:prSet/>
-      <dgm:spPr/>
-      <dgm:t>
-        <a:bodyPr/>
-        <a:lstStyle/>
-        <a:p>
-          <a:endParaRPr lang="en-GB"/>
-        </a:p>
-      </dgm:t>
-    </dgm:pt>
-    <dgm:pt modelId="{11E7C407-5F8B-42CF-80BE-F8449BE9286F}">
-      <dgm:prSet phldrT="[Text]" custT="1"/>
-      <dgm:spPr/>
-      <dgm:t>
-        <a:bodyPr/>
-        <a:lstStyle/>
-        <a:p>
-          <a:r>
-            <a:rPr lang="en-GB" sz="1300" dirty="0" smtClean="0"/>
-            <a:t>Filenames, output image, bounding box vector, selected bounding box</a:t>
-          </a:r>
-          <a:endParaRPr lang="en-GB" sz="1300" dirty="0"/>
-        </a:p>
-      </dgm:t>
-    </dgm:pt>
-    <dgm:pt modelId="{8A7813E9-C67F-4A2A-8F1B-7B2B945E8B8B}" type="parTrans" cxnId="{1FCDF06B-FCD0-43A5-9D77-23FB1B9CAAFC}">
-      <dgm:prSet/>
-      <dgm:spPr/>
-      <dgm:t>
-        <a:bodyPr/>
-        <a:lstStyle/>
-        <a:p>
-          <a:endParaRPr lang="en-GB"/>
-        </a:p>
-      </dgm:t>
-    </dgm:pt>
-    <dgm:pt modelId="{FB4F6F0B-A797-4C22-BFE0-637B18256177}" type="sibTrans" cxnId="{1FCDF06B-FCD0-43A5-9D77-23FB1B9CAAFC}">
-      <dgm:prSet/>
-      <dgm:spPr/>
-      <dgm:t>
-        <a:bodyPr/>
-        <a:lstStyle/>
-        <a:p>
-          <a:endParaRPr lang="en-GB"/>
-        </a:p>
-      </dgm:t>
-    </dgm:pt>
-    <dgm:pt modelId="{ED50F0F3-F6CB-41EF-8344-FE1F75C670EB}">
-      <dgm:prSet phldrT="[Text]" custT="1"/>
-      <dgm:spPr/>
-      <dgm:t>
-        <a:bodyPr/>
-        <a:lstStyle/>
-        <a:p>
-          <a:r>
-            <a:rPr lang="en-GB" sz="1300" dirty="0" smtClean="0"/>
-            <a:t>Difference image (.bin.png) generated</a:t>
-          </a:r>
-          <a:endParaRPr lang="en-GB" sz="1300" dirty="0"/>
-        </a:p>
-      </dgm:t>
-    </dgm:pt>
-    <dgm:pt modelId="{930170D7-F4DE-481B-AE30-2FB22E7FE43B}" type="parTrans" cxnId="{19A1C997-14F3-403F-B231-CEB9AF2FFDAB}">
-      <dgm:prSet/>
-      <dgm:spPr/>
-      <dgm:t>
-        <a:bodyPr/>
-        <a:lstStyle/>
-        <a:p>
-          <a:endParaRPr lang="en-GB"/>
-        </a:p>
-      </dgm:t>
-    </dgm:pt>
-    <dgm:pt modelId="{D377E90B-B98C-4304-8523-95AFF0234517}" type="sibTrans" cxnId="{19A1C997-14F3-403F-B231-CEB9AF2FFDAB}">
-      <dgm:prSet/>
-      <dgm:spPr/>
-      <dgm:t>
-        <a:bodyPr/>
-        <a:lstStyle/>
-        <a:p>
-          <a:endParaRPr lang="en-GB"/>
-        </a:p>
-      </dgm:t>
-    </dgm:pt>
-    <dgm:pt modelId="{CC9436CB-A383-46C2-A127-293D0FD488D9}" type="pres">
-      <dgm:prSet presAssocID="{5ECA6DCA-C759-48CD-B85E-658D7FF4B9A3}" presName="Name0" presStyleCnt="0">
-        <dgm:presLayoutVars>
-          <dgm:dir/>
-        </dgm:presLayoutVars>
-      </dgm:prSet>
-      <dgm:spPr/>
-    </dgm:pt>
-    <dgm:pt modelId="{74F3B316-76EE-4868-93D6-A9B9B6410E3C}" type="pres">
-      <dgm:prSet presAssocID="{82BB8E71-6E46-4CFA-8FF6-DFA2FD7C079F}" presName="parComposite" presStyleCnt="0"/>
-      <dgm:spPr/>
-    </dgm:pt>
-    <dgm:pt modelId="{D69C7994-67D1-4126-B06C-F46CF5C20439}" type="pres">
-      <dgm:prSet presAssocID="{82BB8E71-6E46-4CFA-8FF6-DFA2FD7C079F}" presName="parBigCircle" presStyleLbl="node0" presStyleIdx="0" presStyleCnt="3"/>
-      <dgm:spPr/>
-    </dgm:pt>
-    <dgm:pt modelId="{7F5A107E-5ECD-44BB-B595-1F47C0C49DB1}" type="pres">
-      <dgm:prSet presAssocID="{82BB8E71-6E46-4CFA-8FF6-DFA2FD7C079F}" presName="parTx" presStyleLbl="revTx" presStyleIdx="0" presStyleCnt="15"/>
-      <dgm:spPr/>
-      <dgm:t>
-        <a:bodyPr/>
-        <a:lstStyle/>
-        <a:p>
-          <a:endParaRPr lang="en-GB"/>
-        </a:p>
-      </dgm:t>
-    </dgm:pt>
-    <dgm:pt modelId="{8E0C906C-8D4E-4028-A364-3EE06FFDC2A2}" type="pres">
-      <dgm:prSet presAssocID="{82BB8E71-6E46-4CFA-8FF6-DFA2FD7C079F}" presName="bSpace" presStyleCnt="0"/>
-      <dgm:spPr/>
-    </dgm:pt>
-    <dgm:pt modelId="{D14AA325-0BEE-476C-935D-F64A7F511DD2}" type="pres">
-      <dgm:prSet presAssocID="{82BB8E71-6E46-4CFA-8FF6-DFA2FD7C079F}" presName="parBackupNorm" presStyleCnt="0"/>
-      <dgm:spPr/>
-    </dgm:pt>
-    <dgm:pt modelId="{AE67EAB7-7F85-450A-ACB1-CADC3BB6A596}" type="pres">
-      <dgm:prSet presAssocID="{482E10F3-6897-440A-8111-658C31AB03C6}" presName="parSpace" presStyleCnt="0"/>
-      <dgm:spPr/>
-    </dgm:pt>
-    <dgm:pt modelId="{CBEB0D63-D225-42F4-9C54-E68E5E3B1724}" type="pres">
-      <dgm:prSet presAssocID="{B0E57D30-8025-4D63-A6B2-6DD851E4B257}" presName="desBackupLeftNorm" presStyleCnt="0"/>
-      <dgm:spPr/>
-    </dgm:pt>
-    <dgm:pt modelId="{D6FD5387-C469-449A-908F-0E936B9FE9D6}" type="pres">
-      <dgm:prSet presAssocID="{B0E57D30-8025-4D63-A6B2-6DD851E4B257}" presName="desComposite" presStyleCnt="0"/>
-      <dgm:spPr/>
-    </dgm:pt>
-    <dgm:pt modelId="{6C4AF1A4-C618-4EE3-8A03-80A803CC22A3}" type="pres">
-      <dgm:prSet presAssocID="{B0E57D30-8025-4D63-A6B2-6DD851E4B257}" presName="desCircle" presStyleLbl="node1" presStyleIdx="0" presStyleCnt="6"/>
-      <dgm:spPr/>
-    </dgm:pt>
-    <dgm:pt modelId="{7680FA50-9985-48ED-B5DD-40E7EF73FB5E}" type="pres">
-      <dgm:prSet presAssocID="{B0E57D30-8025-4D63-A6B2-6DD851E4B257}" presName="chTx" presStyleLbl="revTx" presStyleIdx="1" presStyleCnt="15"/>
-      <dgm:spPr/>
-    </dgm:pt>
-    <dgm:pt modelId="{29575E4C-25C1-43B2-ADC9-9E7B70641132}" type="pres">
-      <dgm:prSet presAssocID="{B0E57D30-8025-4D63-A6B2-6DD851E4B257}" presName="desTx" presStyleLbl="revTx" presStyleIdx="2" presStyleCnt="15">
+    <dgm:pt modelId="{23A07CBD-914B-4535-B3C9-BAC415629FCF}" type="pres">
+      <dgm:prSet presAssocID="{ED50F0F3-F6CB-41EF-8344-FE1F75C670EB}" presName="desTx" presStyleLbl="revTx" presStyleIdx="19" presStyleCnt="20">
         <dgm:presLayoutVars>
           <dgm:bulletEnabled val="1"/>
         </dgm:presLayoutVars>
       </dgm:prSet>
       <dgm:spPr/>
     </dgm:pt>
-    <dgm:pt modelId="{AF4576F2-DC6A-419D-899D-15CFE9D62AFA}" type="pres">
-      <dgm:prSet presAssocID="{B0E57D30-8025-4D63-A6B2-6DD851E4B257}" presName="desBackupRightNorm" presStyleCnt="0"/>
-      <dgm:spPr/>
-    </dgm:pt>
-    <dgm:pt modelId="{098DE909-FA78-43C1-B45D-C966DB598DA9}" type="pres">
-      <dgm:prSet presAssocID="{5D7B4CB4-3A01-4E2E-BED0-F2EB71B6957A}" presName="desSpace" presStyleCnt="0"/>
-      <dgm:spPr/>
-    </dgm:pt>
-    <dgm:pt modelId="{FD9ACA3A-3435-47A0-ADAB-1B49E200319A}" type="pres">
-      <dgm:prSet presAssocID="{C97BDEEB-78B6-4994-8F20-0BA55313DF32}" presName="desBackupLeftNorm" presStyleCnt="0"/>
-      <dgm:spPr/>
-    </dgm:pt>
-    <dgm:pt modelId="{24C65332-7124-48C4-9D96-1A6EBFF259F8}" type="pres">
-      <dgm:prSet presAssocID="{C97BDEEB-78B6-4994-8F20-0BA55313DF32}" presName="desComposite" presStyleCnt="0"/>
-      <dgm:spPr/>
-    </dgm:pt>
-    <dgm:pt modelId="{3F078EDC-158C-4C63-844D-E4B1063CFF15}" type="pres">
-      <dgm:prSet presAssocID="{C97BDEEB-78B6-4994-8F20-0BA55313DF32}" presName="desCircle" presStyleLbl="node1" presStyleIdx="1" presStyleCnt="6"/>
-      <dgm:spPr/>
-    </dgm:pt>
-    <dgm:pt modelId="{EDC53E2A-6EC0-4A0B-B661-7117AB5B135F}" type="pres">
-      <dgm:prSet presAssocID="{C97BDEEB-78B6-4994-8F20-0BA55313DF32}" presName="chTx" presStyleLbl="revTx" presStyleIdx="3" presStyleCnt="15"/>
-      <dgm:spPr/>
-    </dgm:pt>
-    <dgm:pt modelId="{BEAAB3AD-B3C9-494A-944C-59B6057BC422}" type="pres">
-      <dgm:prSet presAssocID="{C97BDEEB-78B6-4994-8F20-0BA55313DF32}" presName="desTx" presStyleLbl="revTx" presStyleIdx="4" presStyleCnt="15">
-        <dgm:presLayoutVars>
-          <dgm:bulletEnabled val="1"/>
-        </dgm:presLayoutVars>
-      </dgm:prSet>
-      <dgm:spPr/>
-    </dgm:pt>
-    <dgm:pt modelId="{72E3FD53-6A20-4B3D-B3EC-415AD0017ACB}" type="pres">
-      <dgm:prSet presAssocID="{C97BDEEB-78B6-4994-8F20-0BA55313DF32}" presName="desBackupRightNorm" presStyleCnt="0"/>
-      <dgm:spPr/>
-    </dgm:pt>
-    <dgm:pt modelId="{9031D611-3928-43A1-BC77-9315214F6516}" type="pres">
-      <dgm:prSet presAssocID="{0FA685D8-3AD6-419A-9F68-49BC56316D17}" presName="desSpace" presStyleCnt="0"/>
-      <dgm:spPr/>
-    </dgm:pt>
-    <dgm:pt modelId="{959741F2-830A-4D09-8712-4D056AFC0405}" type="pres">
-      <dgm:prSet presAssocID="{5077B2D9-722E-4285-B280-2CD035099AE6}" presName="parComposite" presStyleCnt="0"/>
-      <dgm:spPr/>
-    </dgm:pt>
-    <dgm:pt modelId="{10E10192-D1DB-4540-BC9E-5F6B92991865}" type="pres">
-      <dgm:prSet presAssocID="{5077B2D9-722E-4285-B280-2CD035099AE6}" presName="parBigCircle" presStyleLbl="node0" presStyleIdx="1" presStyleCnt="3"/>
-      <dgm:spPr/>
-    </dgm:pt>
-    <dgm:pt modelId="{C25F440E-5989-47BB-9438-01B4A72D0B0E}" type="pres">
-      <dgm:prSet presAssocID="{5077B2D9-722E-4285-B280-2CD035099AE6}" presName="parTx" presStyleLbl="revTx" presStyleIdx="5" presStyleCnt="15"/>
-      <dgm:spPr/>
-    </dgm:pt>
-    <dgm:pt modelId="{E3F36667-886E-473C-8A00-B2B1D5543187}" type="pres">
-      <dgm:prSet presAssocID="{5077B2D9-722E-4285-B280-2CD035099AE6}" presName="bSpace" presStyleCnt="0"/>
-      <dgm:spPr/>
-    </dgm:pt>
-    <dgm:pt modelId="{5B0E8A3A-81FF-454D-B0F3-8317F662D0BF}" type="pres">
-      <dgm:prSet presAssocID="{5077B2D9-722E-4285-B280-2CD035099AE6}" presName="parBackupNorm" presStyleCnt="0"/>
-      <dgm:spPr/>
-    </dgm:pt>
-    <dgm:pt modelId="{D22FAE66-2780-429F-A442-F67FC83AFCD2}" type="pres">
-      <dgm:prSet presAssocID="{035A84C1-AC43-4EFD-ADEE-7E7792CBF826}" presName="parSpace" presStyleCnt="0"/>
-      <dgm:spPr/>
-    </dgm:pt>
-    <dgm:pt modelId="{AFCB98A6-9D11-4F07-BC27-B9A0351EB9ED}" type="pres">
-      <dgm:prSet presAssocID="{CD212DAD-B19C-4C50-B5CF-C2B393CA84B3}" presName="desBackupLeftNorm" presStyleCnt="0"/>
-      <dgm:spPr/>
-    </dgm:pt>
-    <dgm:pt modelId="{6436CD56-F091-4481-9EDC-4E73155ACD10}" type="pres">
-      <dgm:prSet presAssocID="{CD212DAD-B19C-4C50-B5CF-C2B393CA84B3}" presName="desComposite" presStyleCnt="0"/>
-      <dgm:spPr/>
-    </dgm:pt>
-    <dgm:pt modelId="{9367CC29-33D8-4FD1-AA42-B42C2C0900F2}" type="pres">
-      <dgm:prSet presAssocID="{CD212DAD-B19C-4C50-B5CF-C2B393CA84B3}" presName="desCircle" presStyleLbl="node1" presStyleIdx="2" presStyleCnt="6"/>
-      <dgm:spPr/>
-    </dgm:pt>
-    <dgm:pt modelId="{C51A1E82-AC8E-4B24-8DED-3EBBDDD58E25}" type="pres">
-      <dgm:prSet presAssocID="{CD212DAD-B19C-4C50-B5CF-C2B393CA84B3}" presName="chTx" presStyleLbl="revTx" presStyleIdx="6" presStyleCnt="15"/>
-      <dgm:spPr/>
-    </dgm:pt>
-    <dgm:pt modelId="{C71E06D2-F9F7-4C4B-81A0-B5BF7480B84C}" type="pres">
-      <dgm:prSet presAssocID="{CD212DAD-B19C-4C50-B5CF-C2B393CA84B3}" presName="desTx" presStyleLbl="revTx" presStyleIdx="7" presStyleCnt="15">
-        <dgm:presLayoutVars>
-          <dgm:bulletEnabled val="1"/>
-        </dgm:presLayoutVars>
-      </dgm:prSet>
-      <dgm:spPr/>
-    </dgm:pt>
-    <dgm:pt modelId="{4E7C56CB-32C2-45D5-BB7D-17A2D9E1FF2C}" type="pres">
-      <dgm:prSet presAssocID="{CD212DAD-B19C-4C50-B5CF-C2B393CA84B3}" presName="desBackupRightNorm" presStyleCnt="0"/>
-      <dgm:spPr/>
-    </dgm:pt>
-    <dgm:pt modelId="{3F7DCEDC-468E-405F-98BE-6DCD7243A661}" type="pres">
-      <dgm:prSet presAssocID="{0D8F5FB1-6A95-4B31-A43E-0CFFFF429532}" presName="desSpace" presStyleCnt="0"/>
-      <dgm:spPr/>
-    </dgm:pt>
-    <dgm:pt modelId="{07B2100A-0C00-4969-870A-25FC4364C763}" type="pres">
-      <dgm:prSet presAssocID="{E6423BA6-930D-4A15-84AA-0BEC7878629E}" presName="desBackupLeftNorm" presStyleCnt="0"/>
-      <dgm:spPr/>
-    </dgm:pt>
-    <dgm:pt modelId="{4537587C-8BC2-4223-807D-434F73C83258}" type="pres">
-      <dgm:prSet presAssocID="{E6423BA6-930D-4A15-84AA-0BEC7878629E}" presName="desComposite" presStyleCnt="0"/>
-      <dgm:spPr/>
-    </dgm:pt>
-    <dgm:pt modelId="{10CA07A6-D0E4-480D-9578-DEF8F7B8EE7A}" type="pres">
-      <dgm:prSet presAssocID="{E6423BA6-930D-4A15-84AA-0BEC7878629E}" presName="desCircle" presStyleLbl="node1" presStyleIdx="3" presStyleCnt="6"/>
-      <dgm:spPr/>
-    </dgm:pt>
-    <dgm:pt modelId="{D04BB978-ED60-4153-924B-65A50DDD181E}" type="pres">
-      <dgm:prSet presAssocID="{E6423BA6-930D-4A15-84AA-0BEC7878629E}" presName="chTx" presStyleLbl="revTx" presStyleIdx="8" presStyleCnt="15"/>
-      <dgm:spPr/>
-      <dgm:t>
-        <a:bodyPr/>
-        <a:lstStyle/>
-        <a:p>
-          <a:endParaRPr lang="en-GB"/>
-        </a:p>
-      </dgm:t>
-    </dgm:pt>
-    <dgm:pt modelId="{69403BB5-4D42-424D-B70C-D011F3EDB6B0}" type="pres">
-      <dgm:prSet presAssocID="{E6423BA6-930D-4A15-84AA-0BEC7878629E}" presName="desTx" presStyleLbl="revTx" presStyleIdx="9" presStyleCnt="15">
-        <dgm:presLayoutVars>
-          <dgm:bulletEnabled val="1"/>
-        </dgm:presLayoutVars>
-      </dgm:prSet>
-      <dgm:spPr/>
-    </dgm:pt>
-    <dgm:pt modelId="{A1E7B169-5DB5-4834-99B5-D4EBAC5EC7FB}" type="pres">
-      <dgm:prSet presAssocID="{E6423BA6-930D-4A15-84AA-0BEC7878629E}" presName="desBackupRightNorm" presStyleCnt="0"/>
-      <dgm:spPr/>
-    </dgm:pt>
-    <dgm:pt modelId="{19BC3BBA-6C3B-41A4-9870-0B36195A7A48}" type="pres">
-      <dgm:prSet presAssocID="{5D5EA7DB-6C66-46ED-ADE7-400DA25E32AF}" presName="desSpace" presStyleCnt="0"/>
-      <dgm:spPr/>
-    </dgm:pt>
-    <dgm:pt modelId="{60638939-F446-41A2-8D1A-FF1F29D4CCA2}" type="pres">
-      <dgm:prSet presAssocID="{366A18A4-A553-4F6D-89E8-15504C0011BD}" presName="parComposite" presStyleCnt="0"/>
-      <dgm:spPr/>
-    </dgm:pt>
-    <dgm:pt modelId="{26E5474D-8EF8-4691-B9DB-24EA66BB7220}" type="pres">
-      <dgm:prSet presAssocID="{366A18A4-A553-4F6D-89E8-15504C0011BD}" presName="parBigCircle" presStyleLbl="node0" presStyleIdx="2" presStyleCnt="3"/>
-      <dgm:spPr/>
-    </dgm:pt>
-    <dgm:pt modelId="{FE9185A6-A871-42E8-9720-DD96299AD075}" type="pres">
-      <dgm:prSet presAssocID="{366A18A4-A553-4F6D-89E8-15504C0011BD}" presName="parTx" presStyleLbl="revTx" presStyleIdx="10" presStyleCnt="15"/>
-      <dgm:spPr/>
-    </dgm:pt>
-    <dgm:pt modelId="{8C229429-6934-4DEE-84F3-46D6ECB15968}" type="pres">
-      <dgm:prSet presAssocID="{366A18A4-A553-4F6D-89E8-15504C0011BD}" presName="bSpace" presStyleCnt="0"/>
-      <dgm:spPr/>
-    </dgm:pt>
-    <dgm:pt modelId="{278D4510-4C6F-45A7-820A-0E3B036CD04C}" type="pres">
-      <dgm:prSet presAssocID="{366A18A4-A553-4F6D-89E8-15504C0011BD}" presName="parBackupNorm" presStyleCnt="0"/>
-      <dgm:spPr/>
-    </dgm:pt>
-    <dgm:pt modelId="{97E6E326-93C4-4E9C-92DF-3FDEA26EE24B}" type="pres">
-      <dgm:prSet presAssocID="{65B22984-A5BA-4456-9BC9-89A37A57521F}" presName="parSpace" presStyleCnt="0"/>
-      <dgm:spPr/>
-    </dgm:pt>
-    <dgm:pt modelId="{2AA21EA2-FB11-4B99-9943-B3259E3C9C3E}" type="pres">
-      <dgm:prSet presAssocID="{11E7C407-5F8B-42CF-80BE-F8449BE9286F}" presName="desBackupLeftNorm" presStyleCnt="0"/>
-      <dgm:spPr/>
-    </dgm:pt>
-    <dgm:pt modelId="{B1F793EB-14A2-45D4-88CF-DD58A5D4AA04}" type="pres">
-      <dgm:prSet presAssocID="{11E7C407-5F8B-42CF-80BE-F8449BE9286F}" presName="desComposite" presStyleCnt="0"/>
-      <dgm:spPr/>
-    </dgm:pt>
-    <dgm:pt modelId="{A9E52EBE-13BA-4B6A-B25D-203B758D84E9}" type="pres">
-      <dgm:prSet presAssocID="{11E7C407-5F8B-42CF-80BE-F8449BE9286F}" presName="desCircle" presStyleLbl="node1" presStyleIdx="4" presStyleCnt="6"/>
-      <dgm:spPr/>
-    </dgm:pt>
-    <dgm:pt modelId="{74A3F228-2583-48CF-B747-D3940B109963}" type="pres">
-      <dgm:prSet presAssocID="{11E7C407-5F8B-42CF-80BE-F8449BE9286F}" presName="chTx" presStyleLbl="revTx" presStyleIdx="11" presStyleCnt="15"/>
-      <dgm:spPr/>
-    </dgm:pt>
-    <dgm:pt modelId="{6F4CAF73-6FA6-44A5-9B5E-8C132110D9F4}" type="pres">
-      <dgm:prSet presAssocID="{11E7C407-5F8B-42CF-80BE-F8449BE9286F}" presName="desTx" presStyleLbl="revTx" presStyleIdx="12" presStyleCnt="15">
-        <dgm:presLayoutVars>
-          <dgm:bulletEnabled val="1"/>
-        </dgm:presLayoutVars>
-      </dgm:prSet>
-      <dgm:spPr/>
-    </dgm:pt>
-    <dgm:pt modelId="{6A6B995E-F600-4BEA-A79D-103001030DF1}" type="pres">
-      <dgm:prSet presAssocID="{11E7C407-5F8B-42CF-80BE-F8449BE9286F}" presName="desBackupRightNorm" presStyleCnt="0"/>
-      <dgm:spPr/>
-    </dgm:pt>
-    <dgm:pt modelId="{B81B90CC-EB1C-4A2B-BC24-94728E703AC1}" type="pres">
-      <dgm:prSet presAssocID="{FB4F6F0B-A797-4C22-BFE0-637B18256177}" presName="desSpace" presStyleCnt="0"/>
-      <dgm:spPr/>
-    </dgm:pt>
-    <dgm:pt modelId="{3478AA6D-3D7B-40EA-9F2C-5A81D2699B73}" type="pres">
-      <dgm:prSet presAssocID="{ED50F0F3-F6CB-41EF-8344-FE1F75C670EB}" presName="desBackupLeftNorm" presStyleCnt="0"/>
-      <dgm:spPr/>
-    </dgm:pt>
-    <dgm:pt modelId="{21BEEAC3-E3D8-4883-82D8-9F9873A38E90}" type="pres">
-      <dgm:prSet presAssocID="{ED50F0F3-F6CB-41EF-8344-FE1F75C670EB}" presName="desComposite" presStyleCnt="0"/>
-      <dgm:spPr/>
-    </dgm:pt>
-    <dgm:pt modelId="{5B70E938-DB6E-4F35-A35D-F8430B08396A}" type="pres">
-      <dgm:prSet presAssocID="{ED50F0F3-F6CB-41EF-8344-FE1F75C670EB}" presName="desCircle" presStyleLbl="node1" presStyleIdx="5" presStyleCnt="6"/>
-      <dgm:spPr/>
-    </dgm:pt>
-    <dgm:pt modelId="{91C7FF6B-8779-43CF-A151-5A76DEB1795E}" type="pres">
-      <dgm:prSet presAssocID="{ED50F0F3-F6CB-41EF-8344-FE1F75C670EB}" presName="chTx" presStyleLbl="revTx" presStyleIdx="13" presStyleCnt="15"/>
-      <dgm:spPr/>
-      <dgm:t>
-        <a:bodyPr/>
-        <a:lstStyle/>
-        <a:p>
-          <a:endParaRPr lang="en-GB"/>
-        </a:p>
-      </dgm:t>
-    </dgm:pt>
-    <dgm:pt modelId="{23A07CBD-914B-4535-B3C9-BAC415629FCF}" type="pres">
-      <dgm:prSet presAssocID="{ED50F0F3-F6CB-41EF-8344-FE1F75C670EB}" presName="desTx" presStyleLbl="revTx" presStyleIdx="14" presStyleCnt="15">
-        <dgm:presLayoutVars>
-          <dgm:bulletEnabled val="1"/>
-        </dgm:presLayoutVars>
-      </dgm:prSet>
-      <dgm:spPr/>
-    </dgm:pt>
     <dgm:pt modelId="{5025C84F-EDFA-4DCE-9D39-922F80659818}" type="pres">
       <dgm:prSet presAssocID="{ED50F0F3-F6CB-41EF-8344-FE1F75C670EB}" presName="desBackupRightNorm" presStyleCnt="0"/>
       <dgm:spPr/>
@@ -4379,85 +4694,111 @@
     </dgm:pt>
   </dgm:ptLst>
   <dgm:cxnLst>
+    <dgm:cxn modelId="{1BBE9534-E3CB-414E-A17C-1480980549CE}" srcId="{5ECA6DCA-C759-48CD-B85E-658D7FF4B9A3}" destId="{366A18A4-A553-4F6D-89E8-15504C0011BD}" srcOrd="3" destOrd="0" parTransId="{1BA40D3A-1335-49EC-86DB-439AE895CE00}" sibTransId="{65B22984-A5BA-4456-9BC9-89A37A57521F}"/>
+    <dgm:cxn modelId="{5337B3DB-3CB2-446C-B21B-62DB974F675A}" srcId="{5077B2D9-722E-4285-B280-2CD035099AE6}" destId="{CD212DAD-B19C-4C50-B5CF-C2B393CA84B3}" srcOrd="0" destOrd="0" parTransId="{F69E3CF4-0B6F-40EE-9095-19E4E6E0D05B}" sibTransId="{0D8F5FB1-6A95-4B31-A43E-0CFFFF429532}"/>
+    <dgm:cxn modelId="{C4E82EDA-5EFE-4861-A557-A91548699321}" srcId="{82BB8E71-6E46-4CFA-8FF6-DFA2FD7C079F}" destId="{B0E57D30-8025-4D63-A6B2-6DD851E4B257}" srcOrd="0" destOrd="0" parTransId="{746CB427-6D26-4E6A-830D-7EDA354BC3C0}" sibTransId="{5D7B4CB4-3A01-4E2E-BED0-F2EB71B6957A}"/>
+    <dgm:cxn modelId="{2BD1DF50-595D-45C3-9E27-1B1E2CEABB20}" type="presOf" srcId="{B0E57D30-8025-4D63-A6B2-6DD851E4B257}" destId="{7680FA50-9985-48ED-B5DD-40E7EF73FB5E}" srcOrd="0" destOrd="0" presId="urn:microsoft.com/office/officeart/2008/layout/CircleAccentTimeline"/>
+    <dgm:cxn modelId="{5B8F428B-F5D4-42D9-861E-E2ECB0E5522F}" type="presOf" srcId="{5077B2D9-722E-4285-B280-2CD035099AE6}" destId="{C25F440E-5989-47BB-9438-01B4A72D0B0E}" srcOrd="0" destOrd="0" presId="urn:microsoft.com/office/officeart/2008/layout/CircleAccentTimeline"/>
+    <dgm:cxn modelId="{8899A5CF-D47D-4454-AB77-2C6EB6C07F52}" srcId="{5ECA6DCA-C759-48CD-B85E-658D7FF4B9A3}" destId="{82BB8E71-6E46-4CFA-8FF6-DFA2FD7C079F}" srcOrd="1" destOrd="0" parTransId="{7248C1A9-7B1D-4115-B4C8-3DE468484551}" sibTransId="{482E10F3-6897-440A-8111-658C31AB03C6}"/>
     <dgm:cxn modelId="{AF947C73-40F9-4AB7-82B5-5EDF51C997B7}" type="presOf" srcId="{ED50F0F3-F6CB-41EF-8344-FE1F75C670EB}" destId="{91C7FF6B-8779-43CF-A151-5A76DEB1795E}" srcOrd="0" destOrd="0" presId="urn:microsoft.com/office/officeart/2008/layout/CircleAccentTimeline"/>
-    <dgm:cxn modelId="{8899A5CF-D47D-4454-AB77-2C6EB6C07F52}" srcId="{5ECA6DCA-C759-48CD-B85E-658D7FF4B9A3}" destId="{82BB8E71-6E46-4CFA-8FF6-DFA2FD7C079F}" srcOrd="0" destOrd="0" parTransId="{7248C1A9-7B1D-4115-B4C8-3DE468484551}" sibTransId="{482E10F3-6897-440A-8111-658C31AB03C6}"/>
-    <dgm:cxn modelId="{7BFF5472-2B82-465D-B0C2-7545E199F1ED}" type="presOf" srcId="{11E7C407-5F8B-42CF-80BE-F8449BE9286F}" destId="{74A3F228-2583-48CF-B747-D3940B109963}" srcOrd="0" destOrd="0" presId="urn:microsoft.com/office/officeart/2008/layout/CircleAccentTimeline"/>
-    <dgm:cxn modelId="{627016CB-F302-4FA9-8BE7-1F8640A37739}" srcId="{5ECA6DCA-C759-48CD-B85E-658D7FF4B9A3}" destId="{5077B2D9-722E-4285-B280-2CD035099AE6}" srcOrd="1" destOrd="0" parTransId="{8EFEC4A1-5895-4CAB-8F37-DD30FC875CFC}" sibTransId="{035A84C1-AC43-4EFD-ADEE-7E7792CBF826}"/>
-    <dgm:cxn modelId="{D97E7910-D9A2-429A-87A7-160961035549}" type="presOf" srcId="{5ECA6DCA-C759-48CD-B85E-658D7FF4B9A3}" destId="{CC9436CB-A383-46C2-A127-293D0FD488D9}" srcOrd="0" destOrd="0" presId="urn:microsoft.com/office/officeart/2008/layout/CircleAccentTimeline"/>
-    <dgm:cxn modelId="{F5A306D7-DABF-470B-8B56-AA817E0DA540}" type="presOf" srcId="{C97BDEEB-78B6-4994-8F20-0BA55313DF32}" destId="{EDC53E2A-6EC0-4A0B-B661-7117AB5B135F}" srcOrd="0" destOrd="0" presId="urn:microsoft.com/office/officeart/2008/layout/CircleAccentTimeline"/>
-    <dgm:cxn modelId="{2BD1DF50-595D-45C3-9E27-1B1E2CEABB20}" type="presOf" srcId="{B0E57D30-8025-4D63-A6B2-6DD851E4B257}" destId="{7680FA50-9985-48ED-B5DD-40E7EF73FB5E}" srcOrd="0" destOrd="0" presId="urn:microsoft.com/office/officeart/2008/layout/CircleAccentTimeline"/>
+    <dgm:cxn modelId="{627016CB-F302-4FA9-8BE7-1F8640A37739}" srcId="{5ECA6DCA-C759-48CD-B85E-658D7FF4B9A3}" destId="{5077B2D9-722E-4285-B280-2CD035099AE6}" srcOrd="2" destOrd="0" parTransId="{8EFEC4A1-5895-4CAB-8F37-DD30FC875CFC}" sibTransId="{035A84C1-AC43-4EFD-ADEE-7E7792CBF826}"/>
+    <dgm:cxn modelId="{1FCDF06B-FCD0-43A5-9D77-23FB1B9CAAFC}" srcId="{366A18A4-A553-4F6D-89E8-15504C0011BD}" destId="{11E7C407-5F8B-42CF-80BE-F8449BE9286F}" srcOrd="0" destOrd="0" parTransId="{8A7813E9-C67F-4A2A-8F1B-7B2B945E8B8B}" sibTransId="{FB4F6F0B-A797-4C22-BFE0-637B18256177}"/>
     <dgm:cxn modelId="{6A1A2AE0-9151-4FD7-8CC8-0E7BDAF08566}" type="presOf" srcId="{366A18A4-A553-4F6D-89E8-15504C0011BD}" destId="{FE9185A6-A871-42E8-9720-DD96299AD075}" srcOrd="0" destOrd="0" presId="urn:microsoft.com/office/officeart/2008/layout/CircleAccentTimeline"/>
     <dgm:cxn modelId="{2B28F8FE-1DE6-445A-BE52-046A6E8E41D2}" type="presOf" srcId="{82BB8E71-6E46-4CFA-8FF6-DFA2FD7C079F}" destId="{7F5A107E-5ECD-44BB-B595-1F47C0C49DB1}" srcOrd="0" destOrd="0" presId="urn:microsoft.com/office/officeart/2008/layout/CircleAccentTimeline"/>
-    <dgm:cxn modelId="{1FCDF06B-FCD0-43A5-9D77-23FB1B9CAAFC}" srcId="{366A18A4-A553-4F6D-89E8-15504C0011BD}" destId="{11E7C407-5F8B-42CF-80BE-F8449BE9286F}" srcOrd="0" destOrd="0" parTransId="{8A7813E9-C67F-4A2A-8F1B-7B2B945E8B8B}" sibTransId="{FB4F6F0B-A797-4C22-BFE0-637B18256177}"/>
+    <dgm:cxn modelId="{F5A306D7-DABF-470B-8B56-AA817E0DA540}" type="presOf" srcId="{C97BDEEB-78B6-4994-8F20-0BA55313DF32}" destId="{EDC53E2A-6EC0-4A0B-B661-7117AB5B135F}" srcOrd="0" destOrd="0" presId="urn:microsoft.com/office/officeart/2008/layout/CircleAccentTimeline"/>
+    <dgm:cxn modelId="{F45FC0D6-96BE-4436-AD76-308D84472044}" type="presOf" srcId="{E6423BA6-930D-4A15-84AA-0BEC7878629E}" destId="{D04BB978-ED60-4153-924B-65A50DDD181E}" srcOrd="0" destOrd="0" presId="urn:microsoft.com/office/officeart/2008/layout/CircleAccentTimeline"/>
+    <dgm:cxn modelId="{FD13928D-7F7C-40EB-96CC-B38DCC4F0A48}" type="presOf" srcId="{CD212DAD-B19C-4C50-B5CF-C2B393CA84B3}" destId="{C51A1E82-AC8E-4B24-8DED-3EBBDDD58E25}" srcOrd="0" destOrd="0" presId="urn:microsoft.com/office/officeart/2008/layout/CircleAccentTimeline"/>
+    <dgm:cxn modelId="{66B2CCE3-2FDE-4CDB-825D-F1DCA07C9337}" srcId="{5077B2D9-722E-4285-B280-2CD035099AE6}" destId="{E6423BA6-930D-4A15-84AA-0BEC7878629E}" srcOrd="1" destOrd="0" parTransId="{1B2719A0-218C-47D9-8D35-5517C2413DC0}" sibTransId="{5D5EA7DB-6C66-46ED-ADE7-400DA25E32AF}"/>
+    <dgm:cxn modelId="{7BFF5472-2B82-465D-B0C2-7545E199F1ED}" type="presOf" srcId="{11E7C407-5F8B-42CF-80BE-F8449BE9286F}" destId="{74A3F228-2583-48CF-B747-D3940B109963}" srcOrd="0" destOrd="0" presId="urn:microsoft.com/office/officeart/2008/layout/CircleAccentTimeline"/>
     <dgm:cxn modelId="{CB5DBCD1-DBF7-4F9F-8174-757AD43B183F}" srcId="{82BB8E71-6E46-4CFA-8FF6-DFA2FD7C079F}" destId="{C97BDEEB-78B6-4994-8F20-0BA55313DF32}" srcOrd="1" destOrd="0" parTransId="{BE43B0C8-D79E-4748-BAFD-390E33BD03C0}" sibTransId="{0FA685D8-3AD6-419A-9F68-49BC56316D17}"/>
-    <dgm:cxn modelId="{1BBE9534-E3CB-414E-A17C-1480980549CE}" srcId="{5ECA6DCA-C759-48CD-B85E-658D7FF4B9A3}" destId="{366A18A4-A553-4F6D-89E8-15504C0011BD}" srcOrd="2" destOrd="0" parTransId="{1BA40D3A-1335-49EC-86DB-439AE895CE00}" sibTransId="{65B22984-A5BA-4456-9BC9-89A37A57521F}"/>
-    <dgm:cxn modelId="{FD13928D-7F7C-40EB-96CC-B38DCC4F0A48}" type="presOf" srcId="{CD212DAD-B19C-4C50-B5CF-C2B393CA84B3}" destId="{C51A1E82-AC8E-4B24-8DED-3EBBDDD58E25}" srcOrd="0" destOrd="0" presId="urn:microsoft.com/office/officeart/2008/layout/CircleAccentTimeline"/>
-    <dgm:cxn modelId="{F45FC0D6-96BE-4436-AD76-308D84472044}" type="presOf" srcId="{E6423BA6-930D-4A15-84AA-0BEC7878629E}" destId="{D04BB978-ED60-4153-924B-65A50DDD181E}" srcOrd="0" destOrd="0" presId="urn:microsoft.com/office/officeart/2008/layout/CircleAccentTimeline"/>
-    <dgm:cxn modelId="{5337B3DB-3CB2-446C-B21B-62DB974F675A}" srcId="{5077B2D9-722E-4285-B280-2CD035099AE6}" destId="{CD212DAD-B19C-4C50-B5CF-C2B393CA84B3}" srcOrd="0" destOrd="0" parTransId="{F69E3CF4-0B6F-40EE-9095-19E4E6E0D05B}" sibTransId="{0D8F5FB1-6A95-4B31-A43E-0CFFFF429532}"/>
     <dgm:cxn modelId="{19A1C997-14F3-403F-B231-CEB9AF2FFDAB}" srcId="{366A18A4-A553-4F6D-89E8-15504C0011BD}" destId="{ED50F0F3-F6CB-41EF-8344-FE1F75C670EB}" srcOrd="1" destOrd="0" parTransId="{930170D7-F4DE-481B-AE30-2FB22E7FE43B}" sibTransId="{D377E90B-B98C-4304-8523-95AFF0234517}"/>
-    <dgm:cxn modelId="{5B8F428B-F5D4-42D9-861E-E2ECB0E5522F}" type="presOf" srcId="{5077B2D9-722E-4285-B280-2CD035099AE6}" destId="{C25F440E-5989-47BB-9438-01B4A72D0B0E}" srcOrd="0" destOrd="0" presId="urn:microsoft.com/office/officeart/2008/layout/CircleAccentTimeline"/>
-    <dgm:cxn modelId="{66B2CCE3-2FDE-4CDB-825D-F1DCA07C9337}" srcId="{5077B2D9-722E-4285-B280-2CD035099AE6}" destId="{E6423BA6-930D-4A15-84AA-0BEC7878629E}" srcOrd="1" destOrd="0" parTransId="{1B2719A0-218C-47D9-8D35-5517C2413DC0}" sibTransId="{5D5EA7DB-6C66-46ED-ADE7-400DA25E32AF}"/>
-    <dgm:cxn modelId="{C4E82EDA-5EFE-4861-A557-A91548699321}" srcId="{82BB8E71-6E46-4CFA-8FF6-DFA2FD7C079F}" destId="{B0E57D30-8025-4D63-A6B2-6DD851E4B257}" srcOrd="0" destOrd="0" parTransId="{746CB427-6D26-4E6A-830D-7EDA354BC3C0}" sibTransId="{5D7B4CB4-3A01-4E2E-BED0-F2EB71B6957A}"/>
-    <dgm:cxn modelId="{1A63A4B8-B2EE-4634-96BE-C5A68675BE8C}" type="presParOf" srcId="{CC9436CB-A383-46C2-A127-293D0FD488D9}" destId="{74F3B316-76EE-4868-93D6-A9B9B6410E3C}" srcOrd="0" destOrd="0" presId="urn:microsoft.com/office/officeart/2008/layout/CircleAccentTimeline"/>
+    <dgm:cxn modelId="{09FFE4BA-2430-44F8-AA41-C3CFD8F027CF}" srcId="{B7A11CD5-84DD-4E26-B454-D70500B3FF9A}" destId="{1CB4436E-0474-4FA4-9F16-D7347F10E0B1}" srcOrd="1" destOrd="0" parTransId="{BA98535D-08A4-4F8C-9794-8A248BE570A5}" sibTransId="{64D97E92-0574-4590-A617-468711B2781A}"/>
+    <dgm:cxn modelId="{D97E7910-D9A2-429A-87A7-160961035549}" type="presOf" srcId="{5ECA6DCA-C759-48CD-B85E-658D7FF4B9A3}" destId="{CC9436CB-A383-46C2-A127-293D0FD488D9}" srcOrd="0" destOrd="0" presId="urn:microsoft.com/office/officeart/2008/layout/CircleAccentTimeline"/>
+    <dgm:cxn modelId="{010822FA-571A-48A3-B6DF-B446EBFEB025}" type="presOf" srcId="{FAA5D020-0509-403E-903F-AEBD56157E2E}" destId="{12D15966-0A2C-4720-B5D6-B6AD87177C07}" srcOrd="0" destOrd="0" presId="urn:microsoft.com/office/officeart/2008/layout/CircleAccentTimeline"/>
+    <dgm:cxn modelId="{DE139066-336E-4341-8A94-5F36A8634932}" type="presOf" srcId="{B7A11CD5-84DD-4E26-B454-D70500B3FF9A}" destId="{138D8308-1825-4093-AA5E-7A021D04E4DE}" srcOrd="0" destOrd="0" presId="urn:microsoft.com/office/officeart/2008/layout/CircleAccentTimeline"/>
+    <dgm:cxn modelId="{FDB57652-7516-4746-9070-FE5C149C7D42}" srcId="{B7A11CD5-84DD-4E26-B454-D70500B3FF9A}" destId="{FAA5D020-0509-403E-903F-AEBD56157E2E}" srcOrd="0" destOrd="0" parTransId="{C75980B1-7490-4614-8305-D8A61406323C}" sibTransId="{5CFD6F5B-9CC0-4A15-9BC7-8083CD8781FF}"/>
+    <dgm:cxn modelId="{66D6BE0F-B716-4D5D-89EE-15152AF5C3EC}" type="presOf" srcId="{1CB4436E-0474-4FA4-9F16-D7347F10E0B1}" destId="{77133696-84FB-4A28-ADCD-CB59880B1347}" srcOrd="0" destOrd="0" presId="urn:microsoft.com/office/officeart/2008/layout/CircleAccentTimeline"/>
+    <dgm:cxn modelId="{161B6901-66C5-42B8-BA50-EE44197B793F}" srcId="{5ECA6DCA-C759-48CD-B85E-658D7FF4B9A3}" destId="{B7A11CD5-84DD-4E26-B454-D70500B3FF9A}" srcOrd="0" destOrd="0" parTransId="{815E9BA0-49D2-4E2E-B4F3-5C9D789ED7E6}" sibTransId="{89586516-59F2-4A9D-B145-1CF4F72F7E3D}"/>
+    <dgm:cxn modelId="{0DEC7A6E-D5B7-4E79-9DB3-ED64A9880621}" type="presParOf" srcId="{CC9436CB-A383-46C2-A127-293D0FD488D9}" destId="{776C68B5-BC55-4C12-AECC-3BFC4E5FC6C9}" srcOrd="0" destOrd="0" presId="urn:microsoft.com/office/officeart/2008/layout/CircleAccentTimeline"/>
+    <dgm:cxn modelId="{E31FE80D-A31A-4FB1-9209-1F4963481E7A}" type="presParOf" srcId="{776C68B5-BC55-4C12-AECC-3BFC4E5FC6C9}" destId="{33EA8CD0-4107-414E-85B3-A6B3CAFE3303}" srcOrd="0" destOrd="0" presId="urn:microsoft.com/office/officeart/2008/layout/CircleAccentTimeline"/>
+    <dgm:cxn modelId="{AA096049-BB1C-4C04-97A7-BD10FB6F4FD6}" type="presParOf" srcId="{776C68B5-BC55-4C12-AECC-3BFC4E5FC6C9}" destId="{138D8308-1825-4093-AA5E-7A021D04E4DE}" srcOrd="1" destOrd="0" presId="urn:microsoft.com/office/officeart/2008/layout/CircleAccentTimeline"/>
+    <dgm:cxn modelId="{40FE4580-7906-47C6-96CF-F7A8E00514A2}" type="presParOf" srcId="{776C68B5-BC55-4C12-AECC-3BFC4E5FC6C9}" destId="{10ECC972-E5E3-4BA4-888D-B40B01CBF4CF}" srcOrd="2" destOrd="0" presId="urn:microsoft.com/office/officeart/2008/layout/CircleAccentTimeline"/>
+    <dgm:cxn modelId="{20CA2F90-E1AE-4EFA-87A8-81F3D3C396C0}" type="presParOf" srcId="{CC9436CB-A383-46C2-A127-293D0FD488D9}" destId="{317374B4-FB1E-4992-84B6-D57C3D7658C6}" srcOrd="1" destOrd="0" presId="urn:microsoft.com/office/officeart/2008/layout/CircleAccentTimeline"/>
+    <dgm:cxn modelId="{FFAFCEA4-CEE4-4331-ABDB-6E70D0ADD7DF}" type="presParOf" srcId="{CC9436CB-A383-46C2-A127-293D0FD488D9}" destId="{64F9066A-5387-4D7D-9AEF-741F7197DAB1}" srcOrd="2" destOrd="0" presId="urn:microsoft.com/office/officeart/2008/layout/CircleAccentTimeline"/>
+    <dgm:cxn modelId="{3B50C905-8A57-4AAA-86B4-656DD5CCF1E0}" type="presParOf" srcId="{CC9436CB-A383-46C2-A127-293D0FD488D9}" destId="{300FFDBB-5191-4E9B-9F8B-0683B8BDB31A}" srcOrd="3" destOrd="0" presId="urn:microsoft.com/office/officeart/2008/layout/CircleAccentTimeline"/>
+    <dgm:cxn modelId="{4D048BF5-1B92-455E-8497-03BC3205F6CD}" type="presParOf" srcId="{CC9436CB-A383-46C2-A127-293D0FD488D9}" destId="{CEB4ACAA-4D3A-4092-A32E-D7A7279FC6DD}" srcOrd="4" destOrd="0" presId="urn:microsoft.com/office/officeart/2008/layout/CircleAccentTimeline"/>
+    <dgm:cxn modelId="{B5096FAE-7E4A-4281-A6C3-D6E25EEDE5DC}" type="presParOf" srcId="{CEB4ACAA-4D3A-4092-A32E-D7A7279FC6DD}" destId="{DBF3E5A5-B586-4C1B-93A4-4D45FA876099}" srcOrd="0" destOrd="0" presId="urn:microsoft.com/office/officeart/2008/layout/CircleAccentTimeline"/>
+    <dgm:cxn modelId="{B68674A7-B181-48F0-8DD4-6437093CD8C4}" type="presParOf" srcId="{CEB4ACAA-4D3A-4092-A32E-D7A7279FC6DD}" destId="{12D15966-0A2C-4720-B5D6-B6AD87177C07}" srcOrd="1" destOrd="0" presId="urn:microsoft.com/office/officeart/2008/layout/CircleAccentTimeline"/>
+    <dgm:cxn modelId="{06A31659-DC7C-46F5-A029-2B64D11737AC}" type="presParOf" srcId="{CEB4ACAA-4D3A-4092-A32E-D7A7279FC6DD}" destId="{583D3A7D-F913-47E2-8016-8E409F0BCFCC}" srcOrd="2" destOrd="0" presId="urn:microsoft.com/office/officeart/2008/layout/CircleAccentTimeline"/>
+    <dgm:cxn modelId="{C5FF255A-9BEC-4CB0-A7C9-4708948BE16E}" type="presParOf" srcId="{CC9436CB-A383-46C2-A127-293D0FD488D9}" destId="{2229CB04-69C7-456A-B6D9-9EB80D2706D9}" srcOrd="5" destOrd="0" presId="urn:microsoft.com/office/officeart/2008/layout/CircleAccentTimeline"/>
+    <dgm:cxn modelId="{FEB96950-0377-4186-B4C6-14D08DB24EE7}" type="presParOf" srcId="{CC9436CB-A383-46C2-A127-293D0FD488D9}" destId="{52D3CF00-0232-4A36-88D0-91F34C19A09F}" srcOrd="6" destOrd="0" presId="urn:microsoft.com/office/officeart/2008/layout/CircleAccentTimeline"/>
+    <dgm:cxn modelId="{04DAF630-8872-41D5-A361-C326A3203F3F}" type="presParOf" srcId="{CC9436CB-A383-46C2-A127-293D0FD488D9}" destId="{6257729E-E791-43D7-B50E-614582D5DE60}" srcOrd="7" destOrd="0" presId="urn:microsoft.com/office/officeart/2008/layout/CircleAccentTimeline"/>
+    <dgm:cxn modelId="{58255FF0-3C62-41AF-81BB-3422210FE644}" type="presParOf" srcId="{CC9436CB-A383-46C2-A127-293D0FD488D9}" destId="{7F7C2637-4296-47E9-AFEC-8C9671A2F5B2}" srcOrd="8" destOrd="0" presId="urn:microsoft.com/office/officeart/2008/layout/CircleAccentTimeline"/>
+    <dgm:cxn modelId="{49204164-EA70-46C7-9956-44053DEB8810}" type="presParOf" srcId="{7F7C2637-4296-47E9-AFEC-8C9671A2F5B2}" destId="{AC0487C1-9396-4811-B9C3-FBCA0B57AAC1}" srcOrd="0" destOrd="0" presId="urn:microsoft.com/office/officeart/2008/layout/CircleAccentTimeline"/>
+    <dgm:cxn modelId="{DEC1EE4C-EC9E-4542-86E0-FBCDF74D4813}" type="presParOf" srcId="{7F7C2637-4296-47E9-AFEC-8C9671A2F5B2}" destId="{77133696-84FB-4A28-ADCD-CB59880B1347}" srcOrd="1" destOrd="0" presId="urn:microsoft.com/office/officeart/2008/layout/CircleAccentTimeline"/>
+    <dgm:cxn modelId="{587A8D90-3566-47E0-BAA1-C8F6A7681828}" type="presParOf" srcId="{7F7C2637-4296-47E9-AFEC-8C9671A2F5B2}" destId="{73ED2672-0EB6-4B12-8CE7-4F35614D4107}" srcOrd="2" destOrd="0" presId="urn:microsoft.com/office/officeart/2008/layout/CircleAccentTimeline"/>
+    <dgm:cxn modelId="{60F07520-67E0-452E-9DBF-BD2A23E63C9F}" type="presParOf" srcId="{CC9436CB-A383-46C2-A127-293D0FD488D9}" destId="{2A86967B-C617-4433-B2FF-07AB612F41E3}" srcOrd="9" destOrd="0" presId="urn:microsoft.com/office/officeart/2008/layout/CircleAccentTimeline"/>
+    <dgm:cxn modelId="{24CC8819-BC32-4E85-B15C-89DD45DE581D}" type="presParOf" srcId="{CC9436CB-A383-46C2-A127-293D0FD488D9}" destId="{B47DD55E-39DB-4E48-A227-7C3BAA93DA2B}" srcOrd="10" destOrd="0" presId="urn:microsoft.com/office/officeart/2008/layout/CircleAccentTimeline"/>
+    <dgm:cxn modelId="{1A63A4B8-B2EE-4634-96BE-C5A68675BE8C}" type="presParOf" srcId="{CC9436CB-A383-46C2-A127-293D0FD488D9}" destId="{74F3B316-76EE-4868-93D6-A9B9B6410E3C}" srcOrd="11" destOrd="0" presId="urn:microsoft.com/office/officeart/2008/layout/CircleAccentTimeline"/>
     <dgm:cxn modelId="{23F66485-0ABD-4DF4-A759-57E1B26FD442}" type="presParOf" srcId="{74F3B316-76EE-4868-93D6-A9B9B6410E3C}" destId="{D69C7994-67D1-4126-B06C-F46CF5C20439}" srcOrd="0" destOrd="0" presId="urn:microsoft.com/office/officeart/2008/layout/CircleAccentTimeline"/>
     <dgm:cxn modelId="{35CE698C-775E-4875-8067-FCDDD20AF34F}" type="presParOf" srcId="{74F3B316-76EE-4868-93D6-A9B9B6410E3C}" destId="{7F5A107E-5ECD-44BB-B595-1F47C0C49DB1}" srcOrd="1" destOrd="0" presId="urn:microsoft.com/office/officeart/2008/layout/CircleAccentTimeline"/>
     <dgm:cxn modelId="{7A77FA98-5D4F-4250-97AB-63D3334599C3}" type="presParOf" srcId="{74F3B316-76EE-4868-93D6-A9B9B6410E3C}" destId="{8E0C906C-8D4E-4028-A364-3EE06FFDC2A2}" srcOrd="2" destOrd="0" presId="urn:microsoft.com/office/officeart/2008/layout/CircleAccentTimeline"/>
-    <dgm:cxn modelId="{296E7E9C-429A-4301-8D69-EA7D161206E3}" type="presParOf" srcId="{CC9436CB-A383-46C2-A127-293D0FD488D9}" destId="{D14AA325-0BEE-476C-935D-F64A7F511DD2}" srcOrd="1" destOrd="0" presId="urn:microsoft.com/office/officeart/2008/layout/CircleAccentTimeline"/>
-    <dgm:cxn modelId="{5B591318-4BAD-486B-A48D-2C40DBADC960}" type="presParOf" srcId="{CC9436CB-A383-46C2-A127-293D0FD488D9}" destId="{AE67EAB7-7F85-450A-ACB1-CADC3BB6A596}" srcOrd="2" destOrd="0" presId="urn:microsoft.com/office/officeart/2008/layout/CircleAccentTimeline"/>
-    <dgm:cxn modelId="{D263FAE9-D39E-4A24-9CDB-7B8469CF6A77}" type="presParOf" srcId="{CC9436CB-A383-46C2-A127-293D0FD488D9}" destId="{CBEB0D63-D225-42F4-9C54-E68E5E3B1724}" srcOrd="3" destOrd="0" presId="urn:microsoft.com/office/officeart/2008/layout/CircleAccentTimeline"/>
-    <dgm:cxn modelId="{6551E284-E74A-4B85-91A8-FF0D2F93B409}" type="presParOf" srcId="{CC9436CB-A383-46C2-A127-293D0FD488D9}" destId="{D6FD5387-C469-449A-908F-0E936B9FE9D6}" srcOrd="4" destOrd="0" presId="urn:microsoft.com/office/officeart/2008/layout/CircleAccentTimeline"/>
+    <dgm:cxn modelId="{296E7E9C-429A-4301-8D69-EA7D161206E3}" type="presParOf" srcId="{CC9436CB-A383-46C2-A127-293D0FD488D9}" destId="{D14AA325-0BEE-476C-935D-F64A7F511DD2}" srcOrd="12" destOrd="0" presId="urn:microsoft.com/office/officeart/2008/layout/CircleAccentTimeline"/>
+    <dgm:cxn modelId="{5B591318-4BAD-486B-A48D-2C40DBADC960}" type="presParOf" srcId="{CC9436CB-A383-46C2-A127-293D0FD488D9}" destId="{AE67EAB7-7F85-450A-ACB1-CADC3BB6A596}" srcOrd="13" destOrd="0" presId="urn:microsoft.com/office/officeart/2008/layout/CircleAccentTimeline"/>
+    <dgm:cxn modelId="{D263FAE9-D39E-4A24-9CDB-7B8469CF6A77}" type="presParOf" srcId="{CC9436CB-A383-46C2-A127-293D0FD488D9}" destId="{CBEB0D63-D225-42F4-9C54-E68E5E3B1724}" srcOrd="14" destOrd="0" presId="urn:microsoft.com/office/officeart/2008/layout/CircleAccentTimeline"/>
+    <dgm:cxn modelId="{6551E284-E74A-4B85-91A8-FF0D2F93B409}" type="presParOf" srcId="{CC9436CB-A383-46C2-A127-293D0FD488D9}" destId="{D6FD5387-C469-449A-908F-0E936B9FE9D6}" srcOrd="15" destOrd="0" presId="urn:microsoft.com/office/officeart/2008/layout/CircleAccentTimeline"/>
     <dgm:cxn modelId="{907DA4D1-C2E2-46A7-AEBD-CE2A6D5B7415}" type="presParOf" srcId="{D6FD5387-C469-449A-908F-0E936B9FE9D6}" destId="{6C4AF1A4-C618-4EE3-8A03-80A803CC22A3}" srcOrd="0" destOrd="0" presId="urn:microsoft.com/office/officeart/2008/layout/CircleAccentTimeline"/>
     <dgm:cxn modelId="{493EC7AD-8543-42F2-A928-4E701FB28867}" type="presParOf" srcId="{D6FD5387-C469-449A-908F-0E936B9FE9D6}" destId="{7680FA50-9985-48ED-B5DD-40E7EF73FB5E}" srcOrd="1" destOrd="0" presId="urn:microsoft.com/office/officeart/2008/layout/CircleAccentTimeline"/>
     <dgm:cxn modelId="{ACD572B7-DEEF-48FE-923D-7CB3DE4E5E26}" type="presParOf" srcId="{D6FD5387-C469-449A-908F-0E936B9FE9D6}" destId="{29575E4C-25C1-43B2-ADC9-9E7B70641132}" srcOrd="2" destOrd="0" presId="urn:microsoft.com/office/officeart/2008/layout/CircleAccentTimeline"/>
-    <dgm:cxn modelId="{A7332FD3-17F4-4085-82E7-51590DB01FB2}" type="presParOf" srcId="{CC9436CB-A383-46C2-A127-293D0FD488D9}" destId="{AF4576F2-DC6A-419D-899D-15CFE9D62AFA}" srcOrd="5" destOrd="0" presId="urn:microsoft.com/office/officeart/2008/layout/CircleAccentTimeline"/>
-    <dgm:cxn modelId="{ED61B95E-10B0-46C0-B8EF-833AFAF21A07}" type="presParOf" srcId="{CC9436CB-A383-46C2-A127-293D0FD488D9}" destId="{098DE909-FA78-43C1-B45D-C966DB598DA9}" srcOrd="6" destOrd="0" presId="urn:microsoft.com/office/officeart/2008/layout/CircleAccentTimeline"/>
-    <dgm:cxn modelId="{AC64FD51-6CB8-467E-9D12-0FBF0CE0F8E1}" type="presParOf" srcId="{CC9436CB-A383-46C2-A127-293D0FD488D9}" destId="{FD9ACA3A-3435-47A0-ADAB-1B49E200319A}" srcOrd="7" destOrd="0" presId="urn:microsoft.com/office/officeart/2008/layout/CircleAccentTimeline"/>
-    <dgm:cxn modelId="{F0ADED9F-FCED-4857-B089-876CC1CBF5EC}" type="presParOf" srcId="{CC9436CB-A383-46C2-A127-293D0FD488D9}" destId="{24C65332-7124-48C4-9D96-1A6EBFF259F8}" srcOrd="8" destOrd="0" presId="urn:microsoft.com/office/officeart/2008/layout/CircleAccentTimeline"/>
+    <dgm:cxn modelId="{A7332FD3-17F4-4085-82E7-51590DB01FB2}" type="presParOf" srcId="{CC9436CB-A383-46C2-A127-293D0FD488D9}" destId="{AF4576F2-DC6A-419D-899D-15CFE9D62AFA}" srcOrd="16" destOrd="0" presId="urn:microsoft.com/office/officeart/2008/layout/CircleAccentTimeline"/>
+    <dgm:cxn modelId="{ED61B95E-10B0-46C0-B8EF-833AFAF21A07}" type="presParOf" srcId="{CC9436CB-A383-46C2-A127-293D0FD488D9}" destId="{098DE909-FA78-43C1-B45D-C966DB598DA9}" srcOrd="17" destOrd="0" presId="urn:microsoft.com/office/officeart/2008/layout/CircleAccentTimeline"/>
+    <dgm:cxn modelId="{AC64FD51-6CB8-467E-9D12-0FBF0CE0F8E1}" type="presParOf" srcId="{CC9436CB-A383-46C2-A127-293D0FD488D9}" destId="{FD9ACA3A-3435-47A0-ADAB-1B49E200319A}" srcOrd="18" destOrd="0" presId="urn:microsoft.com/office/officeart/2008/layout/CircleAccentTimeline"/>
+    <dgm:cxn modelId="{F0ADED9F-FCED-4857-B089-876CC1CBF5EC}" type="presParOf" srcId="{CC9436CB-A383-46C2-A127-293D0FD488D9}" destId="{24C65332-7124-48C4-9D96-1A6EBFF259F8}" srcOrd="19" destOrd="0" presId="urn:microsoft.com/office/officeart/2008/layout/CircleAccentTimeline"/>
     <dgm:cxn modelId="{2CF924F7-BAE8-4354-A161-39CBEECEB534}" type="presParOf" srcId="{24C65332-7124-48C4-9D96-1A6EBFF259F8}" destId="{3F078EDC-158C-4C63-844D-E4B1063CFF15}" srcOrd="0" destOrd="0" presId="urn:microsoft.com/office/officeart/2008/layout/CircleAccentTimeline"/>
     <dgm:cxn modelId="{C4FCF033-F9F4-4CF7-8944-192DBF569F4B}" type="presParOf" srcId="{24C65332-7124-48C4-9D96-1A6EBFF259F8}" destId="{EDC53E2A-6EC0-4A0B-B661-7117AB5B135F}" srcOrd="1" destOrd="0" presId="urn:microsoft.com/office/officeart/2008/layout/CircleAccentTimeline"/>
     <dgm:cxn modelId="{E567FD11-11C9-4C7E-8DA9-47BE70B2785D}" type="presParOf" srcId="{24C65332-7124-48C4-9D96-1A6EBFF259F8}" destId="{BEAAB3AD-B3C9-494A-944C-59B6057BC422}" srcOrd="2" destOrd="0" presId="urn:microsoft.com/office/officeart/2008/layout/CircleAccentTimeline"/>
-    <dgm:cxn modelId="{CE72E2EE-DC57-4C12-B864-BE0E8BD3FFE6}" type="presParOf" srcId="{CC9436CB-A383-46C2-A127-293D0FD488D9}" destId="{72E3FD53-6A20-4B3D-B3EC-415AD0017ACB}" srcOrd="9" destOrd="0" presId="urn:microsoft.com/office/officeart/2008/layout/CircleAccentTimeline"/>
-    <dgm:cxn modelId="{02FEE234-8182-4B44-BC0D-8B84DB04EB1E}" type="presParOf" srcId="{CC9436CB-A383-46C2-A127-293D0FD488D9}" destId="{9031D611-3928-43A1-BC77-9315214F6516}" srcOrd="10" destOrd="0" presId="urn:microsoft.com/office/officeart/2008/layout/CircleAccentTimeline"/>
-    <dgm:cxn modelId="{4400A96B-0F90-4C09-93A0-2D68A1E492CF}" type="presParOf" srcId="{CC9436CB-A383-46C2-A127-293D0FD488D9}" destId="{959741F2-830A-4D09-8712-4D056AFC0405}" srcOrd="11" destOrd="0" presId="urn:microsoft.com/office/officeart/2008/layout/CircleAccentTimeline"/>
+    <dgm:cxn modelId="{CE72E2EE-DC57-4C12-B864-BE0E8BD3FFE6}" type="presParOf" srcId="{CC9436CB-A383-46C2-A127-293D0FD488D9}" destId="{72E3FD53-6A20-4B3D-B3EC-415AD0017ACB}" srcOrd="20" destOrd="0" presId="urn:microsoft.com/office/officeart/2008/layout/CircleAccentTimeline"/>
+    <dgm:cxn modelId="{02FEE234-8182-4B44-BC0D-8B84DB04EB1E}" type="presParOf" srcId="{CC9436CB-A383-46C2-A127-293D0FD488D9}" destId="{9031D611-3928-43A1-BC77-9315214F6516}" srcOrd="21" destOrd="0" presId="urn:microsoft.com/office/officeart/2008/layout/CircleAccentTimeline"/>
+    <dgm:cxn modelId="{4400A96B-0F90-4C09-93A0-2D68A1E492CF}" type="presParOf" srcId="{CC9436CB-A383-46C2-A127-293D0FD488D9}" destId="{959741F2-830A-4D09-8712-4D056AFC0405}" srcOrd="22" destOrd="0" presId="urn:microsoft.com/office/officeart/2008/layout/CircleAccentTimeline"/>
     <dgm:cxn modelId="{3EFA7857-538B-4010-8A59-B6642D37D98D}" type="presParOf" srcId="{959741F2-830A-4D09-8712-4D056AFC0405}" destId="{10E10192-D1DB-4540-BC9E-5F6B92991865}" srcOrd="0" destOrd="0" presId="urn:microsoft.com/office/officeart/2008/layout/CircleAccentTimeline"/>
     <dgm:cxn modelId="{67AAB7DF-AB47-49A6-9AC7-757A162422FF}" type="presParOf" srcId="{959741F2-830A-4D09-8712-4D056AFC0405}" destId="{C25F440E-5989-47BB-9438-01B4A72D0B0E}" srcOrd="1" destOrd="0" presId="urn:microsoft.com/office/officeart/2008/layout/CircleAccentTimeline"/>
     <dgm:cxn modelId="{CB211400-FB86-47B0-AECE-029B4678F7B2}" type="presParOf" srcId="{959741F2-830A-4D09-8712-4D056AFC0405}" destId="{E3F36667-886E-473C-8A00-B2B1D5543187}" srcOrd="2" destOrd="0" presId="urn:microsoft.com/office/officeart/2008/layout/CircleAccentTimeline"/>
-    <dgm:cxn modelId="{8964834D-90C6-4A7D-A983-CB026D17687B}" type="presParOf" srcId="{CC9436CB-A383-46C2-A127-293D0FD488D9}" destId="{5B0E8A3A-81FF-454D-B0F3-8317F662D0BF}" srcOrd="12" destOrd="0" presId="urn:microsoft.com/office/officeart/2008/layout/CircleAccentTimeline"/>
-    <dgm:cxn modelId="{B68B8A28-8DE2-42C9-BF1F-1D81A6FD5829}" type="presParOf" srcId="{CC9436CB-A383-46C2-A127-293D0FD488D9}" destId="{D22FAE66-2780-429F-A442-F67FC83AFCD2}" srcOrd="13" destOrd="0" presId="urn:microsoft.com/office/officeart/2008/layout/CircleAccentTimeline"/>
-    <dgm:cxn modelId="{C431093F-D8C3-41C6-A458-9C65A5EBC00C}" type="presParOf" srcId="{CC9436CB-A383-46C2-A127-293D0FD488D9}" destId="{AFCB98A6-9D11-4F07-BC27-B9A0351EB9ED}" srcOrd="14" destOrd="0" presId="urn:microsoft.com/office/officeart/2008/layout/CircleAccentTimeline"/>
-    <dgm:cxn modelId="{D1AE890C-9A77-4A83-9C42-FFC917B966A0}" type="presParOf" srcId="{CC9436CB-A383-46C2-A127-293D0FD488D9}" destId="{6436CD56-F091-4481-9EDC-4E73155ACD10}" srcOrd="15" destOrd="0" presId="urn:microsoft.com/office/officeart/2008/layout/CircleAccentTimeline"/>
+    <dgm:cxn modelId="{8964834D-90C6-4A7D-A983-CB026D17687B}" type="presParOf" srcId="{CC9436CB-A383-46C2-A127-293D0FD488D9}" destId="{5B0E8A3A-81FF-454D-B0F3-8317F662D0BF}" srcOrd="23" destOrd="0" presId="urn:microsoft.com/office/officeart/2008/layout/CircleAccentTimeline"/>
+    <dgm:cxn modelId="{B68B8A28-8DE2-42C9-BF1F-1D81A6FD5829}" type="presParOf" srcId="{CC9436CB-A383-46C2-A127-293D0FD488D9}" destId="{D22FAE66-2780-429F-A442-F67FC83AFCD2}" srcOrd="24" destOrd="0" presId="urn:microsoft.com/office/officeart/2008/layout/CircleAccentTimeline"/>
+    <dgm:cxn modelId="{C431093F-D8C3-41C6-A458-9C65A5EBC00C}" type="presParOf" srcId="{CC9436CB-A383-46C2-A127-293D0FD488D9}" destId="{AFCB98A6-9D11-4F07-BC27-B9A0351EB9ED}" srcOrd="25" destOrd="0" presId="urn:microsoft.com/office/officeart/2008/layout/CircleAccentTimeline"/>
+    <dgm:cxn modelId="{D1AE890C-9A77-4A83-9C42-FFC917B966A0}" type="presParOf" srcId="{CC9436CB-A383-46C2-A127-293D0FD488D9}" destId="{6436CD56-F091-4481-9EDC-4E73155ACD10}" srcOrd="26" destOrd="0" presId="urn:microsoft.com/office/officeart/2008/layout/CircleAccentTimeline"/>
     <dgm:cxn modelId="{BA6FFB70-BAEB-4679-B85A-0591A93E0BFB}" type="presParOf" srcId="{6436CD56-F091-4481-9EDC-4E73155ACD10}" destId="{9367CC29-33D8-4FD1-AA42-B42C2C0900F2}" srcOrd="0" destOrd="0" presId="urn:microsoft.com/office/officeart/2008/layout/CircleAccentTimeline"/>
     <dgm:cxn modelId="{2E3BD3DF-8FCE-4B92-A1FC-BD2A716F1E71}" type="presParOf" srcId="{6436CD56-F091-4481-9EDC-4E73155ACD10}" destId="{C51A1E82-AC8E-4B24-8DED-3EBBDDD58E25}" srcOrd="1" destOrd="0" presId="urn:microsoft.com/office/officeart/2008/layout/CircleAccentTimeline"/>
     <dgm:cxn modelId="{5CCB4FDE-B704-4BC3-8D03-A1202EF484A5}" type="presParOf" srcId="{6436CD56-F091-4481-9EDC-4E73155ACD10}" destId="{C71E06D2-F9F7-4C4B-81A0-B5BF7480B84C}" srcOrd="2" destOrd="0" presId="urn:microsoft.com/office/officeart/2008/layout/CircleAccentTimeline"/>
-    <dgm:cxn modelId="{7510C082-8A1E-4F0E-A0D4-751F9FBFF422}" type="presParOf" srcId="{CC9436CB-A383-46C2-A127-293D0FD488D9}" destId="{4E7C56CB-32C2-45D5-BB7D-17A2D9E1FF2C}" srcOrd="16" destOrd="0" presId="urn:microsoft.com/office/officeart/2008/layout/CircleAccentTimeline"/>
-    <dgm:cxn modelId="{49BCC6FF-00B4-4517-BD8C-7F489D1E6368}" type="presParOf" srcId="{CC9436CB-A383-46C2-A127-293D0FD488D9}" destId="{3F7DCEDC-468E-405F-98BE-6DCD7243A661}" srcOrd="17" destOrd="0" presId="urn:microsoft.com/office/officeart/2008/layout/CircleAccentTimeline"/>
-    <dgm:cxn modelId="{8AE6887D-0048-4E61-86D7-5F165DAB9CE4}" type="presParOf" srcId="{CC9436CB-A383-46C2-A127-293D0FD488D9}" destId="{07B2100A-0C00-4969-870A-25FC4364C763}" srcOrd="18" destOrd="0" presId="urn:microsoft.com/office/officeart/2008/layout/CircleAccentTimeline"/>
-    <dgm:cxn modelId="{5735D430-D7F7-4BD0-88AC-A57091CB76AF}" type="presParOf" srcId="{CC9436CB-A383-46C2-A127-293D0FD488D9}" destId="{4537587C-8BC2-4223-807D-434F73C83258}" srcOrd="19" destOrd="0" presId="urn:microsoft.com/office/officeart/2008/layout/CircleAccentTimeline"/>
+    <dgm:cxn modelId="{7510C082-8A1E-4F0E-A0D4-751F9FBFF422}" type="presParOf" srcId="{CC9436CB-A383-46C2-A127-293D0FD488D9}" destId="{4E7C56CB-32C2-45D5-BB7D-17A2D9E1FF2C}" srcOrd="27" destOrd="0" presId="urn:microsoft.com/office/officeart/2008/layout/CircleAccentTimeline"/>
+    <dgm:cxn modelId="{49BCC6FF-00B4-4517-BD8C-7F489D1E6368}" type="presParOf" srcId="{CC9436CB-A383-46C2-A127-293D0FD488D9}" destId="{3F7DCEDC-468E-405F-98BE-6DCD7243A661}" srcOrd="28" destOrd="0" presId="urn:microsoft.com/office/officeart/2008/layout/CircleAccentTimeline"/>
+    <dgm:cxn modelId="{8AE6887D-0048-4E61-86D7-5F165DAB9CE4}" type="presParOf" srcId="{CC9436CB-A383-46C2-A127-293D0FD488D9}" destId="{07B2100A-0C00-4969-870A-25FC4364C763}" srcOrd="29" destOrd="0" presId="urn:microsoft.com/office/officeart/2008/layout/CircleAccentTimeline"/>
+    <dgm:cxn modelId="{5735D430-D7F7-4BD0-88AC-A57091CB76AF}" type="presParOf" srcId="{CC9436CB-A383-46C2-A127-293D0FD488D9}" destId="{4537587C-8BC2-4223-807D-434F73C83258}" srcOrd="30" destOrd="0" presId="urn:microsoft.com/office/officeart/2008/layout/CircleAccentTimeline"/>
     <dgm:cxn modelId="{AC702C14-C051-43B9-B229-5D06D19D7B3D}" type="presParOf" srcId="{4537587C-8BC2-4223-807D-434F73C83258}" destId="{10CA07A6-D0E4-480D-9578-DEF8F7B8EE7A}" srcOrd="0" destOrd="0" presId="urn:microsoft.com/office/officeart/2008/layout/CircleAccentTimeline"/>
     <dgm:cxn modelId="{AA0A3A87-BA9C-4BC8-9833-60FC55433625}" type="presParOf" srcId="{4537587C-8BC2-4223-807D-434F73C83258}" destId="{D04BB978-ED60-4153-924B-65A50DDD181E}" srcOrd="1" destOrd="0" presId="urn:microsoft.com/office/officeart/2008/layout/CircleAccentTimeline"/>
     <dgm:cxn modelId="{BE5FD825-D9F1-4B1C-84F4-CC51B1495964}" type="presParOf" srcId="{4537587C-8BC2-4223-807D-434F73C83258}" destId="{69403BB5-4D42-424D-B70C-D011F3EDB6B0}" srcOrd="2" destOrd="0" presId="urn:microsoft.com/office/officeart/2008/layout/CircleAccentTimeline"/>
-    <dgm:cxn modelId="{1E8A3106-3AB2-4C23-AA29-8537A9DF32AC}" type="presParOf" srcId="{CC9436CB-A383-46C2-A127-293D0FD488D9}" destId="{A1E7B169-5DB5-4834-99B5-D4EBAC5EC7FB}" srcOrd="20" destOrd="0" presId="urn:microsoft.com/office/officeart/2008/layout/CircleAccentTimeline"/>
-    <dgm:cxn modelId="{AF5778FE-6640-4685-9EE4-53CB3217E510}" type="presParOf" srcId="{CC9436CB-A383-46C2-A127-293D0FD488D9}" destId="{19BC3BBA-6C3B-41A4-9870-0B36195A7A48}" srcOrd="21" destOrd="0" presId="urn:microsoft.com/office/officeart/2008/layout/CircleAccentTimeline"/>
-    <dgm:cxn modelId="{53B08616-F81D-45BF-85ED-68834CF9072D}" type="presParOf" srcId="{CC9436CB-A383-46C2-A127-293D0FD488D9}" destId="{60638939-F446-41A2-8D1A-FF1F29D4CCA2}" srcOrd="22" destOrd="0" presId="urn:microsoft.com/office/officeart/2008/layout/CircleAccentTimeline"/>
+    <dgm:cxn modelId="{1E8A3106-3AB2-4C23-AA29-8537A9DF32AC}" type="presParOf" srcId="{CC9436CB-A383-46C2-A127-293D0FD488D9}" destId="{A1E7B169-5DB5-4834-99B5-D4EBAC5EC7FB}" srcOrd="31" destOrd="0" presId="urn:microsoft.com/office/officeart/2008/layout/CircleAccentTimeline"/>
+    <dgm:cxn modelId="{AF5778FE-6640-4685-9EE4-53CB3217E510}" type="presParOf" srcId="{CC9436CB-A383-46C2-A127-293D0FD488D9}" destId="{19BC3BBA-6C3B-41A4-9870-0B36195A7A48}" srcOrd="32" destOrd="0" presId="urn:microsoft.com/office/officeart/2008/layout/CircleAccentTimeline"/>
+    <dgm:cxn modelId="{53B08616-F81D-45BF-85ED-68834CF9072D}" type="presParOf" srcId="{CC9436CB-A383-46C2-A127-293D0FD488D9}" destId="{60638939-F446-41A2-8D1A-FF1F29D4CCA2}" srcOrd="33" destOrd="0" presId="urn:microsoft.com/office/officeart/2008/layout/CircleAccentTimeline"/>
     <dgm:cxn modelId="{F8AE5E37-27BE-405D-AB4A-E8062DDD5128}" type="presParOf" srcId="{60638939-F446-41A2-8D1A-FF1F29D4CCA2}" destId="{26E5474D-8EF8-4691-B9DB-24EA66BB7220}" srcOrd="0" destOrd="0" presId="urn:microsoft.com/office/officeart/2008/layout/CircleAccentTimeline"/>
     <dgm:cxn modelId="{6D117810-0361-4DB9-891F-75D941CD746A}" type="presParOf" srcId="{60638939-F446-41A2-8D1A-FF1F29D4CCA2}" destId="{FE9185A6-A871-42E8-9720-DD96299AD075}" srcOrd="1" destOrd="0" presId="urn:microsoft.com/office/officeart/2008/layout/CircleAccentTimeline"/>
     <dgm:cxn modelId="{B0C062FC-EEFB-433C-B8A1-280881A929D3}" type="presParOf" srcId="{60638939-F446-41A2-8D1A-FF1F29D4CCA2}" destId="{8C229429-6934-4DEE-84F3-46D6ECB15968}" srcOrd="2" destOrd="0" presId="urn:microsoft.com/office/officeart/2008/layout/CircleAccentTimeline"/>
-    <dgm:cxn modelId="{5597ACE5-0708-4072-A3C8-CA6265E875B0}" type="presParOf" srcId="{CC9436CB-A383-46C2-A127-293D0FD488D9}" destId="{278D4510-4C6F-45A7-820A-0E3B036CD04C}" srcOrd="23" destOrd="0" presId="urn:microsoft.com/office/officeart/2008/layout/CircleAccentTimeline"/>
-    <dgm:cxn modelId="{91B0DF0D-A77C-45B3-9E0E-E946753A224C}" type="presParOf" srcId="{CC9436CB-A383-46C2-A127-293D0FD488D9}" destId="{97E6E326-93C4-4E9C-92DF-3FDEA26EE24B}" srcOrd="24" destOrd="0" presId="urn:microsoft.com/office/officeart/2008/layout/CircleAccentTimeline"/>
-    <dgm:cxn modelId="{22ABB01B-1DBB-435A-939B-6A480674E426}" type="presParOf" srcId="{CC9436CB-A383-46C2-A127-293D0FD488D9}" destId="{2AA21EA2-FB11-4B99-9943-B3259E3C9C3E}" srcOrd="25" destOrd="0" presId="urn:microsoft.com/office/officeart/2008/layout/CircleAccentTimeline"/>
-    <dgm:cxn modelId="{A69D8CB7-F668-4DBD-A4D3-B1FF917BC574}" type="presParOf" srcId="{CC9436CB-A383-46C2-A127-293D0FD488D9}" destId="{B1F793EB-14A2-45D4-88CF-DD58A5D4AA04}" srcOrd="26" destOrd="0" presId="urn:microsoft.com/office/officeart/2008/layout/CircleAccentTimeline"/>
+    <dgm:cxn modelId="{5597ACE5-0708-4072-A3C8-CA6265E875B0}" type="presParOf" srcId="{CC9436CB-A383-46C2-A127-293D0FD488D9}" destId="{278D4510-4C6F-45A7-820A-0E3B036CD04C}" srcOrd="34" destOrd="0" presId="urn:microsoft.com/office/officeart/2008/layout/CircleAccentTimeline"/>
+    <dgm:cxn modelId="{91B0DF0D-A77C-45B3-9E0E-E946753A224C}" type="presParOf" srcId="{CC9436CB-A383-46C2-A127-293D0FD488D9}" destId="{97E6E326-93C4-4E9C-92DF-3FDEA26EE24B}" srcOrd="35" destOrd="0" presId="urn:microsoft.com/office/officeart/2008/layout/CircleAccentTimeline"/>
+    <dgm:cxn modelId="{22ABB01B-1DBB-435A-939B-6A480674E426}" type="presParOf" srcId="{CC9436CB-A383-46C2-A127-293D0FD488D9}" destId="{2AA21EA2-FB11-4B99-9943-B3259E3C9C3E}" srcOrd="36" destOrd="0" presId="urn:microsoft.com/office/officeart/2008/layout/CircleAccentTimeline"/>
+    <dgm:cxn modelId="{A69D8CB7-F668-4DBD-A4D3-B1FF917BC574}" type="presParOf" srcId="{CC9436CB-A383-46C2-A127-293D0FD488D9}" destId="{B1F793EB-14A2-45D4-88CF-DD58A5D4AA04}" srcOrd="37" destOrd="0" presId="urn:microsoft.com/office/officeart/2008/layout/CircleAccentTimeline"/>
     <dgm:cxn modelId="{21ECC6A6-88E8-4E18-AA9D-EF5C4B0B9473}" type="presParOf" srcId="{B1F793EB-14A2-45D4-88CF-DD58A5D4AA04}" destId="{A9E52EBE-13BA-4B6A-B25D-203B758D84E9}" srcOrd="0" destOrd="0" presId="urn:microsoft.com/office/officeart/2008/layout/CircleAccentTimeline"/>
     <dgm:cxn modelId="{FED4BB97-582B-440C-AE32-3D195D38C1BB}" type="presParOf" srcId="{B1F793EB-14A2-45D4-88CF-DD58A5D4AA04}" destId="{74A3F228-2583-48CF-B747-D3940B109963}" srcOrd="1" destOrd="0" presId="urn:microsoft.com/office/officeart/2008/layout/CircleAccentTimeline"/>
     <dgm:cxn modelId="{DCBAFF94-382A-4DDC-A9E8-F07F73FF0B70}" type="presParOf" srcId="{B1F793EB-14A2-45D4-88CF-DD58A5D4AA04}" destId="{6F4CAF73-6FA6-44A5-9B5E-8C132110D9F4}" srcOrd="2" destOrd="0" presId="urn:microsoft.com/office/officeart/2008/layout/CircleAccentTimeline"/>
-    <dgm:cxn modelId="{51D357E2-4CCC-4D11-84BF-D98E6C263B1D}" type="presParOf" srcId="{CC9436CB-A383-46C2-A127-293D0FD488D9}" destId="{6A6B995E-F600-4BEA-A79D-103001030DF1}" srcOrd="27" destOrd="0" presId="urn:microsoft.com/office/officeart/2008/layout/CircleAccentTimeline"/>
-    <dgm:cxn modelId="{BFE0D255-32C3-4120-9553-72F02AB9EC48}" type="presParOf" srcId="{CC9436CB-A383-46C2-A127-293D0FD488D9}" destId="{B81B90CC-EB1C-4A2B-BC24-94728E703AC1}" srcOrd="28" destOrd="0" presId="urn:microsoft.com/office/officeart/2008/layout/CircleAccentTimeline"/>
-    <dgm:cxn modelId="{1FDEC747-1551-4082-9BF9-67A696F423EE}" type="presParOf" srcId="{CC9436CB-A383-46C2-A127-293D0FD488D9}" destId="{3478AA6D-3D7B-40EA-9F2C-5A81D2699B73}" srcOrd="29" destOrd="0" presId="urn:microsoft.com/office/officeart/2008/layout/CircleAccentTimeline"/>
-    <dgm:cxn modelId="{AED0006C-D925-40B9-B4F4-3E5FB9AFBEAE}" type="presParOf" srcId="{CC9436CB-A383-46C2-A127-293D0FD488D9}" destId="{21BEEAC3-E3D8-4883-82D8-9F9873A38E90}" srcOrd="30" destOrd="0" presId="urn:microsoft.com/office/officeart/2008/layout/CircleAccentTimeline"/>
+    <dgm:cxn modelId="{51D357E2-4CCC-4D11-84BF-D98E6C263B1D}" type="presParOf" srcId="{CC9436CB-A383-46C2-A127-293D0FD488D9}" destId="{6A6B995E-F600-4BEA-A79D-103001030DF1}" srcOrd="38" destOrd="0" presId="urn:microsoft.com/office/officeart/2008/layout/CircleAccentTimeline"/>
+    <dgm:cxn modelId="{BFE0D255-32C3-4120-9553-72F02AB9EC48}" type="presParOf" srcId="{CC9436CB-A383-46C2-A127-293D0FD488D9}" destId="{B81B90CC-EB1C-4A2B-BC24-94728E703AC1}" srcOrd="39" destOrd="0" presId="urn:microsoft.com/office/officeart/2008/layout/CircleAccentTimeline"/>
+    <dgm:cxn modelId="{1FDEC747-1551-4082-9BF9-67A696F423EE}" type="presParOf" srcId="{CC9436CB-A383-46C2-A127-293D0FD488D9}" destId="{3478AA6D-3D7B-40EA-9F2C-5A81D2699B73}" srcOrd="40" destOrd="0" presId="urn:microsoft.com/office/officeart/2008/layout/CircleAccentTimeline"/>
+    <dgm:cxn modelId="{AED0006C-D925-40B9-B4F4-3E5FB9AFBEAE}" type="presParOf" srcId="{CC9436CB-A383-46C2-A127-293D0FD488D9}" destId="{21BEEAC3-E3D8-4883-82D8-9F9873A38E90}" srcOrd="41" destOrd="0" presId="urn:microsoft.com/office/officeart/2008/layout/CircleAccentTimeline"/>
     <dgm:cxn modelId="{A9E0F66C-9446-4F08-B516-2D1F42C075F5}" type="presParOf" srcId="{21BEEAC3-E3D8-4883-82D8-9F9873A38E90}" destId="{5B70E938-DB6E-4F35-A35D-F8430B08396A}" srcOrd="0" destOrd="0" presId="urn:microsoft.com/office/officeart/2008/layout/CircleAccentTimeline"/>
     <dgm:cxn modelId="{95E46D02-E0A2-4888-B797-009C66ACCC3A}" type="presParOf" srcId="{21BEEAC3-E3D8-4883-82D8-9F9873A38E90}" destId="{91C7FF6B-8779-43CF-A151-5A76DEB1795E}" srcOrd="1" destOrd="0" presId="urn:microsoft.com/office/officeart/2008/layout/CircleAccentTimeline"/>
     <dgm:cxn modelId="{1ADB5970-F8B3-4A35-9B8D-FC314C8D2C20}" type="presParOf" srcId="{21BEEAC3-E3D8-4883-82D8-9F9873A38E90}" destId="{23A07CBD-914B-4535-B3C9-BAC415629FCF}" srcOrd="2" destOrd="0" presId="urn:microsoft.com/office/officeart/2008/layout/CircleAccentTimeline"/>
-    <dgm:cxn modelId="{291DBA38-E938-4CC5-91BE-10D70BAB8D43}" type="presParOf" srcId="{CC9436CB-A383-46C2-A127-293D0FD488D9}" destId="{5025C84F-EDFA-4DCE-9D39-922F80659818}" srcOrd="31" destOrd="0" presId="urn:microsoft.com/office/officeart/2008/layout/CircleAccentTimeline"/>
-    <dgm:cxn modelId="{B62CAB78-DE59-4296-8DF1-9E9F1EFCB489}" type="presParOf" srcId="{CC9436CB-A383-46C2-A127-293D0FD488D9}" destId="{41FB11B7-7E32-4DD9-AA11-DFA10ED2E7A3}" srcOrd="32" destOrd="0" presId="urn:microsoft.com/office/officeart/2008/layout/CircleAccentTimeline"/>
+    <dgm:cxn modelId="{291DBA38-E938-4CC5-91BE-10D70BAB8D43}" type="presParOf" srcId="{CC9436CB-A383-46C2-A127-293D0FD488D9}" destId="{5025C84F-EDFA-4DCE-9D39-922F80659818}" srcOrd="42" destOrd="0" presId="urn:microsoft.com/office/officeart/2008/layout/CircleAccentTimeline"/>
+    <dgm:cxn modelId="{B62CAB78-DE59-4296-8DF1-9E9F1EFCB489}" type="presParOf" srcId="{CC9436CB-A383-46C2-A127-293D0FD488D9}" destId="{41FB11B7-7E32-4DD9-AA11-DFA10ED2E7A3}" srcOrd="43" destOrd="0" presId="urn:microsoft.com/office/officeart/2008/layout/CircleAccentTimeline"/>
   </dgm:cxnLst>
   <dgm:bg/>
   <dgm:whole/>
@@ -4876,15 +5217,15 @@
       <dsp:cNvGrpSpPr/>
     </dsp:nvGrpSpPr>
     <dsp:grpSpPr/>
-    <dsp:sp modelId="{9688400C-9B1C-4922-A6B4-205FC5699ACD}">
+    <dsp:sp modelId="{7E8606C6-A9FC-4D39-842E-189787294FA6}">
       <dsp:nvSpPr>
         <dsp:cNvPr id="0" name=""/>
         <dsp:cNvSpPr/>
       </dsp:nvSpPr>
       <dsp:spPr>
         <a:xfrm>
-          <a:off x="705723" y="3301700"/>
-          <a:ext cx="1075085" cy="1075085"/>
+          <a:off x="3655" y="3974110"/>
+          <a:ext cx="1075964" cy="1075964"/>
         </a:xfrm>
         <a:prstGeom prst="donut">
           <a:avLst>
@@ -4928,15 +5269,15 @@
         </a:fontRef>
       </dsp:style>
     </dsp:sp>
-    <dsp:sp modelId="{13170522-CB26-466F-9CA0-0D90ED23F89F}">
+    <dsp:sp modelId="{092C5D9E-1535-42D8-9733-671B60D68406}">
       <dsp:nvSpPr>
         <dsp:cNvPr id="0" name=""/>
         <dsp:cNvSpPr/>
       </dsp:nvSpPr>
       <dsp:spPr>
         <a:xfrm rot="17700000">
-          <a:off x="1134880" y="2423958"/>
-          <a:ext cx="1367496" cy="637674"/>
+          <a:off x="294126" y="2802538"/>
+          <a:ext cx="1742462" cy="812523"/>
         </a:xfrm>
         <a:prstGeom prst="rect">
           <a:avLst/>
@@ -4990,19 +5331,19 @@
         </a:p>
       </dsp:txBody>
       <dsp:txXfrm>
-        <a:off x="1134880" y="2423958"/>
-        <a:ext cx="1367496" cy="637674"/>
+        <a:off x="294126" y="2802538"/>
+        <a:ext cx="1742462" cy="812523"/>
       </dsp:txXfrm>
     </dsp:sp>
-    <dsp:sp modelId="{C1324DF7-F3DA-473B-BA62-047A938E5C04}">
+    <dsp:sp modelId="{D159ADD1-8659-4869-9E65-ABCA8FCB446A}">
       <dsp:nvSpPr>
         <dsp:cNvPr id="0" name=""/>
         <dsp:cNvSpPr/>
       </dsp:nvSpPr>
       <dsp:spPr>
         <a:xfrm>
-          <a:off x="1865452" y="3793024"/>
-          <a:ext cx="558037" cy="558037"/>
+          <a:off x="1322327" y="4303657"/>
+          <a:ext cx="558493" cy="558493"/>
         </a:xfrm>
         <a:prstGeom prst="ellipse">
           <a:avLst/>
@@ -5044,15 +5385,15 @@
         </a:fontRef>
       </dsp:style>
     </dsp:sp>
-    <dsp:sp modelId="{DBB0E32A-4E7D-4E35-BEDA-799FEABC310A}">
+    <dsp:sp modelId="{9925F6FA-F9CF-4CE2-995A-260A6F7B50E1}">
       <dsp:nvSpPr>
         <dsp:cNvPr id="0" name=""/>
         <dsp:cNvSpPr/>
       </dsp:nvSpPr>
       <dsp:spPr>
         <a:xfrm rot="17700000">
-          <a:off x="1204533" y="4569724"/>
-          <a:ext cx="1156092" cy="557424"/>
+          <a:off x="660867" y="5080992"/>
+          <a:ext cx="1157038" cy="557880"/>
         </a:xfrm>
         <a:prstGeom prst="rect">
           <a:avLst/>
@@ -5076,12 +5417,12 @@
         <a:fontRef idx="minor"/>
       </dsp:style>
       <dsp:txBody>
-        <a:bodyPr spcFirstLastPara="0" vert="horz" wrap="square" lIns="0" tIns="0" rIns="40640" bIns="0" numCol="1" spcCol="1270" anchor="ctr" anchorCtr="0">
+        <a:bodyPr spcFirstLastPara="0" vert="horz" wrap="square" lIns="0" tIns="0" rIns="45720" bIns="0" numCol="1" spcCol="1270" anchor="ctr" anchorCtr="0">
           <a:noAutofit/>
         </a:bodyPr>
         <a:lstStyle/>
         <a:p>
-          <a:pPr lvl="0" algn="r" defTabSz="711200">
+          <a:pPr lvl="0" algn="r" defTabSz="800100">
             <a:lnSpc>
               <a:spcPct val="90000"/>
             </a:lnSpc>
@@ -5093,26 +5434,26 @@
             </a:spcAft>
           </a:pPr>
           <a:r>
-            <a:rPr lang="en-GB" sz="1600" kern="1200" dirty="0" smtClean="0"/>
+            <a:rPr lang="en-GB" sz="1800" kern="1200" dirty="0" smtClean="0"/>
             <a:t>Filenames, index</a:t>
           </a:r>
-          <a:endParaRPr lang="en-GB" sz="1600" kern="1200" dirty="0"/>
+          <a:endParaRPr lang="en-GB" sz="1800" kern="1200" dirty="0"/>
         </a:p>
       </dsp:txBody>
       <dsp:txXfrm>
-        <a:off x="1204533" y="4569724"/>
-        <a:ext cx="1156092" cy="557424"/>
+        <a:off x="660867" y="5080992"/>
+        <a:ext cx="1157038" cy="557880"/>
       </dsp:txXfrm>
     </dsp:sp>
-    <dsp:sp modelId="{20FA75F1-CEEF-4297-BB56-8F68CDB693CE}">
+    <dsp:sp modelId="{7801E619-EC98-4026-8531-FD5BA6438C49}">
       <dsp:nvSpPr>
         <dsp:cNvPr id="0" name=""/>
         <dsp:cNvSpPr/>
       </dsp:nvSpPr>
       <dsp:spPr>
         <a:xfrm rot="17700000">
-          <a:off x="1928316" y="3016937"/>
-          <a:ext cx="1156092" cy="557424"/>
+          <a:off x="1385242" y="3526935"/>
+          <a:ext cx="1157038" cy="557880"/>
         </a:xfrm>
         <a:prstGeom prst="rect">
           <a:avLst/>
@@ -5136,15 +5477,15 @@
         <a:fontRef idx="minor"/>
       </dsp:style>
     </dsp:sp>
-    <dsp:sp modelId="{E80C5DA5-89D8-455E-A2A0-C6B709B878CE}">
+    <dsp:sp modelId="{ACF9F588-742E-45D3-A993-3053685F41F6}">
       <dsp:nvSpPr>
         <dsp:cNvPr id="0" name=""/>
         <dsp:cNvSpPr/>
       </dsp:nvSpPr>
       <dsp:spPr>
         <a:xfrm>
-          <a:off x="2504383" y="3793024"/>
-          <a:ext cx="558037" cy="558037"/>
+          <a:off x="1961780" y="4303657"/>
+          <a:ext cx="558493" cy="558493"/>
         </a:xfrm>
         <a:prstGeom prst="ellipse">
           <a:avLst/>
@@ -5186,15 +5527,15 @@
         </a:fontRef>
       </dsp:style>
     </dsp:sp>
-    <dsp:sp modelId="{92B0746D-0CB2-4048-8D10-9D48BDA0DB9E}">
+    <dsp:sp modelId="{0E12781F-B22A-4B0E-AF31-E4765DEB5A46}">
       <dsp:nvSpPr>
         <dsp:cNvPr id="0" name=""/>
         <dsp:cNvSpPr/>
       </dsp:nvSpPr>
       <dsp:spPr>
         <a:xfrm rot="17700000">
-          <a:off x="1843464" y="4569724"/>
-          <a:ext cx="1156092" cy="557424"/>
+          <a:off x="1300321" y="5080992"/>
+          <a:ext cx="1157038" cy="557880"/>
         </a:xfrm>
         <a:prstGeom prst="rect">
           <a:avLst/>
@@ -5218,12 +5559,12 @@
         <a:fontRef idx="minor"/>
       </dsp:style>
       <dsp:txBody>
-        <a:bodyPr spcFirstLastPara="0" vert="horz" wrap="square" lIns="0" tIns="0" rIns="40640" bIns="0" numCol="1" spcCol="1270" anchor="ctr" anchorCtr="0">
+        <a:bodyPr spcFirstLastPara="0" vert="horz" wrap="square" lIns="0" tIns="0" rIns="45720" bIns="0" numCol="1" spcCol="1270" anchor="ctr" anchorCtr="0">
           <a:noAutofit/>
         </a:bodyPr>
         <a:lstStyle/>
         <a:p>
-          <a:pPr lvl="0" algn="r" defTabSz="711200">
+          <a:pPr lvl="0" algn="r" defTabSz="800100">
             <a:lnSpc>
               <a:spcPct val="90000"/>
             </a:lnSpc>
@@ -5235,26 +5576,26 @@
             </a:spcAft>
           </a:pPr>
           <a:r>
-            <a:rPr lang="en-GB" sz="1600" kern="1200" dirty="0" smtClean="0"/>
+            <a:rPr lang="en-GB" sz="1800" kern="1200" dirty="0" smtClean="0"/>
             <a:t>Image array</a:t>
           </a:r>
-          <a:endParaRPr lang="en-GB" sz="1600" kern="1200" dirty="0"/>
+          <a:endParaRPr lang="en-GB" sz="1800" kern="1200" dirty="0"/>
         </a:p>
       </dsp:txBody>
       <dsp:txXfrm>
-        <a:off x="1843464" y="4569724"/>
-        <a:ext cx="1156092" cy="557424"/>
+        <a:off x="1300321" y="5080992"/>
+        <a:ext cx="1157038" cy="557880"/>
       </dsp:txXfrm>
     </dsp:sp>
-    <dsp:sp modelId="{8CB45ED5-BF85-4D66-AE26-8BFBBDFF06CF}">
+    <dsp:sp modelId="{DBFB4B7A-8773-4E4B-A4DC-F92CD537BF44}">
       <dsp:nvSpPr>
         <dsp:cNvPr id="0" name=""/>
         <dsp:cNvSpPr/>
       </dsp:nvSpPr>
       <dsp:spPr>
         <a:xfrm rot="17700000">
-          <a:off x="2567247" y="3016937"/>
-          <a:ext cx="1156092" cy="557424"/>
+          <a:off x="2024695" y="3526935"/>
+          <a:ext cx="1157038" cy="557880"/>
         </a:xfrm>
         <a:prstGeom prst="rect">
           <a:avLst/>
@@ -5278,15 +5619,15 @@
         <a:fontRef idx="minor"/>
       </dsp:style>
     </dsp:sp>
-    <dsp:sp modelId="{2BDA2006-D2CC-4271-8953-F05A714AC723}">
+    <dsp:sp modelId="{7DDDA715-336F-434C-AC1F-E091A43DA84D}">
       <dsp:nvSpPr>
         <dsp:cNvPr id="0" name=""/>
         <dsp:cNvSpPr/>
       </dsp:nvSpPr>
       <dsp:spPr>
         <a:xfrm>
-          <a:off x="3143400" y="3534500"/>
-          <a:ext cx="1075085" cy="1075085"/>
+          <a:off x="2601320" y="4044921"/>
+          <a:ext cx="1075964" cy="1075964"/>
         </a:xfrm>
         <a:prstGeom prst="donut">
           <a:avLst>
@@ -5330,15 +5671,15 @@
         </a:fontRef>
       </dsp:style>
     </dsp:sp>
-    <dsp:sp modelId="{4AAD5A86-CDC5-4210-91CD-D7F23622A03D}">
+    <dsp:sp modelId="{34249376-2C44-474E-9023-D720F8E6BC91}">
       <dsp:nvSpPr>
         <dsp:cNvPr id="0" name=""/>
         <dsp:cNvSpPr/>
       </dsp:nvSpPr>
       <dsp:spPr>
         <a:xfrm rot="17700000">
-          <a:off x="3435828" y="2460347"/>
-          <a:ext cx="1649752" cy="769292"/>
+          <a:off x="2782836" y="2693196"/>
+          <a:ext cx="2102125" cy="980237"/>
         </a:xfrm>
         <a:prstGeom prst="rect">
           <a:avLst/>
@@ -5392,19 +5733,19 @@
         </a:p>
       </dsp:txBody>
       <dsp:txXfrm>
-        <a:off x="3435828" y="2460347"/>
-        <a:ext cx="1649752" cy="769292"/>
+        <a:off x="2782836" y="2693196"/>
+        <a:ext cx="2102125" cy="980237"/>
       </dsp:txXfrm>
     </dsp:sp>
-    <dsp:sp modelId="{05E5D5B0-32D7-4D16-BF77-F9373A0B2F36}">
+    <dsp:sp modelId="{501CB302-E6A0-41DC-97F3-D8A6CE339D3A}">
       <dsp:nvSpPr>
         <dsp:cNvPr id="0" name=""/>
         <dsp:cNvSpPr/>
       </dsp:nvSpPr>
       <dsp:spPr>
         <a:xfrm>
-          <a:off x="4422415" y="3793024"/>
-          <a:ext cx="558037" cy="558037"/>
+          <a:off x="4071992" y="4303657"/>
+          <a:ext cx="558493" cy="558493"/>
         </a:xfrm>
         <a:prstGeom prst="ellipse">
           <a:avLst/>
@@ -5446,15 +5787,15 @@
         </a:fontRef>
       </dsp:style>
     </dsp:sp>
-    <dsp:sp modelId="{835E47B9-A54D-4E11-A093-8B3E340D9D00}">
+    <dsp:sp modelId="{6DFC4E55-C238-4CD3-AE39-A6B5B3B553C0}">
       <dsp:nvSpPr>
         <dsp:cNvPr id="0" name=""/>
         <dsp:cNvSpPr/>
       </dsp:nvSpPr>
       <dsp:spPr>
         <a:xfrm rot="17700000">
-          <a:off x="3761496" y="4569724"/>
-          <a:ext cx="1156092" cy="557424"/>
+          <a:off x="3410532" y="5080992"/>
+          <a:ext cx="1157038" cy="557880"/>
         </a:xfrm>
         <a:prstGeom prst="rect">
           <a:avLst/>
@@ -5478,12 +5819,12 @@
         <a:fontRef idx="minor"/>
       </dsp:style>
       <dsp:txBody>
-        <a:bodyPr spcFirstLastPara="0" vert="horz" wrap="square" lIns="0" tIns="0" rIns="40640" bIns="0" numCol="1" spcCol="1270" anchor="ctr" anchorCtr="0">
+        <a:bodyPr spcFirstLastPara="0" vert="horz" wrap="square" lIns="0" tIns="0" rIns="45720" bIns="0" numCol="1" spcCol="1270" anchor="ctr" anchorCtr="0">
           <a:noAutofit/>
         </a:bodyPr>
         <a:lstStyle/>
         <a:p>
-          <a:pPr lvl="0" algn="r" defTabSz="711200">
+          <a:pPr lvl="0" algn="r" defTabSz="800100">
             <a:lnSpc>
               <a:spcPct val="90000"/>
             </a:lnSpc>
@@ -5495,26 +5836,26 @@
             </a:spcAft>
           </a:pPr>
           <a:r>
-            <a:rPr lang="en-GB" sz="1600" kern="1200" dirty="0" smtClean="0"/>
+            <a:rPr lang="en-GB" sz="1800" kern="1200" dirty="0" smtClean="0"/>
             <a:t>Image array</a:t>
           </a:r>
-          <a:endParaRPr lang="en-GB" sz="1600" kern="1200" dirty="0"/>
+          <a:endParaRPr lang="en-GB" sz="1800" kern="1200" dirty="0"/>
         </a:p>
       </dsp:txBody>
       <dsp:txXfrm>
-        <a:off x="3761496" y="4569724"/>
-        <a:ext cx="1156092" cy="557424"/>
+        <a:off x="3410532" y="5080992"/>
+        <a:ext cx="1157038" cy="557880"/>
       </dsp:txXfrm>
     </dsp:sp>
-    <dsp:sp modelId="{D18F9E56-98BB-48DC-9544-4B218D91759F}">
+    <dsp:sp modelId="{FDFD8208-5EB0-4759-916D-57FFCDF8C9A8}">
       <dsp:nvSpPr>
         <dsp:cNvPr id="0" name=""/>
         <dsp:cNvSpPr/>
       </dsp:nvSpPr>
       <dsp:spPr>
         <a:xfrm rot="17700000">
-          <a:off x="4485279" y="3016937"/>
-          <a:ext cx="1156092" cy="557424"/>
+          <a:off x="4134907" y="3526935"/>
+          <a:ext cx="1157038" cy="557880"/>
         </a:xfrm>
         <a:prstGeom prst="rect">
           <a:avLst/>
@@ -5538,15 +5879,15 @@
         <a:fontRef idx="minor"/>
       </dsp:style>
     </dsp:sp>
-    <dsp:sp modelId="{28532D80-2937-4CD0-9269-CC53355394C3}">
+    <dsp:sp modelId="{A9FBE3EB-C760-4D38-99D1-941341088C92}">
       <dsp:nvSpPr>
         <dsp:cNvPr id="0" name=""/>
         <dsp:cNvSpPr/>
       </dsp:nvSpPr>
       <dsp:spPr>
         <a:xfrm>
-          <a:off x="5061346" y="3793024"/>
-          <a:ext cx="558037" cy="558037"/>
+          <a:off x="4711445" y="4303657"/>
+          <a:ext cx="558493" cy="558493"/>
         </a:xfrm>
         <a:prstGeom prst="ellipse">
           <a:avLst/>
@@ -5588,15 +5929,15 @@
         </a:fontRef>
       </dsp:style>
     </dsp:sp>
-    <dsp:sp modelId="{D4676513-3691-439E-98F5-27DADB37ED56}">
+    <dsp:sp modelId="{FAA2B098-51D4-4067-887A-C83C1261A51C}">
       <dsp:nvSpPr>
         <dsp:cNvPr id="0" name=""/>
         <dsp:cNvSpPr/>
       </dsp:nvSpPr>
       <dsp:spPr>
         <a:xfrm rot="17700000">
-          <a:off x="4400427" y="4569724"/>
-          <a:ext cx="1156092" cy="557424"/>
+          <a:off x="4049985" y="5080992"/>
+          <a:ext cx="1157038" cy="557880"/>
         </a:xfrm>
         <a:prstGeom prst="rect">
           <a:avLst/>
@@ -5620,12 +5961,12 @@
         <a:fontRef idx="minor"/>
       </dsp:style>
       <dsp:txBody>
-        <a:bodyPr spcFirstLastPara="0" vert="horz" wrap="square" lIns="0" tIns="0" rIns="40640" bIns="0" numCol="1" spcCol="1270" anchor="ctr" anchorCtr="0">
+        <a:bodyPr spcFirstLastPara="0" vert="horz" wrap="square" lIns="0" tIns="0" rIns="45720" bIns="0" numCol="1" spcCol="1270" anchor="ctr" anchorCtr="0">
           <a:noAutofit/>
         </a:bodyPr>
         <a:lstStyle/>
         <a:p>
-          <a:pPr lvl="0" algn="r" defTabSz="711200">
+          <a:pPr lvl="0" algn="r" defTabSz="800100">
             <a:lnSpc>
               <a:spcPct val="90000"/>
             </a:lnSpc>
@@ -5637,26 +5978,26 @@
             </a:spcAft>
           </a:pPr>
           <a:r>
-            <a:rPr lang="en-GB" sz="1600" kern="1200" dirty="0" smtClean="0"/>
+            <a:rPr lang="en-GB" sz="1800" kern="1200" dirty="0" smtClean="0"/>
             <a:t>Image array</a:t>
           </a:r>
-          <a:endParaRPr lang="en-GB" sz="1600" kern="1200" dirty="0"/>
+          <a:endParaRPr lang="en-GB" sz="1800" kern="1200" dirty="0"/>
         </a:p>
       </dsp:txBody>
       <dsp:txXfrm>
-        <a:off x="4400427" y="4569724"/>
-        <a:ext cx="1156092" cy="557424"/>
+        <a:off x="4049985" y="5080992"/>
+        <a:ext cx="1157038" cy="557880"/>
       </dsp:txXfrm>
     </dsp:sp>
-    <dsp:sp modelId="{1D0D467E-1E51-452B-9375-43A2E677CC97}">
+    <dsp:sp modelId="{651100C1-FA72-4A1B-B8E0-6AE638CD0874}">
       <dsp:nvSpPr>
         <dsp:cNvPr id="0" name=""/>
         <dsp:cNvSpPr/>
       </dsp:nvSpPr>
       <dsp:spPr>
         <a:xfrm rot="17700000">
-          <a:off x="5124209" y="3016937"/>
-          <a:ext cx="1156092" cy="557424"/>
+          <a:off x="4774360" y="3526935"/>
+          <a:ext cx="1157038" cy="557880"/>
         </a:xfrm>
         <a:prstGeom prst="rect">
           <a:avLst/>
@@ -5680,15 +6021,15 @@
         <a:fontRef idx="minor"/>
       </dsp:style>
     </dsp:sp>
-    <dsp:sp modelId="{A8EA4607-0075-4E8A-9C69-5825B2E3EE87}">
+    <dsp:sp modelId="{5EBE810A-7891-4C02-9C0E-F161AE20AC2F}">
       <dsp:nvSpPr>
         <dsp:cNvPr id="0" name=""/>
         <dsp:cNvSpPr/>
       </dsp:nvSpPr>
       <dsp:spPr>
         <a:xfrm>
-          <a:off x="5700362" y="3534500"/>
-          <a:ext cx="1075085" cy="1075085"/>
+          <a:off x="5464402" y="3991885"/>
+          <a:ext cx="1075964" cy="1075964"/>
         </a:xfrm>
         <a:prstGeom prst="donut">
           <a:avLst>
@@ -5732,15 +6073,15 @@
         </a:fontRef>
       </dsp:style>
     </dsp:sp>
-    <dsp:sp modelId="{58AA0D98-BF47-4D33-BEE8-77888014D308}">
+    <dsp:sp modelId="{FB72DEA4-537A-4147-8D56-48A18869250D}">
       <dsp:nvSpPr>
         <dsp:cNvPr id="0" name=""/>
         <dsp:cNvSpPr/>
       </dsp:nvSpPr>
       <dsp:spPr>
         <a:xfrm rot="17700000">
-          <a:off x="6009700" y="2400948"/>
-          <a:ext cx="1675977" cy="781521"/>
+          <a:off x="5545753" y="2472172"/>
+          <a:ext cx="2135552" cy="995824"/>
         </a:xfrm>
         <a:prstGeom prst="rect">
           <a:avLst/>
@@ -5794,19 +6135,19 @@
         </a:p>
       </dsp:txBody>
       <dsp:txXfrm>
-        <a:off x="6009700" y="2400948"/>
-        <a:ext cx="1675977" cy="781521"/>
+        <a:off x="5545753" y="2472172"/>
+        <a:ext cx="2135552" cy="995824"/>
       </dsp:txXfrm>
     </dsp:sp>
-    <dsp:sp modelId="{215553BB-EC1A-429F-860C-8D73872F200B}">
+    <dsp:sp modelId="{191086B9-3E46-4C18-8EB5-42DC545151A6}">
       <dsp:nvSpPr>
         <dsp:cNvPr id="0" name=""/>
         <dsp:cNvSpPr/>
       </dsp:nvSpPr>
       <dsp:spPr>
         <a:xfrm>
-          <a:off x="6990461" y="3793024"/>
-          <a:ext cx="558037" cy="558037"/>
+          <a:off x="6835783" y="4303657"/>
+          <a:ext cx="558493" cy="558493"/>
         </a:xfrm>
         <a:prstGeom prst="ellipse">
           <a:avLst/>
@@ -5848,15 +6189,15 @@
         </a:fontRef>
       </dsp:style>
     </dsp:sp>
-    <dsp:sp modelId="{0CF9C00C-2488-4AAA-83BF-6186357AF6E3}">
+    <dsp:sp modelId="{E339CC44-0883-4D04-952D-E92DDAED2D8E}">
       <dsp:nvSpPr>
         <dsp:cNvPr id="0" name=""/>
         <dsp:cNvSpPr/>
       </dsp:nvSpPr>
       <dsp:spPr>
         <a:xfrm rot="17700000">
-          <a:off x="6329542" y="4569724"/>
-          <a:ext cx="1156092" cy="557424"/>
+          <a:off x="6174324" y="5080992"/>
+          <a:ext cx="1157038" cy="557880"/>
         </a:xfrm>
         <a:prstGeom prst="rect">
           <a:avLst/>
@@ -5880,12 +6221,12 @@
         <a:fontRef idx="minor"/>
       </dsp:style>
       <dsp:txBody>
-        <a:bodyPr spcFirstLastPara="0" vert="horz" wrap="square" lIns="0" tIns="0" rIns="40640" bIns="0" numCol="1" spcCol="1270" anchor="ctr" anchorCtr="0">
+        <a:bodyPr spcFirstLastPara="0" vert="horz" wrap="square" lIns="0" tIns="0" rIns="45720" bIns="0" numCol="1" spcCol="1270" anchor="ctr" anchorCtr="0">
           <a:noAutofit/>
         </a:bodyPr>
         <a:lstStyle/>
         <a:p>
-          <a:pPr lvl="0" algn="r" defTabSz="711200">
+          <a:pPr lvl="0" algn="r" defTabSz="800100">
             <a:lnSpc>
               <a:spcPct val="90000"/>
             </a:lnSpc>
@@ -5897,26 +6238,26 @@
             </a:spcAft>
           </a:pPr>
           <a:r>
-            <a:rPr lang="en-GB" sz="1600" kern="1200" smtClean="0"/>
+            <a:rPr lang="en-GB" sz="1800" kern="1200" dirty="0" smtClean="0"/>
             <a:t>Image array</a:t>
           </a:r>
-          <a:endParaRPr lang="en-GB" sz="1600" kern="1200" dirty="0"/>
+          <a:endParaRPr lang="en-GB" sz="1800" kern="1200" dirty="0"/>
         </a:p>
       </dsp:txBody>
       <dsp:txXfrm>
-        <a:off x="6329542" y="4569724"/>
-        <a:ext cx="1156092" cy="557424"/>
+        <a:off x="6174324" y="5080992"/>
+        <a:ext cx="1157038" cy="557880"/>
       </dsp:txXfrm>
     </dsp:sp>
-    <dsp:sp modelId="{87F60D4E-EBBB-4910-BD03-A0D431985787}">
+    <dsp:sp modelId="{BE60AF2B-10F6-41EB-9B3D-C968B3B63B02}">
       <dsp:nvSpPr>
         <dsp:cNvPr id="0" name=""/>
         <dsp:cNvSpPr/>
       </dsp:nvSpPr>
       <dsp:spPr>
         <a:xfrm rot="17700000">
-          <a:off x="7053325" y="3016937"/>
-          <a:ext cx="1156092" cy="557424"/>
+          <a:off x="6898698" y="3526935"/>
+          <a:ext cx="1157038" cy="557880"/>
         </a:xfrm>
         <a:prstGeom prst="rect">
           <a:avLst/>
@@ -5940,15 +6281,15 @@
         <a:fontRef idx="minor"/>
       </dsp:style>
     </dsp:sp>
-    <dsp:sp modelId="{2DE2F1A0-42C1-4BD6-9361-9BC55B0CAB80}">
+    <dsp:sp modelId="{7AFBBAFC-96F3-4846-8EE4-195E86EB71DA}">
       <dsp:nvSpPr>
         <dsp:cNvPr id="0" name=""/>
         <dsp:cNvSpPr/>
       </dsp:nvSpPr>
       <dsp:spPr>
         <a:xfrm>
-          <a:off x="7629392" y="3793024"/>
-          <a:ext cx="558037" cy="558037"/>
+          <a:off x="7475237" y="4303657"/>
+          <a:ext cx="558493" cy="558493"/>
         </a:xfrm>
         <a:prstGeom prst="ellipse">
           <a:avLst/>
@@ -5990,15 +6331,15 @@
         </a:fontRef>
       </dsp:style>
     </dsp:sp>
-    <dsp:sp modelId="{5FC37EE6-E8E2-49C5-AD86-1DE7CF0E23C2}">
+    <dsp:sp modelId="{E19C2DC8-F392-499F-A712-A44537B3FC02}">
       <dsp:nvSpPr>
         <dsp:cNvPr id="0" name=""/>
         <dsp:cNvSpPr/>
       </dsp:nvSpPr>
       <dsp:spPr>
         <a:xfrm rot="17700000">
-          <a:off x="6968473" y="4569724"/>
-          <a:ext cx="1156092" cy="557424"/>
+          <a:off x="6813777" y="5080992"/>
+          <a:ext cx="1157038" cy="557880"/>
         </a:xfrm>
         <a:prstGeom prst="rect">
           <a:avLst/>
@@ -6022,12 +6363,12 @@
         <a:fontRef idx="minor"/>
       </dsp:style>
       <dsp:txBody>
-        <a:bodyPr spcFirstLastPara="0" vert="horz" wrap="square" lIns="0" tIns="0" rIns="40640" bIns="0" numCol="1" spcCol="1270" anchor="ctr" anchorCtr="0">
+        <a:bodyPr spcFirstLastPara="0" vert="horz" wrap="square" lIns="0" tIns="0" rIns="45720" bIns="0" numCol="1" spcCol="1270" anchor="ctr" anchorCtr="0">
           <a:noAutofit/>
         </a:bodyPr>
         <a:lstStyle/>
         <a:p>
-          <a:pPr lvl="0" algn="r" defTabSz="711200">
+          <a:pPr lvl="0" algn="r" defTabSz="800100">
             <a:lnSpc>
               <a:spcPct val="90000"/>
             </a:lnSpc>
@@ -6039,26 +6380,26 @@
             </a:spcAft>
           </a:pPr>
           <a:r>
-            <a:rPr lang="en-GB" sz="1600" kern="1200" dirty="0" smtClean="0"/>
-            <a:t>Output image</a:t>
+            <a:rPr lang="en-GB" sz="1800" kern="1200" smtClean="0"/>
+            <a:t>Image array</a:t>
           </a:r>
-          <a:endParaRPr lang="en-GB" sz="1600" kern="1200" dirty="0"/>
+          <a:endParaRPr lang="en-GB" sz="1800" kern="1200" dirty="0"/>
         </a:p>
       </dsp:txBody>
       <dsp:txXfrm>
-        <a:off x="6968473" y="4569724"/>
-        <a:ext cx="1156092" cy="557424"/>
+        <a:off x="6813777" y="5080992"/>
+        <a:ext cx="1157038" cy="557880"/>
       </dsp:txXfrm>
     </dsp:sp>
-    <dsp:sp modelId="{AA363555-0838-4968-9137-0E047988D5E1}">
+    <dsp:sp modelId="{1ECD68C5-1D7A-424E-8665-D233608F296E}">
       <dsp:nvSpPr>
         <dsp:cNvPr id="0" name=""/>
         <dsp:cNvSpPr/>
       </dsp:nvSpPr>
       <dsp:spPr>
         <a:xfrm rot="17700000">
-          <a:off x="7692255" y="3016937"/>
-          <a:ext cx="1156092" cy="557424"/>
+          <a:off x="7538152" y="3526935"/>
+          <a:ext cx="1157038" cy="557880"/>
         </a:xfrm>
         <a:prstGeom prst="rect">
           <a:avLst/>
@@ -6082,15 +6423,15 @@
         <a:fontRef idx="minor"/>
       </dsp:style>
     </dsp:sp>
-    <dsp:sp modelId="{1E15F4E8-0DC5-49EB-A1DB-E5E559965511}">
+    <dsp:sp modelId="{3648EABA-D3F0-4218-B78F-A99C55BA2041}">
       <dsp:nvSpPr>
         <dsp:cNvPr id="0" name=""/>
         <dsp:cNvSpPr/>
       </dsp:nvSpPr>
       <dsp:spPr>
         <a:xfrm>
-          <a:off x="8268409" y="3534500"/>
-          <a:ext cx="1075085" cy="1075085"/>
+          <a:off x="8114776" y="4044921"/>
+          <a:ext cx="1075964" cy="1075964"/>
         </a:xfrm>
         <a:prstGeom prst="donut">
           <a:avLst>
@@ -6134,15 +6475,429 @@
         </a:fontRef>
       </dsp:style>
     </dsp:sp>
-    <dsp:sp modelId="{8AF272FB-F19E-4C5C-A4A0-95CF2BC96881}">
+    <dsp:sp modelId="{B970DA31-055B-43B9-A012-D4169B3AF7EF}">
       <dsp:nvSpPr>
         <dsp:cNvPr id="0" name=""/>
         <dsp:cNvSpPr/>
       </dsp:nvSpPr>
       <dsp:spPr>
         <a:xfrm rot="17700000">
-          <a:off x="8628127" y="2468306"/>
-          <a:ext cx="1565545" cy="730026"/>
+          <a:off x="8411314" y="2914861"/>
+          <a:ext cx="1731433" cy="807380"/>
+        </a:xfrm>
+        <a:prstGeom prst="rect">
+          <a:avLst/>
+        </a:prstGeom>
+        <a:noFill/>
+        <a:ln>
+          <a:noFill/>
+        </a:ln>
+        <a:effectLst/>
+      </dsp:spPr>
+      <dsp:style>
+        <a:lnRef idx="0">
+          <a:scrgbClr r="0" g="0" b="0"/>
+        </a:lnRef>
+        <a:fillRef idx="0">
+          <a:scrgbClr r="0" g="0" b="0"/>
+        </a:fillRef>
+        <a:effectRef idx="0">
+          <a:scrgbClr r="0" g="0" b="0"/>
+        </a:effectRef>
+        <a:fontRef idx="minor"/>
+      </dsp:style>
+      <dsp:txBody>
+        <a:bodyPr spcFirstLastPara="0" vert="horz" wrap="square" lIns="50800" tIns="0" rIns="0" bIns="0" numCol="1" spcCol="1270" anchor="ctr" anchorCtr="0">
+          <a:noAutofit/>
+        </a:bodyPr>
+        <a:lstStyle/>
+        <a:p>
+          <a:pPr lvl="0" algn="l" defTabSz="889000">
+            <a:lnSpc>
+              <a:spcPct val="90000"/>
+            </a:lnSpc>
+            <a:spcBef>
+              <a:spcPct val="0"/>
+            </a:spcBef>
+            <a:spcAft>
+              <a:spcPct val="35000"/>
+            </a:spcAft>
+          </a:pPr>
+          <a:r>
+            <a:rPr lang="en-GB" sz="2000" b="1" kern="1200" dirty="0" err="1" smtClean="0">
+              <a:latin typeface="Courier New" panose="02070309020205020404" pitchFamily="49" charset="0"/>
+              <a:cs typeface="Courier New" panose="02070309020205020404" pitchFamily="49" charset="0"/>
+            </a:rPr>
+            <a:t>detectDifferences</a:t>
+          </a:r>
+          <a:endParaRPr lang="en-GB" sz="2000" b="1" kern="1200" dirty="0">
+            <a:latin typeface="Courier New" panose="02070309020205020404" pitchFamily="49" charset="0"/>
+            <a:cs typeface="Courier New" panose="02070309020205020404" pitchFamily="49" charset="0"/>
+          </a:endParaRPr>
+        </a:p>
+      </dsp:txBody>
+      <dsp:txXfrm>
+        <a:off x="8411314" y="2914861"/>
+        <a:ext cx="1731433" cy="807380"/>
+      </dsp:txXfrm>
+    </dsp:sp>
+    <dsp:sp modelId="{DCE6F5F6-DE07-45DE-B29E-48C5FFF53841}">
+      <dsp:nvSpPr>
+        <dsp:cNvPr id="0" name=""/>
+        <dsp:cNvSpPr/>
+      </dsp:nvSpPr>
+      <dsp:spPr>
+        <a:xfrm>
+          <a:off x="9428787" y="4303657"/>
+          <a:ext cx="558493" cy="558493"/>
+        </a:xfrm>
+        <a:prstGeom prst="ellipse">
+          <a:avLst/>
+        </a:prstGeom>
+        <a:solidFill>
+          <a:schemeClr val="accent4">
+            <a:hueOff val="8910593"/>
+            <a:satOff val="-41115"/>
+            <a:lumOff val="1513"/>
+            <a:alphaOff val="0"/>
+          </a:schemeClr>
+        </a:solidFill>
+        <a:ln w="12700" cap="flat" cmpd="sng" algn="ctr">
+          <a:solidFill>
+            <a:schemeClr val="lt1">
+              <a:hueOff val="0"/>
+              <a:satOff val="0"/>
+              <a:lumOff val="0"/>
+              <a:alphaOff val="0"/>
+            </a:schemeClr>
+          </a:solidFill>
+          <a:prstDash val="solid"/>
+          <a:miter lim="800000"/>
+        </a:ln>
+        <a:effectLst/>
+      </dsp:spPr>
+      <dsp:style>
+        <a:lnRef idx="2">
+          <a:scrgbClr r="0" g="0" b="0"/>
+        </a:lnRef>
+        <a:fillRef idx="1">
+          <a:scrgbClr r="0" g="0" b="0"/>
+        </a:fillRef>
+        <a:effectRef idx="0">
+          <a:scrgbClr r="0" g="0" b="0"/>
+        </a:effectRef>
+        <a:fontRef idx="minor">
+          <a:schemeClr val="lt1"/>
+        </a:fontRef>
+      </dsp:style>
+    </dsp:sp>
+    <dsp:sp modelId="{54775A38-A56D-4BB8-977E-30F8C06AD61A}">
+      <dsp:nvSpPr>
+        <dsp:cNvPr id="0" name=""/>
+        <dsp:cNvSpPr/>
+      </dsp:nvSpPr>
+      <dsp:spPr>
+        <a:xfrm rot="17700000">
+          <a:off x="8767327" y="5080992"/>
+          <a:ext cx="1157038" cy="557880"/>
+        </a:xfrm>
+        <a:prstGeom prst="rect">
+          <a:avLst/>
+        </a:prstGeom>
+        <a:noFill/>
+        <a:ln>
+          <a:noFill/>
+        </a:ln>
+        <a:effectLst/>
+      </dsp:spPr>
+      <dsp:style>
+        <a:lnRef idx="0">
+          <a:scrgbClr r="0" g="0" b="0"/>
+        </a:lnRef>
+        <a:fillRef idx="0">
+          <a:scrgbClr r="0" g="0" b="0"/>
+        </a:fillRef>
+        <a:effectRef idx="0">
+          <a:scrgbClr r="0" g="0" b="0"/>
+        </a:effectRef>
+        <a:fontRef idx="minor"/>
+      </dsp:style>
+      <dsp:txBody>
+        <a:bodyPr spcFirstLastPara="0" vert="horz" wrap="square" lIns="0" tIns="0" rIns="45720" bIns="0" numCol="1" spcCol="1270" anchor="ctr" anchorCtr="0">
+          <a:noAutofit/>
+        </a:bodyPr>
+        <a:lstStyle/>
+        <a:p>
+          <a:pPr lvl="0" algn="r" defTabSz="800100">
+            <a:lnSpc>
+              <a:spcPct val="90000"/>
+            </a:lnSpc>
+            <a:spcBef>
+              <a:spcPct val="0"/>
+            </a:spcBef>
+            <a:spcAft>
+              <a:spcPct val="35000"/>
+            </a:spcAft>
+          </a:pPr>
+          <a:r>
+            <a:rPr lang="en-GB" sz="1800" kern="1200" dirty="0" smtClean="0"/>
+            <a:t>Image array</a:t>
+          </a:r>
+          <a:endParaRPr lang="en-GB" sz="1800" kern="1200" dirty="0"/>
+        </a:p>
+      </dsp:txBody>
+      <dsp:txXfrm>
+        <a:off x="8767327" y="5080992"/>
+        <a:ext cx="1157038" cy="557880"/>
+      </dsp:txXfrm>
+    </dsp:sp>
+    <dsp:sp modelId="{FEF9792E-E78E-483F-8C7A-472BE0A5D023}">
+      <dsp:nvSpPr>
+        <dsp:cNvPr id="0" name=""/>
+        <dsp:cNvSpPr/>
+      </dsp:nvSpPr>
+      <dsp:spPr>
+        <a:xfrm rot="17700000">
+          <a:off x="9491702" y="3526935"/>
+          <a:ext cx="1157038" cy="557880"/>
+        </a:xfrm>
+        <a:prstGeom prst="rect">
+          <a:avLst/>
+        </a:prstGeom>
+        <a:noFill/>
+        <a:ln>
+          <a:noFill/>
+        </a:ln>
+        <a:effectLst/>
+      </dsp:spPr>
+      <dsp:style>
+        <a:lnRef idx="0">
+          <a:scrgbClr r="0" g="0" b="0"/>
+        </a:lnRef>
+        <a:fillRef idx="0">
+          <a:scrgbClr r="0" g="0" b="0"/>
+        </a:fillRef>
+        <a:effectRef idx="0">
+          <a:scrgbClr r="0" g="0" b="0"/>
+        </a:effectRef>
+        <a:fontRef idx="minor"/>
+      </dsp:style>
+    </dsp:sp>
+    <dsp:sp modelId="{0F4919A2-7B5F-45D1-8B9D-93D9E054AC79}">
+      <dsp:nvSpPr>
+        <dsp:cNvPr id="0" name=""/>
+        <dsp:cNvSpPr/>
+      </dsp:nvSpPr>
+      <dsp:spPr>
+        <a:xfrm>
+          <a:off x="10173308" y="4308452"/>
+          <a:ext cx="558493" cy="558493"/>
+        </a:xfrm>
+        <a:prstGeom prst="ellipse">
+          <a:avLst/>
+        </a:prstGeom>
+        <a:solidFill>
+          <a:schemeClr val="accent4">
+            <a:hueOff val="10395692"/>
+            <a:satOff val="-47968"/>
+            <a:lumOff val="1765"/>
+            <a:alphaOff val="0"/>
+          </a:schemeClr>
+        </a:solidFill>
+        <a:ln w="12700" cap="flat" cmpd="sng" algn="ctr">
+          <a:solidFill>
+            <a:schemeClr val="lt1">
+              <a:hueOff val="0"/>
+              <a:satOff val="0"/>
+              <a:lumOff val="0"/>
+              <a:alphaOff val="0"/>
+            </a:schemeClr>
+          </a:solidFill>
+          <a:prstDash val="solid"/>
+          <a:miter lim="800000"/>
+        </a:ln>
+        <a:effectLst/>
+      </dsp:spPr>
+      <dsp:style>
+        <a:lnRef idx="2">
+          <a:scrgbClr r="0" g="0" b="0"/>
+        </a:lnRef>
+        <a:fillRef idx="1">
+          <a:scrgbClr r="0" g="0" b="0"/>
+        </a:fillRef>
+        <a:effectRef idx="0">
+          <a:scrgbClr r="0" g="0" b="0"/>
+        </a:effectRef>
+        <a:fontRef idx="minor">
+          <a:schemeClr val="lt1"/>
+        </a:fontRef>
+      </dsp:style>
+    </dsp:sp>
+    <dsp:sp modelId="{19662F01-965A-4DB7-B190-F79AB48F5357}">
+      <dsp:nvSpPr>
+        <dsp:cNvPr id="0" name=""/>
+        <dsp:cNvSpPr/>
+      </dsp:nvSpPr>
+      <dsp:spPr>
+        <a:xfrm rot="17700000">
+          <a:off x="9386077" y="5073955"/>
+          <a:ext cx="1313330" cy="695846"/>
+        </a:xfrm>
+        <a:prstGeom prst="rect">
+          <a:avLst/>
+        </a:prstGeom>
+        <a:noFill/>
+        <a:ln>
+          <a:noFill/>
+        </a:ln>
+        <a:effectLst/>
+      </dsp:spPr>
+      <dsp:style>
+        <a:lnRef idx="0">
+          <a:scrgbClr r="0" g="0" b="0"/>
+        </a:lnRef>
+        <a:fillRef idx="0">
+          <a:scrgbClr r="0" g="0" b="0"/>
+        </a:fillRef>
+        <a:effectRef idx="0">
+          <a:scrgbClr r="0" g="0" b="0"/>
+        </a:effectRef>
+        <a:fontRef idx="minor"/>
+      </dsp:style>
+      <dsp:txBody>
+        <a:bodyPr spcFirstLastPara="0" vert="horz" wrap="square" lIns="0" tIns="0" rIns="40640" bIns="0" numCol="1" spcCol="1270" anchor="ctr" anchorCtr="0">
+          <a:noAutofit/>
+        </a:bodyPr>
+        <a:lstStyle/>
+        <a:p>
+          <a:pPr lvl="0" algn="r" defTabSz="711200">
+            <a:lnSpc>
+              <a:spcPct val="90000"/>
+            </a:lnSpc>
+            <a:spcBef>
+              <a:spcPct val="0"/>
+            </a:spcBef>
+            <a:spcAft>
+              <a:spcPct val="35000"/>
+            </a:spcAft>
+          </a:pPr>
+          <a:r>
+            <a:rPr lang="en-GB" sz="1600" kern="1200" dirty="0" smtClean="0"/>
+            <a:t>Output image</a:t>
+          </a:r>
+          <a:endParaRPr lang="en-GB" sz="1600" kern="1200" dirty="0"/>
+        </a:p>
+      </dsp:txBody>
+      <dsp:txXfrm>
+        <a:off x="9386077" y="5073955"/>
+        <a:ext cx="1313330" cy="695846"/>
+      </dsp:txXfrm>
+    </dsp:sp>
+    <dsp:sp modelId="{3693A17A-5E5D-43EE-A35A-97A3BAC021D3}">
+      <dsp:nvSpPr>
+        <dsp:cNvPr id="0" name=""/>
+        <dsp:cNvSpPr/>
+      </dsp:nvSpPr>
+      <dsp:spPr>
+        <a:xfrm rot="17700000">
+          <a:off x="10226701" y="3426957"/>
+          <a:ext cx="1157038" cy="557880"/>
+        </a:xfrm>
+        <a:prstGeom prst="rect">
+          <a:avLst/>
+        </a:prstGeom>
+        <a:noFill/>
+        <a:ln>
+          <a:noFill/>
+        </a:ln>
+        <a:effectLst/>
+      </dsp:spPr>
+      <dsp:style>
+        <a:lnRef idx="0">
+          <a:scrgbClr r="0" g="0" b="0"/>
+        </a:lnRef>
+        <a:fillRef idx="0">
+          <a:scrgbClr r="0" g="0" b="0"/>
+        </a:fillRef>
+        <a:effectRef idx="0">
+          <a:scrgbClr r="0" g="0" b="0"/>
+        </a:effectRef>
+        <a:fontRef idx="minor"/>
+      </dsp:style>
+    </dsp:sp>
+  </dsp:spTree>
+</dsp:drawing>
+</file>
+
+<file path=ppt/diagrams/drawing3.xml><?xml version="1.0" encoding="utf-8"?>
+<dsp:drawing xmlns:dgm="http://schemas.openxmlformats.org/drawingml/2006/diagram" xmlns:dsp="http://schemas.microsoft.com/office/drawing/2008/diagram" xmlns:a="http://schemas.openxmlformats.org/drawingml/2006/main">
+  <dsp:spTree>
+    <dsp:nvGrpSpPr>
+      <dsp:cNvPr id="0" name=""/>
+      <dsp:cNvGrpSpPr/>
+    </dsp:nvGrpSpPr>
+    <dsp:grpSpPr/>
+    <dsp:sp modelId="{33EA8CD0-4107-414E-85B3-A6B3CAFE3303}">
+      <dsp:nvSpPr>
+        <dsp:cNvPr id="0" name=""/>
+        <dsp:cNvSpPr/>
+      </dsp:nvSpPr>
+      <dsp:spPr>
+        <a:xfrm>
+          <a:off x="267928" y="2634982"/>
+          <a:ext cx="1173740" cy="1173740"/>
+        </a:xfrm>
+        <a:prstGeom prst="donut">
+          <a:avLst>
+            <a:gd name="adj" fmla="val 20000"/>
+          </a:avLst>
+        </a:prstGeom>
+        <a:solidFill>
+          <a:schemeClr val="accent3">
+            <a:hueOff val="0"/>
+            <a:satOff val="0"/>
+            <a:lumOff val="0"/>
+            <a:alphaOff val="0"/>
+          </a:schemeClr>
+        </a:solidFill>
+        <a:ln w="12700" cap="flat" cmpd="sng" algn="ctr">
+          <a:solidFill>
+            <a:schemeClr val="lt1">
+              <a:hueOff val="0"/>
+              <a:satOff val="0"/>
+              <a:lumOff val="0"/>
+              <a:alphaOff val="0"/>
+            </a:schemeClr>
+          </a:solidFill>
+          <a:prstDash val="solid"/>
+          <a:miter lim="800000"/>
+        </a:ln>
+        <a:effectLst/>
+      </dsp:spPr>
+      <dsp:style>
+        <a:lnRef idx="2">
+          <a:scrgbClr r="0" g="0" b="0"/>
+        </a:lnRef>
+        <a:fillRef idx="1">
+          <a:scrgbClr r="0" g="0" b="0"/>
+        </a:fillRef>
+        <a:effectRef idx="0">
+          <a:scrgbClr r="0" g="0" b="0"/>
+        </a:effectRef>
+        <a:fontRef idx="minor">
+          <a:schemeClr val="lt1"/>
+        </a:fontRef>
+      </dsp:style>
+    </dsp:sp>
+    <dsp:sp modelId="{138D8308-1825-4093-AA5E-7A021D04E4DE}">
+      <dsp:nvSpPr>
+        <dsp:cNvPr id="0" name=""/>
+        <dsp:cNvSpPr/>
+      </dsp:nvSpPr>
+      <dsp:spPr>
+        <a:xfrm rot="17700000">
+          <a:off x="445990" y="1190516"/>
+          <a:ext cx="2176634" cy="1014981"/>
         </a:xfrm>
         <a:prstGeom prst="rect">
           <a:avLst/>
@@ -6196,28 +6951,28 @@
         </a:p>
       </dsp:txBody>
       <dsp:txXfrm>
-        <a:off x="8628127" y="2468306"/>
-        <a:ext cx="1565545" cy="730026"/>
+        <a:off x="445990" y="1190516"/>
+        <a:ext cx="2176634" cy="1014981"/>
       </dsp:txXfrm>
     </dsp:sp>
-    <dsp:sp modelId="{AF7FF73C-E897-47AF-A655-5F2431E1FA41}">
+    <dsp:sp modelId="{DBF3E5A5-B586-4C1B-93A4-4D45FA876099}">
       <dsp:nvSpPr>
         <dsp:cNvPr id="0" name=""/>
         <dsp:cNvSpPr/>
       </dsp:nvSpPr>
       <dsp:spPr>
         <a:xfrm>
-          <a:off x="9511836" y="3793024"/>
-          <a:ext cx="558037" cy="558037"/>
+          <a:off x="1556305" y="2945810"/>
+          <a:ext cx="609245" cy="609245"/>
         </a:xfrm>
         <a:prstGeom prst="ellipse">
           <a:avLst/>
         </a:prstGeom>
         <a:solidFill>
           <a:schemeClr val="accent4">
-            <a:hueOff val="8910593"/>
-            <a:satOff val="-41115"/>
-            <a:lumOff val="1513"/>
+            <a:hueOff val="0"/>
+            <a:satOff val="0"/>
+            <a:lumOff val="0"/>
             <a:alphaOff val="0"/>
           </a:schemeClr>
         </a:solidFill>
@@ -6250,15 +7005,15 @@
         </a:fontRef>
       </dsp:style>
     </dsp:sp>
-    <dsp:sp modelId="{48166FEA-9BEC-4A82-94BA-96137E37F782}">
+    <dsp:sp modelId="{12D15966-0A2C-4720-B5D6-B6AD87177C07}">
       <dsp:nvSpPr>
         <dsp:cNvPr id="0" name=""/>
         <dsp:cNvSpPr/>
       </dsp:nvSpPr>
       <dsp:spPr>
         <a:xfrm rot="17700000">
-          <a:off x="8850917" y="4569724"/>
-          <a:ext cx="1156092" cy="557424"/>
+          <a:off x="834737" y="3793784"/>
+          <a:ext cx="1262181" cy="608576"/>
         </a:xfrm>
         <a:prstGeom prst="rect">
           <a:avLst/>
@@ -6306,19 +7061,19 @@
         </a:p>
       </dsp:txBody>
       <dsp:txXfrm>
-        <a:off x="8850917" y="4569724"/>
-        <a:ext cx="1156092" cy="557424"/>
+        <a:off x="834737" y="3793784"/>
+        <a:ext cx="1262181" cy="608576"/>
       </dsp:txXfrm>
     </dsp:sp>
-    <dsp:sp modelId="{E71938D9-08E7-4775-9AB2-BD810D64D9FB}">
+    <dsp:sp modelId="{583D3A7D-F913-47E2-8016-8E409F0BCFCC}">
       <dsp:nvSpPr>
         <dsp:cNvPr id="0" name=""/>
         <dsp:cNvSpPr/>
       </dsp:nvSpPr>
       <dsp:spPr>
         <a:xfrm rot="17700000">
-          <a:off x="9574700" y="3016937"/>
-          <a:ext cx="1156092" cy="557424"/>
+          <a:off x="1624937" y="2098506"/>
+          <a:ext cx="1262181" cy="608576"/>
         </a:xfrm>
         <a:prstGeom prst="rect">
           <a:avLst/>
@@ -6342,24 +7097,24 @@
         <a:fontRef idx="minor"/>
       </dsp:style>
     </dsp:sp>
-    <dsp:sp modelId="{BB0E9E5E-35F1-49F8-B91A-624D17854DBD}">
+    <dsp:sp modelId="{AC0487C1-9396-4811-B9C3-FBCA0B57AAC1}">
       <dsp:nvSpPr>
         <dsp:cNvPr id="0" name=""/>
         <dsp:cNvSpPr/>
       </dsp:nvSpPr>
       <dsp:spPr>
         <a:xfrm>
-          <a:off x="10150767" y="3793024"/>
-          <a:ext cx="558037" cy="558037"/>
+          <a:off x="2253867" y="2945810"/>
+          <a:ext cx="609245" cy="609245"/>
         </a:xfrm>
         <a:prstGeom prst="ellipse">
           <a:avLst/>
         </a:prstGeom>
         <a:solidFill>
           <a:schemeClr val="accent4">
-            <a:hueOff val="10395692"/>
-            <a:satOff val="-47968"/>
-            <a:lumOff val="1765"/>
+            <a:hueOff val="1485099"/>
+            <a:satOff val="-6853"/>
+            <a:lumOff val="252"/>
             <a:alphaOff val="0"/>
           </a:schemeClr>
         </a:solidFill>
@@ -6392,15 +7147,15 @@
         </a:fontRef>
       </dsp:style>
     </dsp:sp>
-    <dsp:sp modelId="{EA332EF7-A428-44E5-8FC6-7838DAE85A7A}">
+    <dsp:sp modelId="{77133696-84FB-4A28-ADCD-CB59880B1347}">
       <dsp:nvSpPr>
         <dsp:cNvPr id="0" name=""/>
         <dsp:cNvSpPr/>
       </dsp:nvSpPr>
       <dsp:spPr>
         <a:xfrm rot="17700000">
-          <a:off x="9489848" y="4569724"/>
-          <a:ext cx="1156092" cy="557424"/>
+          <a:off x="1532299" y="3793784"/>
+          <a:ext cx="1262181" cy="608576"/>
         </a:xfrm>
         <a:prstGeom prst="rect">
           <a:avLst/>
@@ -6448,19 +7203,19 @@
         </a:p>
       </dsp:txBody>
       <dsp:txXfrm>
-        <a:off x="9489848" y="4569724"/>
-        <a:ext cx="1156092" cy="557424"/>
+        <a:off x="1532299" y="3793784"/>
+        <a:ext cx="1262181" cy="608576"/>
       </dsp:txXfrm>
     </dsp:sp>
-    <dsp:sp modelId="{868EDB69-232C-4315-B585-996F6BCF7B44}">
+    <dsp:sp modelId="{73ED2672-0EB6-4B12-8CE7-4F35614D4107}">
       <dsp:nvSpPr>
         <dsp:cNvPr id="0" name=""/>
         <dsp:cNvSpPr/>
       </dsp:nvSpPr>
       <dsp:spPr>
         <a:xfrm rot="17700000">
-          <a:off x="10213631" y="3016937"/>
-          <a:ext cx="1156092" cy="557424"/>
+          <a:off x="2322499" y="2098506"/>
+          <a:ext cx="1262181" cy="608576"/>
         </a:xfrm>
         <a:prstGeom prst="rect">
           <a:avLst/>
@@ -6484,18 +7239,6 @@
         <a:fontRef idx="minor"/>
       </dsp:style>
     </dsp:sp>
-  </dsp:spTree>
-</dsp:drawing>
-</file>
-
-<file path=ppt/diagrams/drawing3.xml><?xml version="1.0" encoding="utf-8"?>
-<dsp:drawing xmlns:dgm="http://schemas.openxmlformats.org/drawingml/2006/diagram" xmlns:dsp="http://schemas.microsoft.com/office/drawing/2008/diagram" xmlns:a="http://schemas.openxmlformats.org/drawingml/2006/main">
-  <dsp:spTree>
-    <dsp:nvGrpSpPr>
-      <dsp:cNvPr id="0" name=""/>
-      <dsp:cNvGrpSpPr/>
-    </dsp:nvGrpSpPr>
-    <dsp:grpSpPr/>
     <dsp:sp modelId="{D69C7994-67D1-4126-B06C-F46CF5C20439}">
       <dsp:nvSpPr>
         <dsp:cNvPr id="0" name=""/>
@@ -6503,8 +7246,8 @@
       </dsp:nvSpPr>
       <dsp:spPr>
         <a:xfrm>
-          <a:off x="1642" y="1776249"/>
-          <a:ext cx="1317930" cy="1317930"/>
+          <a:off x="2951523" y="2663563"/>
+          <a:ext cx="1173740" cy="1173740"/>
         </a:xfrm>
         <a:prstGeom prst="donut">
           <a:avLst>
@@ -6555,8 +7298,8 @@
       </dsp:nvSpPr>
       <dsp:spPr>
         <a:xfrm rot="17700000">
-          <a:off x="466021" y="701867"/>
-          <a:ext cx="1638333" cy="789550"/>
+          <a:off x="3365096" y="1706725"/>
+          <a:ext cx="1459089" cy="703168"/>
         </a:xfrm>
         <a:prstGeom prst="rect">
           <a:avLst/>
@@ -6610,8 +7353,8 @@
         </a:p>
       </dsp:txBody>
       <dsp:txXfrm>
-        <a:off x="466021" y="701867"/>
-        <a:ext cx="1638333" cy="789550"/>
+        <a:off x="3365096" y="1706725"/>
+        <a:ext cx="1459089" cy="703168"/>
       </dsp:txXfrm>
     </dsp:sp>
     <dsp:sp modelId="{6C4AF1A4-C618-4EE3-8A03-80A803CC22A3}">
@@ -6621,17 +7364,17 @@
       </dsp:nvSpPr>
       <dsp:spPr>
         <a:xfrm>
-          <a:off x="1418843" y="2093170"/>
-          <a:ext cx="684089" cy="684089"/>
+          <a:off x="4213673" y="2945810"/>
+          <a:ext cx="609245" cy="609245"/>
         </a:xfrm>
         <a:prstGeom prst="ellipse">
           <a:avLst/>
         </a:prstGeom>
         <a:solidFill>
           <a:schemeClr val="accent4">
-            <a:hueOff val="0"/>
-            <a:satOff val="0"/>
-            <a:lumOff val="0"/>
+            <a:hueOff val="2970198"/>
+            <a:satOff val="-13705"/>
+            <a:lumOff val="504"/>
             <a:alphaOff val="0"/>
           </a:schemeClr>
         </a:solidFill>
@@ -6671,8 +7414,8 @@
       </dsp:nvSpPr>
       <dsp:spPr>
         <a:xfrm rot="17700000">
-          <a:off x="608633" y="3045314"/>
-          <a:ext cx="1417235" cy="683337"/>
+          <a:off x="3492105" y="3793784"/>
+          <a:ext cx="1262181" cy="608576"/>
         </a:xfrm>
         <a:prstGeom prst="rect">
           <a:avLst/>
@@ -6696,12 +7439,12 @@
         <a:fontRef idx="minor"/>
       </dsp:style>
       <dsp:txBody>
-        <a:bodyPr spcFirstLastPara="0" vert="horz" wrap="square" lIns="0" tIns="0" rIns="33020" bIns="0" numCol="1" spcCol="1270" anchor="ctr" anchorCtr="0">
+        <a:bodyPr spcFirstLastPara="0" vert="horz" wrap="square" lIns="0" tIns="0" rIns="40640" bIns="0" numCol="1" spcCol="1270" anchor="ctr" anchorCtr="0">
           <a:noAutofit/>
         </a:bodyPr>
         <a:lstStyle/>
         <a:p>
-          <a:pPr lvl="0" algn="r" defTabSz="577850">
+          <a:pPr lvl="0" algn="r" defTabSz="711200">
             <a:lnSpc>
               <a:spcPct val="90000"/>
             </a:lnSpc>
@@ -6713,15 +7456,15 @@
             </a:spcAft>
           </a:pPr>
           <a:r>
-            <a:rPr lang="en-GB" sz="1300" kern="1200" dirty="0" smtClean="0"/>
+            <a:rPr lang="en-GB" sz="1600" kern="1200" dirty="0" smtClean="0"/>
             <a:t>Output image, labels</a:t>
           </a:r>
-          <a:endParaRPr lang="en-GB" sz="1300" kern="1200" dirty="0"/>
+          <a:endParaRPr lang="en-GB" sz="1600" kern="1200" dirty="0"/>
         </a:p>
       </dsp:txBody>
       <dsp:txXfrm>
-        <a:off x="608633" y="3045314"/>
-        <a:ext cx="1417235" cy="683337"/>
+        <a:off x="3492105" y="3793784"/>
+        <a:ext cx="1262181" cy="608576"/>
       </dsp:txXfrm>
     </dsp:sp>
     <dsp:sp modelId="{29575E4C-25C1-43B2-ADC9-9E7B70641132}">
@@ -6731,8 +7474,8 @@
       </dsp:nvSpPr>
       <dsp:spPr>
         <a:xfrm rot="17700000">
-          <a:off x="1495907" y="1141777"/>
-          <a:ext cx="1417235" cy="683337"/>
+          <a:off x="4282306" y="2098506"/>
+          <a:ext cx="1262181" cy="608576"/>
         </a:xfrm>
         <a:prstGeom prst="rect">
           <a:avLst/>
@@ -6763,17 +7506,17 @@
       </dsp:nvSpPr>
       <dsp:spPr>
         <a:xfrm>
-          <a:off x="2202098" y="2093170"/>
-          <a:ext cx="684089" cy="684089"/>
+          <a:off x="4911235" y="2945810"/>
+          <a:ext cx="609245" cy="609245"/>
         </a:xfrm>
         <a:prstGeom prst="ellipse">
           <a:avLst/>
         </a:prstGeom>
         <a:solidFill>
           <a:schemeClr val="accent4">
-            <a:hueOff val="2079139"/>
-            <a:satOff val="-9594"/>
-            <a:lumOff val="353"/>
+            <a:hueOff val="4455297"/>
+            <a:satOff val="-20558"/>
+            <a:lumOff val="756"/>
             <a:alphaOff val="0"/>
           </a:schemeClr>
         </a:solidFill>
@@ -6813,8 +7556,8 @@
       </dsp:nvSpPr>
       <dsp:spPr>
         <a:xfrm rot="17700000">
-          <a:off x="1391888" y="3045314"/>
-          <a:ext cx="1417235" cy="683337"/>
+          <a:off x="4189667" y="3793784"/>
+          <a:ext cx="1262181" cy="608576"/>
         </a:xfrm>
         <a:prstGeom prst="rect">
           <a:avLst/>
@@ -6838,12 +7581,12 @@
         <a:fontRef idx="minor"/>
       </dsp:style>
       <dsp:txBody>
-        <a:bodyPr spcFirstLastPara="0" vert="horz" wrap="square" lIns="0" tIns="0" rIns="33020" bIns="0" numCol="1" spcCol="1270" anchor="ctr" anchorCtr="0">
+        <a:bodyPr spcFirstLastPara="0" vert="horz" wrap="square" lIns="0" tIns="0" rIns="40640" bIns="0" numCol="1" spcCol="1270" anchor="ctr" anchorCtr="0">
           <a:noAutofit/>
         </a:bodyPr>
         <a:lstStyle/>
         <a:p>
-          <a:pPr lvl="0" algn="r" defTabSz="577850">
+          <a:pPr lvl="0" algn="r" defTabSz="711200">
             <a:lnSpc>
               <a:spcPct val="90000"/>
             </a:lnSpc>
@@ -6855,15 +7598,15 @@
             </a:spcAft>
           </a:pPr>
           <a:r>
-            <a:rPr lang="en-GB" sz="1300" kern="1200" dirty="0" smtClean="0"/>
+            <a:rPr lang="en-GB" sz="1600" kern="1200" dirty="0" smtClean="0"/>
             <a:t>Bounding box vector</a:t>
           </a:r>
-          <a:endParaRPr lang="en-GB" sz="1300" kern="1200" dirty="0"/>
+          <a:endParaRPr lang="en-GB" sz="1600" kern="1200" dirty="0"/>
         </a:p>
       </dsp:txBody>
       <dsp:txXfrm>
-        <a:off x="1391888" y="3045314"/>
-        <a:ext cx="1417235" cy="683337"/>
+        <a:off x="4189667" y="3793784"/>
+        <a:ext cx="1262181" cy="608576"/>
       </dsp:txXfrm>
     </dsp:sp>
     <dsp:sp modelId="{BEAAB3AD-B3C9-494A-944C-59B6057BC422}">
@@ -6873,8 +7616,8 @@
       </dsp:nvSpPr>
       <dsp:spPr>
         <a:xfrm rot="17700000">
-          <a:off x="2279162" y="1141777"/>
-          <a:ext cx="1417235" cy="683337"/>
+          <a:off x="4979868" y="2098506"/>
+          <a:ext cx="1262181" cy="608576"/>
         </a:xfrm>
         <a:prstGeom prst="rect">
           <a:avLst/>
@@ -6905,8 +7648,8 @@
       </dsp:nvSpPr>
       <dsp:spPr>
         <a:xfrm>
-          <a:off x="2985459" y="1776249"/>
-          <a:ext cx="1317930" cy="1317930"/>
+          <a:off x="5608891" y="2663563"/>
+          <a:ext cx="1173740" cy="1173740"/>
         </a:xfrm>
         <a:prstGeom prst="donut">
           <a:avLst>
@@ -6957,8 +7700,8 @@
       </dsp:nvSpPr>
       <dsp:spPr>
         <a:xfrm rot="17700000">
-          <a:off x="3449838" y="701867"/>
-          <a:ext cx="1638333" cy="789550"/>
+          <a:off x="6022464" y="1706725"/>
+          <a:ext cx="1459089" cy="703168"/>
         </a:xfrm>
         <a:prstGeom prst="rect">
           <a:avLst/>
@@ -7012,8 +7755,8 @@
         </a:p>
       </dsp:txBody>
       <dsp:txXfrm>
-        <a:off x="3449838" y="701867"/>
-        <a:ext cx="1638333" cy="789550"/>
+        <a:off x="6022464" y="1706725"/>
+        <a:ext cx="1459089" cy="703168"/>
       </dsp:txXfrm>
     </dsp:sp>
     <dsp:sp modelId="{9367CC29-33D8-4FD1-AA42-B42C2C0900F2}">
@@ -7023,17 +7766,17 @@
       </dsp:nvSpPr>
       <dsp:spPr>
         <a:xfrm>
-          <a:off x="4402660" y="2093170"/>
-          <a:ext cx="684089" cy="684089"/>
+          <a:off x="6871042" y="2945810"/>
+          <a:ext cx="609245" cy="609245"/>
         </a:xfrm>
         <a:prstGeom prst="ellipse">
           <a:avLst/>
         </a:prstGeom>
         <a:solidFill>
           <a:schemeClr val="accent4">
-            <a:hueOff val="4158277"/>
-            <a:satOff val="-19187"/>
-            <a:lumOff val="706"/>
+            <a:hueOff val="5940396"/>
+            <a:satOff val="-27410"/>
+            <a:lumOff val="1009"/>
             <a:alphaOff val="0"/>
           </a:schemeClr>
         </a:solidFill>
@@ -7073,8 +7816,8 @@
       </dsp:nvSpPr>
       <dsp:spPr>
         <a:xfrm rot="17700000">
-          <a:off x="3592450" y="3045314"/>
-          <a:ext cx="1417235" cy="683337"/>
+          <a:off x="6149474" y="3793784"/>
+          <a:ext cx="1262181" cy="608576"/>
         </a:xfrm>
         <a:prstGeom prst="rect">
           <a:avLst/>
@@ -7098,12 +7841,12 @@
         <a:fontRef idx="minor"/>
       </dsp:style>
       <dsp:txBody>
-        <a:bodyPr spcFirstLastPara="0" vert="horz" wrap="square" lIns="0" tIns="0" rIns="33020" bIns="0" numCol="1" spcCol="1270" anchor="ctr" anchorCtr="0">
+        <a:bodyPr spcFirstLastPara="0" vert="horz" wrap="square" lIns="0" tIns="0" rIns="35560" bIns="0" numCol="1" spcCol="1270" anchor="ctr" anchorCtr="0">
           <a:noAutofit/>
         </a:bodyPr>
         <a:lstStyle/>
         <a:p>
-          <a:pPr lvl="0" algn="r" defTabSz="577850">
+          <a:pPr lvl="0" algn="r" defTabSz="622300">
             <a:lnSpc>
               <a:spcPct val="90000"/>
             </a:lnSpc>
@@ -7115,15 +7858,15 @@
             </a:spcAft>
           </a:pPr>
           <a:r>
-            <a:rPr lang="en-GB" sz="1300" kern="1200" dirty="0" smtClean="0"/>
+            <a:rPr lang="en-GB" sz="1400" kern="1200" dirty="0" smtClean="0"/>
             <a:t>Bounding box vector</a:t>
           </a:r>
-          <a:endParaRPr lang="en-GB" sz="1300" kern="1200" dirty="0"/>
+          <a:endParaRPr lang="en-GB" sz="1400" kern="1200" dirty="0"/>
         </a:p>
       </dsp:txBody>
       <dsp:txXfrm>
-        <a:off x="3592450" y="3045314"/>
-        <a:ext cx="1417235" cy="683337"/>
+        <a:off x="6149474" y="3793784"/>
+        <a:ext cx="1262181" cy="608576"/>
       </dsp:txXfrm>
     </dsp:sp>
     <dsp:sp modelId="{C71E06D2-F9F7-4C4B-81A0-B5BF7480B84C}">
@@ -7133,8 +7876,8 @@
       </dsp:nvSpPr>
       <dsp:spPr>
         <a:xfrm rot="17700000">
-          <a:off x="4479723" y="1141777"/>
-          <a:ext cx="1417235" cy="683337"/>
+          <a:off x="6939674" y="2098506"/>
+          <a:ext cx="1262181" cy="608576"/>
         </a:xfrm>
         <a:prstGeom prst="rect">
           <a:avLst/>
@@ -7165,17 +7908,17 @@
       </dsp:nvSpPr>
       <dsp:spPr>
         <a:xfrm>
-          <a:off x="5185915" y="2093170"/>
-          <a:ext cx="684089" cy="684089"/>
+          <a:off x="7568604" y="2945810"/>
+          <a:ext cx="609245" cy="609245"/>
         </a:xfrm>
         <a:prstGeom prst="ellipse">
           <a:avLst/>
         </a:prstGeom>
         <a:solidFill>
           <a:schemeClr val="accent4">
-            <a:hueOff val="6237415"/>
-            <a:satOff val="-28781"/>
-            <a:lumOff val="1059"/>
+            <a:hueOff val="7425494"/>
+            <a:satOff val="-34263"/>
+            <a:lumOff val="1261"/>
             <a:alphaOff val="0"/>
           </a:schemeClr>
         </a:solidFill>
@@ -7215,8 +7958,8 @@
       </dsp:nvSpPr>
       <dsp:spPr>
         <a:xfrm rot="17700000">
-          <a:off x="4375705" y="3045314"/>
-          <a:ext cx="1417235" cy="683337"/>
+          <a:off x="6996915" y="3840623"/>
+          <a:ext cx="1262181" cy="608576"/>
         </a:xfrm>
         <a:prstGeom prst="rect">
           <a:avLst/>
@@ -7240,12 +7983,12 @@
         <a:fontRef idx="minor"/>
       </dsp:style>
       <dsp:txBody>
-        <a:bodyPr spcFirstLastPara="0" vert="horz" wrap="square" lIns="0" tIns="0" rIns="33020" bIns="0" numCol="1" spcCol="1270" anchor="ctr" anchorCtr="0">
+        <a:bodyPr spcFirstLastPara="0" vert="horz" wrap="square" lIns="0" tIns="0" rIns="35560" bIns="0" numCol="1" spcCol="1270" anchor="ctr" anchorCtr="0">
           <a:noAutofit/>
         </a:bodyPr>
         <a:lstStyle/>
         <a:p>
-          <a:pPr lvl="0" algn="r" defTabSz="577850">
+          <a:pPr lvl="0" algn="r" defTabSz="622300">
             <a:lnSpc>
               <a:spcPct val="90000"/>
             </a:lnSpc>
@@ -7257,15 +8000,15 @@
             </a:spcAft>
           </a:pPr>
           <a:r>
-            <a:rPr lang="en-GB" sz="1300" kern="1200" dirty="0" smtClean="0"/>
+            <a:rPr lang="en-GB" sz="1400" kern="1200" dirty="0" smtClean="0"/>
             <a:t>Bounding box validity, selected bounding box index</a:t>
           </a:r>
-          <a:endParaRPr lang="en-GB" sz="1300" kern="1200" dirty="0"/>
+          <a:endParaRPr lang="en-GB" sz="1400" kern="1200" dirty="0"/>
         </a:p>
       </dsp:txBody>
       <dsp:txXfrm>
-        <a:off x="4375705" y="3045314"/>
-        <a:ext cx="1417235" cy="683337"/>
+        <a:off x="6996915" y="3840623"/>
+        <a:ext cx="1262181" cy="608576"/>
       </dsp:txXfrm>
     </dsp:sp>
     <dsp:sp modelId="{69403BB5-4D42-424D-B70C-D011F3EDB6B0}">
@@ -7275,8 +8018,8 @@
       </dsp:nvSpPr>
       <dsp:spPr>
         <a:xfrm rot="17700000">
-          <a:off x="5262979" y="1141777"/>
-          <a:ext cx="1417235" cy="683337"/>
+          <a:off x="7637236" y="2098506"/>
+          <a:ext cx="1262181" cy="608576"/>
         </a:xfrm>
         <a:prstGeom prst="rect">
           <a:avLst/>
@@ -7307,8 +8050,8 @@
       </dsp:nvSpPr>
       <dsp:spPr>
         <a:xfrm>
-          <a:off x="5969275" y="1776249"/>
-          <a:ext cx="1317930" cy="1317930"/>
+          <a:off x="8266260" y="2663563"/>
+          <a:ext cx="1173740" cy="1173740"/>
         </a:xfrm>
         <a:prstGeom prst="donut">
           <a:avLst>
@@ -7359,8 +8102,8 @@
       </dsp:nvSpPr>
       <dsp:spPr>
         <a:xfrm rot="17700000">
-          <a:off x="6433654" y="701867"/>
-          <a:ext cx="1638333" cy="789550"/>
+          <a:off x="8679833" y="1706725"/>
+          <a:ext cx="1459089" cy="703168"/>
         </a:xfrm>
         <a:prstGeom prst="rect">
           <a:avLst/>
@@ -7414,8 +8157,8 @@
         </a:p>
       </dsp:txBody>
       <dsp:txXfrm>
-        <a:off x="6433654" y="701867"/>
-        <a:ext cx="1638333" cy="789550"/>
+        <a:off x="8679833" y="1706725"/>
+        <a:ext cx="1459089" cy="703168"/>
       </dsp:txXfrm>
     </dsp:sp>
     <dsp:sp modelId="{A9E52EBE-13BA-4B6A-B25D-203B758D84E9}">
@@ -7425,17 +8168,17 @@
       </dsp:nvSpPr>
       <dsp:spPr>
         <a:xfrm>
-          <a:off x="7386477" y="2093170"/>
-          <a:ext cx="684089" cy="684089"/>
+          <a:off x="9691384" y="2939183"/>
+          <a:ext cx="609245" cy="609245"/>
         </a:xfrm>
         <a:prstGeom prst="ellipse">
           <a:avLst/>
         </a:prstGeom>
         <a:solidFill>
           <a:schemeClr val="accent4">
-            <a:hueOff val="8316554"/>
-            <a:satOff val="-38374"/>
-            <a:lumOff val="1412"/>
+            <a:hueOff val="8910593"/>
+            <a:satOff val="-41115"/>
+            <a:lumOff val="1513"/>
             <a:alphaOff val="0"/>
           </a:schemeClr>
         </a:solidFill>
@@ -7475,8 +8218,8 @@
       </dsp:nvSpPr>
       <dsp:spPr>
         <a:xfrm rot="17700000">
-          <a:off x="6576267" y="3045314"/>
-          <a:ext cx="1417235" cy="683337"/>
+          <a:off x="8527973" y="3905255"/>
+          <a:ext cx="1889054" cy="880880"/>
         </a:xfrm>
         <a:prstGeom prst="rect">
           <a:avLst/>
@@ -7500,12 +8243,12 @@
         <a:fontRef idx="minor"/>
       </dsp:style>
       <dsp:txBody>
-        <a:bodyPr spcFirstLastPara="0" vert="horz" wrap="square" lIns="0" tIns="0" rIns="33020" bIns="0" numCol="1" spcCol="1270" anchor="ctr" anchorCtr="0">
+        <a:bodyPr spcFirstLastPara="0" vert="horz" wrap="square" lIns="0" tIns="0" rIns="35560" bIns="0" numCol="1" spcCol="1270" anchor="ctr" anchorCtr="0">
           <a:noAutofit/>
         </a:bodyPr>
         <a:lstStyle/>
         <a:p>
-          <a:pPr lvl="0" algn="r" defTabSz="577850">
+          <a:pPr lvl="0" algn="r" defTabSz="622300">
             <a:lnSpc>
               <a:spcPct val="90000"/>
             </a:lnSpc>
@@ -7517,15 +8260,15 @@
             </a:spcAft>
           </a:pPr>
           <a:r>
-            <a:rPr lang="en-GB" sz="1300" kern="1200" dirty="0" smtClean="0"/>
+            <a:rPr lang="en-GB" sz="1400" kern="1200" dirty="0" smtClean="0"/>
             <a:t>Filenames, output image, bounding box vector, selected bounding box</a:t>
           </a:r>
-          <a:endParaRPr lang="en-GB" sz="1300" kern="1200" dirty="0"/>
+          <a:endParaRPr lang="en-GB" sz="1400" kern="1200" dirty="0"/>
         </a:p>
       </dsp:txBody>
       <dsp:txXfrm>
-        <a:off x="6576267" y="3045314"/>
-        <a:ext cx="1417235" cy="683337"/>
+        <a:off x="8527973" y="3905255"/>
+        <a:ext cx="1889054" cy="880880"/>
       </dsp:txXfrm>
     </dsp:sp>
     <dsp:sp modelId="{6F4CAF73-6FA6-44A5-9B5E-8C132110D9F4}">
@@ -7535,8 +8278,8 @@
       </dsp:nvSpPr>
       <dsp:spPr>
         <a:xfrm rot="17700000">
-          <a:off x="7463540" y="1141777"/>
-          <a:ext cx="1417235" cy="683337"/>
+          <a:off x="9852902" y="1586193"/>
+          <a:ext cx="1262181" cy="608576"/>
         </a:xfrm>
         <a:prstGeom prst="rect">
           <a:avLst/>
@@ -7567,8 +8310,8 @@
       </dsp:nvSpPr>
       <dsp:spPr>
         <a:xfrm>
-          <a:off x="8169732" y="2093170"/>
-          <a:ext cx="684089" cy="684089"/>
+          <a:off x="10481832" y="2945810"/>
+          <a:ext cx="609245" cy="609245"/>
         </a:xfrm>
         <a:prstGeom prst="ellipse">
           <a:avLst/>
@@ -7617,8 +8360,8 @@
       </dsp:nvSpPr>
       <dsp:spPr>
         <a:xfrm rot="17700000">
-          <a:off x="7359522" y="3045314"/>
-          <a:ext cx="1417235" cy="683337"/>
+          <a:off x="9833001" y="3811059"/>
+          <a:ext cx="1262181" cy="608576"/>
         </a:xfrm>
         <a:prstGeom prst="rect">
           <a:avLst/>
@@ -7642,12 +8385,12 @@
         <a:fontRef idx="minor"/>
       </dsp:style>
       <dsp:txBody>
-        <a:bodyPr spcFirstLastPara="0" vert="horz" wrap="square" lIns="0" tIns="0" rIns="33020" bIns="0" numCol="1" spcCol="1270" anchor="ctr" anchorCtr="0">
+        <a:bodyPr spcFirstLastPara="0" vert="horz" wrap="square" lIns="0" tIns="0" rIns="35560" bIns="0" numCol="1" spcCol="1270" anchor="ctr" anchorCtr="0">
           <a:noAutofit/>
         </a:bodyPr>
         <a:lstStyle/>
         <a:p>
-          <a:pPr lvl="0" algn="r" defTabSz="577850">
+          <a:pPr lvl="0" algn="r" defTabSz="622300">
             <a:lnSpc>
               <a:spcPct val="90000"/>
             </a:lnSpc>
@@ -7659,15 +8402,15 @@
             </a:spcAft>
           </a:pPr>
           <a:r>
-            <a:rPr lang="en-GB" sz="1300" kern="1200" dirty="0" smtClean="0"/>
+            <a:rPr lang="en-GB" sz="1400" kern="1200" dirty="0" smtClean="0"/>
             <a:t>Difference image (.bin.png) generated</a:t>
           </a:r>
-          <a:endParaRPr lang="en-GB" sz="1300" kern="1200" dirty="0"/>
+          <a:endParaRPr lang="en-GB" sz="1400" kern="1200" dirty="0"/>
         </a:p>
       </dsp:txBody>
       <dsp:txXfrm>
-        <a:off x="7359522" y="3045314"/>
-        <a:ext cx="1417235" cy="683337"/>
+        <a:off x="9833001" y="3811059"/>
+        <a:ext cx="1262181" cy="608576"/>
       </dsp:txXfrm>
     </dsp:sp>
     <dsp:sp modelId="{23A07CBD-914B-4535-B3C9-BAC415629FCF}">
@@ -7677,8 +8420,8 @@
       </dsp:nvSpPr>
       <dsp:spPr>
         <a:xfrm rot="17700000">
-          <a:off x="8246795" y="1141777"/>
-          <a:ext cx="1417235" cy="683337"/>
+          <a:off x="10550464" y="2098506"/>
+          <a:ext cx="1262181" cy="608576"/>
         </a:xfrm>
         <a:prstGeom prst="rect">
           <a:avLst/>
@@ -16472,19 +17215,19 @@
       </p:grpSpPr>
       <p:graphicFrame>
         <p:nvGraphicFramePr>
-          <p:cNvPr id="4" name="Diagram 3"/>
+          <p:cNvPr id="2" name="Diagram 1"/>
           <p:cNvGraphicFramePr/>
           <p:nvPr>
             <p:extLst>
               <p:ext uri="{D42A27DB-BD31-4B8C-83A1-F6EECF244321}">
-                <p14:modId xmlns:p14="http://schemas.microsoft.com/office/powerpoint/2010/main" val="345414140"/>
+                <p14:modId xmlns:p14="http://schemas.microsoft.com/office/powerpoint/2010/main" val="2103893687"/>
               </p:ext>
             </p:extLst>
           </p:nvPr>
         </p:nvGraphicFramePr>
         <p:xfrm>
-          <a:off x="197706" y="0"/>
-          <a:ext cx="11994294" cy="5494638"/>
+          <a:off x="495299" y="-142875"/>
+          <a:ext cx="11306175" cy="6496050"/>
         </p:xfrm>
         <a:graphic>
           <a:graphicData uri="http://schemas.openxmlformats.org/drawingml/2006/diagram">
@@ -16532,14 +17275,14 @@
             <p:ph idx="1"/>
             <p:extLst>
               <p:ext uri="{D42A27DB-BD31-4B8C-83A1-F6EECF244321}">
-                <p14:modId xmlns:p14="http://schemas.microsoft.com/office/powerpoint/2010/main" val="2994905785"/>
+                <p14:modId xmlns:p14="http://schemas.microsoft.com/office/powerpoint/2010/main" val="1974234152"/>
               </p:ext>
             </p:extLst>
           </p:nvPr>
         </p:nvGraphicFramePr>
         <p:xfrm>
-          <a:off x="1546655" y="804132"/>
-          <a:ext cx="9566188" cy="4360991"/>
+          <a:off x="466724" y="804132"/>
+          <a:ext cx="11725276" cy="5558568"/>
         </p:xfrm>
         <a:graphic>
           <a:graphicData uri="http://schemas.openxmlformats.org/drawingml/2006/diagram">

</xml_diff>